<commit_message>
move crd to admin slide deck - fix #194
</commit_message>
<xml_diff>
--- a/kubernetes/09_ingress.pptx
+++ b/kubernetes/09_ingress.pptx
@@ -5,10 +5,10 @@
     <p:sldMasterId id="2147483733" r:id="rId1"/>
   </p:sldMasterIdLst>
   <p:notesMasterIdLst>
-    <p:notesMasterId r:id="rId20"/>
+    <p:notesMasterId r:id="rId17"/>
   </p:notesMasterIdLst>
   <p:handoutMasterIdLst>
-    <p:handoutMasterId r:id="rId21"/>
+    <p:handoutMasterId r:id="rId18"/>
   </p:handoutMasterIdLst>
   <p:sldIdLst>
     <p:sldId id="433" r:id="rId2"/>
@@ -25,10 +25,7 @@
     <p:sldId id="459" r:id="rId13"/>
     <p:sldId id="462" r:id="rId14"/>
     <p:sldId id="450" r:id="rId15"/>
-    <p:sldId id="452" r:id="rId16"/>
-    <p:sldId id="453" r:id="rId17"/>
-    <p:sldId id="463" r:id="rId18"/>
-    <p:sldId id="265" r:id="rId19"/>
+    <p:sldId id="265" r:id="rId16"/>
   </p:sldIdLst>
   <p:sldSz cx="12195175" cy="6858000"/>
   <p:notesSz cx="6858000" cy="9144000"/>
@@ -204,2631 +201,6 @@
 </p:presentation>
 </file>
 
-<file path=ppt/diagrams/colors1.xml><?xml version="1.0" encoding="utf-8"?>
-<dgm:colorsDef xmlns:dgm="http://schemas.openxmlformats.org/drawingml/2006/diagram" xmlns:a="http://schemas.openxmlformats.org/drawingml/2006/main" uniqueId="urn:microsoft.com/office/officeart/2005/8/colors/accent0_1">
-  <dgm:title val=""/>
-  <dgm:desc val=""/>
-  <dgm:catLst>
-    <dgm:cat type="mainScheme" pri="10100"/>
-  </dgm:catLst>
-  <dgm:styleLbl name="node0">
-    <dgm:fillClrLst meth="repeat">
-      <a:schemeClr val="lt1"/>
-    </dgm:fillClrLst>
-    <dgm:linClrLst meth="repeat">
-      <a:schemeClr val="dk1">
-        <a:shade val="80000"/>
-      </a:schemeClr>
-    </dgm:linClrLst>
-    <dgm:effectClrLst/>
-    <dgm:txLinClrLst/>
-    <dgm:txFillClrLst meth="repeat">
-      <a:schemeClr val="dk1"/>
-    </dgm:txFillClrLst>
-    <dgm:txEffectClrLst/>
-  </dgm:styleLbl>
-  <dgm:styleLbl name="node1">
-    <dgm:fillClrLst meth="repeat">
-      <a:schemeClr val="lt1"/>
-    </dgm:fillClrLst>
-    <dgm:linClrLst meth="repeat">
-      <a:schemeClr val="dk1">
-        <a:shade val="80000"/>
-      </a:schemeClr>
-    </dgm:linClrLst>
-    <dgm:effectClrLst/>
-    <dgm:txLinClrLst/>
-    <dgm:txFillClrLst meth="repeat">
-      <a:schemeClr val="dk1"/>
-    </dgm:txFillClrLst>
-    <dgm:txEffectClrLst/>
-  </dgm:styleLbl>
-  <dgm:styleLbl name="alignNode1">
-    <dgm:fillClrLst meth="repeat">
-      <a:schemeClr val="lt1"/>
-    </dgm:fillClrLst>
-    <dgm:linClrLst meth="repeat">
-      <a:schemeClr val="dk1">
-        <a:shade val="80000"/>
-      </a:schemeClr>
-    </dgm:linClrLst>
-    <dgm:effectClrLst/>
-    <dgm:txLinClrLst/>
-    <dgm:txFillClrLst meth="repeat">
-      <a:schemeClr val="dk1"/>
-    </dgm:txFillClrLst>
-    <dgm:txEffectClrLst/>
-  </dgm:styleLbl>
-  <dgm:styleLbl name="lnNode1">
-    <dgm:fillClrLst meth="repeat">
-      <a:schemeClr val="lt1"/>
-    </dgm:fillClrLst>
-    <dgm:linClrLst meth="repeat">
-      <a:schemeClr val="dk1">
-        <a:shade val="80000"/>
-      </a:schemeClr>
-    </dgm:linClrLst>
-    <dgm:effectClrLst/>
-    <dgm:txLinClrLst/>
-    <dgm:txFillClrLst meth="repeat">
-      <a:schemeClr val="dk1"/>
-    </dgm:txFillClrLst>
-    <dgm:txEffectClrLst/>
-  </dgm:styleLbl>
-  <dgm:styleLbl name="vennNode1">
-    <dgm:fillClrLst meth="repeat">
-      <a:schemeClr val="lt1">
-        <a:alpha val="50000"/>
-      </a:schemeClr>
-    </dgm:fillClrLst>
-    <dgm:linClrLst meth="repeat">
-      <a:schemeClr val="dk1">
-        <a:shade val="80000"/>
-      </a:schemeClr>
-    </dgm:linClrLst>
-    <dgm:effectClrLst/>
-    <dgm:txLinClrLst/>
-    <dgm:txFillClrLst/>
-    <dgm:txEffectClrLst/>
-  </dgm:styleLbl>
-  <dgm:styleLbl name="node2">
-    <dgm:fillClrLst meth="repeat">
-      <a:schemeClr val="lt1"/>
-    </dgm:fillClrLst>
-    <dgm:linClrLst meth="repeat">
-      <a:schemeClr val="dk1">
-        <a:shade val="80000"/>
-      </a:schemeClr>
-    </dgm:linClrLst>
-    <dgm:effectClrLst/>
-    <dgm:txLinClrLst/>
-    <dgm:txFillClrLst meth="repeat">
-      <a:schemeClr val="dk1"/>
-    </dgm:txFillClrLst>
-    <dgm:txEffectClrLst/>
-  </dgm:styleLbl>
-  <dgm:styleLbl name="node3">
-    <dgm:fillClrLst meth="repeat">
-      <a:schemeClr val="lt1"/>
-    </dgm:fillClrLst>
-    <dgm:linClrLst meth="repeat">
-      <a:schemeClr val="dk1">
-        <a:shade val="80000"/>
-      </a:schemeClr>
-    </dgm:linClrLst>
-    <dgm:effectClrLst/>
-    <dgm:txLinClrLst/>
-    <dgm:txFillClrLst meth="repeat">
-      <a:schemeClr val="dk1"/>
-    </dgm:txFillClrLst>
-    <dgm:txEffectClrLst/>
-  </dgm:styleLbl>
-  <dgm:styleLbl name="node4">
-    <dgm:fillClrLst meth="repeat">
-      <a:schemeClr val="lt1"/>
-    </dgm:fillClrLst>
-    <dgm:linClrLst meth="repeat">
-      <a:schemeClr val="dk1">
-        <a:shade val="80000"/>
-      </a:schemeClr>
-    </dgm:linClrLst>
-    <dgm:effectClrLst/>
-    <dgm:txLinClrLst/>
-    <dgm:txFillClrLst meth="repeat">
-      <a:schemeClr val="dk1"/>
-    </dgm:txFillClrLst>
-    <dgm:txEffectClrLst/>
-  </dgm:styleLbl>
-  <dgm:styleLbl name="fgImgPlace1">
-    <dgm:fillClrLst meth="repeat">
-      <a:schemeClr val="dk1">
-        <a:tint val="40000"/>
-      </a:schemeClr>
-    </dgm:fillClrLst>
-    <dgm:linClrLst meth="repeat">
-      <a:schemeClr val="dk1">
-        <a:shade val="80000"/>
-      </a:schemeClr>
-    </dgm:linClrLst>
-    <dgm:effectClrLst/>
-    <dgm:txLinClrLst/>
-    <dgm:txFillClrLst meth="repeat">
-      <a:schemeClr val="lt1"/>
-    </dgm:txFillClrLst>
-    <dgm:txEffectClrLst/>
-  </dgm:styleLbl>
-  <dgm:styleLbl name="alignImgPlace1">
-    <dgm:fillClrLst meth="repeat">
-      <a:schemeClr val="dk1">
-        <a:tint val="40000"/>
-      </a:schemeClr>
-    </dgm:fillClrLst>
-    <dgm:linClrLst meth="repeat">
-      <a:schemeClr val="dk1">
-        <a:shade val="80000"/>
-      </a:schemeClr>
-    </dgm:linClrLst>
-    <dgm:effectClrLst/>
-    <dgm:txLinClrLst/>
-    <dgm:txFillClrLst meth="repeat">
-      <a:schemeClr val="lt1"/>
-    </dgm:txFillClrLst>
-    <dgm:txEffectClrLst/>
-  </dgm:styleLbl>
-  <dgm:styleLbl name="bgImgPlace1">
-    <dgm:fillClrLst meth="repeat">
-      <a:schemeClr val="dk1">
-        <a:tint val="40000"/>
-      </a:schemeClr>
-    </dgm:fillClrLst>
-    <dgm:linClrLst meth="repeat">
-      <a:schemeClr val="dk1">
-        <a:shade val="80000"/>
-      </a:schemeClr>
-    </dgm:linClrLst>
-    <dgm:effectClrLst/>
-    <dgm:txLinClrLst/>
-    <dgm:txFillClrLst meth="repeat">
-      <a:schemeClr val="lt1"/>
-    </dgm:txFillClrLst>
-    <dgm:txEffectClrLst/>
-  </dgm:styleLbl>
-  <dgm:styleLbl name="sibTrans2D1">
-    <dgm:fillClrLst meth="repeat">
-      <a:schemeClr val="dk1">
-        <a:tint val="60000"/>
-      </a:schemeClr>
-    </dgm:fillClrLst>
-    <dgm:linClrLst meth="repeat">
-      <a:schemeClr val="dk1">
-        <a:tint val="60000"/>
-      </a:schemeClr>
-    </dgm:linClrLst>
-    <dgm:effectClrLst/>
-    <dgm:txLinClrLst/>
-    <dgm:txFillClrLst meth="repeat">
-      <a:schemeClr val="dk1"/>
-    </dgm:txFillClrLst>
-    <dgm:txEffectClrLst/>
-  </dgm:styleLbl>
-  <dgm:styleLbl name="fgSibTrans2D1">
-    <dgm:fillClrLst meth="repeat">
-      <a:schemeClr val="dk1">
-        <a:tint val="60000"/>
-      </a:schemeClr>
-    </dgm:fillClrLst>
-    <dgm:linClrLst meth="repeat">
-      <a:schemeClr val="dk1">
-        <a:tint val="60000"/>
-      </a:schemeClr>
-    </dgm:linClrLst>
-    <dgm:effectClrLst/>
-    <dgm:txLinClrLst/>
-    <dgm:txFillClrLst meth="repeat">
-      <a:schemeClr val="dk1"/>
-    </dgm:txFillClrLst>
-    <dgm:txEffectClrLst/>
-  </dgm:styleLbl>
-  <dgm:styleLbl name="bgSibTrans2D1">
-    <dgm:fillClrLst meth="repeat">
-      <a:schemeClr val="dk1">
-        <a:tint val="60000"/>
-      </a:schemeClr>
-    </dgm:fillClrLst>
-    <dgm:linClrLst meth="repeat">
-      <a:schemeClr val="dk1">
-        <a:tint val="60000"/>
-      </a:schemeClr>
-    </dgm:linClrLst>
-    <dgm:effectClrLst/>
-    <dgm:txLinClrLst/>
-    <dgm:txFillClrLst meth="repeat">
-      <a:schemeClr val="dk1"/>
-    </dgm:txFillClrLst>
-    <dgm:txEffectClrLst/>
-  </dgm:styleLbl>
-  <dgm:styleLbl name="sibTrans1D1">
-    <dgm:fillClrLst meth="repeat">
-      <a:schemeClr val="dk1"/>
-    </dgm:fillClrLst>
-    <dgm:linClrLst meth="repeat">
-      <a:schemeClr val="dk1"/>
-    </dgm:linClrLst>
-    <dgm:effectClrLst/>
-    <dgm:txLinClrLst/>
-    <dgm:txFillClrLst meth="repeat">
-      <a:schemeClr val="tx1"/>
-    </dgm:txFillClrLst>
-    <dgm:txEffectClrLst/>
-  </dgm:styleLbl>
-  <dgm:styleLbl name="callout">
-    <dgm:fillClrLst meth="repeat">
-      <a:schemeClr val="dk1"/>
-    </dgm:fillClrLst>
-    <dgm:linClrLst meth="repeat">
-      <a:schemeClr val="dk1"/>
-    </dgm:linClrLst>
-    <dgm:effectClrLst/>
-    <dgm:txLinClrLst/>
-    <dgm:txFillClrLst meth="repeat">
-      <a:schemeClr val="tx1"/>
-    </dgm:txFillClrLst>
-    <dgm:txEffectClrLst/>
-  </dgm:styleLbl>
-  <dgm:styleLbl name="asst0">
-    <dgm:fillClrLst meth="repeat">
-      <a:schemeClr val="lt1"/>
-    </dgm:fillClrLst>
-    <dgm:linClrLst meth="repeat">
-      <a:schemeClr val="dk1">
-        <a:shade val="80000"/>
-      </a:schemeClr>
-    </dgm:linClrLst>
-    <dgm:effectClrLst/>
-    <dgm:txLinClrLst/>
-    <dgm:txFillClrLst meth="repeat">
-      <a:schemeClr val="dk1"/>
-    </dgm:txFillClrLst>
-    <dgm:txEffectClrLst/>
-  </dgm:styleLbl>
-  <dgm:styleLbl name="asst1">
-    <dgm:fillClrLst meth="repeat">
-      <a:schemeClr val="lt1"/>
-    </dgm:fillClrLst>
-    <dgm:linClrLst meth="repeat">
-      <a:schemeClr val="dk1">
-        <a:shade val="80000"/>
-      </a:schemeClr>
-    </dgm:linClrLst>
-    <dgm:effectClrLst/>
-    <dgm:txLinClrLst/>
-    <dgm:txFillClrLst meth="repeat">
-      <a:schemeClr val="dk1"/>
-    </dgm:txFillClrLst>
-    <dgm:txEffectClrLst/>
-  </dgm:styleLbl>
-  <dgm:styleLbl name="asst2">
-    <dgm:fillClrLst meth="repeat">
-      <a:schemeClr val="lt1"/>
-    </dgm:fillClrLst>
-    <dgm:linClrLst meth="repeat">
-      <a:schemeClr val="dk1">
-        <a:shade val="80000"/>
-      </a:schemeClr>
-    </dgm:linClrLst>
-    <dgm:effectClrLst/>
-    <dgm:txLinClrLst/>
-    <dgm:txFillClrLst meth="repeat">
-      <a:schemeClr val="dk1"/>
-    </dgm:txFillClrLst>
-    <dgm:txEffectClrLst/>
-  </dgm:styleLbl>
-  <dgm:styleLbl name="asst3">
-    <dgm:fillClrLst meth="repeat">
-      <a:schemeClr val="lt1"/>
-    </dgm:fillClrLst>
-    <dgm:linClrLst meth="repeat">
-      <a:schemeClr val="dk1">
-        <a:shade val="80000"/>
-      </a:schemeClr>
-    </dgm:linClrLst>
-    <dgm:effectClrLst/>
-    <dgm:txLinClrLst/>
-    <dgm:txFillClrLst meth="repeat">
-      <a:schemeClr val="dk1"/>
-    </dgm:txFillClrLst>
-    <dgm:txEffectClrLst/>
-  </dgm:styleLbl>
-  <dgm:styleLbl name="asst4">
-    <dgm:fillClrLst meth="repeat">
-      <a:schemeClr val="lt1"/>
-    </dgm:fillClrLst>
-    <dgm:linClrLst meth="repeat">
-      <a:schemeClr val="dk1">
-        <a:shade val="80000"/>
-      </a:schemeClr>
-    </dgm:linClrLst>
-    <dgm:effectClrLst/>
-    <dgm:txLinClrLst/>
-    <dgm:txFillClrLst meth="repeat">
-      <a:schemeClr val="dk1"/>
-    </dgm:txFillClrLst>
-    <dgm:txEffectClrLst/>
-  </dgm:styleLbl>
-  <dgm:styleLbl name="parChTrans2D1">
-    <dgm:fillClrLst meth="repeat">
-      <a:schemeClr val="dk1">
-        <a:tint val="60000"/>
-      </a:schemeClr>
-    </dgm:fillClrLst>
-    <dgm:linClrLst meth="repeat">
-      <a:schemeClr val="dk1">
-        <a:tint val="60000"/>
-      </a:schemeClr>
-    </dgm:linClrLst>
-    <dgm:effectClrLst/>
-    <dgm:txLinClrLst/>
-    <dgm:txFillClrLst/>
-    <dgm:txEffectClrLst/>
-  </dgm:styleLbl>
-  <dgm:styleLbl name="parChTrans2D2">
-    <dgm:fillClrLst meth="repeat">
-      <a:schemeClr val="dk1"/>
-    </dgm:fillClrLst>
-    <dgm:linClrLst meth="repeat">
-      <a:schemeClr val="dk1"/>
-    </dgm:linClrLst>
-    <dgm:effectClrLst/>
-    <dgm:txLinClrLst/>
-    <dgm:txFillClrLst/>
-    <dgm:txEffectClrLst/>
-  </dgm:styleLbl>
-  <dgm:styleLbl name="parChTrans2D3">
-    <dgm:fillClrLst meth="repeat">
-      <a:schemeClr val="dk1"/>
-    </dgm:fillClrLst>
-    <dgm:linClrLst meth="repeat">
-      <a:schemeClr val="dk1"/>
-    </dgm:linClrLst>
-    <dgm:effectClrLst/>
-    <dgm:txLinClrLst/>
-    <dgm:txFillClrLst/>
-    <dgm:txEffectClrLst/>
-  </dgm:styleLbl>
-  <dgm:styleLbl name="parChTrans2D4">
-    <dgm:fillClrLst meth="repeat">
-      <a:schemeClr val="dk1"/>
-    </dgm:fillClrLst>
-    <dgm:linClrLst meth="repeat">
-      <a:schemeClr val="dk1"/>
-    </dgm:linClrLst>
-    <dgm:effectClrLst/>
-    <dgm:txLinClrLst/>
-    <dgm:txFillClrLst meth="repeat">
-      <a:schemeClr val="lt1"/>
-    </dgm:txFillClrLst>
-    <dgm:txEffectClrLst/>
-  </dgm:styleLbl>
-  <dgm:styleLbl name="parChTrans1D1">
-    <dgm:fillClrLst meth="repeat">
-      <a:schemeClr val="dk1"/>
-    </dgm:fillClrLst>
-    <dgm:linClrLst meth="repeat">
-      <a:schemeClr val="dk1">
-        <a:shade val="60000"/>
-      </a:schemeClr>
-    </dgm:linClrLst>
-    <dgm:effectClrLst/>
-    <dgm:txLinClrLst/>
-    <dgm:txFillClrLst meth="repeat">
-      <a:schemeClr val="tx1"/>
-    </dgm:txFillClrLst>
-    <dgm:txEffectClrLst/>
-  </dgm:styleLbl>
-  <dgm:styleLbl name="parChTrans1D2">
-    <dgm:fillClrLst meth="repeat">
-      <a:schemeClr val="dk1"/>
-    </dgm:fillClrLst>
-    <dgm:linClrLst meth="repeat">
-      <a:schemeClr val="dk1">
-        <a:shade val="60000"/>
-      </a:schemeClr>
-    </dgm:linClrLst>
-    <dgm:effectClrLst/>
-    <dgm:txLinClrLst/>
-    <dgm:txFillClrLst meth="repeat">
-      <a:schemeClr val="tx1"/>
-    </dgm:txFillClrLst>
-    <dgm:txEffectClrLst/>
-  </dgm:styleLbl>
-  <dgm:styleLbl name="parChTrans1D3">
-    <dgm:fillClrLst meth="repeat">
-      <a:schemeClr val="dk1"/>
-    </dgm:fillClrLst>
-    <dgm:linClrLst meth="repeat">
-      <a:schemeClr val="dk1">
-        <a:shade val="80000"/>
-      </a:schemeClr>
-    </dgm:linClrLst>
-    <dgm:effectClrLst/>
-    <dgm:txLinClrLst/>
-    <dgm:txFillClrLst meth="repeat">
-      <a:schemeClr val="tx1"/>
-    </dgm:txFillClrLst>
-    <dgm:txEffectClrLst/>
-  </dgm:styleLbl>
-  <dgm:styleLbl name="parChTrans1D4">
-    <dgm:fillClrLst meth="repeat">
-      <a:schemeClr val="dk1"/>
-    </dgm:fillClrLst>
-    <dgm:linClrLst meth="repeat">
-      <a:schemeClr val="dk1">
-        <a:shade val="80000"/>
-      </a:schemeClr>
-    </dgm:linClrLst>
-    <dgm:effectClrLst/>
-    <dgm:txLinClrLst/>
-    <dgm:txFillClrLst meth="repeat">
-      <a:schemeClr val="tx1"/>
-    </dgm:txFillClrLst>
-    <dgm:txEffectClrLst/>
-  </dgm:styleLbl>
-  <dgm:styleLbl name="fgAcc1">
-    <dgm:fillClrLst meth="repeat">
-      <a:schemeClr val="dk1">
-        <a:alpha val="90000"/>
-        <a:tint val="40000"/>
-      </a:schemeClr>
-    </dgm:fillClrLst>
-    <dgm:linClrLst meth="repeat">
-      <a:schemeClr val="dk1"/>
-    </dgm:linClrLst>
-    <dgm:effectClrLst/>
-    <dgm:txLinClrLst/>
-    <dgm:txFillClrLst meth="repeat">
-      <a:schemeClr val="dk1"/>
-    </dgm:txFillClrLst>
-    <dgm:txEffectClrLst/>
-  </dgm:styleLbl>
-  <dgm:styleLbl name="conFgAcc1">
-    <dgm:fillClrLst meth="repeat">
-      <a:schemeClr val="dk1">
-        <a:alpha val="90000"/>
-        <a:tint val="40000"/>
-      </a:schemeClr>
-    </dgm:fillClrLst>
-    <dgm:linClrLst meth="repeat">
-      <a:schemeClr val="dk1"/>
-    </dgm:linClrLst>
-    <dgm:effectClrLst/>
-    <dgm:txLinClrLst/>
-    <dgm:txFillClrLst meth="repeat">
-      <a:schemeClr val="dk1"/>
-    </dgm:txFillClrLst>
-    <dgm:txEffectClrLst/>
-  </dgm:styleLbl>
-  <dgm:styleLbl name="alignAcc1">
-    <dgm:fillClrLst meth="repeat">
-      <a:schemeClr val="dk1">
-        <a:alpha val="90000"/>
-        <a:tint val="40000"/>
-      </a:schemeClr>
-    </dgm:fillClrLst>
-    <dgm:linClrLst meth="repeat">
-      <a:schemeClr val="dk1"/>
-    </dgm:linClrLst>
-    <dgm:effectClrLst/>
-    <dgm:txLinClrLst/>
-    <dgm:txFillClrLst meth="repeat">
-      <a:schemeClr val="dk1"/>
-    </dgm:txFillClrLst>
-    <dgm:txEffectClrLst/>
-  </dgm:styleLbl>
-  <dgm:styleLbl name="trAlignAcc1">
-    <dgm:fillClrLst meth="repeat">
-      <a:schemeClr val="dk1">
-        <a:alpha val="40000"/>
-        <a:tint val="40000"/>
-      </a:schemeClr>
-    </dgm:fillClrLst>
-    <dgm:linClrLst meth="repeat">
-      <a:schemeClr val="dk1"/>
-    </dgm:linClrLst>
-    <dgm:effectClrLst/>
-    <dgm:txLinClrLst/>
-    <dgm:txFillClrLst meth="repeat">
-      <a:schemeClr val="dk1"/>
-    </dgm:txFillClrLst>
-    <dgm:txEffectClrLst/>
-  </dgm:styleLbl>
-  <dgm:styleLbl name="bgAcc1">
-    <dgm:fillClrLst meth="repeat">
-      <a:schemeClr val="dk1">
-        <a:alpha val="90000"/>
-        <a:tint val="40000"/>
-      </a:schemeClr>
-    </dgm:fillClrLst>
-    <dgm:linClrLst meth="repeat">
-      <a:schemeClr val="dk1"/>
-    </dgm:linClrLst>
-    <dgm:effectClrLst/>
-    <dgm:txLinClrLst/>
-    <dgm:txFillClrLst meth="repeat">
-      <a:schemeClr val="dk1"/>
-    </dgm:txFillClrLst>
-    <dgm:txEffectClrLst/>
-  </dgm:styleLbl>
-  <dgm:styleLbl name="solidFgAcc1">
-    <dgm:fillClrLst meth="repeat">
-      <a:schemeClr val="lt1"/>
-    </dgm:fillClrLst>
-    <dgm:linClrLst meth="repeat">
-      <a:schemeClr val="dk1"/>
-    </dgm:linClrLst>
-    <dgm:effectClrLst/>
-    <dgm:txLinClrLst/>
-    <dgm:txFillClrLst meth="repeat">
-      <a:schemeClr val="dk1"/>
-    </dgm:txFillClrLst>
-    <dgm:txEffectClrLst/>
-  </dgm:styleLbl>
-  <dgm:styleLbl name="solidAlignAcc1">
-    <dgm:fillClrLst meth="repeat">
-      <a:schemeClr val="lt1"/>
-    </dgm:fillClrLst>
-    <dgm:linClrLst meth="repeat">
-      <a:schemeClr val="dk1"/>
-    </dgm:linClrLst>
-    <dgm:effectClrLst/>
-    <dgm:txLinClrLst/>
-    <dgm:txFillClrLst meth="repeat">
-      <a:schemeClr val="dk1"/>
-    </dgm:txFillClrLst>
-    <dgm:txEffectClrLst/>
-  </dgm:styleLbl>
-  <dgm:styleLbl name="solidBgAcc1">
-    <dgm:fillClrLst meth="repeat">
-      <a:schemeClr val="lt1"/>
-    </dgm:fillClrLst>
-    <dgm:linClrLst meth="repeat">
-      <a:schemeClr val="dk1"/>
-    </dgm:linClrLst>
-    <dgm:effectClrLst/>
-    <dgm:txLinClrLst/>
-    <dgm:txFillClrLst meth="repeat">
-      <a:schemeClr val="dk1"/>
-    </dgm:txFillClrLst>
-    <dgm:txEffectClrLst/>
-  </dgm:styleLbl>
-  <dgm:styleLbl name="fgAccFollowNode1">
-    <dgm:fillClrLst meth="repeat">
-      <a:schemeClr val="lt1">
-        <a:alpha val="90000"/>
-        <a:tint val="40000"/>
-      </a:schemeClr>
-    </dgm:fillClrLst>
-    <dgm:linClrLst meth="repeat">
-      <a:schemeClr val="dk1">
-        <a:alpha val="90000"/>
-      </a:schemeClr>
-    </dgm:linClrLst>
-    <dgm:effectClrLst/>
-    <dgm:txLinClrLst/>
-    <dgm:txFillClrLst meth="repeat">
-      <a:schemeClr val="dk1"/>
-    </dgm:txFillClrLst>
-    <dgm:txEffectClrLst/>
-  </dgm:styleLbl>
-  <dgm:styleLbl name="alignAccFollowNode1">
-    <dgm:fillClrLst meth="repeat">
-      <a:schemeClr val="lt1">
-        <a:alpha val="90000"/>
-        <a:tint val="40000"/>
-      </a:schemeClr>
-    </dgm:fillClrLst>
-    <dgm:linClrLst meth="repeat">
-      <a:schemeClr val="dk1">
-        <a:alpha val="90000"/>
-      </a:schemeClr>
-    </dgm:linClrLst>
-    <dgm:effectClrLst/>
-    <dgm:txLinClrLst/>
-    <dgm:txFillClrLst meth="repeat">
-      <a:schemeClr val="dk1"/>
-    </dgm:txFillClrLst>
-    <dgm:txEffectClrLst/>
-  </dgm:styleLbl>
-  <dgm:styleLbl name="bgAccFollowNode1">
-    <dgm:fillClrLst meth="repeat">
-      <a:schemeClr val="lt1">
-        <a:alpha val="90000"/>
-        <a:tint val="40000"/>
-      </a:schemeClr>
-    </dgm:fillClrLst>
-    <dgm:linClrLst meth="repeat">
-      <a:schemeClr val="dk1">
-        <a:alpha val="90000"/>
-      </a:schemeClr>
-    </dgm:linClrLst>
-    <dgm:effectClrLst/>
-    <dgm:txLinClrLst/>
-    <dgm:txFillClrLst meth="repeat">
-      <a:schemeClr val="dk1"/>
-    </dgm:txFillClrLst>
-    <dgm:txEffectClrLst/>
-  </dgm:styleLbl>
-  <dgm:styleLbl name="fgAcc0">
-    <dgm:fillClrLst meth="repeat">
-      <a:schemeClr val="dk1">
-        <a:alpha val="90000"/>
-        <a:tint val="40000"/>
-      </a:schemeClr>
-    </dgm:fillClrLst>
-    <dgm:linClrLst meth="repeat">
-      <a:schemeClr val="dk1"/>
-    </dgm:linClrLst>
-    <dgm:effectClrLst/>
-    <dgm:txLinClrLst/>
-    <dgm:txFillClrLst meth="repeat">
-      <a:schemeClr val="dk1"/>
-    </dgm:txFillClrLst>
-    <dgm:txEffectClrLst/>
-  </dgm:styleLbl>
-  <dgm:styleLbl name="fgAcc2">
-    <dgm:fillClrLst meth="repeat">
-      <a:schemeClr val="dk1">
-        <a:alpha val="90000"/>
-        <a:tint val="40000"/>
-      </a:schemeClr>
-    </dgm:fillClrLst>
-    <dgm:linClrLst meth="repeat">
-      <a:schemeClr val="dk1"/>
-    </dgm:linClrLst>
-    <dgm:effectClrLst/>
-    <dgm:txLinClrLst/>
-    <dgm:txFillClrLst meth="repeat">
-      <a:schemeClr val="dk1"/>
-    </dgm:txFillClrLst>
-    <dgm:txEffectClrLst/>
-  </dgm:styleLbl>
-  <dgm:styleLbl name="fgAcc3">
-    <dgm:fillClrLst meth="repeat">
-      <a:schemeClr val="dk1">
-        <a:alpha val="90000"/>
-        <a:tint val="40000"/>
-      </a:schemeClr>
-    </dgm:fillClrLst>
-    <dgm:linClrLst meth="repeat">
-      <a:schemeClr val="dk1"/>
-    </dgm:linClrLst>
-    <dgm:effectClrLst/>
-    <dgm:txLinClrLst/>
-    <dgm:txFillClrLst meth="repeat">
-      <a:schemeClr val="dk1"/>
-    </dgm:txFillClrLst>
-    <dgm:txEffectClrLst/>
-  </dgm:styleLbl>
-  <dgm:styleLbl name="fgAcc4">
-    <dgm:fillClrLst meth="repeat">
-      <a:schemeClr val="dk1">
-        <a:alpha val="90000"/>
-        <a:tint val="40000"/>
-      </a:schemeClr>
-    </dgm:fillClrLst>
-    <dgm:linClrLst meth="repeat">
-      <a:schemeClr val="dk1"/>
-    </dgm:linClrLst>
-    <dgm:effectClrLst/>
-    <dgm:txLinClrLst/>
-    <dgm:txFillClrLst meth="repeat">
-      <a:schemeClr val="dk1"/>
-    </dgm:txFillClrLst>
-    <dgm:txEffectClrLst/>
-  </dgm:styleLbl>
-  <dgm:styleLbl name="bgShp">
-    <dgm:fillClrLst meth="repeat">
-      <a:schemeClr val="dk1">
-        <a:tint val="40000"/>
-      </a:schemeClr>
-    </dgm:fillClrLst>
-    <dgm:linClrLst meth="repeat">
-      <a:schemeClr val="dk1"/>
-    </dgm:linClrLst>
-    <dgm:effectClrLst/>
-    <dgm:txLinClrLst/>
-    <dgm:txFillClrLst meth="repeat">
-      <a:schemeClr val="dk1"/>
-    </dgm:txFillClrLst>
-    <dgm:txEffectClrLst/>
-  </dgm:styleLbl>
-  <dgm:styleLbl name="dkBgShp">
-    <dgm:fillClrLst meth="repeat">
-      <a:schemeClr val="dk1">
-        <a:shade val="80000"/>
-      </a:schemeClr>
-    </dgm:fillClrLst>
-    <dgm:linClrLst meth="repeat">
-      <a:schemeClr val="dk1"/>
-    </dgm:linClrLst>
-    <dgm:effectClrLst/>
-    <dgm:txLinClrLst/>
-    <dgm:txFillClrLst meth="repeat">
-      <a:schemeClr val="lt1"/>
-    </dgm:txFillClrLst>
-    <dgm:txEffectClrLst/>
-  </dgm:styleLbl>
-  <dgm:styleLbl name="trBgShp">
-    <dgm:fillClrLst meth="repeat">
-      <a:schemeClr val="dk1">
-        <a:tint val="50000"/>
-        <a:alpha val="40000"/>
-      </a:schemeClr>
-    </dgm:fillClrLst>
-    <dgm:linClrLst meth="repeat">
-      <a:schemeClr val="dk1"/>
-    </dgm:linClrLst>
-    <dgm:effectClrLst/>
-    <dgm:txLinClrLst/>
-    <dgm:txFillClrLst meth="repeat">
-      <a:schemeClr val="lt1"/>
-    </dgm:txFillClrLst>
-    <dgm:txEffectClrLst/>
-  </dgm:styleLbl>
-  <dgm:styleLbl name="fgShp">
-    <dgm:fillClrLst meth="repeat">
-      <a:schemeClr val="dk1">
-        <a:tint val="60000"/>
-      </a:schemeClr>
-    </dgm:fillClrLst>
-    <dgm:linClrLst meth="repeat">
-      <a:schemeClr val="lt1"/>
-    </dgm:linClrLst>
-    <dgm:effectClrLst/>
-    <dgm:txLinClrLst/>
-    <dgm:txFillClrLst meth="repeat">
-      <a:schemeClr val="dk1"/>
-    </dgm:txFillClrLst>
-    <dgm:txEffectClrLst/>
-  </dgm:styleLbl>
-  <dgm:styleLbl name="revTx">
-    <dgm:fillClrLst meth="repeat">
-      <a:schemeClr val="lt1">
-        <a:alpha val="0"/>
-      </a:schemeClr>
-    </dgm:fillClrLst>
-    <dgm:linClrLst meth="repeat">
-      <a:schemeClr val="dk1">
-        <a:alpha val="0"/>
-      </a:schemeClr>
-    </dgm:linClrLst>
-    <dgm:effectClrLst/>
-    <dgm:txLinClrLst/>
-    <dgm:txFillClrLst meth="repeat">
-      <a:schemeClr val="tx1"/>
-    </dgm:txFillClrLst>
-    <dgm:txEffectClrLst/>
-  </dgm:styleLbl>
-</dgm:colorsDef>
-</file>
-
-<file path=ppt/diagrams/data1.xml><?xml version="1.0" encoding="utf-8"?>
-<dgm:dataModel xmlns:dgm="http://schemas.openxmlformats.org/drawingml/2006/diagram" xmlns:a="http://schemas.openxmlformats.org/drawingml/2006/main">
-  <dgm:ptLst>
-    <dgm:pt modelId="{BC4D5D8D-46B5-4050-A8A2-9358720318CB}" type="doc">
-      <dgm:prSet loTypeId="urn:microsoft.com/office/officeart/2005/8/layout/chevronAccent+Icon" loCatId="process" qsTypeId="urn:microsoft.com/office/officeart/2005/8/quickstyle/simple1" qsCatId="simple" csTypeId="urn:microsoft.com/office/officeart/2005/8/colors/accent0_1" csCatId="mainScheme" phldr="1"/>
-      <dgm:spPr/>
-      <dgm:t>
-        <a:bodyPr/>
-        <a:lstStyle/>
-        <a:p>
-          <a:endParaRPr lang="en-US"/>
-        </a:p>
-      </dgm:t>
-    </dgm:pt>
-    <dgm:pt modelId="{5F7701CA-FAE9-401E-8919-DA68891591F1}">
-      <dgm:prSet phldrT="[Text]"/>
-      <dgm:spPr/>
-      <dgm:t>
-        <a:bodyPr/>
-        <a:lstStyle/>
-        <a:p>
-          <a:r>
-            <a:rPr lang="en-US" dirty="0"/>
-            <a:t>Observe</a:t>
-          </a:r>
-        </a:p>
-      </dgm:t>
-    </dgm:pt>
-    <dgm:pt modelId="{57EC1A04-2D89-479D-B4CD-41E513268C4C}" type="parTrans" cxnId="{788EE39B-32B1-4162-8BBC-1C338A4C1A09}">
-      <dgm:prSet/>
-      <dgm:spPr/>
-      <dgm:t>
-        <a:bodyPr/>
-        <a:lstStyle/>
-        <a:p>
-          <a:endParaRPr lang="en-US"/>
-        </a:p>
-      </dgm:t>
-    </dgm:pt>
-    <dgm:pt modelId="{1E496758-F884-4589-8FBC-E44F78EEE5A6}" type="sibTrans" cxnId="{788EE39B-32B1-4162-8BBC-1C338A4C1A09}">
-      <dgm:prSet/>
-      <dgm:spPr/>
-      <dgm:t>
-        <a:bodyPr/>
-        <a:lstStyle/>
-        <a:p>
-          <a:endParaRPr lang="en-US"/>
-        </a:p>
-      </dgm:t>
-    </dgm:pt>
-    <dgm:pt modelId="{3511B0DC-F6D6-48BD-9E3E-8060DA330747}">
-      <dgm:prSet phldrT="[Text]"/>
-      <dgm:spPr/>
-      <dgm:t>
-        <a:bodyPr/>
-        <a:lstStyle/>
-        <a:p>
-          <a:r>
-            <a:rPr lang="en-US" dirty="0"/>
-            <a:t>Analyze</a:t>
-          </a:r>
-        </a:p>
-      </dgm:t>
-    </dgm:pt>
-    <dgm:pt modelId="{DB215E9B-41B1-4594-AECD-054A768F9C75}" type="parTrans" cxnId="{4AA21BBC-29B0-4376-8FA9-2ECF348FFB0B}">
-      <dgm:prSet/>
-      <dgm:spPr/>
-      <dgm:t>
-        <a:bodyPr/>
-        <a:lstStyle/>
-        <a:p>
-          <a:endParaRPr lang="en-US"/>
-        </a:p>
-      </dgm:t>
-    </dgm:pt>
-    <dgm:pt modelId="{4DA7C20A-7791-417E-8B3D-4A6E6D60BD33}" type="sibTrans" cxnId="{4AA21BBC-29B0-4376-8FA9-2ECF348FFB0B}">
-      <dgm:prSet/>
-      <dgm:spPr/>
-      <dgm:t>
-        <a:bodyPr/>
-        <a:lstStyle/>
-        <a:p>
-          <a:endParaRPr lang="en-US"/>
-        </a:p>
-      </dgm:t>
-    </dgm:pt>
-    <dgm:pt modelId="{FB9AAE57-5715-4E83-B795-233F80C28DD5}">
-      <dgm:prSet phldrT="[Text]"/>
-      <dgm:spPr/>
-      <dgm:t>
-        <a:bodyPr/>
-        <a:lstStyle/>
-        <a:p>
-          <a:r>
-            <a:rPr lang="en-US" dirty="0"/>
-            <a:t>Act</a:t>
-          </a:r>
-        </a:p>
-      </dgm:t>
-    </dgm:pt>
-    <dgm:pt modelId="{DEC4E5B5-5AAD-461A-8948-F5A4F37B3F48}" type="parTrans" cxnId="{2816C6BF-DAD6-46C7-876C-AD193175ADED}">
-      <dgm:prSet/>
-      <dgm:spPr/>
-      <dgm:t>
-        <a:bodyPr/>
-        <a:lstStyle/>
-        <a:p>
-          <a:endParaRPr lang="en-US"/>
-        </a:p>
-      </dgm:t>
-    </dgm:pt>
-    <dgm:pt modelId="{51F931F7-68A4-4543-AC94-B359BC369D41}" type="sibTrans" cxnId="{2816C6BF-DAD6-46C7-876C-AD193175ADED}">
-      <dgm:prSet/>
-      <dgm:spPr/>
-      <dgm:t>
-        <a:bodyPr/>
-        <a:lstStyle/>
-        <a:p>
-          <a:endParaRPr lang="en-US"/>
-        </a:p>
-      </dgm:t>
-    </dgm:pt>
-    <dgm:pt modelId="{EC220F0F-3F68-4F91-BA27-61155048D978}" type="pres">
-      <dgm:prSet presAssocID="{BC4D5D8D-46B5-4050-A8A2-9358720318CB}" presName="Name0" presStyleCnt="0">
-        <dgm:presLayoutVars>
-          <dgm:dir/>
-          <dgm:resizeHandles val="exact"/>
-        </dgm:presLayoutVars>
-      </dgm:prSet>
-      <dgm:spPr/>
-    </dgm:pt>
-    <dgm:pt modelId="{C3D11DBA-0569-4639-9DC1-670B1227587E}" type="pres">
-      <dgm:prSet presAssocID="{5F7701CA-FAE9-401E-8919-DA68891591F1}" presName="composite" presStyleCnt="0"/>
-      <dgm:spPr/>
-    </dgm:pt>
-    <dgm:pt modelId="{64A0FA5C-7039-4FF4-8C99-48E9820D938C}" type="pres">
-      <dgm:prSet presAssocID="{5F7701CA-FAE9-401E-8919-DA68891591F1}" presName="bgChev" presStyleLbl="node1" presStyleIdx="0" presStyleCnt="3"/>
-      <dgm:spPr/>
-    </dgm:pt>
-    <dgm:pt modelId="{1D11700A-BBAA-42A9-917B-63350AB4255C}" type="pres">
-      <dgm:prSet presAssocID="{5F7701CA-FAE9-401E-8919-DA68891591F1}" presName="txNode" presStyleLbl="fgAcc1" presStyleIdx="0" presStyleCnt="3">
-        <dgm:presLayoutVars>
-          <dgm:bulletEnabled val="1"/>
-        </dgm:presLayoutVars>
-      </dgm:prSet>
-      <dgm:spPr/>
-    </dgm:pt>
-    <dgm:pt modelId="{B6942620-027C-4D06-8944-E1A5AEED9AA4}" type="pres">
-      <dgm:prSet presAssocID="{1E496758-F884-4589-8FBC-E44F78EEE5A6}" presName="compositeSpace" presStyleCnt="0"/>
-      <dgm:spPr/>
-    </dgm:pt>
-    <dgm:pt modelId="{555F4A6A-4580-4AC2-BDB7-98DDDCFBC2D0}" type="pres">
-      <dgm:prSet presAssocID="{3511B0DC-F6D6-48BD-9E3E-8060DA330747}" presName="composite" presStyleCnt="0"/>
-      <dgm:spPr/>
-    </dgm:pt>
-    <dgm:pt modelId="{1067899F-33B4-491C-B69D-476224B9506A}" type="pres">
-      <dgm:prSet presAssocID="{3511B0DC-F6D6-48BD-9E3E-8060DA330747}" presName="bgChev" presStyleLbl="node1" presStyleIdx="1" presStyleCnt="3"/>
-      <dgm:spPr/>
-    </dgm:pt>
-    <dgm:pt modelId="{2334EE4A-B7B4-4E1E-8449-49872BBBF2B1}" type="pres">
-      <dgm:prSet presAssocID="{3511B0DC-F6D6-48BD-9E3E-8060DA330747}" presName="txNode" presStyleLbl="fgAcc1" presStyleIdx="1" presStyleCnt="3">
-        <dgm:presLayoutVars>
-          <dgm:bulletEnabled val="1"/>
-        </dgm:presLayoutVars>
-      </dgm:prSet>
-      <dgm:spPr/>
-    </dgm:pt>
-    <dgm:pt modelId="{044ED2E9-BCEE-4979-BA15-D586BFDD3383}" type="pres">
-      <dgm:prSet presAssocID="{4DA7C20A-7791-417E-8B3D-4A6E6D60BD33}" presName="compositeSpace" presStyleCnt="0"/>
-      <dgm:spPr/>
-    </dgm:pt>
-    <dgm:pt modelId="{22D5889F-3E05-42E6-A440-F71D5A35A9E8}" type="pres">
-      <dgm:prSet presAssocID="{FB9AAE57-5715-4E83-B795-233F80C28DD5}" presName="composite" presStyleCnt="0"/>
-      <dgm:spPr/>
-    </dgm:pt>
-    <dgm:pt modelId="{44309A0F-9A2A-4650-84CF-CAAB96393DA0}" type="pres">
-      <dgm:prSet presAssocID="{FB9AAE57-5715-4E83-B795-233F80C28DD5}" presName="bgChev" presStyleLbl="node1" presStyleIdx="2" presStyleCnt="3"/>
-      <dgm:spPr/>
-    </dgm:pt>
-    <dgm:pt modelId="{14F1B3E8-DBE2-4A1E-A7D3-9504D758FDF0}" type="pres">
-      <dgm:prSet presAssocID="{FB9AAE57-5715-4E83-B795-233F80C28DD5}" presName="txNode" presStyleLbl="fgAcc1" presStyleIdx="2" presStyleCnt="3">
-        <dgm:presLayoutVars>
-          <dgm:bulletEnabled val="1"/>
-        </dgm:presLayoutVars>
-      </dgm:prSet>
-      <dgm:spPr/>
-    </dgm:pt>
-  </dgm:ptLst>
-  <dgm:cxnLst>
-    <dgm:cxn modelId="{5BCA772D-8541-4DB2-815A-BC0EB44BA024}" type="presOf" srcId="{BC4D5D8D-46B5-4050-A8A2-9358720318CB}" destId="{EC220F0F-3F68-4F91-BA27-61155048D978}" srcOrd="0" destOrd="0" presId="urn:microsoft.com/office/officeart/2005/8/layout/chevronAccent+Icon"/>
-    <dgm:cxn modelId="{F3017B91-E2ED-4F5F-B55A-DD06EAF122C7}" type="presOf" srcId="{FB9AAE57-5715-4E83-B795-233F80C28DD5}" destId="{14F1B3E8-DBE2-4A1E-A7D3-9504D758FDF0}" srcOrd="0" destOrd="0" presId="urn:microsoft.com/office/officeart/2005/8/layout/chevronAccent+Icon"/>
-    <dgm:cxn modelId="{788EE39B-32B1-4162-8BBC-1C338A4C1A09}" srcId="{BC4D5D8D-46B5-4050-A8A2-9358720318CB}" destId="{5F7701CA-FAE9-401E-8919-DA68891591F1}" srcOrd="0" destOrd="0" parTransId="{57EC1A04-2D89-479D-B4CD-41E513268C4C}" sibTransId="{1E496758-F884-4589-8FBC-E44F78EEE5A6}"/>
-    <dgm:cxn modelId="{4AA21BBC-29B0-4376-8FA9-2ECF348FFB0B}" srcId="{BC4D5D8D-46B5-4050-A8A2-9358720318CB}" destId="{3511B0DC-F6D6-48BD-9E3E-8060DA330747}" srcOrd="1" destOrd="0" parTransId="{DB215E9B-41B1-4594-AECD-054A768F9C75}" sibTransId="{4DA7C20A-7791-417E-8B3D-4A6E6D60BD33}"/>
-    <dgm:cxn modelId="{2816C6BF-DAD6-46C7-876C-AD193175ADED}" srcId="{BC4D5D8D-46B5-4050-A8A2-9358720318CB}" destId="{FB9AAE57-5715-4E83-B795-233F80C28DD5}" srcOrd="2" destOrd="0" parTransId="{DEC4E5B5-5AAD-461A-8948-F5A4F37B3F48}" sibTransId="{51F931F7-68A4-4543-AC94-B359BC369D41}"/>
-    <dgm:cxn modelId="{D3F8B6DC-EEC6-486F-86BE-95B48E381F69}" type="presOf" srcId="{5F7701CA-FAE9-401E-8919-DA68891591F1}" destId="{1D11700A-BBAA-42A9-917B-63350AB4255C}" srcOrd="0" destOrd="0" presId="urn:microsoft.com/office/officeart/2005/8/layout/chevronAccent+Icon"/>
-    <dgm:cxn modelId="{1C2A04E7-4632-4668-84C2-F442F319FC08}" type="presOf" srcId="{3511B0DC-F6D6-48BD-9E3E-8060DA330747}" destId="{2334EE4A-B7B4-4E1E-8449-49872BBBF2B1}" srcOrd="0" destOrd="0" presId="urn:microsoft.com/office/officeart/2005/8/layout/chevronAccent+Icon"/>
-    <dgm:cxn modelId="{04A4F9D3-360C-4432-80AE-A8E0FE542F41}" type="presParOf" srcId="{EC220F0F-3F68-4F91-BA27-61155048D978}" destId="{C3D11DBA-0569-4639-9DC1-670B1227587E}" srcOrd="0" destOrd="0" presId="urn:microsoft.com/office/officeart/2005/8/layout/chevronAccent+Icon"/>
-    <dgm:cxn modelId="{15BBE625-E919-4308-96E2-CB685A7300A5}" type="presParOf" srcId="{C3D11DBA-0569-4639-9DC1-670B1227587E}" destId="{64A0FA5C-7039-4FF4-8C99-48E9820D938C}" srcOrd="0" destOrd="0" presId="urn:microsoft.com/office/officeart/2005/8/layout/chevronAccent+Icon"/>
-    <dgm:cxn modelId="{07C7C6C3-9B17-47BF-B816-273A3C7CD7DF}" type="presParOf" srcId="{C3D11DBA-0569-4639-9DC1-670B1227587E}" destId="{1D11700A-BBAA-42A9-917B-63350AB4255C}" srcOrd="1" destOrd="0" presId="urn:microsoft.com/office/officeart/2005/8/layout/chevronAccent+Icon"/>
-    <dgm:cxn modelId="{6B171094-4663-46A6-AF01-DAB56E3B103D}" type="presParOf" srcId="{EC220F0F-3F68-4F91-BA27-61155048D978}" destId="{B6942620-027C-4D06-8944-E1A5AEED9AA4}" srcOrd="1" destOrd="0" presId="urn:microsoft.com/office/officeart/2005/8/layout/chevronAccent+Icon"/>
-    <dgm:cxn modelId="{AC761A58-C3C7-48CD-A53D-2E75C39D5299}" type="presParOf" srcId="{EC220F0F-3F68-4F91-BA27-61155048D978}" destId="{555F4A6A-4580-4AC2-BDB7-98DDDCFBC2D0}" srcOrd="2" destOrd="0" presId="urn:microsoft.com/office/officeart/2005/8/layout/chevronAccent+Icon"/>
-    <dgm:cxn modelId="{B08EDD57-7815-4509-A29C-576F70AFBF2C}" type="presParOf" srcId="{555F4A6A-4580-4AC2-BDB7-98DDDCFBC2D0}" destId="{1067899F-33B4-491C-B69D-476224B9506A}" srcOrd="0" destOrd="0" presId="urn:microsoft.com/office/officeart/2005/8/layout/chevronAccent+Icon"/>
-    <dgm:cxn modelId="{64674B21-D43C-4A38-8924-08AA4A927DC3}" type="presParOf" srcId="{555F4A6A-4580-4AC2-BDB7-98DDDCFBC2D0}" destId="{2334EE4A-B7B4-4E1E-8449-49872BBBF2B1}" srcOrd="1" destOrd="0" presId="urn:microsoft.com/office/officeart/2005/8/layout/chevronAccent+Icon"/>
-    <dgm:cxn modelId="{65BC2773-7FF8-4A57-A611-94AFF4F2C888}" type="presParOf" srcId="{EC220F0F-3F68-4F91-BA27-61155048D978}" destId="{044ED2E9-BCEE-4979-BA15-D586BFDD3383}" srcOrd="3" destOrd="0" presId="urn:microsoft.com/office/officeart/2005/8/layout/chevronAccent+Icon"/>
-    <dgm:cxn modelId="{558F2373-43E2-4F6A-855E-983CC45BB556}" type="presParOf" srcId="{EC220F0F-3F68-4F91-BA27-61155048D978}" destId="{22D5889F-3E05-42E6-A440-F71D5A35A9E8}" srcOrd="4" destOrd="0" presId="urn:microsoft.com/office/officeart/2005/8/layout/chevronAccent+Icon"/>
-    <dgm:cxn modelId="{B529721A-C207-410E-BCC1-BD3CC034F340}" type="presParOf" srcId="{22D5889F-3E05-42E6-A440-F71D5A35A9E8}" destId="{44309A0F-9A2A-4650-84CF-CAAB96393DA0}" srcOrd="0" destOrd="0" presId="urn:microsoft.com/office/officeart/2005/8/layout/chevronAccent+Icon"/>
-    <dgm:cxn modelId="{3F26C6A6-AD68-4B25-AE80-F6BB1AE68E10}" type="presParOf" srcId="{22D5889F-3E05-42E6-A440-F71D5A35A9E8}" destId="{14F1B3E8-DBE2-4A1E-A7D3-9504D758FDF0}" srcOrd="1" destOrd="0" presId="urn:microsoft.com/office/officeart/2005/8/layout/chevronAccent+Icon"/>
-  </dgm:cxnLst>
-  <dgm:bg/>
-  <dgm:whole/>
-  <dgm:extLst>
-    <a:ext uri="http://schemas.microsoft.com/office/drawing/2008/diagram">
-      <dsp:dataModelExt xmlns:dsp="http://schemas.microsoft.com/office/drawing/2008/diagram" relId="rId7" minVer="http://schemas.openxmlformats.org/drawingml/2006/diagram"/>
-    </a:ext>
-  </dgm:extLst>
-</dgm:dataModel>
-</file>
-
-<file path=ppt/diagrams/drawing1.xml><?xml version="1.0" encoding="utf-8"?>
-<dsp:drawing xmlns:dgm="http://schemas.openxmlformats.org/drawingml/2006/diagram" xmlns:dsp="http://schemas.microsoft.com/office/drawing/2008/diagram" xmlns:a="http://schemas.openxmlformats.org/drawingml/2006/main">
-  <dsp:spTree>
-    <dsp:nvGrpSpPr>
-      <dsp:cNvPr id="0" name=""/>
-      <dsp:cNvGrpSpPr/>
-    </dsp:nvGrpSpPr>
-    <dsp:grpSpPr/>
-    <dsp:sp modelId="{64A0FA5C-7039-4FF4-8C99-48E9820D938C}">
-      <dsp:nvSpPr>
-        <dsp:cNvPr id="0" name=""/>
-        <dsp:cNvSpPr/>
-      </dsp:nvSpPr>
-      <dsp:spPr>
-        <a:xfrm>
-          <a:off x="1338" y="0"/>
-          <a:ext cx="3363247" cy="852283"/>
-        </a:xfrm>
-        <a:prstGeom prst="chevron">
-          <a:avLst>
-            <a:gd name="adj" fmla="val 40000"/>
-          </a:avLst>
-        </a:prstGeom>
-        <a:solidFill>
-          <a:schemeClr val="lt1">
-            <a:hueOff val="0"/>
-            <a:satOff val="0"/>
-            <a:lumOff val="0"/>
-            <a:alphaOff val="0"/>
-          </a:schemeClr>
-        </a:solidFill>
-        <a:ln w="19050" cap="flat" cmpd="sng" algn="ctr">
-          <a:solidFill>
-            <a:schemeClr val="dk1">
-              <a:shade val="80000"/>
-              <a:hueOff val="0"/>
-              <a:satOff val="0"/>
-              <a:lumOff val="0"/>
-              <a:alphaOff val="0"/>
-            </a:schemeClr>
-          </a:solidFill>
-          <a:prstDash val="solid"/>
-        </a:ln>
-        <a:effectLst/>
-      </dsp:spPr>
-      <dsp:style>
-        <a:lnRef idx="2">
-          <a:scrgbClr r="0" g="0" b="0"/>
-        </a:lnRef>
-        <a:fillRef idx="1">
-          <a:scrgbClr r="0" g="0" b="0"/>
-        </a:fillRef>
-        <a:effectRef idx="0">
-          <a:scrgbClr r="0" g="0" b="0"/>
-        </a:effectRef>
-        <a:fontRef idx="minor">
-          <a:schemeClr val="lt1"/>
-        </a:fontRef>
-      </dsp:style>
-    </dsp:sp>
-    <dsp:sp modelId="{1D11700A-BBAA-42A9-917B-63350AB4255C}">
-      <dsp:nvSpPr>
-        <dsp:cNvPr id="0" name=""/>
-        <dsp:cNvSpPr/>
-      </dsp:nvSpPr>
-      <dsp:spPr>
-        <a:xfrm>
-          <a:off x="898204" y="213070"/>
-          <a:ext cx="2840075" cy="852283"/>
-        </a:xfrm>
-        <a:prstGeom prst="roundRect">
-          <a:avLst>
-            <a:gd name="adj" fmla="val 10000"/>
-          </a:avLst>
-        </a:prstGeom>
-        <a:solidFill>
-          <a:schemeClr val="dk1">
-            <a:alpha val="90000"/>
-            <a:tint val="40000"/>
-            <a:hueOff val="0"/>
-            <a:satOff val="0"/>
-            <a:lumOff val="0"/>
-            <a:alphaOff val="0"/>
-          </a:schemeClr>
-        </a:solidFill>
-        <a:ln w="19050" cap="flat" cmpd="sng" algn="ctr">
-          <a:solidFill>
-            <a:schemeClr val="dk1">
-              <a:hueOff val="0"/>
-              <a:satOff val="0"/>
-              <a:lumOff val="0"/>
-              <a:alphaOff val="0"/>
-            </a:schemeClr>
-          </a:solidFill>
-          <a:prstDash val="solid"/>
-        </a:ln>
-        <a:effectLst/>
-      </dsp:spPr>
-      <dsp:style>
-        <a:lnRef idx="2">
-          <a:scrgbClr r="0" g="0" b="0"/>
-        </a:lnRef>
-        <a:fillRef idx="1">
-          <a:scrgbClr r="0" g="0" b="0"/>
-        </a:fillRef>
-        <a:effectRef idx="0">
-          <a:scrgbClr r="0" g="0" b="0"/>
-        </a:effectRef>
-        <a:fontRef idx="minor"/>
-      </dsp:style>
-      <dsp:txBody>
-        <a:bodyPr spcFirstLastPara="0" vert="horz" wrap="square" lIns="206248" tIns="206248" rIns="206248" bIns="206248" numCol="1" spcCol="1270" anchor="ctr" anchorCtr="0">
-          <a:noAutofit/>
-        </a:bodyPr>
-        <a:lstStyle/>
-        <a:p>
-          <a:pPr marL="0" lvl="0" indent="0" algn="ctr" defTabSz="1289050">
-            <a:lnSpc>
-              <a:spcPct val="90000"/>
-            </a:lnSpc>
-            <a:spcBef>
-              <a:spcPct val="0"/>
-            </a:spcBef>
-            <a:spcAft>
-              <a:spcPct val="35000"/>
-            </a:spcAft>
-            <a:buNone/>
-          </a:pPr>
-          <a:r>
-            <a:rPr lang="en-US" sz="2900" kern="1200" dirty="0"/>
-            <a:t>Observe</a:t>
-          </a:r>
-        </a:p>
-      </dsp:txBody>
-      <dsp:txXfrm>
-        <a:off x="923167" y="238033"/>
-        <a:ext cx="2790149" cy="802357"/>
-      </dsp:txXfrm>
-    </dsp:sp>
-    <dsp:sp modelId="{1067899F-33B4-491C-B69D-476224B9506A}">
-      <dsp:nvSpPr>
-        <dsp:cNvPr id="0" name=""/>
-        <dsp:cNvSpPr/>
-      </dsp:nvSpPr>
-      <dsp:spPr>
-        <a:xfrm>
-          <a:off x="3842914" y="0"/>
-          <a:ext cx="3363247" cy="852283"/>
-        </a:xfrm>
-        <a:prstGeom prst="chevron">
-          <a:avLst>
-            <a:gd name="adj" fmla="val 40000"/>
-          </a:avLst>
-        </a:prstGeom>
-        <a:solidFill>
-          <a:schemeClr val="lt1">
-            <a:hueOff val="0"/>
-            <a:satOff val="0"/>
-            <a:lumOff val="0"/>
-            <a:alphaOff val="0"/>
-          </a:schemeClr>
-        </a:solidFill>
-        <a:ln w="19050" cap="flat" cmpd="sng" algn="ctr">
-          <a:solidFill>
-            <a:schemeClr val="dk1">
-              <a:shade val="80000"/>
-              <a:hueOff val="0"/>
-              <a:satOff val="0"/>
-              <a:lumOff val="0"/>
-              <a:alphaOff val="0"/>
-            </a:schemeClr>
-          </a:solidFill>
-          <a:prstDash val="solid"/>
-        </a:ln>
-        <a:effectLst/>
-      </dsp:spPr>
-      <dsp:style>
-        <a:lnRef idx="2">
-          <a:scrgbClr r="0" g="0" b="0"/>
-        </a:lnRef>
-        <a:fillRef idx="1">
-          <a:scrgbClr r="0" g="0" b="0"/>
-        </a:fillRef>
-        <a:effectRef idx="0">
-          <a:scrgbClr r="0" g="0" b="0"/>
-        </a:effectRef>
-        <a:fontRef idx="minor">
-          <a:schemeClr val="lt1"/>
-        </a:fontRef>
-      </dsp:style>
-    </dsp:sp>
-    <dsp:sp modelId="{2334EE4A-B7B4-4E1E-8449-49872BBBF2B1}">
-      <dsp:nvSpPr>
-        <dsp:cNvPr id="0" name=""/>
-        <dsp:cNvSpPr/>
-      </dsp:nvSpPr>
-      <dsp:spPr>
-        <a:xfrm>
-          <a:off x="4739780" y="213070"/>
-          <a:ext cx="2840075" cy="852283"/>
-        </a:xfrm>
-        <a:prstGeom prst="roundRect">
-          <a:avLst>
-            <a:gd name="adj" fmla="val 10000"/>
-          </a:avLst>
-        </a:prstGeom>
-        <a:solidFill>
-          <a:schemeClr val="dk1">
-            <a:alpha val="90000"/>
-            <a:tint val="40000"/>
-            <a:hueOff val="0"/>
-            <a:satOff val="0"/>
-            <a:lumOff val="0"/>
-            <a:alphaOff val="0"/>
-          </a:schemeClr>
-        </a:solidFill>
-        <a:ln w="19050" cap="flat" cmpd="sng" algn="ctr">
-          <a:solidFill>
-            <a:schemeClr val="dk1">
-              <a:hueOff val="0"/>
-              <a:satOff val="0"/>
-              <a:lumOff val="0"/>
-              <a:alphaOff val="0"/>
-            </a:schemeClr>
-          </a:solidFill>
-          <a:prstDash val="solid"/>
-        </a:ln>
-        <a:effectLst/>
-      </dsp:spPr>
-      <dsp:style>
-        <a:lnRef idx="2">
-          <a:scrgbClr r="0" g="0" b="0"/>
-        </a:lnRef>
-        <a:fillRef idx="1">
-          <a:scrgbClr r="0" g="0" b="0"/>
-        </a:fillRef>
-        <a:effectRef idx="0">
-          <a:scrgbClr r="0" g="0" b="0"/>
-        </a:effectRef>
-        <a:fontRef idx="minor"/>
-      </dsp:style>
-      <dsp:txBody>
-        <a:bodyPr spcFirstLastPara="0" vert="horz" wrap="square" lIns="206248" tIns="206248" rIns="206248" bIns="206248" numCol="1" spcCol="1270" anchor="ctr" anchorCtr="0">
-          <a:noAutofit/>
-        </a:bodyPr>
-        <a:lstStyle/>
-        <a:p>
-          <a:pPr marL="0" lvl="0" indent="0" algn="ctr" defTabSz="1289050">
-            <a:lnSpc>
-              <a:spcPct val="90000"/>
-            </a:lnSpc>
-            <a:spcBef>
-              <a:spcPct val="0"/>
-            </a:spcBef>
-            <a:spcAft>
-              <a:spcPct val="35000"/>
-            </a:spcAft>
-            <a:buNone/>
-          </a:pPr>
-          <a:r>
-            <a:rPr lang="en-US" sz="2900" kern="1200" dirty="0"/>
-            <a:t>Analyze</a:t>
-          </a:r>
-        </a:p>
-      </dsp:txBody>
-      <dsp:txXfrm>
-        <a:off x="4764743" y="238033"/>
-        <a:ext cx="2790149" cy="802357"/>
-      </dsp:txXfrm>
-    </dsp:sp>
-    <dsp:sp modelId="{44309A0F-9A2A-4650-84CF-CAAB96393DA0}">
-      <dsp:nvSpPr>
-        <dsp:cNvPr id="0" name=""/>
-        <dsp:cNvSpPr/>
-      </dsp:nvSpPr>
-      <dsp:spPr>
-        <a:xfrm>
-          <a:off x="7684490" y="0"/>
-          <a:ext cx="3363247" cy="852283"/>
-        </a:xfrm>
-        <a:prstGeom prst="chevron">
-          <a:avLst>
-            <a:gd name="adj" fmla="val 40000"/>
-          </a:avLst>
-        </a:prstGeom>
-        <a:solidFill>
-          <a:schemeClr val="lt1">
-            <a:hueOff val="0"/>
-            <a:satOff val="0"/>
-            <a:lumOff val="0"/>
-            <a:alphaOff val="0"/>
-          </a:schemeClr>
-        </a:solidFill>
-        <a:ln w="19050" cap="flat" cmpd="sng" algn="ctr">
-          <a:solidFill>
-            <a:schemeClr val="dk1">
-              <a:shade val="80000"/>
-              <a:hueOff val="0"/>
-              <a:satOff val="0"/>
-              <a:lumOff val="0"/>
-              <a:alphaOff val="0"/>
-            </a:schemeClr>
-          </a:solidFill>
-          <a:prstDash val="solid"/>
-        </a:ln>
-        <a:effectLst/>
-      </dsp:spPr>
-      <dsp:style>
-        <a:lnRef idx="2">
-          <a:scrgbClr r="0" g="0" b="0"/>
-        </a:lnRef>
-        <a:fillRef idx="1">
-          <a:scrgbClr r="0" g="0" b="0"/>
-        </a:fillRef>
-        <a:effectRef idx="0">
-          <a:scrgbClr r="0" g="0" b="0"/>
-        </a:effectRef>
-        <a:fontRef idx="minor">
-          <a:schemeClr val="lt1"/>
-        </a:fontRef>
-      </dsp:style>
-    </dsp:sp>
-    <dsp:sp modelId="{14F1B3E8-DBE2-4A1E-A7D3-9504D758FDF0}">
-      <dsp:nvSpPr>
-        <dsp:cNvPr id="0" name=""/>
-        <dsp:cNvSpPr/>
-      </dsp:nvSpPr>
-      <dsp:spPr>
-        <a:xfrm>
-          <a:off x="8581356" y="213070"/>
-          <a:ext cx="2840075" cy="852283"/>
-        </a:xfrm>
-        <a:prstGeom prst="roundRect">
-          <a:avLst>
-            <a:gd name="adj" fmla="val 10000"/>
-          </a:avLst>
-        </a:prstGeom>
-        <a:solidFill>
-          <a:schemeClr val="dk1">
-            <a:alpha val="90000"/>
-            <a:tint val="40000"/>
-            <a:hueOff val="0"/>
-            <a:satOff val="0"/>
-            <a:lumOff val="0"/>
-            <a:alphaOff val="0"/>
-          </a:schemeClr>
-        </a:solidFill>
-        <a:ln w="19050" cap="flat" cmpd="sng" algn="ctr">
-          <a:solidFill>
-            <a:schemeClr val="dk1">
-              <a:hueOff val="0"/>
-              <a:satOff val="0"/>
-              <a:lumOff val="0"/>
-              <a:alphaOff val="0"/>
-            </a:schemeClr>
-          </a:solidFill>
-          <a:prstDash val="solid"/>
-        </a:ln>
-        <a:effectLst/>
-      </dsp:spPr>
-      <dsp:style>
-        <a:lnRef idx="2">
-          <a:scrgbClr r="0" g="0" b="0"/>
-        </a:lnRef>
-        <a:fillRef idx="1">
-          <a:scrgbClr r="0" g="0" b="0"/>
-        </a:fillRef>
-        <a:effectRef idx="0">
-          <a:scrgbClr r="0" g="0" b="0"/>
-        </a:effectRef>
-        <a:fontRef idx="minor"/>
-      </dsp:style>
-      <dsp:txBody>
-        <a:bodyPr spcFirstLastPara="0" vert="horz" wrap="square" lIns="206248" tIns="206248" rIns="206248" bIns="206248" numCol="1" spcCol="1270" anchor="ctr" anchorCtr="0">
-          <a:noAutofit/>
-        </a:bodyPr>
-        <a:lstStyle/>
-        <a:p>
-          <a:pPr marL="0" lvl="0" indent="0" algn="ctr" defTabSz="1289050">
-            <a:lnSpc>
-              <a:spcPct val="90000"/>
-            </a:lnSpc>
-            <a:spcBef>
-              <a:spcPct val="0"/>
-            </a:spcBef>
-            <a:spcAft>
-              <a:spcPct val="35000"/>
-            </a:spcAft>
-            <a:buNone/>
-          </a:pPr>
-          <a:r>
-            <a:rPr lang="en-US" sz="2900" kern="1200" dirty="0"/>
-            <a:t>Act</a:t>
-          </a:r>
-        </a:p>
-      </dsp:txBody>
-      <dsp:txXfrm>
-        <a:off x="8606319" y="238033"/>
-        <a:ext cx="2790149" cy="802357"/>
-      </dsp:txXfrm>
-    </dsp:sp>
-  </dsp:spTree>
-</dsp:drawing>
-</file>
-
-<file path=ppt/diagrams/layout1.xml><?xml version="1.0" encoding="utf-8"?>
-<dgm:layoutDef xmlns:dgm="http://schemas.openxmlformats.org/drawingml/2006/diagram" xmlns:a="http://schemas.openxmlformats.org/drawingml/2006/main" uniqueId="urn:microsoft.com/office/officeart/2005/8/layout/chevronAccent+Icon">
-  <dgm:title val="Chevron Accent Process"/>
-  <dgm:desc val="Use to show sequential steps in a task, process, or workflow, or to emphasize movement or direction. Works best with minimal Level 1 and Level 2 text."/>
-  <dgm:catLst>
-    <dgm:cat type="process" pri="9500"/>
-    <dgm:cat type="officeonline" pri="2000"/>
-  </dgm:catLst>
-  <dgm:sampData useDef="1">
-    <dgm:dataModel>
-      <dgm:ptLst/>
-      <dgm:bg/>
-      <dgm:whole/>
-    </dgm:dataModel>
-  </dgm:sampData>
-  <dgm:styleData>
-    <dgm:dataModel>
-      <dgm:ptLst>
-        <dgm:pt modelId="0" type="doc"/>
-        <dgm:pt modelId="1"/>
-        <dgm:pt modelId="2"/>
-      </dgm:ptLst>
-      <dgm:cxnLst>
-        <dgm:cxn modelId="4" srcId="0" destId="1" srcOrd="0" destOrd="0"/>
-        <dgm:cxn modelId="5" srcId="0" destId="2" srcOrd="1" destOrd="0"/>
-      </dgm:cxnLst>
-      <dgm:bg/>
-      <dgm:whole/>
-    </dgm:dataModel>
-  </dgm:styleData>
-  <dgm:clrData>
-    <dgm:dataModel>
-      <dgm:ptLst>
-        <dgm:pt modelId="0" type="doc"/>
-        <dgm:pt modelId="1"/>
-        <dgm:pt modelId="2"/>
-        <dgm:pt modelId="3"/>
-        <dgm:pt modelId="4"/>
-      </dgm:ptLst>
-      <dgm:cxnLst>
-        <dgm:cxn modelId="5" srcId="0" destId="1" srcOrd="0" destOrd="0"/>
-        <dgm:cxn modelId="6" srcId="0" destId="2" srcOrd="1" destOrd="0"/>
-        <dgm:cxn modelId="7" srcId="0" destId="3" srcOrd="2" destOrd="0"/>
-        <dgm:cxn modelId="8" srcId="0" destId="4" srcOrd="3" destOrd="0"/>
-      </dgm:cxnLst>
-      <dgm:bg/>
-      <dgm:whole/>
-    </dgm:dataModel>
-  </dgm:clrData>
-  <dgm:layoutNode name="Name0">
-    <dgm:varLst>
-      <dgm:dir/>
-      <dgm:resizeHandles val="exact"/>
-    </dgm:varLst>
-    <dgm:choose name="Name1">
-      <dgm:if name="Name2" func="var" arg="dir" op="equ" val="norm">
-        <dgm:alg type="lin"/>
-      </dgm:if>
-      <dgm:else name="Name3">
-        <dgm:alg type="lin">
-          <dgm:param type="linDir" val="fromR"/>
-        </dgm:alg>
-      </dgm:else>
-    </dgm:choose>
-    <dgm:shape xmlns:r="http://schemas.openxmlformats.org/officeDocument/2006/relationships" r:blip="">
-      <dgm:adjLst/>
-    </dgm:shape>
-    <dgm:presOf/>
-    <dgm:constrLst>
-      <dgm:constr type="w" for="ch" forName="composite" refType="w"/>
-      <dgm:constr type="primFontSz" for="des" forName="txNode" op="equ" val="65"/>
-      <dgm:constr type="w" for="ch" forName="compositeSpace" refType="w" refFor="ch" refForName="composite" fact="0.028"/>
-    </dgm:constrLst>
-    <dgm:ruleLst/>
-    <dgm:forEach name="Name4" axis="ch" ptType="node">
-      <dgm:layoutNode name="composite">
-        <dgm:alg type="composite"/>
-        <dgm:shape xmlns:r="http://schemas.openxmlformats.org/officeDocument/2006/relationships" r:blip="">
-          <dgm:adjLst/>
-        </dgm:shape>
-        <dgm:presOf/>
-        <dgm:choose name="Name5">
-          <dgm:if name="Name6" func="var" arg="dir" op="equ" val="norm">
-            <dgm:constrLst>
-              <dgm:constr type="l" for="ch" forName="bgChev"/>
-              <dgm:constr type="w" for="ch" forName="bgChev" refType="w" fact="0.9"/>
-              <dgm:constr type="t" for="ch" forName="bgChev"/>
-              <dgm:constr type="h" for="ch" forName="bgChev" refType="w" refFor="ch" refForName="bgChev" fact="0.386"/>
-              <dgm:constr type="l" for="ch" forName="txNode" refType="w" fact="0.24"/>
-              <dgm:constr type="w" for="ch" forName="txNode" refType="w" fact="0.76"/>
-              <dgm:constr type="t" for="ch" forName="txNode" refType="h" refFor="ch" refForName="bgChev" fact="0.25"/>
-              <dgm:constr type="h" for="ch" forName="txNode" refType="h" refFor="ch" refForName="bgChev"/>
-            </dgm:constrLst>
-          </dgm:if>
-          <dgm:else name="Name7">
-            <dgm:constrLst>
-              <dgm:constr type="l" for="ch" forName="bgChev" refType="w" fact="0.1"/>
-              <dgm:constr type="w" for="ch" forName="bgChev" refType="w" fact="0.9"/>
-              <dgm:constr type="t" for="ch" forName="bgChev"/>
-              <dgm:constr type="h" for="ch" forName="bgChev" refType="w" refFor="ch" refForName="bgChev" fact="0.386"/>
-              <dgm:constr type="l" for="ch" forName="txNode"/>
-              <dgm:constr type="w" for="ch" forName="txNode" refType="w" fact="0.76"/>
-              <dgm:constr type="t" for="ch" forName="txNode" refType="h" refFor="ch" refForName="bgChev" fact="0.25"/>
-              <dgm:constr type="h" for="ch" forName="txNode" refType="h" refFor="ch" refForName="bgChev"/>
-            </dgm:constrLst>
-          </dgm:else>
-        </dgm:choose>
-        <dgm:ruleLst/>
-        <dgm:layoutNode name="bgChev" styleLbl="node1">
-          <dgm:alg type="sp"/>
-          <dgm:choose name="Name8">
-            <dgm:if name="Name9" func="var" arg="dir" op="equ" val="norm">
-              <dgm:shape xmlns:r="http://schemas.openxmlformats.org/officeDocument/2006/relationships" type="chevron" r:blip="">
-                <dgm:adjLst>
-                  <dgm:adj idx="1" val="0.4"/>
-                </dgm:adjLst>
-              </dgm:shape>
-            </dgm:if>
-            <dgm:else name="Name10">
-              <dgm:shape xmlns:r="http://schemas.openxmlformats.org/officeDocument/2006/relationships" rot="180" type="chevron" r:blip="">
-                <dgm:adjLst>
-                  <dgm:adj idx="1" val="0.4"/>
-                </dgm:adjLst>
-              </dgm:shape>
-            </dgm:else>
-          </dgm:choose>
-          <dgm:presOf/>
-          <dgm:constrLst/>
-        </dgm:layoutNode>
-        <dgm:layoutNode name="txNode" styleLbl="fgAcc1">
-          <dgm:varLst>
-            <dgm:bulletEnabled val="1"/>
-          </dgm:varLst>
-          <dgm:alg type="tx"/>
-          <dgm:shape xmlns:r="http://schemas.openxmlformats.org/officeDocument/2006/relationships" type="roundRect" r:blip="">
-            <dgm:adjLst>
-              <dgm:adj idx="1" val="0.1"/>
-            </dgm:adjLst>
-          </dgm:shape>
-          <dgm:presOf axis="desOrSelf" ptType="node"/>
-          <dgm:ruleLst>
-            <dgm:rule type="primFontSz" val="5" fact="NaN" max="NaN"/>
-          </dgm:ruleLst>
-        </dgm:layoutNode>
-      </dgm:layoutNode>
-      <dgm:forEach name="Name11" axis="followSib" ptType="sibTrans" cnt="1">
-        <dgm:layoutNode name="compositeSpace">
-          <dgm:alg type="sp"/>
-          <dgm:shape xmlns:r="http://schemas.openxmlformats.org/officeDocument/2006/relationships" r:blip="">
-            <dgm:adjLst/>
-          </dgm:shape>
-          <dgm:presOf axis="self"/>
-          <dgm:constrLst/>
-          <dgm:ruleLst/>
-        </dgm:layoutNode>
-      </dgm:forEach>
-    </dgm:forEach>
-  </dgm:layoutNode>
-</dgm:layoutDef>
-</file>
-
-<file path=ppt/diagrams/quickStyle1.xml><?xml version="1.0" encoding="utf-8"?>
-<dgm:styleDef xmlns:dgm="http://schemas.openxmlformats.org/drawingml/2006/diagram" xmlns:a="http://schemas.openxmlformats.org/drawingml/2006/main" uniqueId="urn:microsoft.com/office/officeart/2005/8/quickstyle/simple1">
-  <dgm:title val=""/>
-  <dgm:desc val=""/>
-  <dgm:catLst>
-    <dgm:cat type="simple" pri="10100"/>
-  </dgm:catLst>
-  <dgm:scene3d>
-    <a:camera prst="orthographicFront"/>
-    <a:lightRig rig="threePt" dir="t"/>
-  </dgm:scene3d>
-  <dgm:styleLbl name="node0">
-    <dgm:scene3d>
-      <a:camera prst="orthographicFront"/>
-      <a:lightRig rig="threePt" dir="t"/>
-    </dgm:scene3d>
-    <dgm:sp3d/>
-    <dgm:txPr/>
-    <dgm:style>
-      <a:lnRef idx="2">
-        <a:scrgbClr r="0" g="0" b="0"/>
-      </a:lnRef>
-      <a:fillRef idx="1">
-        <a:scrgbClr r="0" g="0" b="0"/>
-      </a:fillRef>
-      <a:effectRef idx="0">
-        <a:scrgbClr r="0" g="0" b="0"/>
-      </a:effectRef>
-      <a:fontRef idx="minor">
-        <a:schemeClr val="lt1"/>
-      </a:fontRef>
-    </dgm:style>
-  </dgm:styleLbl>
-  <dgm:styleLbl name="lnNode1">
-    <dgm:scene3d>
-      <a:camera prst="orthographicFront"/>
-      <a:lightRig rig="threePt" dir="t"/>
-    </dgm:scene3d>
-    <dgm:sp3d/>
-    <dgm:txPr/>
-    <dgm:style>
-      <a:lnRef idx="2">
-        <a:scrgbClr r="0" g="0" b="0"/>
-      </a:lnRef>
-      <a:fillRef idx="1">
-        <a:scrgbClr r="0" g="0" b="0"/>
-      </a:fillRef>
-      <a:effectRef idx="0">
-        <a:scrgbClr r="0" g="0" b="0"/>
-      </a:effectRef>
-      <a:fontRef idx="minor">
-        <a:schemeClr val="lt1"/>
-      </a:fontRef>
-    </dgm:style>
-  </dgm:styleLbl>
-  <dgm:styleLbl name="vennNode1">
-    <dgm:scene3d>
-      <a:camera prst="orthographicFront"/>
-      <a:lightRig rig="threePt" dir="t"/>
-    </dgm:scene3d>
-    <dgm:sp3d/>
-    <dgm:txPr/>
-    <dgm:style>
-      <a:lnRef idx="2">
-        <a:scrgbClr r="0" g="0" b="0"/>
-      </a:lnRef>
-      <a:fillRef idx="1">
-        <a:scrgbClr r="0" g="0" b="0"/>
-      </a:fillRef>
-      <a:effectRef idx="0">
-        <a:scrgbClr r="0" g="0" b="0"/>
-      </a:effectRef>
-      <a:fontRef idx="minor">
-        <a:schemeClr val="tx1"/>
-      </a:fontRef>
-    </dgm:style>
-  </dgm:styleLbl>
-  <dgm:styleLbl name="alignNode1">
-    <dgm:scene3d>
-      <a:camera prst="orthographicFront"/>
-      <a:lightRig rig="threePt" dir="t"/>
-    </dgm:scene3d>
-    <dgm:sp3d/>
-    <dgm:txPr/>
-    <dgm:style>
-      <a:lnRef idx="2">
-        <a:scrgbClr r="0" g="0" b="0"/>
-      </a:lnRef>
-      <a:fillRef idx="1">
-        <a:scrgbClr r="0" g="0" b="0"/>
-      </a:fillRef>
-      <a:effectRef idx="0">
-        <a:scrgbClr r="0" g="0" b="0"/>
-      </a:effectRef>
-      <a:fontRef idx="minor">
-        <a:schemeClr val="lt1"/>
-      </a:fontRef>
-    </dgm:style>
-  </dgm:styleLbl>
-  <dgm:styleLbl name="node1">
-    <dgm:scene3d>
-      <a:camera prst="orthographicFront"/>
-      <a:lightRig rig="threePt" dir="t"/>
-    </dgm:scene3d>
-    <dgm:sp3d/>
-    <dgm:txPr/>
-    <dgm:style>
-      <a:lnRef idx="2">
-        <a:scrgbClr r="0" g="0" b="0"/>
-      </a:lnRef>
-      <a:fillRef idx="1">
-        <a:scrgbClr r="0" g="0" b="0"/>
-      </a:fillRef>
-      <a:effectRef idx="0">
-        <a:scrgbClr r="0" g="0" b="0"/>
-      </a:effectRef>
-      <a:fontRef idx="minor">
-        <a:schemeClr val="lt1"/>
-      </a:fontRef>
-    </dgm:style>
-  </dgm:styleLbl>
-  <dgm:styleLbl name="node2">
-    <dgm:scene3d>
-      <a:camera prst="orthographicFront"/>
-      <a:lightRig rig="threePt" dir="t"/>
-    </dgm:scene3d>
-    <dgm:sp3d/>
-    <dgm:txPr/>
-    <dgm:style>
-      <a:lnRef idx="2">
-        <a:scrgbClr r="0" g="0" b="0"/>
-      </a:lnRef>
-      <a:fillRef idx="1">
-        <a:scrgbClr r="0" g="0" b="0"/>
-      </a:fillRef>
-      <a:effectRef idx="0">
-        <a:scrgbClr r="0" g="0" b="0"/>
-      </a:effectRef>
-      <a:fontRef idx="minor">
-        <a:schemeClr val="lt1"/>
-      </a:fontRef>
-    </dgm:style>
-  </dgm:styleLbl>
-  <dgm:styleLbl name="node3">
-    <dgm:scene3d>
-      <a:camera prst="orthographicFront"/>
-      <a:lightRig rig="threePt" dir="t"/>
-    </dgm:scene3d>
-    <dgm:sp3d/>
-    <dgm:txPr/>
-    <dgm:style>
-      <a:lnRef idx="2">
-        <a:scrgbClr r="0" g="0" b="0"/>
-      </a:lnRef>
-      <a:fillRef idx="1">
-        <a:scrgbClr r="0" g="0" b="0"/>
-      </a:fillRef>
-      <a:effectRef idx="0">
-        <a:scrgbClr r="0" g="0" b="0"/>
-      </a:effectRef>
-      <a:fontRef idx="minor">
-        <a:schemeClr val="lt1"/>
-      </a:fontRef>
-    </dgm:style>
-  </dgm:styleLbl>
-  <dgm:styleLbl name="node4">
-    <dgm:scene3d>
-      <a:camera prst="orthographicFront"/>
-      <a:lightRig rig="threePt" dir="t"/>
-    </dgm:scene3d>
-    <dgm:sp3d/>
-    <dgm:txPr/>
-    <dgm:style>
-      <a:lnRef idx="2">
-        <a:scrgbClr r="0" g="0" b="0"/>
-      </a:lnRef>
-      <a:fillRef idx="1">
-        <a:scrgbClr r="0" g="0" b="0"/>
-      </a:fillRef>
-      <a:effectRef idx="0">
-        <a:scrgbClr r="0" g="0" b="0"/>
-      </a:effectRef>
-      <a:fontRef idx="minor">
-        <a:schemeClr val="lt1"/>
-      </a:fontRef>
-    </dgm:style>
-  </dgm:styleLbl>
-  <dgm:styleLbl name="fgImgPlace1">
-    <dgm:scene3d>
-      <a:camera prst="orthographicFront"/>
-      <a:lightRig rig="threePt" dir="t"/>
-    </dgm:scene3d>
-    <dgm:sp3d/>
-    <dgm:txPr/>
-    <dgm:style>
-      <a:lnRef idx="2">
-        <a:scrgbClr r="0" g="0" b="0"/>
-      </a:lnRef>
-      <a:fillRef idx="1">
-        <a:scrgbClr r="0" g="0" b="0"/>
-      </a:fillRef>
-      <a:effectRef idx="0">
-        <a:scrgbClr r="0" g="0" b="0"/>
-      </a:effectRef>
-      <a:fontRef idx="minor"/>
-    </dgm:style>
-  </dgm:styleLbl>
-  <dgm:styleLbl name="alignImgPlace1">
-    <dgm:scene3d>
-      <a:camera prst="orthographicFront"/>
-      <a:lightRig rig="threePt" dir="t"/>
-    </dgm:scene3d>
-    <dgm:sp3d/>
-    <dgm:txPr/>
-    <dgm:style>
-      <a:lnRef idx="2">
-        <a:scrgbClr r="0" g="0" b="0"/>
-      </a:lnRef>
-      <a:fillRef idx="1">
-        <a:scrgbClr r="0" g="0" b="0"/>
-      </a:fillRef>
-      <a:effectRef idx="0">
-        <a:scrgbClr r="0" g="0" b="0"/>
-      </a:effectRef>
-      <a:fontRef idx="minor"/>
-    </dgm:style>
-  </dgm:styleLbl>
-  <dgm:styleLbl name="bgImgPlace1">
-    <dgm:scene3d>
-      <a:camera prst="orthographicFront"/>
-      <a:lightRig rig="threePt" dir="t"/>
-    </dgm:scene3d>
-    <dgm:sp3d/>
-    <dgm:txPr/>
-    <dgm:style>
-      <a:lnRef idx="2">
-        <a:scrgbClr r="0" g="0" b="0"/>
-      </a:lnRef>
-      <a:fillRef idx="1">
-        <a:scrgbClr r="0" g="0" b="0"/>
-      </a:fillRef>
-      <a:effectRef idx="0">
-        <a:scrgbClr r="0" g="0" b="0"/>
-      </a:effectRef>
-      <a:fontRef idx="minor"/>
-    </dgm:style>
-  </dgm:styleLbl>
-  <dgm:styleLbl name="sibTrans2D1">
-    <dgm:scene3d>
-      <a:camera prst="orthographicFront"/>
-      <a:lightRig rig="threePt" dir="t"/>
-    </dgm:scene3d>
-    <dgm:sp3d/>
-    <dgm:txPr/>
-    <dgm:style>
-      <a:lnRef idx="0">
-        <a:scrgbClr r="0" g="0" b="0"/>
-      </a:lnRef>
-      <a:fillRef idx="1">
-        <a:scrgbClr r="0" g="0" b="0"/>
-      </a:fillRef>
-      <a:effectRef idx="0">
-        <a:scrgbClr r="0" g="0" b="0"/>
-      </a:effectRef>
-      <a:fontRef idx="minor">
-        <a:schemeClr val="lt1"/>
-      </a:fontRef>
-    </dgm:style>
-  </dgm:styleLbl>
-  <dgm:styleLbl name="fgSibTrans2D1">
-    <dgm:scene3d>
-      <a:camera prst="orthographicFront"/>
-      <a:lightRig rig="threePt" dir="t"/>
-    </dgm:scene3d>
-    <dgm:sp3d/>
-    <dgm:txPr/>
-    <dgm:style>
-      <a:lnRef idx="0">
-        <a:scrgbClr r="0" g="0" b="0"/>
-      </a:lnRef>
-      <a:fillRef idx="1">
-        <a:scrgbClr r="0" g="0" b="0"/>
-      </a:fillRef>
-      <a:effectRef idx="0">
-        <a:scrgbClr r="0" g="0" b="0"/>
-      </a:effectRef>
-      <a:fontRef idx="minor">
-        <a:schemeClr val="lt1"/>
-      </a:fontRef>
-    </dgm:style>
-  </dgm:styleLbl>
-  <dgm:styleLbl name="bgSibTrans2D1">
-    <dgm:scene3d>
-      <a:camera prst="orthographicFront"/>
-      <a:lightRig rig="threePt" dir="t"/>
-    </dgm:scene3d>
-    <dgm:sp3d/>
-    <dgm:txPr/>
-    <dgm:style>
-      <a:lnRef idx="0">
-        <a:scrgbClr r="0" g="0" b="0"/>
-      </a:lnRef>
-      <a:fillRef idx="1">
-        <a:scrgbClr r="0" g="0" b="0"/>
-      </a:fillRef>
-      <a:effectRef idx="0">
-        <a:scrgbClr r="0" g="0" b="0"/>
-      </a:effectRef>
-      <a:fontRef idx="minor">
-        <a:schemeClr val="lt1"/>
-      </a:fontRef>
-    </dgm:style>
-  </dgm:styleLbl>
-  <dgm:styleLbl name="sibTrans1D1">
-    <dgm:scene3d>
-      <a:camera prst="orthographicFront"/>
-      <a:lightRig rig="threePt" dir="t"/>
-    </dgm:scene3d>
-    <dgm:sp3d/>
-    <dgm:txPr/>
-    <dgm:style>
-      <a:lnRef idx="1">
-        <a:scrgbClr r="0" g="0" b="0"/>
-      </a:lnRef>
-      <a:fillRef idx="0">
-        <a:scrgbClr r="0" g="0" b="0"/>
-      </a:fillRef>
-      <a:effectRef idx="0">
-        <a:scrgbClr r="0" g="0" b="0"/>
-      </a:effectRef>
-      <a:fontRef idx="minor"/>
-    </dgm:style>
-  </dgm:styleLbl>
-  <dgm:styleLbl name="callout">
-    <dgm:scene3d>
-      <a:camera prst="orthographicFront"/>
-      <a:lightRig rig="threePt" dir="t"/>
-    </dgm:scene3d>
-    <dgm:sp3d/>
-    <dgm:txPr/>
-    <dgm:style>
-      <a:lnRef idx="2">
-        <a:scrgbClr r="0" g="0" b="0"/>
-      </a:lnRef>
-      <a:fillRef idx="1">
-        <a:scrgbClr r="0" g="0" b="0"/>
-      </a:fillRef>
-      <a:effectRef idx="0">
-        <a:scrgbClr r="0" g="0" b="0"/>
-      </a:effectRef>
-      <a:fontRef idx="minor"/>
-    </dgm:style>
-  </dgm:styleLbl>
-  <dgm:styleLbl name="asst0">
-    <dgm:scene3d>
-      <a:camera prst="orthographicFront"/>
-      <a:lightRig rig="threePt" dir="t"/>
-    </dgm:scene3d>
-    <dgm:sp3d/>
-    <dgm:txPr/>
-    <dgm:style>
-      <a:lnRef idx="2">
-        <a:scrgbClr r="0" g="0" b="0"/>
-      </a:lnRef>
-      <a:fillRef idx="1">
-        <a:scrgbClr r="0" g="0" b="0"/>
-      </a:fillRef>
-      <a:effectRef idx="0">
-        <a:scrgbClr r="0" g="0" b="0"/>
-      </a:effectRef>
-      <a:fontRef idx="minor">
-        <a:schemeClr val="lt1"/>
-      </a:fontRef>
-    </dgm:style>
-  </dgm:styleLbl>
-  <dgm:styleLbl name="asst1">
-    <dgm:scene3d>
-      <a:camera prst="orthographicFront"/>
-      <a:lightRig rig="threePt" dir="t"/>
-    </dgm:scene3d>
-    <dgm:sp3d/>
-    <dgm:txPr/>
-    <dgm:style>
-      <a:lnRef idx="2">
-        <a:scrgbClr r="0" g="0" b="0"/>
-      </a:lnRef>
-      <a:fillRef idx="1">
-        <a:scrgbClr r="0" g="0" b="0"/>
-      </a:fillRef>
-      <a:effectRef idx="0">
-        <a:scrgbClr r="0" g="0" b="0"/>
-      </a:effectRef>
-      <a:fontRef idx="minor">
-        <a:schemeClr val="lt1"/>
-      </a:fontRef>
-    </dgm:style>
-  </dgm:styleLbl>
-  <dgm:styleLbl name="asst2">
-    <dgm:scene3d>
-      <a:camera prst="orthographicFront"/>
-      <a:lightRig rig="threePt" dir="t"/>
-    </dgm:scene3d>
-    <dgm:sp3d/>
-    <dgm:txPr/>
-    <dgm:style>
-      <a:lnRef idx="2">
-        <a:scrgbClr r="0" g="0" b="0"/>
-      </a:lnRef>
-      <a:fillRef idx="1">
-        <a:scrgbClr r="0" g="0" b="0"/>
-      </a:fillRef>
-      <a:effectRef idx="0">
-        <a:scrgbClr r="0" g="0" b="0"/>
-      </a:effectRef>
-      <a:fontRef idx="minor">
-        <a:schemeClr val="lt1"/>
-      </a:fontRef>
-    </dgm:style>
-  </dgm:styleLbl>
-  <dgm:styleLbl name="asst3">
-    <dgm:scene3d>
-      <a:camera prst="orthographicFront"/>
-      <a:lightRig rig="threePt" dir="t"/>
-    </dgm:scene3d>
-    <dgm:sp3d/>
-    <dgm:txPr/>
-    <dgm:style>
-      <a:lnRef idx="2">
-        <a:scrgbClr r="0" g="0" b="0"/>
-      </a:lnRef>
-      <a:fillRef idx="1">
-        <a:scrgbClr r="0" g="0" b="0"/>
-      </a:fillRef>
-      <a:effectRef idx="0">
-        <a:scrgbClr r="0" g="0" b="0"/>
-      </a:effectRef>
-      <a:fontRef idx="minor">
-        <a:schemeClr val="lt1"/>
-      </a:fontRef>
-    </dgm:style>
-  </dgm:styleLbl>
-  <dgm:styleLbl name="asst4">
-    <dgm:scene3d>
-      <a:camera prst="orthographicFront"/>
-      <a:lightRig rig="threePt" dir="t"/>
-    </dgm:scene3d>
-    <dgm:sp3d/>
-    <dgm:txPr/>
-    <dgm:style>
-      <a:lnRef idx="2">
-        <a:scrgbClr r="0" g="0" b="0"/>
-      </a:lnRef>
-      <a:fillRef idx="1">
-        <a:scrgbClr r="0" g="0" b="0"/>
-      </a:fillRef>
-      <a:effectRef idx="0">
-        <a:scrgbClr r="0" g="0" b="0"/>
-      </a:effectRef>
-      <a:fontRef idx="minor">
-        <a:schemeClr val="lt1"/>
-      </a:fontRef>
-    </dgm:style>
-  </dgm:styleLbl>
-  <dgm:styleLbl name="parChTrans2D1">
-    <dgm:scene3d>
-      <a:camera prst="orthographicFront"/>
-      <a:lightRig rig="threePt" dir="t"/>
-    </dgm:scene3d>
-    <dgm:sp3d/>
-    <dgm:txPr/>
-    <dgm:style>
-      <a:lnRef idx="2">
-        <a:scrgbClr r="0" g="0" b="0"/>
-      </a:lnRef>
-      <a:fillRef idx="1">
-        <a:scrgbClr r="0" g="0" b="0"/>
-      </a:fillRef>
-      <a:effectRef idx="0">
-        <a:scrgbClr r="0" g="0" b="0"/>
-      </a:effectRef>
-      <a:fontRef idx="minor">
-        <a:schemeClr val="lt1"/>
-      </a:fontRef>
-    </dgm:style>
-  </dgm:styleLbl>
-  <dgm:styleLbl name="parChTrans2D2">
-    <dgm:scene3d>
-      <a:camera prst="orthographicFront"/>
-      <a:lightRig rig="threePt" dir="t"/>
-    </dgm:scene3d>
-    <dgm:sp3d/>
-    <dgm:txPr/>
-    <dgm:style>
-      <a:lnRef idx="2">
-        <a:scrgbClr r="0" g="0" b="0"/>
-      </a:lnRef>
-      <a:fillRef idx="1">
-        <a:scrgbClr r="0" g="0" b="0"/>
-      </a:fillRef>
-      <a:effectRef idx="0">
-        <a:scrgbClr r="0" g="0" b="0"/>
-      </a:effectRef>
-      <a:fontRef idx="minor">
-        <a:schemeClr val="lt1"/>
-      </a:fontRef>
-    </dgm:style>
-  </dgm:styleLbl>
-  <dgm:styleLbl name="parChTrans2D3">
-    <dgm:scene3d>
-      <a:camera prst="orthographicFront"/>
-      <a:lightRig rig="threePt" dir="t"/>
-    </dgm:scene3d>
-    <dgm:sp3d/>
-    <dgm:txPr/>
-    <dgm:style>
-      <a:lnRef idx="2">
-        <a:scrgbClr r="0" g="0" b="0"/>
-      </a:lnRef>
-      <a:fillRef idx="1">
-        <a:scrgbClr r="0" g="0" b="0"/>
-      </a:fillRef>
-      <a:effectRef idx="0">
-        <a:scrgbClr r="0" g="0" b="0"/>
-      </a:effectRef>
-      <a:fontRef idx="minor">
-        <a:schemeClr val="lt1"/>
-      </a:fontRef>
-    </dgm:style>
-  </dgm:styleLbl>
-  <dgm:styleLbl name="parChTrans2D4">
-    <dgm:scene3d>
-      <a:camera prst="orthographicFront"/>
-      <a:lightRig rig="threePt" dir="t"/>
-    </dgm:scene3d>
-    <dgm:sp3d/>
-    <dgm:txPr/>
-    <dgm:style>
-      <a:lnRef idx="2">
-        <a:scrgbClr r="0" g="0" b="0"/>
-      </a:lnRef>
-      <a:fillRef idx="1">
-        <a:scrgbClr r="0" g="0" b="0"/>
-      </a:fillRef>
-      <a:effectRef idx="0">
-        <a:scrgbClr r="0" g="0" b="0"/>
-      </a:effectRef>
-      <a:fontRef idx="minor">
-        <a:schemeClr val="lt1"/>
-      </a:fontRef>
-    </dgm:style>
-  </dgm:styleLbl>
-  <dgm:styleLbl name="parChTrans1D1">
-    <dgm:scene3d>
-      <a:camera prst="orthographicFront"/>
-      <a:lightRig rig="threePt" dir="t"/>
-    </dgm:scene3d>
-    <dgm:sp3d/>
-    <dgm:txPr/>
-    <dgm:style>
-      <a:lnRef idx="2">
-        <a:scrgbClr r="0" g="0" b="0"/>
-      </a:lnRef>
-      <a:fillRef idx="0">
-        <a:scrgbClr r="0" g="0" b="0"/>
-      </a:fillRef>
-      <a:effectRef idx="0">
-        <a:scrgbClr r="0" g="0" b="0"/>
-      </a:effectRef>
-      <a:fontRef idx="minor"/>
-    </dgm:style>
-  </dgm:styleLbl>
-  <dgm:styleLbl name="parChTrans1D2">
-    <dgm:scene3d>
-      <a:camera prst="orthographicFront"/>
-      <a:lightRig rig="threePt" dir="t"/>
-    </dgm:scene3d>
-    <dgm:sp3d/>
-    <dgm:txPr/>
-    <dgm:style>
-      <a:lnRef idx="2">
-        <a:scrgbClr r="0" g="0" b="0"/>
-      </a:lnRef>
-      <a:fillRef idx="0">
-        <a:scrgbClr r="0" g="0" b="0"/>
-      </a:fillRef>
-      <a:effectRef idx="0">
-        <a:scrgbClr r="0" g="0" b="0"/>
-      </a:effectRef>
-      <a:fontRef idx="minor"/>
-    </dgm:style>
-  </dgm:styleLbl>
-  <dgm:styleLbl name="parChTrans1D3">
-    <dgm:scene3d>
-      <a:camera prst="orthographicFront"/>
-      <a:lightRig rig="threePt" dir="t"/>
-    </dgm:scene3d>
-    <dgm:sp3d/>
-    <dgm:txPr/>
-    <dgm:style>
-      <a:lnRef idx="2">
-        <a:scrgbClr r="0" g="0" b="0"/>
-      </a:lnRef>
-      <a:fillRef idx="0">
-        <a:scrgbClr r="0" g="0" b="0"/>
-      </a:fillRef>
-      <a:effectRef idx="0">
-        <a:scrgbClr r="0" g="0" b="0"/>
-      </a:effectRef>
-      <a:fontRef idx="minor"/>
-    </dgm:style>
-  </dgm:styleLbl>
-  <dgm:styleLbl name="parChTrans1D4">
-    <dgm:scene3d>
-      <a:camera prst="orthographicFront"/>
-      <a:lightRig rig="threePt" dir="t"/>
-    </dgm:scene3d>
-    <dgm:sp3d/>
-    <dgm:txPr/>
-    <dgm:style>
-      <a:lnRef idx="2">
-        <a:scrgbClr r="0" g="0" b="0"/>
-      </a:lnRef>
-      <a:fillRef idx="0">
-        <a:scrgbClr r="0" g="0" b="0"/>
-      </a:fillRef>
-      <a:effectRef idx="0">
-        <a:scrgbClr r="0" g="0" b="0"/>
-      </a:effectRef>
-      <a:fontRef idx="minor"/>
-    </dgm:style>
-  </dgm:styleLbl>
-  <dgm:styleLbl name="fgAcc1">
-    <dgm:scene3d>
-      <a:camera prst="orthographicFront"/>
-      <a:lightRig rig="threePt" dir="t"/>
-    </dgm:scene3d>
-    <dgm:sp3d/>
-    <dgm:txPr/>
-    <dgm:style>
-      <a:lnRef idx="2">
-        <a:scrgbClr r="0" g="0" b="0"/>
-      </a:lnRef>
-      <a:fillRef idx="1">
-        <a:scrgbClr r="0" g="0" b="0"/>
-      </a:fillRef>
-      <a:effectRef idx="0">
-        <a:scrgbClr r="0" g="0" b="0"/>
-      </a:effectRef>
-      <a:fontRef idx="minor"/>
-    </dgm:style>
-  </dgm:styleLbl>
-  <dgm:styleLbl name="conFgAcc1">
-    <dgm:scene3d>
-      <a:camera prst="orthographicFront"/>
-      <a:lightRig rig="threePt" dir="t"/>
-    </dgm:scene3d>
-    <dgm:sp3d/>
-    <dgm:txPr/>
-    <dgm:style>
-      <a:lnRef idx="2">
-        <a:scrgbClr r="0" g="0" b="0"/>
-      </a:lnRef>
-      <a:fillRef idx="1">
-        <a:scrgbClr r="0" g="0" b="0"/>
-      </a:fillRef>
-      <a:effectRef idx="0">
-        <a:scrgbClr r="0" g="0" b="0"/>
-      </a:effectRef>
-      <a:fontRef idx="minor"/>
-    </dgm:style>
-  </dgm:styleLbl>
-  <dgm:styleLbl name="alignAcc1">
-    <dgm:scene3d>
-      <a:camera prst="orthographicFront"/>
-      <a:lightRig rig="threePt" dir="t"/>
-    </dgm:scene3d>
-    <dgm:sp3d/>
-    <dgm:txPr/>
-    <dgm:style>
-      <a:lnRef idx="2">
-        <a:scrgbClr r="0" g="0" b="0"/>
-      </a:lnRef>
-      <a:fillRef idx="1">
-        <a:scrgbClr r="0" g="0" b="0"/>
-      </a:fillRef>
-      <a:effectRef idx="0">
-        <a:scrgbClr r="0" g="0" b="0"/>
-      </a:effectRef>
-      <a:fontRef idx="minor"/>
-    </dgm:style>
-  </dgm:styleLbl>
-  <dgm:styleLbl name="trAlignAcc1">
-    <dgm:scene3d>
-      <a:camera prst="orthographicFront"/>
-      <a:lightRig rig="threePt" dir="t"/>
-    </dgm:scene3d>
-    <dgm:sp3d/>
-    <dgm:txPr/>
-    <dgm:style>
-      <a:lnRef idx="1">
-        <a:scrgbClr r="0" g="0" b="0"/>
-      </a:lnRef>
-      <a:fillRef idx="1">
-        <a:scrgbClr r="0" g="0" b="0"/>
-      </a:fillRef>
-      <a:effectRef idx="0">
-        <a:scrgbClr r="0" g="0" b="0"/>
-      </a:effectRef>
-      <a:fontRef idx="minor"/>
-    </dgm:style>
-  </dgm:styleLbl>
-  <dgm:styleLbl name="bgAcc1">
-    <dgm:scene3d>
-      <a:camera prst="orthographicFront"/>
-      <a:lightRig rig="threePt" dir="t"/>
-    </dgm:scene3d>
-    <dgm:sp3d/>
-    <dgm:txPr/>
-    <dgm:style>
-      <a:lnRef idx="2">
-        <a:scrgbClr r="0" g="0" b="0"/>
-      </a:lnRef>
-      <a:fillRef idx="1">
-        <a:scrgbClr r="0" g="0" b="0"/>
-      </a:fillRef>
-      <a:effectRef idx="0">
-        <a:scrgbClr r="0" g="0" b="0"/>
-      </a:effectRef>
-      <a:fontRef idx="minor"/>
-    </dgm:style>
-  </dgm:styleLbl>
-  <dgm:styleLbl name="solidFgAcc1">
-    <dgm:scene3d>
-      <a:camera prst="orthographicFront"/>
-      <a:lightRig rig="threePt" dir="t"/>
-    </dgm:scene3d>
-    <dgm:sp3d/>
-    <dgm:txPr/>
-    <dgm:style>
-      <a:lnRef idx="2">
-        <a:scrgbClr r="0" g="0" b="0"/>
-      </a:lnRef>
-      <a:fillRef idx="1">
-        <a:scrgbClr r="0" g="0" b="0"/>
-      </a:fillRef>
-      <a:effectRef idx="0">
-        <a:scrgbClr r="0" g="0" b="0"/>
-      </a:effectRef>
-      <a:fontRef idx="minor"/>
-    </dgm:style>
-  </dgm:styleLbl>
-  <dgm:styleLbl name="solidAlignAcc1">
-    <dgm:scene3d>
-      <a:camera prst="orthographicFront"/>
-      <a:lightRig rig="threePt" dir="t"/>
-    </dgm:scene3d>
-    <dgm:sp3d/>
-    <dgm:txPr/>
-    <dgm:style>
-      <a:lnRef idx="2">
-        <a:scrgbClr r="0" g="0" b="0"/>
-      </a:lnRef>
-      <a:fillRef idx="1">
-        <a:scrgbClr r="0" g="0" b="0"/>
-      </a:fillRef>
-      <a:effectRef idx="0">
-        <a:scrgbClr r="0" g="0" b="0"/>
-      </a:effectRef>
-      <a:fontRef idx="minor"/>
-    </dgm:style>
-  </dgm:styleLbl>
-  <dgm:styleLbl name="solidBgAcc1">
-    <dgm:scene3d>
-      <a:camera prst="orthographicFront"/>
-      <a:lightRig rig="threePt" dir="t"/>
-    </dgm:scene3d>
-    <dgm:sp3d/>
-    <dgm:txPr/>
-    <dgm:style>
-      <a:lnRef idx="2">
-        <a:scrgbClr r="0" g="0" b="0"/>
-      </a:lnRef>
-      <a:fillRef idx="1">
-        <a:scrgbClr r="0" g="0" b="0"/>
-      </a:fillRef>
-      <a:effectRef idx="0">
-        <a:scrgbClr r="0" g="0" b="0"/>
-      </a:effectRef>
-      <a:fontRef idx="minor"/>
-    </dgm:style>
-  </dgm:styleLbl>
-  <dgm:styleLbl name="fgAccFollowNode1">
-    <dgm:scene3d>
-      <a:camera prst="orthographicFront"/>
-      <a:lightRig rig="threePt" dir="t"/>
-    </dgm:scene3d>
-    <dgm:sp3d/>
-    <dgm:txPr/>
-    <dgm:style>
-      <a:lnRef idx="2">
-        <a:scrgbClr r="0" g="0" b="0"/>
-      </a:lnRef>
-      <a:fillRef idx="1">
-        <a:scrgbClr r="0" g="0" b="0"/>
-      </a:fillRef>
-      <a:effectRef idx="0">
-        <a:scrgbClr r="0" g="0" b="0"/>
-      </a:effectRef>
-      <a:fontRef idx="minor"/>
-    </dgm:style>
-  </dgm:styleLbl>
-  <dgm:styleLbl name="alignAccFollowNode1">
-    <dgm:scene3d>
-      <a:camera prst="orthographicFront"/>
-      <a:lightRig rig="threePt" dir="t"/>
-    </dgm:scene3d>
-    <dgm:sp3d/>
-    <dgm:txPr/>
-    <dgm:style>
-      <a:lnRef idx="2">
-        <a:scrgbClr r="0" g="0" b="0"/>
-      </a:lnRef>
-      <a:fillRef idx="1">
-        <a:scrgbClr r="0" g="0" b="0"/>
-      </a:fillRef>
-      <a:effectRef idx="0">
-        <a:scrgbClr r="0" g="0" b="0"/>
-      </a:effectRef>
-      <a:fontRef idx="minor"/>
-    </dgm:style>
-  </dgm:styleLbl>
-  <dgm:styleLbl name="bgAccFollowNode1">
-    <dgm:scene3d>
-      <a:camera prst="orthographicFront"/>
-      <a:lightRig rig="threePt" dir="t"/>
-    </dgm:scene3d>
-    <dgm:sp3d/>
-    <dgm:txPr/>
-    <dgm:style>
-      <a:lnRef idx="2">
-        <a:scrgbClr r="0" g="0" b="0"/>
-      </a:lnRef>
-      <a:fillRef idx="1">
-        <a:scrgbClr r="0" g="0" b="0"/>
-      </a:fillRef>
-      <a:effectRef idx="0">
-        <a:scrgbClr r="0" g="0" b="0"/>
-      </a:effectRef>
-      <a:fontRef idx="minor"/>
-    </dgm:style>
-  </dgm:styleLbl>
-  <dgm:styleLbl name="fgAcc0">
-    <dgm:scene3d>
-      <a:camera prst="orthographicFront"/>
-      <a:lightRig rig="threePt" dir="t"/>
-    </dgm:scene3d>
-    <dgm:sp3d/>
-    <dgm:txPr/>
-    <dgm:style>
-      <a:lnRef idx="2">
-        <a:scrgbClr r="0" g="0" b="0"/>
-      </a:lnRef>
-      <a:fillRef idx="1">
-        <a:scrgbClr r="0" g="0" b="0"/>
-      </a:fillRef>
-      <a:effectRef idx="0">
-        <a:scrgbClr r="0" g="0" b="0"/>
-      </a:effectRef>
-      <a:fontRef idx="minor"/>
-    </dgm:style>
-  </dgm:styleLbl>
-  <dgm:styleLbl name="fgAcc2">
-    <dgm:scene3d>
-      <a:camera prst="orthographicFront"/>
-      <a:lightRig rig="threePt" dir="t"/>
-    </dgm:scene3d>
-    <dgm:sp3d/>
-    <dgm:txPr/>
-    <dgm:style>
-      <a:lnRef idx="2">
-        <a:scrgbClr r="0" g="0" b="0"/>
-      </a:lnRef>
-      <a:fillRef idx="1">
-        <a:scrgbClr r="0" g="0" b="0"/>
-      </a:fillRef>
-      <a:effectRef idx="0">
-        <a:scrgbClr r="0" g="0" b="0"/>
-      </a:effectRef>
-      <a:fontRef idx="minor"/>
-    </dgm:style>
-  </dgm:styleLbl>
-  <dgm:styleLbl name="fgAcc3">
-    <dgm:scene3d>
-      <a:camera prst="orthographicFront"/>
-      <a:lightRig rig="threePt" dir="t"/>
-    </dgm:scene3d>
-    <dgm:sp3d/>
-    <dgm:txPr/>
-    <dgm:style>
-      <a:lnRef idx="2">
-        <a:scrgbClr r="0" g="0" b="0"/>
-      </a:lnRef>
-      <a:fillRef idx="1">
-        <a:scrgbClr r="0" g="0" b="0"/>
-      </a:fillRef>
-      <a:effectRef idx="0">
-        <a:scrgbClr r="0" g="0" b="0"/>
-      </a:effectRef>
-      <a:fontRef idx="minor"/>
-    </dgm:style>
-  </dgm:styleLbl>
-  <dgm:styleLbl name="fgAcc4">
-    <dgm:scene3d>
-      <a:camera prst="orthographicFront"/>
-      <a:lightRig rig="threePt" dir="t"/>
-    </dgm:scene3d>
-    <dgm:sp3d/>
-    <dgm:txPr/>
-    <dgm:style>
-      <a:lnRef idx="2">
-        <a:scrgbClr r="0" g="0" b="0"/>
-      </a:lnRef>
-      <a:fillRef idx="1">
-        <a:scrgbClr r="0" g="0" b="0"/>
-      </a:fillRef>
-      <a:effectRef idx="0">
-        <a:scrgbClr r="0" g="0" b="0"/>
-      </a:effectRef>
-      <a:fontRef idx="minor"/>
-    </dgm:style>
-  </dgm:styleLbl>
-  <dgm:styleLbl name="bgShp">
-    <dgm:scene3d>
-      <a:camera prst="orthographicFront"/>
-      <a:lightRig rig="threePt" dir="t"/>
-    </dgm:scene3d>
-    <dgm:sp3d/>
-    <dgm:txPr/>
-    <dgm:style>
-      <a:lnRef idx="0">
-        <a:scrgbClr r="0" g="0" b="0"/>
-      </a:lnRef>
-      <a:fillRef idx="1">
-        <a:scrgbClr r="0" g="0" b="0"/>
-      </a:fillRef>
-      <a:effectRef idx="0">
-        <a:scrgbClr r="0" g="0" b="0"/>
-      </a:effectRef>
-      <a:fontRef idx="minor"/>
-    </dgm:style>
-  </dgm:styleLbl>
-  <dgm:styleLbl name="dkBgShp">
-    <dgm:scene3d>
-      <a:camera prst="orthographicFront"/>
-      <a:lightRig rig="threePt" dir="t"/>
-    </dgm:scene3d>
-    <dgm:sp3d/>
-    <dgm:txPr/>
-    <dgm:style>
-      <a:lnRef idx="0">
-        <a:scrgbClr r="0" g="0" b="0"/>
-      </a:lnRef>
-      <a:fillRef idx="1">
-        <a:scrgbClr r="0" g="0" b="0"/>
-      </a:fillRef>
-      <a:effectRef idx="0">
-        <a:scrgbClr r="0" g="0" b="0"/>
-      </a:effectRef>
-      <a:fontRef idx="minor"/>
-    </dgm:style>
-  </dgm:styleLbl>
-  <dgm:styleLbl name="trBgShp">
-    <dgm:scene3d>
-      <a:camera prst="orthographicFront"/>
-      <a:lightRig rig="threePt" dir="t"/>
-    </dgm:scene3d>
-    <dgm:sp3d/>
-    <dgm:txPr/>
-    <dgm:style>
-      <a:lnRef idx="0">
-        <a:scrgbClr r="0" g="0" b="0"/>
-      </a:lnRef>
-      <a:fillRef idx="1">
-        <a:scrgbClr r="0" g="0" b="0"/>
-      </a:fillRef>
-      <a:effectRef idx="0">
-        <a:scrgbClr r="0" g="0" b="0"/>
-      </a:effectRef>
-      <a:fontRef idx="minor"/>
-    </dgm:style>
-  </dgm:styleLbl>
-  <dgm:styleLbl name="fgShp">
-    <dgm:scene3d>
-      <a:camera prst="orthographicFront"/>
-      <a:lightRig rig="threePt" dir="t"/>
-    </dgm:scene3d>
-    <dgm:sp3d/>
-    <dgm:txPr/>
-    <dgm:style>
-      <a:lnRef idx="2">
-        <a:scrgbClr r="0" g="0" b="0"/>
-      </a:lnRef>
-      <a:fillRef idx="1">
-        <a:scrgbClr r="0" g="0" b="0"/>
-      </a:fillRef>
-      <a:effectRef idx="0">
-        <a:scrgbClr r="0" g="0" b="0"/>
-      </a:effectRef>
-      <a:fontRef idx="minor"/>
-    </dgm:style>
-  </dgm:styleLbl>
-  <dgm:styleLbl name="revTx">
-    <dgm:scene3d>
-      <a:camera prst="orthographicFront"/>
-      <a:lightRig rig="threePt" dir="t"/>
-    </dgm:scene3d>
-    <dgm:sp3d/>
-    <dgm:txPr/>
-    <dgm:style>
-      <a:lnRef idx="0">
-        <a:scrgbClr r="0" g="0" b="0"/>
-      </a:lnRef>
-      <a:fillRef idx="0">
-        <a:scrgbClr r="0" g="0" b="0"/>
-      </a:fillRef>
-      <a:effectRef idx="0">
-        <a:scrgbClr r="0" g="0" b="0"/>
-      </a:effectRef>
-      <a:fontRef idx="minor"/>
-    </dgm:style>
-  </dgm:styleLbl>
-</dgm:styleDef>
-</file>
-
 <file path=ppt/handoutMasters/handoutMaster1.xml><?xml version="1.0" encoding="utf-8"?>
 <p:handoutMaster xmlns:a="http://schemas.openxmlformats.org/drawingml/2006/main" xmlns:r="http://schemas.openxmlformats.org/officeDocument/2006/relationships" xmlns:p="http://schemas.openxmlformats.org/presentationml/2006/main">
   <p:cSld>
@@ -4156,120 +1528,6 @@
       </p:grpSpPr>
       <p:sp>
         <p:nvSpPr>
-          <p:cNvPr id="2" name="Slide Image Placeholder 1"/>
-          <p:cNvSpPr>
-            <a:spLocks noGrp="1" noRot="1" noChangeAspect="1"/>
-          </p:cNvSpPr>
-          <p:nvPr>
-            <p:ph type="sldImg"/>
-          </p:nvPr>
-        </p:nvSpPr>
-        <p:spPr/>
-      </p:sp>
-      <p:sp>
-        <p:nvSpPr>
-          <p:cNvPr id="3" name="Notes Placeholder 2"/>
-          <p:cNvSpPr>
-            <a:spLocks noGrp="1"/>
-          </p:cNvSpPr>
-          <p:nvPr>
-            <p:ph type="body" idx="1"/>
-          </p:nvPr>
-        </p:nvSpPr>
-        <p:spPr/>
-        <p:txBody>
-          <a:bodyPr>
-            <a:normAutofit fontScale="85000" lnSpcReduction="20000"/>
-          </a:bodyPr>
-          <a:lstStyle/>
-          <a:p>
-            <a:r>
-              <a:rPr lang="en-US" dirty="0"/>
-              <a:t>About controller &amp; the operator pattern:</a:t>
-            </a:r>
-          </a:p>
-          <a:p>
-            <a:r>
-              <a:rPr lang="en-US" dirty="0"/>
-              <a:t>In the beginning of our course we said: “Kubernetes is extensible”. You cannot only bring your workloads into container and onto Kubernetes, you can also enhance the way Kubernetes is working. We start with the simplest way of doing so – writing a “controller” or “operator”. It basically consists of 3 logical parts:</a:t>
-            </a:r>
-          </a:p>
-          <a:p>
-            <a:pPr marL="342900" indent="-342900">
-              <a:buAutoNum type="arabicParenR"/>
-            </a:pPr>
-            <a:r>
-              <a:rPr lang="en-US" dirty="0"/>
-              <a:t>Observe - write a control loop, checking certain objects for their state.</a:t>
-            </a:r>
-          </a:p>
-          <a:p>
-            <a:pPr marL="342900" indent="-342900">
-              <a:buAutoNum type="arabicParenR"/>
-            </a:pPr>
-            <a:r>
-              <a:rPr lang="en-US" dirty="0"/>
-              <a:t>Analyze – check the current state against a desired state (may be stored in a different resource, outside of the cluster, hardcoded, …) </a:t>
-            </a:r>
-          </a:p>
-          <a:p>
-            <a:pPr marL="342900" indent="-342900">
-              <a:buAutoNum type="arabicParenR"/>
-            </a:pPr>
-            <a:r>
-              <a:rPr lang="en-US" dirty="0"/>
-              <a:t>Action – if there’s a difference between desired &amp; current state, the controller should act and trigger a defined action to bring the observed objects into the desired state</a:t>
-            </a:r>
-          </a:p>
-          <a:p>
-            <a:endParaRPr lang="en-US" dirty="0"/>
-          </a:p>
-          <a:p>
-            <a:r>
-              <a:rPr lang="en-US" dirty="0"/>
-              <a:t>Lets combine the controller/operator with another powerful mechanism in the K8s realm: “Custom Resource Definition/Object” API (CRD / CRO)</a:t>
-            </a:r>
-          </a:p>
-          <a:p>
-            <a:r>
-              <a:rPr lang="en-US" dirty="0"/>
-              <a:t>CRDs allow you to specify your own objects and integrate them with the K8s API (like a deployment or PVC). Once you defined a CRD, you can start to create objects of that type. But only if you have an operator watching for these objects, something will happen.</a:t>
-            </a:r>
-          </a:p>
-          <a:p>
-            <a:endParaRPr lang="en-US" dirty="0"/>
-          </a:p>
-          <a:p>
-            <a:r>
-              <a:rPr lang="en-US" dirty="0"/>
-              <a:t>Example:</a:t>
-            </a:r>
-          </a:p>
-          <a:p>
-            <a:r>
-              <a:rPr lang="en-US" dirty="0"/>
-              <a:t>You want to run a distributed database on K8s. The actual instances are wrapped into a deployment. However for actions like backup or scaling, you would need to logon to each pod and prepare it manually. A possible solution would be to put scripts into the container images and trigger them. But it still is a manual action to trigger. </a:t>
-            </a:r>
-          </a:p>
-          <a:p>
-            <a:r>
-              <a:rPr lang="en-US" dirty="0"/>
-              <a:t>Instead writing a controller, that watch for certain annotations in the resources metadata is a very valid option. The controller could not only process the action associated with these annotations but also update them.</a:t>
-            </a:r>
-          </a:p>
-          <a:p>
-            <a:endParaRPr lang="en-US" dirty="0"/>
-          </a:p>
-          <a:p>
-            <a:r>
-              <a:rPr lang="en-US" dirty="0"/>
-              <a:t>A slightly different approach would be to go with an API extension via CRD. Define a representation of your database as a custom resource definition and write an operator that observes/analyzes/acts on objects of this type. </a:t>
-            </a:r>
-          </a:p>
-        </p:txBody>
-      </p:sp>
-      <p:sp>
-        <p:nvSpPr>
           <p:cNvPr id="4" name="Slide Number Placeholder 3"/>
           <p:cNvSpPr>
             <a:spLocks noGrp="1"/>
@@ -4284,478 +1542,9 @@
           <a:lstStyle/>
           <a:p>
             <a:fld id="{7D8C2C35-2B8A-446E-BEC0-FD36716C29AC}" type="slidenum">
-              <a:rPr lang="de-DE" smtClean="0"/>
+              <a:rPr lang="en-US" smtClean="0"/>
               <a:pPr/>
               <a:t>15</a:t>
-            </a:fld>
-            <a:endParaRPr lang="de-DE" dirty="0"/>
-          </a:p>
-        </p:txBody>
-      </p:sp>
-    </p:spTree>
-    <p:extLst>
-      <p:ext uri="{BB962C8B-B14F-4D97-AF65-F5344CB8AC3E}">
-        <p14:creationId xmlns:p14="http://schemas.microsoft.com/office/powerpoint/2010/main" val="373502214"/>
-      </p:ext>
-    </p:extLst>
-  </p:cSld>
-  <p:clrMapOvr>
-    <a:masterClrMapping/>
-  </p:clrMapOvr>
-</p:notes>
-</file>
-
-<file path=ppt/notesSlides/notesSlide16.xml><?xml version="1.0" encoding="utf-8"?>
-<p:notes xmlns:a="http://schemas.openxmlformats.org/drawingml/2006/main" xmlns:r="http://schemas.openxmlformats.org/officeDocument/2006/relationships" xmlns:p="http://schemas.openxmlformats.org/presentationml/2006/main">
-  <p:cSld>
-    <p:spTree>
-      <p:nvGrpSpPr>
-        <p:cNvPr id="1" name=""/>
-        <p:cNvGrpSpPr/>
-        <p:nvPr/>
-      </p:nvGrpSpPr>
-      <p:grpSpPr>
-        <a:xfrm>
-          <a:off x="0" y="0"/>
-          <a:ext cx="0" cy="0"/>
-          <a:chOff x="0" y="0"/>
-          <a:chExt cx="0" cy="0"/>
-        </a:xfrm>
-      </p:grpSpPr>
-      <p:sp>
-        <p:nvSpPr>
-          <p:cNvPr id="2" name="Slide Image Placeholder 1"/>
-          <p:cNvSpPr>
-            <a:spLocks noGrp="1" noRot="1" noChangeAspect="1"/>
-          </p:cNvSpPr>
-          <p:nvPr>
-            <p:ph type="sldImg"/>
-          </p:nvPr>
-        </p:nvSpPr>
-        <p:spPr/>
-      </p:sp>
-      <p:sp>
-        <p:nvSpPr>
-          <p:cNvPr id="3" name="Notes Placeholder 2"/>
-          <p:cNvSpPr>
-            <a:spLocks noGrp="1"/>
-          </p:cNvSpPr>
-          <p:nvPr>
-            <p:ph type="body" idx="1"/>
-          </p:nvPr>
-        </p:nvSpPr>
-        <p:spPr/>
-        <p:txBody>
-          <a:bodyPr>
-            <a:normAutofit lnSpcReduction="10000"/>
-          </a:bodyPr>
-          <a:lstStyle/>
-          <a:p>
-            <a:pPr marL="285750" marR="0" lvl="0" indent="-285750" algn="l" defTabSz="1088776" rtl="0" eaLnBrk="1" fontAlgn="auto" latinLnBrk="0" hangingPunct="1">
-              <a:lnSpc>
-                <a:spcPct val="100000"/>
-              </a:lnSpc>
-              <a:spcBef>
-                <a:spcPts val="0"/>
-              </a:spcBef>
-              <a:spcAft>
-                <a:spcPts val="0"/>
-              </a:spcAft>
-              <a:buClrTx/>
-              <a:buSzTx/>
-              <a:buFontTx/>
-              <a:buChar char="-"/>
-              <a:tabLst/>
-              <a:defRPr/>
-            </a:pPr>
-            <a:r>
-              <a:rPr lang="en-US" baseline="0" dirty="0"/>
-              <a:t>Optionally you can show this demo</a:t>
-            </a:r>
-          </a:p>
-          <a:p>
-            <a:pPr marL="285750" marR="0" lvl="0" indent="-285750" algn="l" defTabSz="1088776" rtl="0" eaLnBrk="1" fontAlgn="auto" latinLnBrk="0" hangingPunct="1">
-              <a:lnSpc>
-                <a:spcPct val="100000"/>
-              </a:lnSpc>
-              <a:spcBef>
-                <a:spcPts val="0"/>
-              </a:spcBef>
-              <a:spcAft>
-                <a:spcPts val="0"/>
-              </a:spcAft>
-              <a:buClrTx/>
-              <a:buSzTx/>
-              <a:buFontTx/>
-              <a:buChar char="-"/>
-              <a:tabLst/>
-              <a:defRPr/>
-            </a:pPr>
-            <a:r>
-              <a:rPr lang="en-US" baseline="0" dirty="0"/>
-              <a:t>Firstly, try to create the custom resource object (09_cro.yaml). It will fail, as the cluster </a:t>
-            </a:r>
-            <a:r>
-              <a:rPr lang="en-US" baseline="0" dirty="0" err="1"/>
-              <a:t>api</a:t>
-            </a:r>
-            <a:r>
-              <a:rPr lang="en-US" baseline="0" dirty="0"/>
-              <a:t> doesn’t know about this resource type</a:t>
-            </a:r>
-          </a:p>
-          <a:p>
-            <a:pPr marL="285750" marR="0" lvl="0" indent="-285750" algn="l" defTabSz="1088776" rtl="0" eaLnBrk="1" fontAlgn="auto" latinLnBrk="0" hangingPunct="1">
-              <a:lnSpc>
-                <a:spcPct val="100000"/>
-              </a:lnSpc>
-              <a:spcBef>
-                <a:spcPts val="0"/>
-              </a:spcBef>
-              <a:spcAft>
-                <a:spcPts val="0"/>
-              </a:spcAft>
-              <a:buClrTx/>
-              <a:buSzTx/>
-              <a:buFontTx/>
-              <a:buChar char="-"/>
-              <a:tabLst/>
-              <a:defRPr/>
-            </a:pPr>
-            <a:r>
-              <a:rPr lang="en-US" baseline="0" dirty="0"/>
-              <a:t>Create the custom resource definition (09_crd.yaml). Show the </a:t>
-            </a:r>
-            <a:r>
-              <a:rPr lang="en-US" baseline="0" dirty="0" err="1"/>
-              <a:t>yaml</a:t>
-            </a:r>
-            <a:r>
-              <a:rPr lang="en-US" baseline="0" dirty="0"/>
-              <a:t> and explain the spec</a:t>
-            </a:r>
-          </a:p>
-          <a:p>
-            <a:pPr marL="465750" marR="0" lvl="1" indent="-285750" algn="l" defTabSz="1088776" rtl="0" eaLnBrk="1" fontAlgn="auto" latinLnBrk="0" hangingPunct="1">
-              <a:lnSpc>
-                <a:spcPct val="100000"/>
-              </a:lnSpc>
-              <a:spcBef>
-                <a:spcPts val="0"/>
-              </a:spcBef>
-              <a:spcAft>
-                <a:spcPts val="0"/>
-              </a:spcAft>
-              <a:buClrTx/>
-              <a:buSzTx/>
-              <a:buFontTx/>
-              <a:buChar char="-"/>
-              <a:tabLst/>
-              <a:defRPr/>
-            </a:pPr>
-            <a:r>
-              <a:rPr lang="en-US" baseline="0" dirty="0"/>
-              <a:t>Group: this is path in the </a:t>
-            </a:r>
-            <a:r>
-              <a:rPr lang="en-US" baseline="0" dirty="0" err="1"/>
-              <a:t>api</a:t>
-            </a:r>
-            <a:r>
-              <a:rPr lang="en-US" baseline="0" dirty="0"/>
-              <a:t> (like apps or apiextensions.k8s.io)</a:t>
-            </a:r>
-          </a:p>
-          <a:p>
-            <a:pPr marL="465750" marR="0" lvl="1" indent="-285750" algn="l" defTabSz="1088776" rtl="0" eaLnBrk="1" fontAlgn="auto" latinLnBrk="0" hangingPunct="1">
-              <a:lnSpc>
-                <a:spcPct val="100000"/>
-              </a:lnSpc>
-              <a:spcBef>
-                <a:spcPts val="0"/>
-              </a:spcBef>
-              <a:spcAft>
-                <a:spcPts val="0"/>
-              </a:spcAft>
-              <a:buClrTx/>
-              <a:buSzTx/>
-              <a:buFontTx/>
-              <a:buChar char="-"/>
-              <a:tabLst/>
-              <a:defRPr/>
-            </a:pPr>
-            <a:r>
-              <a:rPr lang="en-US" baseline="0" dirty="0"/>
-              <a:t>Version: version of the </a:t>
-            </a:r>
-            <a:r>
-              <a:rPr lang="en-US" baseline="0" dirty="0" err="1"/>
-              <a:t>api</a:t>
-            </a:r>
-            <a:r>
-              <a:rPr lang="en-US" baseline="0" dirty="0"/>
-              <a:t> objects in this group (like v1 or v1beta1)</a:t>
-            </a:r>
-          </a:p>
-          <a:p>
-            <a:pPr marL="465750" marR="0" lvl="1" indent="-285750" algn="l" defTabSz="1088776" rtl="0" eaLnBrk="1" fontAlgn="auto" latinLnBrk="0" hangingPunct="1">
-              <a:lnSpc>
-                <a:spcPct val="100000"/>
-              </a:lnSpc>
-              <a:spcBef>
-                <a:spcPts val="0"/>
-              </a:spcBef>
-              <a:spcAft>
-                <a:spcPts val="0"/>
-              </a:spcAft>
-              <a:buClrTx/>
-              <a:buSzTx/>
-              <a:buFontTx/>
-              <a:buChar char="-"/>
-              <a:tabLst/>
-              <a:defRPr/>
-            </a:pPr>
-            <a:r>
-              <a:rPr lang="en-US" baseline="0" dirty="0"/>
-              <a:t>Scope: objects can exist within a namespace like pods or outside like nodes</a:t>
-            </a:r>
-          </a:p>
-          <a:p>
-            <a:pPr marL="465750" marR="0" lvl="1" indent="-285750" algn="l" defTabSz="1088776" rtl="0" eaLnBrk="1" fontAlgn="auto" latinLnBrk="0" hangingPunct="1">
-              <a:lnSpc>
-                <a:spcPct val="100000"/>
-              </a:lnSpc>
-              <a:spcBef>
-                <a:spcPts val="0"/>
-              </a:spcBef>
-              <a:spcAft>
-                <a:spcPts val="0"/>
-              </a:spcAft>
-              <a:buClrTx/>
-              <a:buSzTx/>
-              <a:buFontTx/>
-              <a:buChar char="-"/>
-              <a:tabLst/>
-              <a:defRPr/>
-            </a:pPr>
-            <a:r>
-              <a:rPr lang="en-US" baseline="0" dirty="0"/>
-              <a:t>Names: names for the object, can also include a short version like </a:t>
-            </a:r>
-            <a:r>
-              <a:rPr lang="en-US" baseline="0" dirty="0" err="1"/>
-              <a:t>pvc</a:t>
-            </a:r>
-            <a:r>
-              <a:rPr lang="en-US" baseline="0" dirty="0"/>
-              <a:t> for </a:t>
-            </a:r>
-            <a:r>
-              <a:rPr lang="en-US" baseline="0" dirty="0" err="1"/>
-              <a:t>persistentvolumeclaim</a:t>
-            </a:r>
-            <a:endParaRPr lang="en-US" baseline="0" dirty="0"/>
-          </a:p>
-          <a:p>
-            <a:pPr marL="465750" marR="0" lvl="1" indent="-285750" algn="l" defTabSz="1088776" rtl="0" eaLnBrk="1" fontAlgn="auto" latinLnBrk="0" hangingPunct="1">
-              <a:lnSpc>
-                <a:spcPct val="100000"/>
-              </a:lnSpc>
-              <a:spcBef>
-                <a:spcPts val="0"/>
-              </a:spcBef>
-              <a:spcAft>
-                <a:spcPts val="0"/>
-              </a:spcAft>
-              <a:buClrTx/>
-              <a:buSzTx/>
-              <a:buFontTx/>
-              <a:buChar char="-"/>
-              <a:tabLst/>
-              <a:defRPr/>
-            </a:pPr>
-            <a:r>
-              <a:rPr lang="en-US" baseline="0" dirty="0"/>
-              <a:t>Validation: this is the definition of the objects structure and how to validate it. The example requires the training object with properties name and participants</a:t>
-            </a:r>
-          </a:p>
-          <a:p>
-            <a:pPr marL="465750" marR="0" lvl="1" indent="-285750" algn="l" defTabSz="1088776" rtl="0" eaLnBrk="1" fontAlgn="auto" latinLnBrk="0" hangingPunct="1">
-              <a:lnSpc>
-                <a:spcPct val="100000"/>
-              </a:lnSpc>
-              <a:spcBef>
-                <a:spcPts val="0"/>
-              </a:spcBef>
-              <a:spcAft>
-                <a:spcPts val="0"/>
-              </a:spcAft>
-              <a:buClrTx/>
-              <a:buSzTx/>
-              <a:buFontTx/>
-              <a:buChar char="-"/>
-              <a:tabLst/>
-              <a:defRPr/>
-            </a:pPr>
-            <a:endParaRPr lang="en-US" baseline="0" dirty="0"/>
-          </a:p>
-          <a:p>
-            <a:pPr marL="180000" marR="0" lvl="1" indent="0" algn="l" defTabSz="1088776" rtl="0" eaLnBrk="1" fontAlgn="auto" latinLnBrk="0" hangingPunct="1">
-              <a:lnSpc>
-                <a:spcPct val="100000"/>
-              </a:lnSpc>
-              <a:spcBef>
-                <a:spcPts val="0"/>
-              </a:spcBef>
-              <a:spcAft>
-                <a:spcPts val="0"/>
-              </a:spcAft>
-              <a:buClrTx/>
-              <a:buSzTx/>
-              <a:buFontTx/>
-              <a:buNone/>
-              <a:tabLst/>
-              <a:defRPr/>
-            </a:pPr>
-            <a:r>
-              <a:rPr lang="en-US" baseline="0" dirty="0"/>
-              <a:t>To move on one could write an operator, that could create namespaces based on course objects.</a:t>
-            </a:r>
-          </a:p>
-          <a:p>
-            <a:pPr marL="180000" marR="0" lvl="1" indent="0" algn="l" defTabSz="1088776" rtl="0" eaLnBrk="1" fontAlgn="auto" latinLnBrk="0" hangingPunct="1">
-              <a:lnSpc>
-                <a:spcPct val="100000"/>
-              </a:lnSpc>
-              <a:spcBef>
-                <a:spcPts val="0"/>
-              </a:spcBef>
-              <a:spcAft>
-                <a:spcPts val="0"/>
-              </a:spcAft>
-              <a:buClrTx/>
-              <a:buSzTx/>
-              <a:buFontTx/>
-              <a:buNone/>
-              <a:tabLst/>
-              <a:defRPr/>
-            </a:pPr>
-            <a:endParaRPr lang="en-US" baseline="0" dirty="0"/>
-          </a:p>
-          <a:p>
-            <a:pPr marL="180000" marR="0" lvl="1" indent="0" algn="l" defTabSz="1088776" rtl="0" eaLnBrk="1" fontAlgn="auto" latinLnBrk="0" hangingPunct="1">
-              <a:lnSpc>
-                <a:spcPct val="100000"/>
-              </a:lnSpc>
-              <a:spcBef>
-                <a:spcPts val="0"/>
-              </a:spcBef>
-              <a:spcAft>
-                <a:spcPts val="0"/>
-              </a:spcAft>
-              <a:buClrTx/>
-              <a:buSzTx/>
-              <a:buFontTx/>
-              <a:buNone/>
-              <a:tabLst/>
-              <a:defRPr/>
-            </a:pPr>
-            <a:r>
-              <a:rPr lang="en-US" baseline="0" dirty="0"/>
-              <a:t>A real life example is how Gardener manages the shoot clusters. When you create a new Gardener cluster, actually a </a:t>
-            </a:r>
-            <a:r>
-              <a:rPr lang="en-US" baseline="0" dirty="0" err="1"/>
-              <a:t>yaml</a:t>
-            </a:r>
-            <a:r>
-              <a:rPr lang="en-US" baseline="0" dirty="0"/>
-              <a:t> file is generated and send to the seed clusters </a:t>
-            </a:r>
-            <a:r>
-              <a:rPr lang="en-US" baseline="0" dirty="0" err="1"/>
-              <a:t>api</a:t>
-            </a:r>
-            <a:r>
-              <a:rPr lang="en-US" baseline="0" dirty="0"/>
-              <a:t> server. The operator evaluates it and triggers corresponding actions.</a:t>
-            </a:r>
-          </a:p>
-        </p:txBody>
-      </p:sp>
-      <p:sp>
-        <p:nvSpPr>
-          <p:cNvPr id="4" name="Slide Number Placeholder 3"/>
-          <p:cNvSpPr>
-            <a:spLocks noGrp="1"/>
-          </p:cNvSpPr>
-          <p:nvPr>
-            <p:ph type="sldNum" sz="quarter" idx="10"/>
-          </p:nvPr>
-        </p:nvSpPr>
-        <p:spPr/>
-        <p:txBody>
-          <a:bodyPr/>
-          <a:lstStyle/>
-          <a:p>
-            <a:fld id="{7D8C2C35-2B8A-446E-BEC0-FD36716C29AC}" type="slidenum">
-              <a:rPr lang="de-DE" smtClean="0"/>
-              <a:pPr/>
-              <a:t>17</a:t>
-            </a:fld>
-            <a:endParaRPr lang="de-DE" dirty="0"/>
-          </a:p>
-        </p:txBody>
-      </p:sp>
-    </p:spTree>
-    <p:extLst>
-      <p:ext uri="{BB962C8B-B14F-4D97-AF65-F5344CB8AC3E}">
-        <p14:creationId xmlns:p14="http://schemas.microsoft.com/office/powerpoint/2010/main" val="549751525"/>
-      </p:ext>
-    </p:extLst>
-  </p:cSld>
-  <p:clrMapOvr>
-    <a:masterClrMapping/>
-  </p:clrMapOvr>
-</p:notes>
-</file>
-
-<file path=ppt/notesSlides/notesSlide17.xml><?xml version="1.0" encoding="utf-8"?>
-<p:notes xmlns:a="http://schemas.openxmlformats.org/drawingml/2006/main" xmlns:r="http://schemas.openxmlformats.org/officeDocument/2006/relationships" xmlns:p="http://schemas.openxmlformats.org/presentationml/2006/main">
-  <p:cSld>
-    <p:spTree>
-      <p:nvGrpSpPr>
-        <p:cNvPr id="1" name=""/>
-        <p:cNvGrpSpPr/>
-        <p:nvPr/>
-      </p:nvGrpSpPr>
-      <p:grpSpPr>
-        <a:xfrm>
-          <a:off x="0" y="0"/>
-          <a:ext cx="0" cy="0"/>
-          <a:chOff x="0" y="0"/>
-          <a:chExt cx="0" cy="0"/>
-        </a:xfrm>
-      </p:grpSpPr>
-      <p:sp>
-        <p:nvSpPr>
-          <p:cNvPr id="4" name="Slide Number Placeholder 3"/>
-          <p:cNvSpPr>
-            <a:spLocks noGrp="1"/>
-          </p:cNvSpPr>
-          <p:nvPr>
-            <p:ph type="sldNum" sz="quarter" idx="10"/>
-          </p:nvPr>
-        </p:nvSpPr>
-        <p:spPr/>
-        <p:txBody>
-          <a:bodyPr/>
-          <a:lstStyle/>
-          <a:p>
-            <a:fld id="{7D8C2C35-2B8A-446E-BEC0-FD36716C29AC}" type="slidenum">
-              <a:rPr lang="en-US" smtClean="0"/>
-              <a:pPr/>
-              <a:t>18</a:t>
             </a:fld>
             <a:endParaRPr lang="en-US" dirty="0"/>
           </a:p>
@@ -21852,1601 +18641,6 @@
 </file>
 
 <file path=ppt/slides/slide15.xml><?xml version="1.0" encoding="utf-8"?>
-<p:sld xmlns:a="http://schemas.openxmlformats.org/drawingml/2006/main" xmlns:r="http://schemas.openxmlformats.org/officeDocument/2006/relationships" xmlns:p="http://schemas.openxmlformats.org/presentationml/2006/main">
-  <p:cSld>
-    <p:spTree>
-      <p:nvGrpSpPr>
-        <p:cNvPr id="1" name=""/>
-        <p:cNvGrpSpPr/>
-        <p:nvPr/>
-      </p:nvGrpSpPr>
-      <p:grpSpPr>
-        <a:xfrm>
-          <a:off x="0" y="0"/>
-          <a:ext cx="0" cy="0"/>
-          <a:chOff x="0" y="0"/>
-          <a:chExt cx="0" cy="0"/>
-        </a:xfrm>
-      </p:grpSpPr>
-      <p:sp>
-        <p:nvSpPr>
-          <p:cNvPr id="3" name="Title 2">
-            <a:extLst>
-              <a:ext uri="{FF2B5EF4-FFF2-40B4-BE49-F238E27FC236}">
-                <a16:creationId xmlns:a16="http://schemas.microsoft.com/office/drawing/2014/main" id="{0C59C333-28D0-4634-874F-97F7337CB0CD}"/>
-              </a:ext>
-            </a:extLst>
-          </p:cNvPr>
-          <p:cNvSpPr>
-            <a:spLocks noGrp="1"/>
-          </p:cNvSpPr>
-          <p:nvPr>
-            <p:ph type="title"/>
-          </p:nvPr>
-        </p:nvSpPr>
-        <p:spPr/>
-        <p:txBody>
-          <a:bodyPr/>
-          <a:lstStyle/>
-          <a:p>
-            <a:r>
-              <a:rPr lang="en-US" dirty="0"/>
-              <a:t>What was this something about a “controller”?</a:t>
-            </a:r>
-          </a:p>
-        </p:txBody>
-      </p:sp>
-      <p:graphicFrame>
-        <p:nvGraphicFramePr>
-          <p:cNvPr id="6" name="Diagram 5">
-            <a:extLst>
-              <a:ext uri="{FF2B5EF4-FFF2-40B4-BE49-F238E27FC236}">
-                <a16:creationId xmlns:a16="http://schemas.microsoft.com/office/drawing/2014/main" id="{96400DA1-E9AF-4D54-8833-28161067C5A9}"/>
-              </a:ext>
-            </a:extLst>
-          </p:cNvPr>
-          <p:cNvGraphicFramePr/>
-          <p:nvPr>
-            <p:extLst>
-              <p:ext uri="{D42A27DB-BD31-4B8C-83A1-F6EECF244321}">
-                <p14:modId xmlns:p14="http://schemas.microsoft.com/office/powerpoint/2010/main" val="4018982168"/>
-              </p:ext>
-            </p:extLst>
-          </p:nvPr>
-        </p:nvGraphicFramePr>
-        <p:xfrm>
-          <a:off x="267706" y="1179576"/>
-          <a:ext cx="11422771" cy="1065354"/>
-        </p:xfrm>
-        <a:graphic>
-          <a:graphicData uri="http://schemas.openxmlformats.org/drawingml/2006/diagram">
-            <dgm:relIds xmlns:dgm="http://schemas.openxmlformats.org/drawingml/2006/diagram" xmlns:r="http://schemas.openxmlformats.org/officeDocument/2006/relationships" r:dm="rId3" r:lo="rId4" r:qs="rId5" r:cs="rId6"/>
-          </a:graphicData>
-        </a:graphic>
-      </p:graphicFrame>
-      <p:sp>
-        <p:nvSpPr>
-          <p:cNvPr id="7" name="Flowchart: Alternate Process 6">
-            <a:extLst>
-              <a:ext uri="{FF2B5EF4-FFF2-40B4-BE49-F238E27FC236}">
-                <a16:creationId xmlns:a16="http://schemas.microsoft.com/office/drawing/2014/main" id="{555CF690-EFA8-43B1-B072-7D0EA34EB271}"/>
-              </a:ext>
-            </a:extLst>
-          </p:cNvPr>
-          <p:cNvSpPr/>
-          <p:nvPr/>
-        </p:nvSpPr>
-        <p:spPr bwMode="gray">
-          <a:xfrm>
-            <a:off x="5244831" y="3374212"/>
-            <a:ext cx="2216880" cy="1248155"/>
-          </a:xfrm>
-          <a:prstGeom prst="flowChartAlternateProcess">
-            <a:avLst/>
-          </a:prstGeom>
-          <a:ln>
-            <a:headEnd/>
-            <a:tailEnd/>
-          </a:ln>
-        </p:spPr>
-        <p:style>
-          <a:lnRef idx="2">
-            <a:schemeClr val="accent2"/>
-          </a:lnRef>
-          <a:fillRef idx="1">
-            <a:schemeClr val="lt1"/>
-          </a:fillRef>
-          <a:effectRef idx="0">
-            <a:schemeClr val="accent2"/>
-          </a:effectRef>
-          <a:fontRef idx="minor">
-            <a:schemeClr val="dk1"/>
-          </a:fontRef>
-        </p:style>
-        <p:txBody>
-          <a:bodyPr lIns="90000" tIns="72000" rIns="90000" bIns="72000" rtlCol="0" anchor="ctr"/>
-          <a:lstStyle/>
-          <a:p>
-            <a:pPr marR="0" algn="ctr" defTabSz="914400" eaLnBrk="1" fontAlgn="base" latinLnBrk="0" hangingPunct="1">
-              <a:lnSpc>
-                <a:spcPct val="100000"/>
-              </a:lnSpc>
-              <a:spcBef>
-                <a:spcPct val="50000"/>
-              </a:spcBef>
-              <a:spcAft>
-                <a:spcPct val="0"/>
-              </a:spcAft>
-              <a:buClr>
-                <a:srgbClr val="F0AB00"/>
-              </a:buClr>
-              <a:buSzPct val="80000"/>
-              <a:tabLst/>
-            </a:pPr>
-            <a:r>
-              <a:rPr kumimoji="0" lang="en-US" sz="1800" b="0" i="0" u="none" strike="noStrike" kern="0" cap="none" spc="0" normalizeH="0" baseline="0" noProof="0" dirty="0">
-                <a:ln>
-                  <a:noFill/>
-                </a:ln>
-                <a:effectLst/>
-                <a:uLnTx/>
-                <a:uFillTx/>
-                <a:ea typeface="Arial Unicode MS" pitchFamily="34" charset="-128"/>
-                <a:cs typeface="Arial Unicode MS" pitchFamily="34" charset="-128"/>
-              </a:rPr>
-              <a:t>Operator</a:t>
-            </a:r>
-          </a:p>
-        </p:txBody>
-      </p:sp>
-      <p:sp>
-        <p:nvSpPr>
-          <p:cNvPr id="8" name="Scroll: Vertical 7">
-            <a:extLst>
-              <a:ext uri="{FF2B5EF4-FFF2-40B4-BE49-F238E27FC236}">
-                <a16:creationId xmlns:a16="http://schemas.microsoft.com/office/drawing/2014/main" id="{150895A8-6424-40BB-94B2-76ADA3C2C250}"/>
-              </a:ext>
-            </a:extLst>
-          </p:cNvPr>
-          <p:cNvSpPr/>
-          <p:nvPr/>
-        </p:nvSpPr>
-        <p:spPr bwMode="gray">
-          <a:xfrm>
-            <a:off x="1996155" y="2626691"/>
-            <a:ext cx="1508760" cy="1371599"/>
-          </a:xfrm>
-          <a:prstGeom prst="verticalScroll">
-            <a:avLst/>
-          </a:prstGeom>
-          <a:ln>
-            <a:headEnd/>
-            <a:tailEnd/>
-          </a:ln>
-        </p:spPr>
-        <p:style>
-          <a:lnRef idx="2">
-            <a:schemeClr val="accent2"/>
-          </a:lnRef>
-          <a:fillRef idx="1">
-            <a:schemeClr val="lt1"/>
-          </a:fillRef>
-          <a:effectRef idx="0">
-            <a:schemeClr val="accent2"/>
-          </a:effectRef>
-          <a:fontRef idx="minor">
-            <a:schemeClr val="dk1"/>
-          </a:fontRef>
-        </p:style>
-        <p:txBody>
-          <a:bodyPr vert="horz" lIns="90000" tIns="72000" rIns="90000" bIns="72000" rtlCol="0" anchor="ctr"/>
-          <a:lstStyle/>
-          <a:p>
-            <a:pPr marR="0" algn="ctr" defTabSz="914400" eaLnBrk="1" fontAlgn="base" latinLnBrk="0" hangingPunct="1">
-              <a:lnSpc>
-                <a:spcPct val="100000"/>
-              </a:lnSpc>
-              <a:spcBef>
-                <a:spcPct val="50000"/>
-              </a:spcBef>
-              <a:spcAft>
-                <a:spcPct val="0"/>
-              </a:spcAft>
-              <a:buClr>
-                <a:srgbClr val="F0AB00"/>
-              </a:buClr>
-              <a:buSzPct val="80000"/>
-              <a:tabLst/>
-            </a:pPr>
-            <a:r>
-              <a:rPr kumimoji="0" lang="en-US" sz="1800" b="0" i="0" u="none" strike="noStrike" kern="0" cap="none" spc="0" normalizeH="0" baseline="0" noProof="0" dirty="0">
-                <a:ln>
-                  <a:noFill/>
-                </a:ln>
-                <a:effectLst/>
-                <a:uLnTx/>
-                <a:uFillTx/>
-                <a:ea typeface="Arial Unicode MS" pitchFamily="34" charset="-128"/>
-                <a:cs typeface="Arial Unicode MS" pitchFamily="34" charset="-128"/>
-              </a:rPr>
-              <a:t>CRD</a:t>
-            </a:r>
-          </a:p>
-        </p:txBody>
-      </p:sp>
-      <p:sp>
-        <p:nvSpPr>
-          <p:cNvPr id="9" name="Flowchart: Alternate Process 8">
-            <a:extLst>
-              <a:ext uri="{FF2B5EF4-FFF2-40B4-BE49-F238E27FC236}">
-                <a16:creationId xmlns:a16="http://schemas.microsoft.com/office/drawing/2014/main" id="{BEF33497-C8DA-4C6A-95AC-86631F28F97C}"/>
-              </a:ext>
-            </a:extLst>
-          </p:cNvPr>
-          <p:cNvSpPr/>
-          <p:nvPr/>
-        </p:nvSpPr>
-        <p:spPr bwMode="gray">
-          <a:xfrm>
-            <a:off x="8978877" y="4213217"/>
-            <a:ext cx="1396476" cy="1274488"/>
-          </a:xfrm>
-          <a:prstGeom prst="flowChartAlternateProcess">
-            <a:avLst/>
-          </a:prstGeom>
-          <a:ln>
-            <a:headEnd/>
-            <a:tailEnd/>
-          </a:ln>
-        </p:spPr>
-        <p:style>
-          <a:lnRef idx="2">
-            <a:schemeClr val="accent2"/>
-          </a:lnRef>
-          <a:fillRef idx="1">
-            <a:schemeClr val="lt1"/>
-          </a:fillRef>
-          <a:effectRef idx="0">
-            <a:schemeClr val="accent2"/>
-          </a:effectRef>
-          <a:fontRef idx="minor">
-            <a:schemeClr val="dk1"/>
-          </a:fontRef>
-        </p:style>
-        <p:txBody>
-          <a:bodyPr lIns="90000" tIns="72000" rIns="90000" bIns="72000" rtlCol="0" anchor="ctr"/>
-          <a:lstStyle/>
-          <a:p>
-            <a:pPr marR="0" algn="ctr" defTabSz="914400" eaLnBrk="1" fontAlgn="base" latinLnBrk="0" hangingPunct="1">
-              <a:lnSpc>
-                <a:spcPct val="100000"/>
-              </a:lnSpc>
-              <a:spcBef>
-                <a:spcPct val="50000"/>
-              </a:spcBef>
-              <a:spcAft>
-                <a:spcPct val="0"/>
-              </a:spcAft>
-              <a:buClr>
-                <a:srgbClr val="F0AB00"/>
-              </a:buClr>
-              <a:buSzPct val="80000"/>
-              <a:tabLst/>
-            </a:pPr>
-            <a:r>
-              <a:rPr kumimoji="0" lang="en-US" sz="1800" b="0" i="0" u="none" strike="noStrike" kern="0" cap="none" spc="0" normalizeH="0" baseline="0" noProof="0" dirty="0">
-                <a:ln>
-                  <a:noFill/>
-                </a:ln>
-                <a:effectLst/>
-                <a:uLnTx/>
-                <a:uFillTx/>
-                <a:ea typeface="Arial Unicode MS" pitchFamily="34" charset="-128"/>
-                <a:cs typeface="Arial Unicode MS" pitchFamily="34" charset="-128"/>
-              </a:rPr>
-              <a:t>Pod</a:t>
-            </a:r>
-          </a:p>
-        </p:txBody>
-      </p:sp>
-      <p:sp>
-        <p:nvSpPr>
-          <p:cNvPr id="10" name="Scroll: Vertical 9">
-            <a:extLst>
-              <a:ext uri="{FF2B5EF4-FFF2-40B4-BE49-F238E27FC236}">
-                <a16:creationId xmlns:a16="http://schemas.microsoft.com/office/drawing/2014/main" id="{3F63FEC2-BB88-483F-83BB-F72560D01569}"/>
-              </a:ext>
-            </a:extLst>
-          </p:cNvPr>
-          <p:cNvSpPr/>
-          <p:nvPr/>
-        </p:nvSpPr>
-        <p:spPr bwMode="gray">
-          <a:xfrm>
-            <a:off x="1996155" y="4324008"/>
-            <a:ext cx="1508760" cy="1371599"/>
-          </a:xfrm>
-          <a:prstGeom prst="verticalScroll">
-            <a:avLst/>
-          </a:prstGeom>
-          <a:ln>
-            <a:headEnd/>
-            <a:tailEnd/>
-          </a:ln>
-        </p:spPr>
-        <p:style>
-          <a:lnRef idx="2">
-            <a:schemeClr val="accent2"/>
-          </a:lnRef>
-          <a:fillRef idx="1">
-            <a:schemeClr val="lt1"/>
-          </a:fillRef>
-          <a:effectRef idx="0">
-            <a:schemeClr val="accent2"/>
-          </a:effectRef>
-          <a:fontRef idx="minor">
-            <a:schemeClr val="dk1"/>
-          </a:fontRef>
-        </p:style>
-        <p:txBody>
-          <a:bodyPr vert="horz" lIns="90000" tIns="72000" rIns="90000" bIns="72000" rtlCol="0" anchor="ctr"/>
-          <a:lstStyle/>
-          <a:p>
-            <a:pPr marR="0" algn="ctr" defTabSz="914400" eaLnBrk="1" fontAlgn="base" latinLnBrk="0" hangingPunct="1">
-              <a:lnSpc>
-                <a:spcPct val="100000"/>
-              </a:lnSpc>
-              <a:spcBef>
-                <a:spcPct val="50000"/>
-              </a:spcBef>
-              <a:spcAft>
-                <a:spcPct val="0"/>
-              </a:spcAft>
-              <a:buClr>
-                <a:srgbClr val="F0AB00"/>
-              </a:buClr>
-              <a:buSzPct val="80000"/>
-              <a:tabLst/>
-            </a:pPr>
-            <a:r>
-              <a:rPr kumimoji="0" lang="en-US" sz="1800" b="0" i="0" u="none" strike="noStrike" kern="0" cap="none" spc="0" normalizeH="0" baseline="0" noProof="0" dirty="0">
-                <a:ln>
-                  <a:noFill/>
-                </a:ln>
-                <a:effectLst/>
-                <a:uLnTx/>
-                <a:uFillTx/>
-                <a:ea typeface="Arial Unicode MS" pitchFamily="34" charset="-128"/>
-                <a:cs typeface="Arial Unicode MS" pitchFamily="34" charset="-128"/>
-              </a:rPr>
-              <a:t>CRO</a:t>
-            </a:r>
-          </a:p>
-        </p:txBody>
-      </p:sp>
-      <p:sp>
-        <p:nvSpPr>
-          <p:cNvPr id="11" name="Flowchart: Alternate Process 10">
-            <a:extLst>
-              <a:ext uri="{FF2B5EF4-FFF2-40B4-BE49-F238E27FC236}">
-                <a16:creationId xmlns:a16="http://schemas.microsoft.com/office/drawing/2014/main" id="{D9AB9761-B883-4C75-80CE-78B6EA344896}"/>
-              </a:ext>
-            </a:extLst>
-          </p:cNvPr>
-          <p:cNvSpPr/>
-          <p:nvPr/>
-        </p:nvSpPr>
-        <p:spPr bwMode="gray">
-          <a:xfrm>
-            <a:off x="8978877" y="2626691"/>
-            <a:ext cx="1396476" cy="1274488"/>
-          </a:xfrm>
-          <a:prstGeom prst="flowChartAlternateProcess">
-            <a:avLst/>
-          </a:prstGeom>
-          <a:ln>
-            <a:headEnd/>
-            <a:tailEnd/>
-          </a:ln>
-        </p:spPr>
-        <p:style>
-          <a:lnRef idx="2">
-            <a:schemeClr val="accent2"/>
-          </a:lnRef>
-          <a:fillRef idx="1">
-            <a:schemeClr val="lt1"/>
-          </a:fillRef>
-          <a:effectRef idx="0">
-            <a:schemeClr val="accent2"/>
-          </a:effectRef>
-          <a:fontRef idx="minor">
-            <a:schemeClr val="dk1"/>
-          </a:fontRef>
-        </p:style>
-        <p:txBody>
-          <a:bodyPr lIns="90000" tIns="72000" rIns="90000" bIns="72000" rtlCol="0" anchor="ctr"/>
-          <a:lstStyle/>
-          <a:p>
-            <a:pPr marR="0" algn="ctr" defTabSz="914400" eaLnBrk="1" fontAlgn="base" latinLnBrk="0" hangingPunct="1">
-              <a:lnSpc>
-                <a:spcPct val="100000"/>
-              </a:lnSpc>
-              <a:spcBef>
-                <a:spcPct val="50000"/>
-              </a:spcBef>
-              <a:spcAft>
-                <a:spcPct val="0"/>
-              </a:spcAft>
-              <a:buClr>
-                <a:srgbClr val="F0AB00"/>
-              </a:buClr>
-              <a:buSzPct val="80000"/>
-              <a:tabLst/>
-            </a:pPr>
-            <a:r>
-              <a:rPr kumimoji="0" lang="en-US" sz="1800" b="0" i="0" u="none" strike="noStrike" kern="0" cap="none" spc="0" normalizeH="0" baseline="0" noProof="0" dirty="0">
-                <a:ln>
-                  <a:noFill/>
-                </a:ln>
-                <a:effectLst/>
-                <a:uLnTx/>
-                <a:uFillTx/>
-                <a:ea typeface="Arial Unicode MS" pitchFamily="34" charset="-128"/>
-                <a:cs typeface="Arial Unicode MS" pitchFamily="34" charset="-128"/>
-              </a:rPr>
-              <a:t>Pod</a:t>
-            </a:r>
-          </a:p>
-        </p:txBody>
-      </p:sp>
-      <p:cxnSp>
-        <p:nvCxnSpPr>
-          <p:cNvPr id="17" name="Straight Arrow Connector 16">
-            <a:extLst>
-              <a:ext uri="{FF2B5EF4-FFF2-40B4-BE49-F238E27FC236}">
-                <a16:creationId xmlns:a16="http://schemas.microsoft.com/office/drawing/2014/main" id="{C4881647-A915-4AF8-BF46-39EA1FFEC4BE}"/>
-              </a:ext>
-            </a:extLst>
-          </p:cNvPr>
-          <p:cNvCxnSpPr>
-            <a:cxnSpLocks/>
-            <a:stCxn id="8" idx="2"/>
-            <a:endCxn id="10" idx="0"/>
-          </p:cNvCxnSpPr>
-          <p:nvPr/>
-        </p:nvCxnSpPr>
-        <p:spPr>
-          <a:xfrm>
-            <a:off x="2750535" y="3998290"/>
-            <a:ext cx="0" cy="325718"/>
-          </a:xfrm>
-          <a:prstGeom prst="straightConnector1">
-            <a:avLst/>
-          </a:prstGeom>
-          <a:ln w="57150">
-            <a:solidFill>
-              <a:schemeClr val="tx1"/>
-            </a:solidFill>
-            <a:headEnd type="none" w="med" len="med"/>
-            <a:tailEnd type="triangle"/>
-          </a:ln>
-        </p:spPr>
-        <p:style>
-          <a:lnRef idx="1">
-            <a:schemeClr val="accent1"/>
-          </a:lnRef>
-          <a:fillRef idx="0">
-            <a:schemeClr val="accent1"/>
-          </a:fillRef>
-          <a:effectRef idx="0">
-            <a:schemeClr val="accent1"/>
-          </a:effectRef>
-          <a:fontRef idx="minor">
-            <a:schemeClr val="tx1"/>
-          </a:fontRef>
-        </p:style>
-      </p:cxnSp>
-      <p:cxnSp>
-        <p:nvCxnSpPr>
-          <p:cNvPr id="18" name="Straight Arrow Connector 17">
-            <a:extLst>
-              <a:ext uri="{FF2B5EF4-FFF2-40B4-BE49-F238E27FC236}">
-                <a16:creationId xmlns:a16="http://schemas.microsoft.com/office/drawing/2014/main" id="{AA796564-D3CB-48A7-8DA1-312179EB1493}"/>
-              </a:ext>
-            </a:extLst>
-          </p:cNvPr>
-          <p:cNvCxnSpPr>
-            <a:cxnSpLocks/>
-            <a:stCxn id="7" idx="1"/>
-            <a:endCxn id="8" idx="3"/>
-          </p:cNvCxnSpPr>
-          <p:nvPr/>
-        </p:nvCxnSpPr>
-        <p:spPr>
-          <a:xfrm flipH="1" flipV="1">
-            <a:off x="3333465" y="3312491"/>
-            <a:ext cx="1911366" cy="685799"/>
-          </a:xfrm>
-          <a:prstGeom prst="straightConnector1">
-            <a:avLst/>
-          </a:prstGeom>
-          <a:ln w="57150">
-            <a:solidFill>
-              <a:schemeClr val="tx1"/>
-            </a:solidFill>
-            <a:headEnd type="none" w="med" len="med"/>
-            <a:tailEnd type="triangle"/>
-          </a:ln>
-        </p:spPr>
-        <p:style>
-          <a:lnRef idx="1">
-            <a:schemeClr val="accent1"/>
-          </a:lnRef>
-          <a:fillRef idx="0">
-            <a:schemeClr val="accent1"/>
-          </a:fillRef>
-          <a:effectRef idx="0">
-            <a:schemeClr val="accent1"/>
-          </a:effectRef>
-          <a:fontRef idx="minor">
-            <a:schemeClr val="tx1"/>
-          </a:fontRef>
-        </p:style>
-      </p:cxnSp>
-      <p:cxnSp>
-        <p:nvCxnSpPr>
-          <p:cNvPr id="21" name="Straight Arrow Connector 20">
-            <a:extLst>
-              <a:ext uri="{FF2B5EF4-FFF2-40B4-BE49-F238E27FC236}">
-                <a16:creationId xmlns:a16="http://schemas.microsoft.com/office/drawing/2014/main" id="{475C0C7B-918A-4516-8A24-5D9F230EF895}"/>
-              </a:ext>
-            </a:extLst>
-          </p:cNvPr>
-          <p:cNvCxnSpPr>
-            <a:cxnSpLocks/>
-            <a:stCxn id="7" idx="1"/>
-            <a:endCxn id="10" idx="3"/>
-          </p:cNvCxnSpPr>
-          <p:nvPr/>
-        </p:nvCxnSpPr>
-        <p:spPr>
-          <a:xfrm flipH="1">
-            <a:off x="3333465" y="3998290"/>
-            <a:ext cx="1911366" cy="1011518"/>
-          </a:xfrm>
-          <a:prstGeom prst="straightConnector1">
-            <a:avLst/>
-          </a:prstGeom>
-          <a:ln w="57150">
-            <a:solidFill>
-              <a:schemeClr val="tx1"/>
-            </a:solidFill>
-            <a:headEnd type="none" w="med" len="med"/>
-            <a:tailEnd type="triangle"/>
-          </a:ln>
-        </p:spPr>
-        <p:style>
-          <a:lnRef idx="1">
-            <a:schemeClr val="accent1"/>
-          </a:lnRef>
-          <a:fillRef idx="0">
-            <a:schemeClr val="accent1"/>
-          </a:fillRef>
-          <a:effectRef idx="0">
-            <a:schemeClr val="accent1"/>
-          </a:effectRef>
-          <a:fontRef idx="minor">
-            <a:schemeClr val="tx1"/>
-          </a:fontRef>
-        </p:style>
-      </p:cxnSp>
-      <p:cxnSp>
-        <p:nvCxnSpPr>
-          <p:cNvPr id="25" name="Straight Arrow Connector 24">
-            <a:extLst>
-              <a:ext uri="{FF2B5EF4-FFF2-40B4-BE49-F238E27FC236}">
-                <a16:creationId xmlns:a16="http://schemas.microsoft.com/office/drawing/2014/main" id="{2B18D363-4106-4F15-B4DA-0BE8BA1CA451}"/>
-              </a:ext>
-            </a:extLst>
-          </p:cNvPr>
-          <p:cNvCxnSpPr>
-            <a:cxnSpLocks/>
-            <a:stCxn id="7" idx="3"/>
-            <a:endCxn id="9" idx="1"/>
-          </p:cNvCxnSpPr>
-          <p:nvPr/>
-        </p:nvCxnSpPr>
-        <p:spPr>
-          <a:xfrm>
-            <a:off x="7461711" y="3998290"/>
-            <a:ext cx="1517166" cy="852171"/>
-          </a:xfrm>
-          <a:prstGeom prst="straightConnector1">
-            <a:avLst/>
-          </a:prstGeom>
-          <a:ln w="57150">
-            <a:solidFill>
-              <a:schemeClr val="tx1"/>
-            </a:solidFill>
-            <a:headEnd type="none" w="med" len="med"/>
-            <a:tailEnd type="triangle"/>
-          </a:ln>
-        </p:spPr>
-        <p:style>
-          <a:lnRef idx="1">
-            <a:schemeClr val="accent1"/>
-          </a:lnRef>
-          <a:fillRef idx="0">
-            <a:schemeClr val="accent1"/>
-          </a:fillRef>
-          <a:effectRef idx="0">
-            <a:schemeClr val="accent1"/>
-          </a:effectRef>
-          <a:fontRef idx="minor">
-            <a:schemeClr val="tx1"/>
-          </a:fontRef>
-        </p:style>
-      </p:cxnSp>
-      <p:cxnSp>
-        <p:nvCxnSpPr>
-          <p:cNvPr id="28" name="Straight Arrow Connector 27">
-            <a:extLst>
-              <a:ext uri="{FF2B5EF4-FFF2-40B4-BE49-F238E27FC236}">
-                <a16:creationId xmlns:a16="http://schemas.microsoft.com/office/drawing/2014/main" id="{B81C3205-BAFC-4DF3-9EB5-62487BE70D2F}"/>
-              </a:ext>
-            </a:extLst>
-          </p:cNvPr>
-          <p:cNvCxnSpPr>
-            <a:cxnSpLocks/>
-            <a:stCxn id="7" idx="3"/>
-            <a:endCxn id="11" idx="1"/>
-          </p:cNvCxnSpPr>
-          <p:nvPr/>
-        </p:nvCxnSpPr>
-        <p:spPr>
-          <a:xfrm flipV="1">
-            <a:off x="7461711" y="3263935"/>
-            <a:ext cx="1517166" cy="734355"/>
-          </a:xfrm>
-          <a:prstGeom prst="straightConnector1">
-            <a:avLst/>
-          </a:prstGeom>
-          <a:ln w="57150">
-            <a:solidFill>
-              <a:schemeClr val="tx1"/>
-            </a:solidFill>
-            <a:headEnd type="none" w="med" len="med"/>
-            <a:tailEnd type="triangle"/>
-          </a:ln>
-        </p:spPr>
-        <p:style>
-          <a:lnRef idx="1">
-            <a:schemeClr val="accent1"/>
-          </a:lnRef>
-          <a:fillRef idx="0">
-            <a:schemeClr val="accent1"/>
-          </a:fillRef>
-          <a:effectRef idx="0">
-            <a:schemeClr val="accent1"/>
-          </a:effectRef>
-          <a:fontRef idx="minor">
-            <a:schemeClr val="tx1"/>
-          </a:fontRef>
-        </p:style>
-      </p:cxnSp>
-    </p:spTree>
-    <p:extLst>
-      <p:ext uri="{BB962C8B-B14F-4D97-AF65-F5344CB8AC3E}">
-        <p14:creationId xmlns:p14="http://schemas.microsoft.com/office/powerpoint/2010/main" val="48665732"/>
-      </p:ext>
-    </p:extLst>
-  </p:cSld>
-  <p:clrMapOvr>
-    <a:masterClrMapping/>
-  </p:clrMapOvr>
-  <p:timing>
-    <p:tnLst>
-      <p:par>
-        <p:cTn id="1" dur="indefinite" restart="never" nodeType="tmRoot">
-          <p:childTnLst>
-            <p:seq concurrent="1" nextAc="seek">
-              <p:cTn id="2" dur="indefinite" nodeType="mainSeq">
-                <p:childTnLst>
-                  <p:par>
-                    <p:cTn id="3" fill="hold">
-                      <p:stCondLst>
-                        <p:cond delay="indefinite"/>
-                      </p:stCondLst>
-                      <p:childTnLst>
-                        <p:par>
-                          <p:cTn id="4" fill="hold">
-                            <p:stCondLst>
-                              <p:cond delay="0"/>
-                            </p:stCondLst>
-                            <p:childTnLst>
-                              <p:par>
-                                <p:cTn id="5" presetID="1" presetClass="entr" presetSubtype="0" fill="hold" grpId="0" nodeType="clickEffect">
-                                  <p:stCondLst>
-                                    <p:cond delay="0"/>
-                                  </p:stCondLst>
-                                  <p:childTnLst>
-                                    <p:set>
-                                      <p:cBhvr>
-                                        <p:cTn id="6" dur="1" fill="hold">
-                                          <p:stCondLst>
-                                            <p:cond delay="0"/>
-                                          </p:stCondLst>
-                                        </p:cTn>
-                                        <p:tgtEl>
-                                          <p:spTgt spid="8"/>
-                                        </p:tgtEl>
-                                        <p:attrNameLst>
-                                          <p:attrName>style.visibility</p:attrName>
-                                        </p:attrNameLst>
-                                      </p:cBhvr>
-                                      <p:to>
-                                        <p:strVal val="visible"/>
-                                      </p:to>
-                                    </p:set>
-                                  </p:childTnLst>
-                                </p:cTn>
-                              </p:par>
-                              <p:par>
-                                <p:cTn id="7" presetID="1" presetClass="entr" presetSubtype="0" fill="hold" nodeType="withEffect">
-                                  <p:stCondLst>
-                                    <p:cond delay="0"/>
-                                  </p:stCondLst>
-                                  <p:childTnLst>
-                                    <p:set>
-                                      <p:cBhvr>
-                                        <p:cTn id="8" dur="1" fill="hold">
-                                          <p:stCondLst>
-                                            <p:cond delay="0"/>
-                                          </p:stCondLst>
-                                        </p:cTn>
-                                        <p:tgtEl>
-                                          <p:spTgt spid="17"/>
-                                        </p:tgtEl>
-                                        <p:attrNameLst>
-                                          <p:attrName>style.visibility</p:attrName>
-                                        </p:attrNameLst>
-                                      </p:cBhvr>
-                                      <p:to>
-                                        <p:strVal val="visible"/>
-                                      </p:to>
-                                    </p:set>
-                                  </p:childTnLst>
-                                </p:cTn>
-                              </p:par>
-                              <p:par>
-                                <p:cTn id="9" presetID="1" presetClass="entr" presetSubtype="0" fill="hold" grpId="0" nodeType="withEffect">
-                                  <p:stCondLst>
-                                    <p:cond delay="0"/>
-                                  </p:stCondLst>
-                                  <p:childTnLst>
-                                    <p:set>
-                                      <p:cBhvr>
-                                        <p:cTn id="10" dur="1" fill="hold">
-                                          <p:stCondLst>
-                                            <p:cond delay="0"/>
-                                          </p:stCondLst>
-                                        </p:cTn>
-                                        <p:tgtEl>
-                                          <p:spTgt spid="10"/>
-                                        </p:tgtEl>
-                                        <p:attrNameLst>
-                                          <p:attrName>style.visibility</p:attrName>
-                                        </p:attrNameLst>
-                                      </p:cBhvr>
-                                      <p:to>
-                                        <p:strVal val="visible"/>
-                                      </p:to>
-                                    </p:set>
-                                  </p:childTnLst>
-                                </p:cTn>
-                              </p:par>
-                            </p:childTnLst>
-                          </p:cTn>
-                        </p:par>
-                      </p:childTnLst>
-                    </p:cTn>
-                  </p:par>
-                  <p:par>
-                    <p:cTn id="11" fill="hold">
-                      <p:stCondLst>
-                        <p:cond delay="indefinite"/>
-                      </p:stCondLst>
-                      <p:childTnLst>
-                        <p:par>
-                          <p:cTn id="12" fill="hold">
-                            <p:stCondLst>
-                              <p:cond delay="0"/>
-                            </p:stCondLst>
-                            <p:childTnLst>
-                              <p:par>
-                                <p:cTn id="13" presetID="1" presetClass="entr" presetSubtype="0" fill="hold" nodeType="clickEffect">
-                                  <p:stCondLst>
-                                    <p:cond delay="0"/>
-                                  </p:stCondLst>
-                                  <p:childTnLst>
-                                    <p:set>
-                                      <p:cBhvr>
-                                        <p:cTn id="14" dur="1" fill="hold">
-                                          <p:stCondLst>
-                                            <p:cond delay="0"/>
-                                          </p:stCondLst>
-                                        </p:cTn>
-                                        <p:tgtEl>
-                                          <p:spTgt spid="18"/>
-                                        </p:tgtEl>
-                                        <p:attrNameLst>
-                                          <p:attrName>style.visibility</p:attrName>
-                                        </p:attrNameLst>
-                                      </p:cBhvr>
-                                      <p:to>
-                                        <p:strVal val="visible"/>
-                                      </p:to>
-                                    </p:set>
-                                  </p:childTnLst>
-                                </p:cTn>
-                              </p:par>
-                              <p:par>
-                                <p:cTn id="15" presetID="1" presetClass="entr" presetSubtype="0" fill="hold" grpId="0" nodeType="withEffect">
-                                  <p:stCondLst>
-                                    <p:cond delay="0"/>
-                                  </p:stCondLst>
-                                  <p:childTnLst>
-                                    <p:set>
-                                      <p:cBhvr>
-                                        <p:cTn id="16" dur="1" fill="hold">
-                                          <p:stCondLst>
-                                            <p:cond delay="0"/>
-                                          </p:stCondLst>
-                                        </p:cTn>
-                                        <p:tgtEl>
-                                          <p:spTgt spid="7"/>
-                                        </p:tgtEl>
-                                        <p:attrNameLst>
-                                          <p:attrName>style.visibility</p:attrName>
-                                        </p:attrNameLst>
-                                      </p:cBhvr>
-                                      <p:to>
-                                        <p:strVal val="visible"/>
-                                      </p:to>
-                                    </p:set>
-                                  </p:childTnLst>
-                                </p:cTn>
-                              </p:par>
-                              <p:par>
-                                <p:cTn id="17" presetID="1" presetClass="entr" presetSubtype="0" fill="hold" nodeType="withEffect">
-                                  <p:stCondLst>
-                                    <p:cond delay="0"/>
-                                  </p:stCondLst>
-                                  <p:childTnLst>
-                                    <p:set>
-                                      <p:cBhvr>
-                                        <p:cTn id="18" dur="1" fill="hold">
-                                          <p:stCondLst>
-                                            <p:cond delay="0"/>
-                                          </p:stCondLst>
-                                        </p:cTn>
-                                        <p:tgtEl>
-                                          <p:spTgt spid="21"/>
-                                        </p:tgtEl>
-                                        <p:attrNameLst>
-                                          <p:attrName>style.visibility</p:attrName>
-                                        </p:attrNameLst>
-                                      </p:cBhvr>
-                                      <p:to>
-                                        <p:strVal val="visible"/>
-                                      </p:to>
-                                    </p:set>
-                                  </p:childTnLst>
-                                </p:cTn>
-                              </p:par>
-                            </p:childTnLst>
-                          </p:cTn>
-                        </p:par>
-                      </p:childTnLst>
-                    </p:cTn>
-                  </p:par>
-                  <p:par>
-                    <p:cTn id="19" fill="hold">
-                      <p:stCondLst>
-                        <p:cond delay="indefinite"/>
-                      </p:stCondLst>
-                      <p:childTnLst>
-                        <p:par>
-                          <p:cTn id="20" fill="hold">
-                            <p:stCondLst>
-                              <p:cond delay="0"/>
-                            </p:stCondLst>
-                            <p:childTnLst>
-                              <p:par>
-                                <p:cTn id="21" presetID="1" presetClass="entr" presetSubtype="0" fill="hold" grpId="0" nodeType="clickEffect">
-                                  <p:stCondLst>
-                                    <p:cond delay="0"/>
-                                  </p:stCondLst>
-                                  <p:childTnLst>
-                                    <p:set>
-                                      <p:cBhvr>
-                                        <p:cTn id="22" dur="1" fill="hold">
-                                          <p:stCondLst>
-                                            <p:cond delay="0"/>
-                                          </p:stCondLst>
-                                        </p:cTn>
-                                        <p:tgtEl>
-                                          <p:spTgt spid="9"/>
-                                        </p:tgtEl>
-                                        <p:attrNameLst>
-                                          <p:attrName>style.visibility</p:attrName>
-                                        </p:attrNameLst>
-                                      </p:cBhvr>
-                                      <p:to>
-                                        <p:strVal val="visible"/>
-                                      </p:to>
-                                    </p:set>
-                                  </p:childTnLst>
-                                </p:cTn>
-                              </p:par>
-                              <p:par>
-                                <p:cTn id="23" presetID="1" presetClass="entr" presetSubtype="0" fill="hold" nodeType="withEffect">
-                                  <p:stCondLst>
-                                    <p:cond delay="0"/>
-                                  </p:stCondLst>
-                                  <p:childTnLst>
-                                    <p:set>
-                                      <p:cBhvr>
-                                        <p:cTn id="24" dur="1" fill="hold">
-                                          <p:stCondLst>
-                                            <p:cond delay="0"/>
-                                          </p:stCondLst>
-                                        </p:cTn>
-                                        <p:tgtEl>
-                                          <p:spTgt spid="25"/>
-                                        </p:tgtEl>
-                                        <p:attrNameLst>
-                                          <p:attrName>style.visibility</p:attrName>
-                                        </p:attrNameLst>
-                                      </p:cBhvr>
-                                      <p:to>
-                                        <p:strVal val="visible"/>
-                                      </p:to>
-                                    </p:set>
-                                  </p:childTnLst>
-                                </p:cTn>
-                              </p:par>
-                              <p:par>
-                                <p:cTn id="25" presetID="1" presetClass="entr" presetSubtype="0" fill="hold" nodeType="withEffect">
-                                  <p:stCondLst>
-                                    <p:cond delay="0"/>
-                                  </p:stCondLst>
-                                  <p:childTnLst>
-                                    <p:set>
-                                      <p:cBhvr>
-                                        <p:cTn id="26" dur="1" fill="hold">
-                                          <p:stCondLst>
-                                            <p:cond delay="0"/>
-                                          </p:stCondLst>
-                                        </p:cTn>
-                                        <p:tgtEl>
-                                          <p:spTgt spid="28"/>
-                                        </p:tgtEl>
-                                        <p:attrNameLst>
-                                          <p:attrName>style.visibility</p:attrName>
-                                        </p:attrNameLst>
-                                      </p:cBhvr>
-                                      <p:to>
-                                        <p:strVal val="visible"/>
-                                      </p:to>
-                                    </p:set>
-                                  </p:childTnLst>
-                                </p:cTn>
-                              </p:par>
-                              <p:par>
-                                <p:cTn id="27" presetID="1" presetClass="entr" presetSubtype="0" fill="hold" grpId="0" nodeType="withEffect">
-                                  <p:stCondLst>
-                                    <p:cond delay="0"/>
-                                  </p:stCondLst>
-                                  <p:childTnLst>
-                                    <p:set>
-                                      <p:cBhvr>
-                                        <p:cTn id="28" dur="1" fill="hold">
-                                          <p:stCondLst>
-                                            <p:cond delay="0"/>
-                                          </p:stCondLst>
-                                        </p:cTn>
-                                        <p:tgtEl>
-                                          <p:spTgt spid="11"/>
-                                        </p:tgtEl>
-                                        <p:attrNameLst>
-                                          <p:attrName>style.visibility</p:attrName>
-                                        </p:attrNameLst>
-                                      </p:cBhvr>
-                                      <p:to>
-                                        <p:strVal val="visible"/>
-                                      </p:to>
-                                    </p:set>
-                                  </p:childTnLst>
-                                </p:cTn>
-                              </p:par>
-                            </p:childTnLst>
-                          </p:cTn>
-                        </p:par>
-                      </p:childTnLst>
-                    </p:cTn>
-                  </p:par>
-                </p:childTnLst>
-              </p:cTn>
-              <p:prevCondLst>
-                <p:cond evt="onPrev" delay="0">
-                  <p:tgtEl>
-                    <p:sldTgt/>
-                  </p:tgtEl>
-                </p:cond>
-              </p:prevCondLst>
-              <p:nextCondLst>
-                <p:cond evt="onNext" delay="0">
-                  <p:tgtEl>
-                    <p:sldTgt/>
-                  </p:tgtEl>
-                </p:cond>
-              </p:nextCondLst>
-            </p:seq>
-          </p:childTnLst>
-        </p:cTn>
-      </p:par>
-    </p:tnLst>
-    <p:bldLst>
-      <p:bldP spid="7" grpId="0" animBg="1"/>
-      <p:bldP spid="8" grpId="0" animBg="1"/>
-      <p:bldP spid="9" grpId="0" animBg="1"/>
-      <p:bldP spid="10" grpId="0" animBg="1"/>
-      <p:bldP spid="11" grpId="0" animBg="1"/>
-    </p:bldLst>
-  </p:timing>
-</p:sld>
-</file>
-
-<file path=ppt/slides/slide16.xml><?xml version="1.0" encoding="utf-8"?>
-<p:sld xmlns:a="http://schemas.openxmlformats.org/drawingml/2006/main" xmlns:r="http://schemas.openxmlformats.org/officeDocument/2006/relationships" xmlns:p="http://schemas.openxmlformats.org/presentationml/2006/main">
-  <p:cSld>
-    <p:spTree>
-      <p:nvGrpSpPr>
-        <p:cNvPr id="1" name=""/>
-        <p:cNvGrpSpPr/>
-        <p:nvPr/>
-      </p:nvGrpSpPr>
-      <p:grpSpPr>
-        <a:xfrm>
-          <a:off x="0" y="0"/>
-          <a:ext cx="0" cy="0"/>
-          <a:chOff x="0" y="0"/>
-          <a:chExt cx="0" cy="0"/>
-        </a:xfrm>
-      </p:grpSpPr>
-      <p:pic>
-        <p:nvPicPr>
-          <p:cNvPr id="2" name="Picture 1">
-            <a:extLst>
-              <a:ext uri="{FF2B5EF4-FFF2-40B4-BE49-F238E27FC236}">
-                <a16:creationId xmlns:a16="http://schemas.microsoft.com/office/drawing/2014/main" id="{5628F058-60DD-4407-8BAB-257B7CBA7802}"/>
-              </a:ext>
-            </a:extLst>
-          </p:cNvPr>
-          <p:cNvPicPr>
-            <a:picLocks noChangeAspect="1"/>
-          </p:cNvPicPr>
-          <p:nvPr/>
-        </p:nvPicPr>
-        <p:blipFill>
-          <a:blip r:embed="rId2"/>
-          <a:stretch>
-            <a:fillRect/>
-          </a:stretch>
-        </p:blipFill>
-        <p:spPr>
-          <a:xfrm>
-            <a:off x="504001" y="969917"/>
-            <a:ext cx="3237980" cy="5560879"/>
-          </a:xfrm>
-          <a:prstGeom prst="rect">
-            <a:avLst/>
-          </a:prstGeom>
-          <a:ln>
-            <a:solidFill>
-              <a:schemeClr val="tx1"/>
-            </a:solidFill>
-          </a:ln>
-        </p:spPr>
-      </p:pic>
-      <p:pic>
-        <p:nvPicPr>
-          <p:cNvPr id="10" name="Picture 9">
-            <a:extLst>
-              <a:ext uri="{FF2B5EF4-FFF2-40B4-BE49-F238E27FC236}">
-                <a16:creationId xmlns:a16="http://schemas.microsoft.com/office/drawing/2014/main" id="{93F5C68F-E879-4B51-9EAF-54BF7B5C7048}"/>
-              </a:ext>
-            </a:extLst>
-          </p:cNvPr>
-          <p:cNvPicPr>
-            <a:picLocks noChangeAspect="1"/>
-          </p:cNvPicPr>
-          <p:nvPr/>
-        </p:nvPicPr>
-        <p:blipFill>
-          <a:blip r:embed="rId3"/>
-          <a:stretch>
-            <a:fillRect/>
-          </a:stretch>
-        </p:blipFill>
-        <p:spPr>
-          <a:xfrm>
-            <a:off x="7952510" y="2196225"/>
-            <a:ext cx="3146480" cy="2278485"/>
-          </a:xfrm>
-          <a:prstGeom prst="rect">
-            <a:avLst/>
-          </a:prstGeom>
-          <a:ln>
-            <a:solidFill>
-              <a:schemeClr val="tx1"/>
-            </a:solidFill>
-          </a:ln>
-        </p:spPr>
-      </p:pic>
-      <p:sp>
-        <p:nvSpPr>
-          <p:cNvPr id="3" name="Title 2">
-            <a:extLst>
-              <a:ext uri="{FF2B5EF4-FFF2-40B4-BE49-F238E27FC236}">
-                <a16:creationId xmlns:a16="http://schemas.microsoft.com/office/drawing/2014/main" id="{A4432EFF-05F9-4C4E-AE9E-F6A3F8C70928}"/>
-              </a:ext>
-            </a:extLst>
-          </p:cNvPr>
-          <p:cNvSpPr>
-            <a:spLocks noGrp="1"/>
-          </p:cNvSpPr>
-          <p:nvPr>
-            <p:ph type="title"/>
-          </p:nvPr>
-        </p:nvSpPr>
-        <p:spPr/>
-        <p:txBody>
-          <a:bodyPr/>
-          <a:lstStyle/>
-          <a:p>
-            <a:r>
-              <a:rPr lang="en-US" dirty="0"/>
-              <a:t>CRD/CRO Example</a:t>
-            </a:r>
-          </a:p>
-        </p:txBody>
-      </p:sp>
-      <p:sp>
-        <p:nvSpPr>
-          <p:cNvPr id="6" name="Speech Bubble: Rectangle 5">
-            <a:extLst>
-              <a:ext uri="{FF2B5EF4-FFF2-40B4-BE49-F238E27FC236}">
-                <a16:creationId xmlns:a16="http://schemas.microsoft.com/office/drawing/2014/main" id="{3168BAB8-9930-4B26-8068-27A9400AD305}"/>
-              </a:ext>
-            </a:extLst>
-          </p:cNvPr>
-          <p:cNvSpPr/>
-          <p:nvPr/>
-        </p:nvSpPr>
-        <p:spPr bwMode="gray">
-          <a:xfrm>
-            <a:off x="4046371" y="1462271"/>
-            <a:ext cx="3067662" cy="521977"/>
-          </a:xfrm>
-          <a:prstGeom prst="wedgeRectCallout">
-            <a:avLst>
-              <a:gd name="adj1" fmla="val -73263"/>
-              <a:gd name="adj2" fmla="val 64322"/>
-            </a:avLst>
-          </a:prstGeom>
-          <a:ln>
-            <a:headEnd/>
-            <a:tailEnd/>
-          </a:ln>
-        </p:spPr>
-        <p:style>
-          <a:lnRef idx="2">
-            <a:schemeClr val="accent5"/>
-          </a:lnRef>
-          <a:fillRef idx="1">
-            <a:schemeClr val="lt1"/>
-          </a:fillRef>
-          <a:effectRef idx="0">
-            <a:schemeClr val="accent5"/>
-          </a:effectRef>
-          <a:fontRef idx="minor">
-            <a:schemeClr val="dk1"/>
-          </a:fontRef>
-        </p:style>
-        <p:txBody>
-          <a:bodyPr lIns="90000" tIns="72000" rIns="90000" bIns="72000" rtlCol="0" anchor="ctr"/>
-          <a:lstStyle/>
-          <a:p>
-            <a:pPr marR="0" algn="ctr" defTabSz="914400" eaLnBrk="1" fontAlgn="base" latinLnBrk="0" hangingPunct="1">
-              <a:lnSpc>
-                <a:spcPct val="100000"/>
-              </a:lnSpc>
-              <a:spcBef>
-                <a:spcPct val="50000"/>
-              </a:spcBef>
-              <a:spcAft>
-                <a:spcPct val="0"/>
-              </a:spcAft>
-              <a:buClr>
-                <a:srgbClr val="F0AB00"/>
-              </a:buClr>
-              <a:buSzPct val="80000"/>
-              <a:tabLst/>
-            </a:pPr>
-            <a:r>
-              <a:rPr lang="en-US" sz="1800" kern="0" dirty="0">
-                <a:ea typeface="Arial Unicode MS" pitchFamily="34" charset="-128"/>
-                <a:cs typeface="Arial Unicode MS" pitchFamily="34" charset="-128"/>
-              </a:rPr>
-              <a:t>API specification</a:t>
-            </a:r>
-            <a:endParaRPr kumimoji="0" lang="en-US" sz="1800" b="0" i="0" u="none" strike="noStrike" kern="0" cap="none" spc="0" normalizeH="0" baseline="0" noProof="0" dirty="0">
-              <a:ln>
-                <a:noFill/>
-              </a:ln>
-              <a:effectLst/>
-              <a:uLnTx/>
-              <a:uFillTx/>
-              <a:ea typeface="Arial Unicode MS" pitchFamily="34" charset="-128"/>
-              <a:cs typeface="Arial Unicode MS" pitchFamily="34" charset="-128"/>
-            </a:endParaRPr>
-          </a:p>
-        </p:txBody>
-      </p:sp>
-      <p:sp>
-        <p:nvSpPr>
-          <p:cNvPr id="7" name="Speech Bubble: Rectangle 6">
-            <a:extLst>
-              <a:ext uri="{FF2B5EF4-FFF2-40B4-BE49-F238E27FC236}">
-                <a16:creationId xmlns:a16="http://schemas.microsoft.com/office/drawing/2014/main" id="{B5D4B24E-CE04-46FC-8814-BE49D39643E6}"/>
-              </a:ext>
-            </a:extLst>
-          </p:cNvPr>
-          <p:cNvSpPr/>
-          <p:nvPr/>
-        </p:nvSpPr>
-        <p:spPr bwMode="gray">
-          <a:xfrm>
-            <a:off x="3558691" y="2920579"/>
-            <a:ext cx="3067662" cy="829778"/>
-          </a:xfrm>
-          <a:prstGeom prst="wedgeRectCallout">
-            <a:avLst>
-              <a:gd name="adj1" fmla="val -73263"/>
-              <a:gd name="adj2" fmla="val 64322"/>
-            </a:avLst>
-          </a:prstGeom>
-          <a:ln>
-            <a:headEnd/>
-            <a:tailEnd/>
-          </a:ln>
-        </p:spPr>
-        <p:style>
-          <a:lnRef idx="2">
-            <a:schemeClr val="accent5"/>
-          </a:lnRef>
-          <a:fillRef idx="1">
-            <a:schemeClr val="lt1"/>
-          </a:fillRef>
-          <a:effectRef idx="0">
-            <a:schemeClr val="accent5"/>
-          </a:effectRef>
-          <a:fontRef idx="minor">
-            <a:schemeClr val="dk1"/>
-          </a:fontRef>
-        </p:style>
-        <p:txBody>
-          <a:bodyPr lIns="90000" tIns="72000" rIns="90000" bIns="72000" rtlCol="0" anchor="ctr"/>
-          <a:lstStyle/>
-          <a:p>
-            <a:pPr marR="0" algn="ctr" defTabSz="914400" eaLnBrk="1" fontAlgn="base" latinLnBrk="0" hangingPunct="1">
-              <a:lnSpc>
-                <a:spcPct val="100000"/>
-              </a:lnSpc>
-              <a:spcBef>
-                <a:spcPct val="50000"/>
-              </a:spcBef>
-              <a:spcAft>
-                <a:spcPct val="0"/>
-              </a:spcAft>
-              <a:buClr>
-                <a:srgbClr val="F0AB00"/>
-              </a:buClr>
-              <a:buSzPct val="80000"/>
-              <a:tabLst/>
-            </a:pPr>
-            <a:r>
-              <a:rPr lang="en-US" sz="1800" kern="0" dirty="0">
-                <a:ea typeface="Arial Unicode MS" pitchFamily="34" charset="-128"/>
-                <a:cs typeface="Arial Unicode MS" pitchFamily="34" charset="-128"/>
-              </a:rPr>
-              <a:t>Validation schema to outline resource structure </a:t>
-            </a:r>
-            <a:endParaRPr kumimoji="0" lang="en-US" sz="1800" b="0" i="0" u="none" strike="noStrike" kern="0" cap="none" spc="0" normalizeH="0" baseline="0" noProof="0" dirty="0">
-              <a:ln>
-                <a:noFill/>
-              </a:ln>
-              <a:effectLst/>
-              <a:uLnTx/>
-              <a:uFillTx/>
-              <a:ea typeface="Arial Unicode MS" pitchFamily="34" charset="-128"/>
-              <a:cs typeface="Arial Unicode MS" pitchFamily="34" charset="-128"/>
-            </a:endParaRPr>
-          </a:p>
-        </p:txBody>
-      </p:sp>
-      <p:sp>
-        <p:nvSpPr>
-          <p:cNvPr id="8" name="Speech Bubble: Rectangle 7">
-            <a:extLst>
-              <a:ext uri="{FF2B5EF4-FFF2-40B4-BE49-F238E27FC236}">
-                <a16:creationId xmlns:a16="http://schemas.microsoft.com/office/drawing/2014/main" id="{796FB130-0865-43A3-975C-FA99EB64E93E}"/>
-              </a:ext>
-            </a:extLst>
-          </p:cNvPr>
-          <p:cNvSpPr/>
-          <p:nvPr/>
-        </p:nvSpPr>
-        <p:spPr bwMode="gray">
-          <a:xfrm>
-            <a:off x="4654296" y="4988132"/>
-            <a:ext cx="3393646" cy="829778"/>
-          </a:xfrm>
-          <a:prstGeom prst="wedgeRectCallout">
-            <a:avLst>
-              <a:gd name="adj1" fmla="val 58487"/>
-              <a:gd name="adj2" fmla="val -108688"/>
-            </a:avLst>
-          </a:prstGeom>
-          <a:ln>
-            <a:headEnd/>
-            <a:tailEnd/>
-          </a:ln>
-        </p:spPr>
-        <p:style>
-          <a:lnRef idx="2">
-            <a:schemeClr val="accent5"/>
-          </a:lnRef>
-          <a:fillRef idx="1">
-            <a:schemeClr val="lt1"/>
-          </a:fillRef>
-          <a:effectRef idx="0">
-            <a:schemeClr val="accent5"/>
-          </a:effectRef>
-          <a:fontRef idx="minor">
-            <a:schemeClr val="dk1"/>
-          </a:fontRef>
-        </p:style>
-        <p:txBody>
-          <a:bodyPr lIns="90000" tIns="72000" rIns="90000" bIns="72000" rtlCol="0" anchor="ctr"/>
-          <a:lstStyle/>
-          <a:p>
-            <a:pPr marR="0" algn="ctr" defTabSz="914400" eaLnBrk="1" fontAlgn="base" latinLnBrk="0" hangingPunct="1">
-              <a:lnSpc>
-                <a:spcPct val="100000"/>
-              </a:lnSpc>
-              <a:spcBef>
-                <a:spcPct val="50000"/>
-              </a:spcBef>
-              <a:spcAft>
-                <a:spcPct val="0"/>
-              </a:spcAft>
-              <a:buClr>
-                <a:srgbClr val="F0AB00"/>
-              </a:buClr>
-              <a:buSzPct val="80000"/>
-              <a:tabLst/>
-            </a:pPr>
-            <a:r>
-              <a:rPr lang="en-US" sz="1800" kern="0" dirty="0">
-                <a:ea typeface="Arial Unicode MS" pitchFamily="34" charset="-128"/>
-                <a:cs typeface="Arial Unicode MS" pitchFamily="34" charset="-128"/>
-              </a:rPr>
-              <a:t>Resource structured according to validation schema</a:t>
-            </a:r>
-            <a:endParaRPr kumimoji="0" lang="en-US" sz="1800" b="0" i="0" u="none" strike="noStrike" kern="0" cap="none" spc="0" normalizeH="0" baseline="0" noProof="0" dirty="0">
-              <a:ln>
-                <a:noFill/>
-              </a:ln>
-              <a:effectLst/>
-              <a:uLnTx/>
-              <a:uFillTx/>
-              <a:ea typeface="Arial Unicode MS" pitchFamily="34" charset="-128"/>
-              <a:cs typeface="Arial Unicode MS" pitchFamily="34" charset="-128"/>
-            </a:endParaRPr>
-          </a:p>
-        </p:txBody>
-      </p:sp>
-      <p:sp>
-        <p:nvSpPr>
-          <p:cNvPr id="9" name="Speech Bubble: Rectangle 8">
-            <a:extLst>
-              <a:ext uri="{FF2B5EF4-FFF2-40B4-BE49-F238E27FC236}">
-                <a16:creationId xmlns:a16="http://schemas.microsoft.com/office/drawing/2014/main" id="{7A9578CA-9F00-4E58-8C70-B42D38A280E5}"/>
-              </a:ext>
-            </a:extLst>
-          </p:cNvPr>
-          <p:cNvSpPr/>
-          <p:nvPr/>
-        </p:nvSpPr>
-        <p:spPr bwMode="gray">
-          <a:xfrm>
-            <a:off x="7705344" y="1056781"/>
-            <a:ext cx="3393646" cy="591749"/>
-          </a:xfrm>
-          <a:prstGeom prst="wedgeRectCallout">
-            <a:avLst>
-              <a:gd name="adj1" fmla="val 32351"/>
-              <a:gd name="adj2" fmla="val 135952"/>
-            </a:avLst>
-          </a:prstGeom>
-          <a:ln>
-            <a:headEnd/>
-            <a:tailEnd/>
-          </a:ln>
-        </p:spPr>
-        <p:style>
-          <a:lnRef idx="2">
-            <a:schemeClr val="accent5"/>
-          </a:lnRef>
-          <a:fillRef idx="1">
-            <a:schemeClr val="lt1"/>
-          </a:fillRef>
-          <a:effectRef idx="0">
-            <a:schemeClr val="accent5"/>
-          </a:effectRef>
-          <a:fontRef idx="minor">
-            <a:schemeClr val="dk1"/>
-          </a:fontRef>
-        </p:style>
-        <p:txBody>
-          <a:bodyPr lIns="90000" tIns="72000" rIns="90000" bIns="72000" rtlCol="0" anchor="ctr"/>
-          <a:lstStyle/>
-          <a:p>
-            <a:pPr marR="0" algn="ctr" defTabSz="914400" eaLnBrk="1" fontAlgn="base" latinLnBrk="0" hangingPunct="1">
-              <a:lnSpc>
-                <a:spcPct val="100000"/>
-              </a:lnSpc>
-              <a:spcBef>
-                <a:spcPct val="50000"/>
-              </a:spcBef>
-              <a:spcAft>
-                <a:spcPct val="0"/>
-              </a:spcAft>
-              <a:buClr>
-                <a:srgbClr val="F0AB00"/>
-              </a:buClr>
-              <a:buSzPct val="80000"/>
-              <a:tabLst/>
-            </a:pPr>
-            <a:r>
-              <a:rPr lang="en-US" sz="1800" kern="0" dirty="0">
-                <a:ea typeface="Arial Unicode MS" pitchFamily="34" charset="-128"/>
-                <a:cs typeface="Arial Unicode MS" pitchFamily="34" charset="-128"/>
-              </a:rPr>
-              <a:t>Newly created API endpoint</a:t>
-            </a:r>
-            <a:endParaRPr kumimoji="0" lang="en-US" sz="1800" b="0" i="0" u="none" strike="noStrike" kern="0" cap="none" spc="0" normalizeH="0" baseline="0" noProof="0" dirty="0">
-              <a:ln>
-                <a:noFill/>
-              </a:ln>
-              <a:effectLst/>
-              <a:uLnTx/>
-              <a:uFillTx/>
-              <a:ea typeface="Arial Unicode MS" pitchFamily="34" charset="-128"/>
-              <a:cs typeface="Arial Unicode MS" pitchFamily="34" charset="-128"/>
-            </a:endParaRPr>
-          </a:p>
-        </p:txBody>
-      </p:sp>
-    </p:spTree>
-    <p:extLst>
-      <p:ext uri="{BB962C8B-B14F-4D97-AF65-F5344CB8AC3E}">
-        <p14:creationId xmlns:p14="http://schemas.microsoft.com/office/powerpoint/2010/main" val="411549746"/>
-      </p:ext>
-    </p:extLst>
-  </p:cSld>
-  <p:clrMapOvr>
-    <a:masterClrMapping/>
-  </p:clrMapOvr>
-</p:sld>
-</file>
-
-<file path=ppt/slides/slide17.xml><?xml version="1.0" encoding="utf-8"?>
-<p:sld xmlns:a="http://schemas.openxmlformats.org/drawingml/2006/main" xmlns:r="http://schemas.openxmlformats.org/officeDocument/2006/relationships" xmlns:p="http://schemas.openxmlformats.org/presentationml/2006/main">
-  <p:cSld>
-    <p:spTree>
-      <p:nvGrpSpPr>
-        <p:cNvPr id="1" name=""/>
-        <p:cNvGrpSpPr/>
-        <p:nvPr/>
-      </p:nvGrpSpPr>
-      <p:grpSpPr>
-        <a:xfrm>
-          <a:off x="0" y="0"/>
-          <a:ext cx="0" cy="0"/>
-          <a:chOff x="0" y="0"/>
-          <a:chExt cx="0" cy="0"/>
-        </a:xfrm>
-      </p:grpSpPr>
-      <p:sp>
-        <p:nvSpPr>
-          <p:cNvPr id="3" name="Title 2"/>
-          <p:cNvSpPr>
-            <a:spLocks noGrp="1"/>
-          </p:cNvSpPr>
-          <p:nvPr>
-            <p:ph type="title"/>
-          </p:nvPr>
-        </p:nvSpPr>
-        <p:spPr/>
-        <p:txBody>
-          <a:bodyPr/>
-          <a:lstStyle/>
-          <a:p>
-            <a:r>
-              <a:rPr lang="en-US" dirty="0"/>
-              <a:t>Demo</a:t>
-            </a:r>
-          </a:p>
-        </p:txBody>
-      </p:sp>
-      <p:pic>
-        <p:nvPicPr>
-          <p:cNvPr id="5" name="Picture 4">
-            <a:extLst>
-              <a:ext uri="{FF2B5EF4-FFF2-40B4-BE49-F238E27FC236}">
-                <a16:creationId xmlns:a16="http://schemas.microsoft.com/office/drawing/2014/main" id="{1586E469-D4BE-4FD2-8C2F-DB3709242579}"/>
-              </a:ext>
-            </a:extLst>
-          </p:cNvPr>
-          <p:cNvPicPr>
-            <a:picLocks noChangeAspect="1"/>
-          </p:cNvPicPr>
-          <p:nvPr/>
-        </p:nvPicPr>
-        <p:blipFill>
-          <a:blip r:embed="rId3"/>
-          <a:stretch>
-            <a:fillRect/>
-          </a:stretch>
-        </p:blipFill>
-        <p:spPr>
-          <a:xfrm>
-            <a:off x="3645157" y="976918"/>
-            <a:ext cx="4904163" cy="4904163"/>
-          </a:xfrm>
-          <a:prstGeom prst="rect">
-            <a:avLst/>
-          </a:prstGeom>
-        </p:spPr>
-      </p:pic>
-    </p:spTree>
-    <p:extLst>
-      <p:ext uri="{BB962C8B-B14F-4D97-AF65-F5344CB8AC3E}">
-        <p14:creationId xmlns:p14="http://schemas.microsoft.com/office/powerpoint/2010/main" val="3929190446"/>
-      </p:ext>
-    </p:extLst>
-  </p:cSld>
-  <p:clrMapOvr>
-    <a:masterClrMapping/>
-  </p:clrMapOvr>
-</p:sld>
-</file>
-
-<file path=ppt/slides/slide18.xml><?xml version="1.0" encoding="utf-8"?>
 <p:sld xmlns:a="http://schemas.openxmlformats.org/drawingml/2006/main" xmlns:r="http://schemas.openxmlformats.org/officeDocument/2006/relationships" xmlns:p="http://schemas.openxmlformats.org/presentationml/2006/main" show="0">
   <p:cSld>
     <p:spTree>

</xml_diff>

<commit_message>
adapt to new rewrite mechanism
</commit_message>
<xml_diff>
--- a/kubernetes/09_ingress.pptx
+++ b/kubernetes/09_ingress.pptx
@@ -2738,6 +2738,39 @@
               <a:rPr lang="en-US" dirty="0"/>
               <a:t>Rules define forwarding of incoming traffic to services.</a:t>
             </a:r>
+          </a:p>
+          <a:p>
+            <a:endParaRPr lang="en-US" dirty="0"/>
+          </a:p>
+          <a:p>
+            <a:r>
+              <a:rPr lang="en-US" dirty="0"/>
+              <a:t>With v0.22 the re-write annotation has been changed. Now it requires capture groups, if you want to pass on any substrings within the URI. Everything not captured will be dropped. In the example above every substring following “/my” and “/your” will be forwarded to the backend.</a:t>
+            </a:r>
+          </a:p>
+          <a:p>
+            <a:endParaRPr lang="en-US" dirty="0"/>
+          </a:p>
+          <a:p>
+            <a:r>
+              <a:rPr lang="en-US" dirty="0"/>
+              <a:t>For details, see: </a:t>
+            </a:r>
+          </a:p>
+          <a:p>
+            <a:r>
+              <a:rPr lang="en-US" dirty="0"/>
+              <a:t>https://github.com/kubernetes/ingress-nginx/releases/tag/nginx-0.22.0</a:t>
+            </a:r>
+          </a:p>
+          <a:p>
+            <a:r>
+              <a:rPr lang="en-US" dirty="0"/>
+              <a:t>https://kubernetes.github.io/ingress-nginx/examples/rewrite/#rewrite-target</a:t>
+            </a:r>
+          </a:p>
+          <a:p>
+            <a:endParaRPr lang="en-US" dirty="0"/>
           </a:p>
         </p:txBody>
       </p:sp>
@@ -18164,10 +18197,10 @@
       </p:grpSpPr>
       <p:pic>
         <p:nvPicPr>
-          <p:cNvPr id="5" name="Picture 4">
+          <p:cNvPr id="3" name="Picture 2">
             <a:extLst>
               <a:ext uri="{FF2B5EF4-FFF2-40B4-BE49-F238E27FC236}">
-                <a16:creationId xmlns:a16="http://schemas.microsoft.com/office/drawing/2014/main" id="{808553A2-96C5-4477-94CF-07FE6B36D413}"/>
+                <a16:creationId xmlns:a16="http://schemas.microsoft.com/office/drawing/2014/main" id="{3B20B5A0-3E17-4121-8EA5-4A0F4A768AB1}"/>
               </a:ext>
             </a:extLst>
           </p:cNvPr>
@@ -18184,8 +18217,8 @@
         </p:blipFill>
         <p:spPr>
           <a:xfrm>
-            <a:off x="504001" y="1186003"/>
-            <a:ext cx="5797959" cy="5011093"/>
+            <a:off x="504001" y="1087333"/>
+            <a:ext cx="6685714" cy="5266667"/>
           </a:xfrm>
           <a:prstGeom prst="rect">
             <a:avLst/>
@@ -18239,7 +18272,7 @@
         </p:nvSpPr>
         <p:spPr bwMode="gray">
           <a:xfrm>
-            <a:off x="7078788" y="2164765"/>
+            <a:off x="7588740" y="1757359"/>
             <a:ext cx="4101737" cy="677425"/>
           </a:xfrm>
           <a:prstGeom prst="wedgeRectCallout">
@@ -18335,7 +18368,7 @@
         </p:nvSpPr>
         <p:spPr bwMode="gray">
           <a:xfrm>
-            <a:off x="7078788" y="3696792"/>
+            <a:off x="7588740" y="3536095"/>
             <a:ext cx="4101737" cy="677425"/>
           </a:xfrm>
           <a:prstGeom prst="wedgeRectCallout">
@@ -27027,10 +27060,10 @@
       </p:grpSpPr>
       <p:pic>
         <p:nvPicPr>
-          <p:cNvPr id="5" name="Picture 4">
+          <p:cNvPr id="3" name="Picture 2">
             <a:extLst>
               <a:ext uri="{FF2B5EF4-FFF2-40B4-BE49-F238E27FC236}">
-                <a16:creationId xmlns:a16="http://schemas.microsoft.com/office/drawing/2014/main" id="{B06E1059-F386-4EB0-AE05-6C7C57CAC52C}"/>
+                <a16:creationId xmlns:a16="http://schemas.microsoft.com/office/drawing/2014/main" id="{C8CAC47D-D6C8-41F3-9DEC-9D25F9D43C92}"/>
               </a:ext>
             </a:extLst>
           </p:cNvPr>
@@ -27047,8 +27080,8 @@
         </p:blipFill>
         <p:spPr>
           <a:xfrm>
-            <a:off x="504001" y="1075255"/>
-            <a:ext cx="6748285" cy="4835506"/>
+            <a:off x="504001" y="1134348"/>
+            <a:ext cx="7047619" cy="4990476"/>
           </a:xfrm>
           <a:prstGeom prst="rect">
             <a:avLst/>
@@ -27102,8 +27135,8 @@
         </p:nvSpPr>
         <p:spPr bwMode="gray">
           <a:xfrm>
-            <a:off x="7722005" y="2691211"/>
-            <a:ext cx="3683610" cy="677425"/>
+            <a:off x="8012317" y="2756491"/>
+            <a:ext cx="3678160" cy="677425"/>
           </a:xfrm>
           <a:prstGeom prst="wedgeRectCallout">
             <a:avLst>
@@ -27184,7 +27217,7 @@
         </p:nvSpPr>
         <p:spPr bwMode="gray">
           <a:xfrm>
-            <a:off x="6899891" y="4290185"/>
+            <a:off x="7190633" y="4428919"/>
             <a:ext cx="4505724" cy="677425"/>
           </a:xfrm>
           <a:prstGeom prst="wedgeRectCallout">
@@ -27301,13 +27334,13 @@
         </p:nvSpPr>
         <p:spPr bwMode="gray">
           <a:xfrm>
-            <a:off x="6899891" y="5499061"/>
+            <a:off x="7184753" y="5786111"/>
             <a:ext cx="4505724" cy="677425"/>
           </a:xfrm>
           <a:prstGeom prst="wedgeRectCallout">
             <a:avLst>
-              <a:gd name="adj1" fmla="val -76478"/>
-              <a:gd name="adj2" fmla="val -21211"/>
+              <a:gd name="adj1" fmla="val -76679"/>
+              <a:gd name="adj2" fmla="val -43931"/>
             </a:avLst>
           </a:prstGeom>
           <a:ln>
@@ -27418,7 +27451,7 @@
         </p:nvSpPr>
         <p:spPr bwMode="gray">
           <a:xfrm>
-            <a:off x="6899891" y="1606707"/>
+            <a:off x="7184753" y="1595111"/>
             <a:ext cx="4505724" cy="677425"/>
           </a:xfrm>
           <a:prstGeom prst="wedgeRectCallout">

</xml_diff>

<commit_message>
explain traffic flow with ingress controller
</commit_message>
<xml_diff>
--- a/kubernetes/09_ingress.pptx
+++ b/kubernetes/09_ingress.pptx
@@ -5,28 +5,29 @@
     <p:sldMasterId id="2147483733" r:id="rId1"/>
   </p:sldMasterIdLst>
   <p:notesMasterIdLst>
-    <p:notesMasterId r:id="rId18"/>
+    <p:notesMasterId r:id="rId19"/>
   </p:notesMasterIdLst>
   <p:handoutMasterIdLst>
-    <p:handoutMasterId r:id="rId19"/>
+    <p:handoutMasterId r:id="rId20"/>
   </p:handoutMasterIdLst>
   <p:sldIdLst>
     <p:sldId id="433" r:id="rId2"/>
     <p:sldId id="447" r:id="rId3"/>
     <p:sldId id="454" r:id="rId4"/>
-    <p:sldId id="448" r:id="rId5"/>
-    <p:sldId id="455" r:id="rId6"/>
-    <p:sldId id="449" r:id="rId7"/>
-    <p:sldId id="460" r:id="rId8"/>
-    <p:sldId id="456" r:id="rId9"/>
-    <p:sldId id="457" r:id="rId10"/>
-    <p:sldId id="461" r:id="rId11"/>
-    <p:sldId id="458" r:id="rId12"/>
-    <p:sldId id="459" r:id="rId13"/>
-    <p:sldId id="462" r:id="rId14"/>
-    <p:sldId id="450" r:id="rId15"/>
-    <p:sldId id="451" r:id="rId16"/>
-    <p:sldId id="265" r:id="rId17"/>
+    <p:sldId id="463" r:id="rId5"/>
+    <p:sldId id="448" r:id="rId6"/>
+    <p:sldId id="455" r:id="rId7"/>
+    <p:sldId id="449" r:id="rId8"/>
+    <p:sldId id="460" r:id="rId9"/>
+    <p:sldId id="456" r:id="rId10"/>
+    <p:sldId id="457" r:id="rId11"/>
+    <p:sldId id="461" r:id="rId12"/>
+    <p:sldId id="458" r:id="rId13"/>
+    <p:sldId id="459" r:id="rId14"/>
+    <p:sldId id="462" r:id="rId15"/>
+    <p:sldId id="450" r:id="rId16"/>
+    <p:sldId id="451" r:id="rId17"/>
+    <p:sldId id="265" r:id="rId18"/>
   </p:sldIdLst>
   <p:sldSz cx="12195175" cy="6858000"/>
   <p:notesSz cx="6858000" cy="9144000"/>
@@ -659,217 +660,49 @@
           <a:bodyPr/>
           <a:lstStyle/>
           <a:p>
-            <a:pPr marL="285750" marR="0" lvl="0" indent="-285750" algn="l" defTabSz="1088776" rtl="0" eaLnBrk="1" fontAlgn="auto" latinLnBrk="0" hangingPunct="1">
-              <a:lnSpc>
-                <a:spcPct val="100000"/>
-              </a:lnSpc>
-              <a:spcBef>
-                <a:spcPts val="0"/>
-              </a:spcBef>
-              <a:spcAft>
-                <a:spcPts val="0"/>
-              </a:spcAft>
-              <a:buClrTx/>
-              <a:buSzTx/>
-              <a:buFontTx/>
-              <a:buChar char="-"/>
-              <a:tabLst/>
-              <a:defRPr/>
-            </a:pPr>
-            <a:r>
-              <a:rPr lang="en-US" baseline="0" dirty="0"/>
-              <a:t>Use the 09_fanout_and_virtual_host_ingress.yaml to create a deployment, service and corresponding ingress resources</a:t>
-            </a:r>
-          </a:p>
-          <a:p>
-            <a:pPr marL="285750" marR="0" lvl="0" indent="-285750" algn="l" defTabSz="1088776" rtl="0" eaLnBrk="1" fontAlgn="auto" latinLnBrk="0" hangingPunct="1">
-              <a:lnSpc>
-                <a:spcPct val="100000"/>
-              </a:lnSpc>
-              <a:spcBef>
-                <a:spcPts val="0"/>
-              </a:spcBef>
-              <a:spcAft>
-                <a:spcPts val="0"/>
-              </a:spcAft>
-              <a:buClrTx/>
-              <a:buSzTx/>
-              <a:buFontTx/>
-              <a:buChar char="-"/>
-              <a:tabLst/>
-              <a:defRPr/>
-            </a:pPr>
-            <a:r>
-              <a:rPr lang="en-US" baseline="0" dirty="0"/>
-              <a:t>Note, that this file contains not only the fanout demo but based on the same 2 deployments &amp; services also the virtual host demo.</a:t>
-            </a:r>
-          </a:p>
-          <a:p>
-            <a:pPr marL="285750" marR="0" lvl="0" indent="-285750" algn="l" defTabSz="1088776" rtl="0" eaLnBrk="1" fontAlgn="auto" latinLnBrk="0" hangingPunct="1">
-              <a:lnSpc>
-                <a:spcPct val="100000"/>
-              </a:lnSpc>
-              <a:spcBef>
-                <a:spcPts val="0"/>
-              </a:spcBef>
-              <a:spcAft>
-                <a:spcPts val="0"/>
-              </a:spcAft>
-              <a:buClrTx/>
-              <a:buSzTx/>
-              <a:buFontTx/>
-              <a:buChar char="-"/>
-              <a:tabLst/>
-              <a:defRPr/>
-            </a:pPr>
-            <a:endParaRPr lang="en-US" baseline="0" dirty="0"/>
-          </a:p>
-          <a:p>
-            <a:pPr marL="285750" marR="0" lvl="0" indent="-285750" algn="l" defTabSz="1088776" rtl="0" eaLnBrk="1" fontAlgn="auto" latinLnBrk="0" hangingPunct="1">
-              <a:lnSpc>
-                <a:spcPct val="100000"/>
-              </a:lnSpc>
-              <a:spcBef>
-                <a:spcPts val="0"/>
-              </a:spcBef>
-              <a:spcAft>
-                <a:spcPts val="0"/>
-              </a:spcAft>
-              <a:buClrTx/>
-              <a:buSzTx/>
-              <a:buFontTx/>
-              <a:buChar char="-"/>
-              <a:tabLst/>
-              <a:defRPr/>
-            </a:pPr>
-            <a:r>
-              <a:rPr lang="en-US" baseline="0" dirty="0"/>
-              <a:t>Show the deployments &amp; services</a:t>
-            </a:r>
-          </a:p>
-          <a:p>
-            <a:pPr marL="285750" marR="0" lvl="0" indent="-285750" algn="l" defTabSz="1088776" rtl="0" eaLnBrk="1" fontAlgn="auto" latinLnBrk="0" hangingPunct="1">
-              <a:lnSpc>
-                <a:spcPct val="100000"/>
-              </a:lnSpc>
-              <a:spcBef>
-                <a:spcPts val="0"/>
-              </a:spcBef>
-              <a:spcAft>
-                <a:spcPts val="0"/>
-              </a:spcAft>
-              <a:buClrTx/>
-              <a:buSzTx/>
-              <a:buFontTx/>
-              <a:buChar char="-"/>
-              <a:tabLst/>
-              <a:defRPr/>
-            </a:pPr>
-            <a:r>
-              <a:rPr lang="en-US" baseline="0" dirty="0"/>
-              <a:t>Show the fanout ingress</a:t>
-            </a:r>
-          </a:p>
-          <a:p>
-            <a:pPr marL="465750" marR="0" lvl="1" indent="-285750" algn="l" defTabSz="1088776" rtl="0" eaLnBrk="1" fontAlgn="auto" latinLnBrk="0" hangingPunct="1">
-              <a:lnSpc>
-                <a:spcPct val="100000"/>
-              </a:lnSpc>
-              <a:spcBef>
-                <a:spcPts val="0"/>
-              </a:spcBef>
-              <a:spcAft>
-                <a:spcPts val="0"/>
-              </a:spcAft>
-              <a:buClrTx/>
-              <a:buSzTx/>
-              <a:buFontTx/>
-              <a:buChar char="-"/>
-              <a:tabLst/>
-              <a:defRPr/>
-            </a:pPr>
-            <a:r>
-              <a:rPr lang="en-US" baseline="0" dirty="0"/>
-              <a:t>Highlight the rewrite-target annotation and its importance.</a:t>
-            </a:r>
-          </a:p>
-          <a:p>
-            <a:pPr marL="465750" marR="0" lvl="1" indent="-285750" algn="l" defTabSz="1088776" rtl="0" eaLnBrk="1" fontAlgn="auto" latinLnBrk="0" hangingPunct="1">
-              <a:lnSpc>
-                <a:spcPct val="100000"/>
-              </a:lnSpc>
-              <a:spcBef>
-                <a:spcPts val="0"/>
-              </a:spcBef>
-              <a:spcAft>
-                <a:spcPts val="0"/>
-              </a:spcAft>
-              <a:buClrTx/>
-              <a:buSzTx/>
-              <a:buFontTx/>
-              <a:buChar char="-"/>
-              <a:tabLst/>
-              <a:defRPr/>
-            </a:pPr>
-            <a:r>
-              <a:rPr lang="en-US" baseline="0" dirty="0"/>
-              <a:t>Without this annotation the traffic would be forwarded to my-</a:t>
-            </a:r>
-            <a:r>
-              <a:rPr lang="en-US" baseline="0" dirty="0" err="1"/>
-              <a:t>nginx</a:t>
-            </a:r>
-            <a:r>
-              <a:rPr lang="en-US" baseline="0" dirty="0"/>
-              <a:t>-service/</a:t>
-            </a:r>
-            <a:r>
-              <a:rPr lang="en-US" baseline="0" dirty="0" err="1"/>
-              <a:t>mynginx</a:t>
-            </a:r>
-            <a:r>
-              <a:rPr lang="en-US" baseline="0" dirty="0"/>
-              <a:t> or your-</a:t>
-            </a:r>
-            <a:r>
-              <a:rPr lang="en-US" baseline="0" dirty="0" err="1"/>
-              <a:t>nginx</a:t>
-            </a:r>
-            <a:r>
-              <a:rPr lang="en-US" baseline="0" dirty="0"/>
-              <a:t>-service/</a:t>
-            </a:r>
-            <a:r>
-              <a:rPr lang="en-US" baseline="0" dirty="0" err="1"/>
-              <a:t>yournginx</a:t>
-            </a:r>
-            <a:r>
-              <a:rPr lang="en-US" baseline="0" dirty="0"/>
-              <a:t>. Obviously none of the services is aware of this path, so you would get an error instead of your index.html.</a:t>
-            </a:r>
-          </a:p>
-          <a:p>
-            <a:pPr marL="285750" marR="0" lvl="0" indent="-285750" algn="l" defTabSz="1088776" rtl="0" eaLnBrk="1" fontAlgn="auto" latinLnBrk="0" hangingPunct="1">
-              <a:lnSpc>
-                <a:spcPct val="100000"/>
-              </a:lnSpc>
-              <a:spcBef>
-                <a:spcPts val="0"/>
-              </a:spcBef>
-              <a:spcAft>
-                <a:spcPts val="0"/>
-              </a:spcAft>
-              <a:buClrTx/>
-              <a:buSzTx/>
-              <a:buFontTx/>
-              <a:buChar char="-"/>
-              <a:tabLst/>
-              <a:defRPr/>
-            </a:pPr>
-            <a:r>
-              <a:rPr lang="en-US" baseline="0" dirty="0"/>
-              <a:t>Open the URL in a browser and show the different endpoints based on their path</a:t>
-            </a:r>
+            <a:r>
+              <a:rPr lang="en-US" dirty="0"/>
+              <a:t>In the spec, there is a section about rules &amp; TLS. </a:t>
+            </a:r>
+          </a:p>
+          <a:p>
+            <a:r>
+              <a:rPr lang="en-US" dirty="0"/>
+              <a:t>Rules define forwarding of incoming traffic to services.</a:t>
+            </a:r>
+          </a:p>
+          <a:p>
+            <a:endParaRPr lang="en-US" dirty="0"/>
+          </a:p>
+          <a:p>
+            <a:r>
+              <a:rPr lang="en-US" dirty="0"/>
+              <a:t>With v0.22 the re-write annotation has been changed. Now it requires capture groups, if you want to pass on any substrings within the URI. Everything not captured will be dropped. In the example above every substring following “/my” and “/your” will be forwarded to the backend.</a:t>
+            </a:r>
+          </a:p>
+          <a:p>
+            <a:endParaRPr lang="en-US" dirty="0"/>
+          </a:p>
+          <a:p>
+            <a:r>
+              <a:rPr lang="en-US" dirty="0"/>
+              <a:t>For details, see: </a:t>
+            </a:r>
+          </a:p>
+          <a:p>
+            <a:r>
+              <a:rPr lang="en-US" dirty="0"/>
+              <a:t>https://github.com/kubernetes/ingress-nginx/releases/tag/nginx-0.22.0</a:t>
+            </a:r>
+          </a:p>
+          <a:p>
+            <a:r>
+              <a:rPr lang="en-US" dirty="0"/>
+              <a:t>https://kubernetes.github.io/ingress-nginx/examples/rewrite/#rewrite-target</a:t>
+            </a:r>
+          </a:p>
+          <a:p>
+            <a:endParaRPr lang="en-US" dirty="0"/>
           </a:p>
         </p:txBody>
       </p:sp>
@@ -900,7 +733,7 @@
     </p:spTree>
     <p:extLst>
       <p:ext uri="{BB962C8B-B14F-4D97-AF65-F5344CB8AC3E}">
-        <p14:creationId xmlns:p14="http://schemas.microsoft.com/office/powerpoint/2010/main" val="1516069979"/>
+        <p14:creationId xmlns:p14="http://schemas.microsoft.com/office/powerpoint/2010/main" val="2843793769"/>
       </p:ext>
     </p:extLst>
   </p:cSld>
@@ -954,17 +787,216 @@
           <a:bodyPr/>
           <a:lstStyle/>
           <a:p>
-            <a:r>
-              <a:rPr lang="en-US" dirty="0"/>
-              <a:t>The 3</a:t>
-            </a:r>
-            <a:r>
-              <a:rPr lang="en-US" baseline="30000" dirty="0"/>
-              <a:t>rd</a:t>
-            </a:r>
-            <a:r>
-              <a:rPr lang="en-US" dirty="0"/>
-              <a:t> option to make services available is to have several URLs managed by one Ingress resource. The IP also here, the IP endpoint remains stable. </a:t>
+            <a:pPr marL="285750" marR="0" lvl="0" indent="-285750" algn="l" defTabSz="1088776" rtl="0" eaLnBrk="1" fontAlgn="auto" latinLnBrk="0" hangingPunct="1">
+              <a:lnSpc>
+                <a:spcPct val="100000"/>
+              </a:lnSpc>
+              <a:spcBef>
+                <a:spcPts val="0"/>
+              </a:spcBef>
+              <a:spcAft>
+                <a:spcPts val="0"/>
+              </a:spcAft>
+              <a:buClrTx/>
+              <a:buSzTx/>
+              <a:buFontTx/>
+              <a:buChar char="-"/>
+              <a:tabLst/>
+              <a:defRPr/>
+            </a:pPr>
+            <a:r>
+              <a:rPr lang="en-US" baseline="0" dirty="0"/>
+              <a:t>Use the 09_fanout_and_virtual_host_ingress.yaml to create a deployment, service and corresponding ingress resources</a:t>
+            </a:r>
+          </a:p>
+          <a:p>
+            <a:pPr marL="285750" marR="0" lvl="0" indent="-285750" algn="l" defTabSz="1088776" rtl="0" eaLnBrk="1" fontAlgn="auto" latinLnBrk="0" hangingPunct="1">
+              <a:lnSpc>
+                <a:spcPct val="100000"/>
+              </a:lnSpc>
+              <a:spcBef>
+                <a:spcPts val="0"/>
+              </a:spcBef>
+              <a:spcAft>
+                <a:spcPts val="0"/>
+              </a:spcAft>
+              <a:buClrTx/>
+              <a:buSzTx/>
+              <a:buFontTx/>
+              <a:buChar char="-"/>
+              <a:tabLst/>
+              <a:defRPr/>
+            </a:pPr>
+            <a:r>
+              <a:rPr lang="en-US" baseline="0" dirty="0"/>
+              <a:t>Note, that this file contains not only the fanout demo but based on the same 2 deployments &amp; services also the virtual host demo.</a:t>
+            </a:r>
+          </a:p>
+          <a:p>
+            <a:pPr marL="285750" marR="0" lvl="0" indent="-285750" algn="l" defTabSz="1088776" rtl="0" eaLnBrk="1" fontAlgn="auto" latinLnBrk="0" hangingPunct="1">
+              <a:lnSpc>
+                <a:spcPct val="100000"/>
+              </a:lnSpc>
+              <a:spcBef>
+                <a:spcPts val="0"/>
+              </a:spcBef>
+              <a:spcAft>
+                <a:spcPts val="0"/>
+              </a:spcAft>
+              <a:buClrTx/>
+              <a:buSzTx/>
+              <a:buFontTx/>
+              <a:buChar char="-"/>
+              <a:tabLst/>
+              <a:defRPr/>
+            </a:pPr>
+            <a:endParaRPr lang="en-US" baseline="0" dirty="0"/>
+          </a:p>
+          <a:p>
+            <a:pPr marL="285750" marR="0" lvl="0" indent="-285750" algn="l" defTabSz="1088776" rtl="0" eaLnBrk="1" fontAlgn="auto" latinLnBrk="0" hangingPunct="1">
+              <a:lnSpc>
+                <a:spcPct val="100000"/>
+              </a:lnSpc>
+              <a:spcBef>
+                <a:spcPts val="0"/>
+              </a:spcBef>
+              <a:spcAft>
+                <a:spcPts val="0"/>
+              </a:spcAft>
+              <a:buClrTx/>
+              <a:buSzTx/>
+              <a:buFontTx/>
+              <a:buChar char="-"/>
+              <a:tabLst/>
+              <a:defRPr/>
+            </a:pPr>
+            <a:r>
+              <a:rPr lang="en-US" baseline="0" dirty="0"/>
+              <a:t>Show the deployments &amp; services</a:t>
+            </a:r>
+          </a:p>
+          <a:p>
+            <a:pPr marL="285750" marR="0" lvl="0" indent="-285750" algn="l" defTabSz="1088776" rtl="0" eaLnBrk="1" fontAlgn="auto" latinLnBrk="0" hangingPunct="1">
+              <a:lnSpc>
+                <a:spcPct val="100000"/>
+              </a:lnSpc>
+              <a:spcBef>
+                <a:spcPts val="0"/>
+              </a:spcBef>
+              <a:spcAft>
+                <a:spcPts val="0"/>
+              </a:spcAft>
+              <a:buClrTx/>
+              <a:buSzTx/>
+              <a:buFontTx/>
+              <a:buChar char="-"/>
+              <a:tabLst/>
+              <a:defRPr/>
+            </a:pPr>
+            <a:r>
+              <a:rPr lang="en-US" baseline="0" dirty="0"/>
+              <a:t>Show the fanout ingress</a:t>
+            </a:r>
+          </a:p>
+          <a:p>
+            <a:pPr marL="465750" marR="0" lvl="1" indent="-285750" algn="l" defTabSz="1088776" rtl="0" eaLnBrk="1" fontAlgn="auto" latinLnBrk="0" hangingPunct="1">
+              <a:lnSpc>
+                <a:spcPct val="100000"/>
+              </a:lnSpc>
+              <a:spcBef>
+                <a:spcPts val="0"/>
+              </a:spcBef>
+              <a:spcAft>
+                <a:spcPts val="0"/>
+              </a:spcAft>
+              <a:buClrTx/>
+              <a:buSzTx/>
+              <a:buFontTx/>
+              <a:buChar char="-"/>
+              <a:tabLst/>
+              <a:defRPr/>
+            </a:pPr>
+            <a:r>
+              <a:rPr lang="en-US" baseline="0" dirty="0"/>
+              <a:t>Highlight the rewrite-target annotation and its importance.</a:t>
+            </a:r>
+          </a:p>
+          <a:p>
+            <a:pPr marL="465750" marR="0" lvl="1" indent="-285750" algn="l" defTabSz="1088776" rtl="0" eaLnBrk="1" fontAlgn="auto" latinLnBrk="0" hangingPunct="1">
+              <a:lnSpc>
+                <a:spcPct val="100000"/>
+              </a:lnSpc>
+              <a:spcBef>
+                <a:spcPts val="0"/>
+              </a:spcBef>
+              <a:spcAft>
+                <a:spcPts val="0"/>
+              </a:spcAft>
+              <a:buClrTx/>
+              <a:buSzTx/>
+              <a:buFontTx/>
+              <a:buChar char="-"/>
+              <a:tabLst/>
+              <a:defRPr/>
+            </a:pPr>
+            <a:r>
+              <a:rPr lang="en-US" baseline="0" dirty="0"/>
+              <a:t>Without this annotation the traffic would be forwarded to my-</a:t>
+            </a:r>
+            <a:r>
+              <a:rPr lang="en-US" baseline="0" dirty="0" err="1"/>
+              <a:t>nginx</a:t>
+            </a:r>
+            <a:r>
+              <a:rPr lang="en-US" baseline="0" dirty="0"/>
+              <a:t>-service/</a:t>
+            </a:r>
+            <a:r>
+              <a:rPr lang="en-US" baseline="0" dirty="0" err="1"/>
+              <a:t>mynginx</a:t>
+            </a:r>
+            <a:r>
+              <a:rPr lang="en-US" baseline="0" dirty="0"/>
+              <a:t> or your-</a:t>
+            </a:r>
+            <a:r>
+              <a:rPr lang="en-US" baseline="0" dirty="0" err="1"/>
+              <a:t>nginx</a:t>
+            </a:r>
+            <a:r>
+              <a:rPr lang="en-US" baseline="0" dirty="0"/>
+              <a:t>-service/</a:t>
+            </a:r>
+            <a:r>
+              <a:rPr lang="en-US" baseline="0" dirty="0" err="1"/>
+              <a:t>yournginx</a:t>
+            </a:r>
+            <a:r>
+              <a:rPr lang="en-US" baseline="0" dirty="0"/>
+              <a:t>. Obviously none of the services is aware of this path, so you would get an error instead of your index.html.</a:t>
+            </a:r>
+          </a:p>
+          <a:p>
+            <a:pPr marL="285750" marR="0" lvl="0" indent="-285750" algn="l" defTabSz="1088776" rtl="0" eaLnBrk="1" fontAlgn="auto" latinLnBrk="0" hangingPunct="1">
+              <a:lnSpc>
+                <a:spcPct val="100000"/>
+              </a:lnSpc>
+              <a:spcBef>
+                <a:spcPts val="0"/>
+              </a:spcBef>
+              <a:spcAft>
+                <a:spcPts val="0"/>
+              </a:spcAft>
+              <a:buClrTx/>
+              <a:buSzTx/>
+              <a:buFontTx/>
+              <a:buChar char="-"/>
+              <a:tabLst/>
+              <a:defRPr/>
+            </a:pPr>
+            <a:r>
+              <a:rPr lang="en-US" baseline="0" dirty="0"/>
+              <a:t>Open the URL in a browser and show the different endpoints based on their path</a:t>
             </a:r>
           </a:p>
         </p:txBody>
@@ -996,7 +1028,7 @@
     </p:spTree>
     <p:extLst>
       <p:ext uri="{BB962C8B-B14F-4D97-AF65-F5344CB8AC3E}">
-        <p14:creationId xmlns:p14="http://schemas.microsoft.com/office/powerpoint/2010/main" val="2950948830"/>
+        <p14:creationId xmlns:p14="http://schemas.microsoft.com/office/powerpoint/2010/main" val="1516069979"/>
       </p:ext>
     </p:extLst>
   </p:cSld>
@@ -1052,13 +1084,15 @@
           <a:p>
             <a:r>
               <a:rPr lang="en-US" dirty="0"/>
-              <a:t>In the spec, there is a section about rules &amp; TLS. </a:t>
-            </a:r>
-          </a:p>
-          <a:p>
+              <a:t>The 3</a:t>
+            </a:r>
+            <a:r>
+              <a:rPr lang="en-US" baseline="30000" dirty="0"/>
+              <a:t>rd</a:t>
+            </a:r>
             <a:r>
               <a:rPr lang="en-US" dirty="0"/>
-              <a:t>Rules define forwarding of incoming traffic to services.</a:t>
+              <a:t> option to make services available is to have several URLs managed by one Ingress resource. The IP also here, the IP endpoint remains stable. </a:t>
             </a:r>
           </a:p>
         </p:txBody>
@@ -1090,7 +1124,7 @@
     </p:spTree>
     <p:extLst>
       <p:ext uri="{BB962C8B-B14F-4D97-AF65-F5344CB8AC3E}">
-        <p14:creationId xmlns:p14="http://schemas.microsoft.com/office/powerpoint/2010/main" val="4151655171"/>
+        <p14:creationId xmlns:p14="http://schemas.microsoft.com/office/powerpoint/2010/main" val="2950948830"/>
       </p:ext>
     </p:extLst>
   </p:cSld>
@@ -1144,216 +1178,15 @@
           <a:bodyPr/>
           <a:lstStyle/>
           <a:p>
-            <a:pPr marL="285750" marR="0" lvl="0" indent="-285750" algn="l" defTabSz="1088776" rtl="0" eaLnBrk="1" fontAlgn="auto" latinLnBrk="0" hangingPunct="1">
-              <a:lnSpc>
-                <a:spcPct val="100000"/>
-              </a:lnSpc>
-              <a:spcBef>
-                <a:spcPts val="0"/>
-              </a:spcBef>
-              <a:spcAft>
-                <a:spcPts val="0"/>
-              </a:spcAft>
-              <a:buClrTx/>
-              <a:buSzTx/>
-              <a:buFontTx/>
-              <a:buChar char="-"/>
-              <a:tabLst/>
-              <a:defRPr/>
-            </a:pPr>
-            <a:r>
-              <a:rPr lang="en-US" baseline="0" dirty="0"/>
-              <a:t>Use the 09_fanout_and_virtual_host_ingress.yaml to create a deployment, service and corresponding ingress resources</a:t>
-            </a:r>
-          </a:p>
-          <a:p>
-            <a:pPr marL="285750" marR="0" lvl="0" indent="-285750" algn="l" defTabSz="1088776" rtl="0" eaLnBrk="1" fontAlgn="auto" latinLnBrk="0" hangingPunct="1">
-              <a:lnSpc>
-                <a:spcPct val="100000"/>
-              </a:lnSpc>
-              <a:spcBef>
-                <a:spcPts val="0"/>
-              </a:spcBef>
-              <a:spcAft>
-                <a:spcPts val="0"/>
-              </a:spcAft>
-              <a:buClrTx/>
-              <a:buSzTx/>
-              <a:buFontTx/>
-              <a:buChar char="-"/>
-              <a:tabLst/>
-              <a:defRPr/>
-            </a:pPr>
-            <a:r>
-              <a:rPr lang="en-US" baseline="0" dirty="0"/>
-              <a:t>Note, that this file contains not only the fanout demo but based on the same 2 deployments &amp; services also the virtual host demo.</a:t>
-            </a:r>
-          </a:p>
-          <a:p>
-            <a:pPr marL="285750" marR="0" lvl="0" indent="-285750" algn="l" defTabSz="1088776" rtl="0" eaLnBrk="1" fontAlgn="auto" latinLnBrk="0" hangingPunct="1">
-              <a:lnSpc>
-                <a:spcPct val="100000"/>
-              </a:lnSpc>
-              <a:spcBef>
-                <a:spcPts val="0"/>
-              </a:spcBef>
-              <a:spcAft>
-                <a:spcPts val="0"/>
-              </a:spcAft>
-              <a:buClrTx/>
-              <a:buSzTx/>
-              <a:buFontTx/>
-              <a:buChar char="-"/>
-              <a:tabLst/>
-              <a:defRPr/>
-            </a:pPr>
-            <a:endParaRPr lang="en-US" baseline="0" dirty="0"/>
-          </a:p>
-          <a:p>
-            <a:pPr marL="285750" marR="0" lvl="0" indent="-285750" algn="l" defTabSz="1088776" rtl="0" eaLnBrk="1" fontAlgn="auto" latinLnBrk="0" hangingPunct="1">
-              <a:lnSpc>
-                <a:spcPct val="100000"/>
-              </a:lnSpc>
-              <a:spcBef>
-                <a:spcPts val="0"/>
-              </a:spcBef>
-              <a:spcAft>
-                <a:spcPts val="0"/>
-              </a:spcAft>
-              <a:buClrTx/>
-              <a:buSzTx/>
-              <a:buFontTx/>
-              <a:buChar char="-"/>
-              <a:tabLst/>
-              <a:defRPr/>
-            </a:pPr>
-            <a:r>
-              <a:rPr lang="en-US" baseline="0" dirty="0"/>
-              <a:t>Show the deployments &amp; services</a:t>
-            </a:r>
-          </a:p>
-          <a:p>
-            <a:pPr marL="285750" marR="0" lvl="0" indent="-285750" algn="l" defTabSz="1088776" rtl="0" eaLnBrk="1" fontAlgn="auto" latinLnBrk="0" hangingPunct="1">
-              <a:lnSpc>
-                <a:spcPct val="100000"/>
-              </a:lnSpc>
-              <a:spcBef>
-                <a:spcPts val="0"/>
-              </a:spcBef>
-              <a:spcAft>
-                <a:spcPts val="0"/>
-              </a:spcAft>
-              <a:buClrTx/>
-              <a:buSzTx/>
-              <a:buFontTx/>
-              <a:buChar char="-"/>
-              <a:tabLst/>
-              <a:defRPr/>
-            </a:pPr>
-            <a:r>
-              <a:rPr lang="en-US" baseline="0" dirty="0"/>
-              <a:t>Show the virtual hosts ingress</a:t>
-            </a:r>
-          </a:p>
-          <a:p>
-            <a:pPr marL="465750" marR="0" lvl="1" indent="-285750" algn="l" defTabSz="1088776" rtl="0" eaLnBrk="1" fontAlgn="auto" latinLnBrk="0" hangingPunct="1">
-              <a:lnSpc>
-                <a:spcPct val="100000"/>
-              </a:lnSpc>
-              <a:spcBef>
-                <a:spcPts val="0"/>
-              </a:spcBef>
-              <a:spcAft>
-                <a:spcPts val="0"/>
-              </a:spcAft>
-              <a:buClrTx/>
-              <a:buSzTx/>
-              <a:buFontTx/>
-              <a:buChar char="-"/>
-              <a:tabLst/>
-              <a:defRPr/>
-            </a:pPr>
-            <a:r>
-              <a:rPr lang="en-US" baseline="0" dirty="0"/>
-              <a:t>Highlight the rewrite-target annotation and its importance.</a:t>
-            </a:r>
-          </a:p>
-          <a:p>
-            <a:pPr marL="465750" marR="0" lvl="1" indent="-285750" algn="l" defTabSz="1088776" rtl="0" eaLnBrk="1" fontAlgn="auto" latinLnBrk="0" hangingPunct="1">
-              <a:lnSpc>
-                <a:spcPct val="100000"/>
-              </a:lnSpc>
-              <a:spcBef>
-                <a:spcPts val="0"/>
-              </a:spcBef>
-              <a:spcAft>
-                <a:spcPts val="0"/>
-              </a:spcAft>
-              <a:buClrTx/>
-              <a:buSzTx/>
-              <a:buFontTx/>
-              <a:buChar char="-"/>
-              <a:tabLst/>
-              <a:defRPr/>
-            </a:pPr>
-            <a:r>
-              <a:rPr lang="en-US" baseline="0" dirty="0"/>
-              <a:t>Without this annotation the traffic would be forwarded to my-</a:t>
-            </a:r>
-            <a:r>
-              <a:rPr lang="en-US" baseline="0" dirty="0" err="1"/>
-              <a:t>nginx</a:t>
-            </a:r>
-            <a:r>
-              <a:rPr lang="en-US" baseline="0" dirty="0"/>
-              <a:t>-service/</a:t>
-            </a:r>
-            <a:r>
-              <a:rPr lang="en-US" baseline="0" dirty="0" err="1"/>
-              <a:t>mynginx</a:t>
-            </a:r>
-            <a:r>
-              <a:rPr lang="en-US" baseline="0" dirty="0"/>
-              <a:t> or your-</a:t>
-            </a:r>
-            <a:r>
-              <a:rPr lang="en-US" baseline="0" dirty="0" err="1"/>
-              <a:t>nginx</a:t>
-            </a:r>
-            <a:r>
-              <a:rPr lang="en-US" baseline="0" dirty="0"/>
-              <a:t>-service/</a:t>
-            </a:r>
-            <a:r>
-              <a:rPr lang="en-US" baseline="0" dirty="0" err="1"/>
-              <a:t>yournginx</a:t>
-            </a:r>
-            <a:r>
-              <a:rPr lang="en-US" baseline="0" dirty="0"/>
-              <a:t>. Obviously none of the services is aware of this path, so you would get an error instead of your index.html.</a:t>
-            </a:r>
-          </a:p>
-          <a:p>
-            <a:pPr marL="285750" marR="0" lvl="0" indent="-285750" algn="l" defTabSz="1088776" rtl="0" eaLnBrk="1" fontAlgn="auto" latinLnBrk="0" hangingPunct="1">
-              <a:lnSpc>
-                <a:spcPct val="100000"/>
-              </a:lnSpc>
-              <a:spcBef>
-                <a:spcPts val="0"/>
-              </a:spcBef>
-              <a:spcAft>
-                <a:spcPts val="0"/>
-              </a:spcAft>
-              <a:buClrTx/>
-              <a:buSzTx/>
-              <a:buFontTx/>
-              <a:buChar char="-"/>
-              <a:tabLst/>
-              <a:defRPr/>
-            </a:pPr>
-            <a:r>
-              <a:rPr lang="en-US" baseline="0" dirty="0"/>
-              <a:t>Open the URL in a browser and show the different endpoints based on their URL</a:t>
+            <a:r>
+              <a:rPr lang="en-US" dirty="0"/>
+              <a:t>In the spec, there is a section about rules &amp; TLS. </a:t>
+            </a:r>
+          </a:p>
+          <a:p>
+            <a:r>
+              <a:rPr lang="en-US" dirty="0"/>
+              <a:t>Rules define forwarding of incoming traffic to services.</a:t>
             </a:r>
           </a:p>
         </p:txBody>
@@ -1385,7 +1218,7 @@
     </p:spTree>
     <p:extLst>
       <p:ext uri="{BB962C8B-B14F-4D97-AF65-F5344CB8AC3E}">
-        <p14:creationId xmlns:p14="http://schemas.microsoft.com/office/powerpoint/2010/main" val="2138588329"/>
+        <p14:creationId xmlns:p14="http://schemas.microsoft.com/office/powerpoint/2010/main" val="4151655171"/>
       </p:ext>
     </p:extLst>
   </p:cSld>
@@ -1439,37 +1272,217 @@
           <a:bodyPr/>
           <a:lstStyle/>
           <a:p>
-            <a:r>
-              <a:rPr lang="en-US" dirty="0"/>
-              <a:t>With Gardener, you get an ingress controller for free </a:t>
-            </a:r>
-            <a:r>
-              <a:rPr lang="en-US" dirty="0">
-                <a:sym typeface="Wingdings" panose="05000000000000000000" pitchFamily="2" charset="2"/>
-              </a:rPr>
-              <a:t> it is also registered with a domain, so you will get your own sub-domain to register your URLs.</a:t>
-            </a:r>
-          </a:p>
-          <a:p>
-            <a:r>
-              <a:rPr lang="en-US" dirty="0">
-                <a:sym typeface="Wingdings" panose="05000000000000000000" pitchFamily="2" charset="2"/>
-              </a:rPr>
-              <a:t>The schema is described in the Gardener how-to docs. You might need to adapt the </a:t>
-            </a:r>
-            <a:r>
-              <a:rPr lang="en-US" dirty="0" err="1">
-                <a:sym typeface="Wingdings" panose="05000000000000000000" pitchFamily="2" charset="2"/>
-              </a:rPr>
-              <a:t>ingress.yaml</a:t>
-            </a:r>
-            <a:r>
-              <a:rPr lang="en-US" dirty="0">
-                <a:sym typeface="Wingdings" panose="05000000000000000000" pitchFamily="2" charset="2"/>
-              </a:rPr>
-              <a:t> to your training project.</a:t>
-            </a:r>
-            <a:endParaRPr lang="en-US" dirty="0"/>
+            <a:pPr marL="285750" marR="0" lvl="0" indent="-285750" algn="l" defTabSz="1088776" rtl="0" eaLnBrk="1" fontAlgn="auto" latinLnBrk="0" hangingPunct="1">
+              <a:lnSpc>
+                <a:spcPct val="100000"/>
+              </a:lnSpc>
+              <a:spcBef>
+                <a:spcPts val="0"/>
+              </a:spcBef>
+              <a:spcAft>
+                <a:spcPts val="0"/>
+              </a:spcAft>
+              <a:buClrTx/>
+              <a:buSzTx/>
+              <a:buFontTx/>
+              <a:buChar char="-"/>
+              <a:tabLst/>
+              <a:defRPr/>
+            </a:pPr>
+            <a:r>
+              <a:rPr lang="en-US" baseline="0" dirty="0"/>
+              <a:t>Use the 09_fanout_and_virtual_host_ingress.yaml to create a deployment, service and corresponding ingress resources</a:t>
+            </a:r>
+          </a:p>
+          <a:p>
+            <a:pPr marL="285750" marR="0" lvl="0" indent="-285750" algn="l" defTabSz="1088776" rtl="0" eaLnBrk="1" fontAlgn="auto" latinLnBrk="0" hangingPunct="1">
+              <a:lnSpc>
+                <a:spcPct val="100000"/>
+              </a:lnSpc>
+              <a:spcBef>
+                <a:spcPts val="0"/>
+              </a:spcBef>
+              <a:spcAft>
+                <a:spcPts val="0"/>
+              </a:spcAft>
+              <a:buClrTx/>
+              <a:buSzTx/>
+              <a:buFontTx/>
+              <a:buChar char="-"/>
+              <a:tabLst/>
+              <a:defRPr/>
+            </a:pPr>
+            <a:r>
+              <a:rPr lang="en-US" baseline="0" dirty="0"/>
+              <a:t>Note, that this file contains not only the fanout demo but based on the same 2 deployments &amp; services also the virtual host demo.</a:t>
+            </a:r>
+          </a:p>
+          <a:p>
+            <a:pPr marL="285750" marR="0" lvl="0" indent="-285750" algn="l" defTabSz="1088776" rtl="0" eaLnBrk="1" fontAlgn="auto" latinLnBrk="0" hangingPunct="1">
+              <a:lnSpc>
+                <a:spcPct val="100000"/>
+              </a:lnSpc>
+              <a:spcBef>
+                <a:spcPts val="0"/>
+              </a:spcBef>
+              <a:spcAft>
+                <a:spcPts val="0"/>
+              </a:spcAft>
+              <a:buClrTx/>
+              <a:buSzTx/>
+              <a:buFontTx/>
+              <a:buChar char="-"/>
+              <a:tabLst/>
+              <a:defRPr/>
+            </a:pPr>
+            <a:endParaRPr lang="en-US" baseline="0" dirty="0"/>
+          </a:p>
+          <a:p>
+            <a:pPr marL="285750" marR="0" lvl="0" indent="-285750" algn="l" defTabSz="1088776" rtl="0" eaLnBrk="1" fontAlgn="auto" latinLnBrk="0" hangingPunct="1">
+              <a:lnSpc>
+                <a:spcPct val="100000"/>
+              </a:lnSpc>
+              <a:spcBef>
+                <a:spcPts val="0"/>
+              </a:spcBef>
+              <a:spcAft>
+                <a:spcPts val="0"/>
+              </a:spcAft>
+              <a:buClrTx/>
+              <a:buSzTx/>
+              <a:buFontTx/>
+              <a:buChar char="-"/>
+              <a:tabLst/>
+              <a:defRPr/>
+            </a:pPr>
+            <a:r>
+              <a:rPr lang="en-US" baseline="0" dirty="0"/>
+              <a:t>Show the deployments &amp; services</a:t>
+            </a:r>
+          </a:p>
+          <a:p>
+            <a:pPr marL="285750" marR="0" lvl="0" indent="-285750" algn="l" defTabSz="1088776" rtl="0" eaLnBrk="1" fontAlgn="auto" latinLnBrk="0" hangingPunct="1">
+              <a:lnSpc>
+                <a:spcPct val="100000"/>
+              </a:lnSpc>
+              <a:spcBef>
+                <a:spcPts val="0"/>
+              </a:spcBef>
+              <a:spcAft>
+                <a:spcPts val="0"/>
+              </a:spcAft>
+              <a:buClrTx/>
+              <a:buSzTx/>
+              <a:buFontTx/>
+              <a:buChar char="-"/>
+              <a:tabLst/>
+              <a:defRPr/>
+            </a:pPr>
+            <a:r>
+              <a:rPr lang="en-US" baseline="0" dirty="0"/>
+              <a:t>Show the virtual hosts ingress</a:t>
+            </a:r>
+          </a:p>
+          <a:p>
+            <a:pPr marL="465750" marR="0" lvl="1" indent="-285750" algn="l" defTabSz="1088776" rtl="0" eaLnBrk="1" fontAlgn="auto" latinLnBrk="0" hangingPunct="1">
+              <a:lnSpc>
+                <a:spcPct val="100000"/>
+              </a:lnSpc>
+              <a:spcBef>
+                <a:spcPts val="0"/>
+              </a:spcBef>
+              <a:spcAft>
+                <a:spcPts val="0"/>
+              </a:spcAft>
+              <a:buClrTx/>
+              <a:buSzTx/>
+              <a:buFontTx/>
+              <a:buChar char="-"/>
+              <a:tabLst/>
+              <a:defRPr/>
+            </a:pPr>
+            <a:r>
+              <a:rPr lang="en-US" baseline="0" dirty="0"/>
+              <a:t>Highlight the rewrite-target annotation and its importance.</a:t>
+            </a:r>
+          </a:p>
+          <a:p>
+            <a:pPr marL="465750" marR="0" lvl="1" indent="-285750" algn="l" defTabSz="1088776" rtl="0" eaLnBrk="1" fontAlgn="auto" latinLnBrk="0" hangingPunct="1">
+              <a:lnSpc>
+                <a:spcPct val="100000"/>
+              </a:lnSpc>
+              <a:spcBef>
+                <a:spcPts val="0"/>
+              </a:spcBef>
+              <a:spcAft>
+                <a:spcPts val="0"/>
+              </a:spcAft>
+              <a:buClrTx/>
+              <a:buSzTx/>
+              <a:buFontTx/>
+              <a:buChar char="-"/>
+              <a:tabLst/>
+              <a:defRPr/>
+            </a:pPr>
+            <a:r>
+              <a:rPr lang="en-US" baseline="0" dirty="0"/>
+              <a:t>Without this annotation the traffic would be forwarded to my-</a:t>
+            </a:r>
+            <a:r>
+              <a:rPr lang="en-US" baseline="0" dirty="0" err="1"/>
+              <a:t>nginx</a:t>
+            </a:r>
+            <a:r>
+              <a:rPr lang="en-US" baseline="0" dirty="0"/>
+              <a:t>-service/</a:t>
+            </a:r>
+            <a:r>
+              <a:rPr lang="en-US" baseline="0" dirty="0" err="1"/>
+              <a:t>mynginx</a:t>
+            </a:r>
+            <a:r>
+              <a:rPr lang="en-US" baseline="0" dirty="0"/>
+              <a:t> or your-</a:t>
+            </a:r>
+            <a:r>
+              <a:rPr lang="en-US" baseline="0" dirty="0" err="1"/>
+              <a:t>nginx</a:t>
+            </a:r>
+            <a:r>
+              <a:rPr lang="en-US" baseline="0" dirty="0"/>
+              <a:t>-service/</a:t>
+            </a:r>
+            <a:r>
+              <a:rPr lang="en-US" baseline="0" dirty="0" err="1"/>
+              <a:t>yournginx</a:t>
+            </a:r>
+            <a:r>
+              <a:rPr lang="en-US" baseline="0" dirty="0"/>
+              <a:t>. Obviously none of the services is aware of this path, so you would get an error instead of your index.html.</a:t>
+            </a:r>
+          </a:p>
+          <a:p>
+            <a:pPr marL="285750" marR="0" lvl="0" indent="-285750" algn="l" defTabSz="1088776" rtl="0" eaLnBrk="1" fontAlgn="auto" latinLnBrk="0" hangingPunct="1">
+              <a:lnSpc>
+                <a:spcPct val="100000"/>
+              </a:lnSpc>
+              <a:spcBef>
+                <a:spcPts val="0"/>
+              </a:spcBef>
+              <a:spcAft>
+                <a:spcPts val="0"/>
+              </a:spcAft>
+              <a:buClrTx/>
+              <a:buSzTx/>
+              <a:buFontTx/>
+              <a:buChar char="-"/>
+              <a:tabLst/>
+              <a:defRPr/>
+            </a:pPr>
+            <a:r>
+              <a:rPr lang="en-US" baseline="0" dirty="0"/>
+              <a:t>Open the URL in a browser and show the different endpoints based on their URL</a:t>
+            </a:r>
           </a:p>
         </p:txBody>
       </p:sp>
@@ -1500,6 +1513,121 @@
     </p:spTree>
     <p:extLst>
       <p:ext uri="{BB962C8B-B14F-4D97-AF65-F5344CB8AC3E}">
+        <p14:creationId xmlns:p14="http://schemas.microsoft.com/office/powerpoint/2010/main" val="2138588329"/>
+      </p:ext>
+    </p:extLst>
+  </p:cSld>
+  <p:clrMapOvr>
+    <a:masterClrMapping/>
+  </p:clrMapOvr>
+</p:notes>
+</file>
+
+<file path=ppt/notesSlides/notesSlide15.xml><?xml version="1.0" encoding="utf-8"?>
+<p:notes xmlns:a="http://schemas.openxmlformats.org/drawingml/2006/main" xmlns:r="http://schemas.openxmlformats.org/officeDocument/2006/relationships" xmlns:p="http://schemas.openxmlformats.org/presentationml/2006/main">
+  <p:cSld>
+    <p:spTree>
+      <p:nvGrpSpPr>
+        <p:cNvPr id="1" name=""/>
+        <p:cNvGrpSpPr/>
+        <p:nvPr/>
+      </p:nvGrpSpPr>
+      <p:grpSpPr>
+        <a:xfrm>
+          <a:off x="0" y="0"/>
+          <a:ext cx="0" cy="0"/>
+          <a:chOff x="0" y="0"/>
+          <a:chExt cx="0" cy="0"/>
+        </a:xfrm>
+      </p:grpSpPr>
+      <p:sp>
+        <p:nvSpPr>
+          <p:cNvPr id="2" name="Slide Image Placeholder 1"/>
+          <p:cNvSpPr>
+            <a:spLocks noGrp="1" noRot="1" noChangeAspect="1"/>
+          </p:cNvSpPr>
+          <p:nvPr>
+            <p:ph type="sldImg"/>
+          </p:nvPr>
+        </p:nvSpPr>
+        <p:spPr/>
+      </p:sp>
+      <p:sp>
+        <p:nvSpPr>
+          <p:cNvPr id="3" name="Notes Placeholder 2"/>
+          <p:cNvSpPr>
+            <a:spLocks noGrp="1"/>
+          </p:cNvSpPr>
+          <p:nvPr>
+            <p:ph type="body" idx="1"/>
+          </p:nvPr>
+        </p:nvSpPr>
+        <p:spPr/>
+        <p:txBody>
+          <a:bodyPr/>
+          <a:lstStyle/>
+          <a:p>
+            <a:r>
+              <a:rPr lang="en-US" dirty="0"/>
+              <a:t>With Gardener, you get an ingress controller for free </a:t>
+            </a:r>
+            <a:r>
+              <a:rPr lang="en-US" dirty="0">
+                <a:sym typeface="Wingdings" panose="05000000000000000000" pitchFamily="2" charset="2"/>
+              </a:rPr>
+              <a:t> it is also registered with a domain, so you will get your own sub-domain to register your URLs.</a:t>
+            </a:r>
+          </a:p>
+          <a:p>
+            <a:r>
+              <a:rPr lang="en-US" dirty="0">
+                <a:sym typeface="Wingdings" panose="05000000000000000000" pitchFamily="2" charset="2"/>
+              </a:rPr>
+              <a:t>The schema is described in the Gardener how-to docs. You might need to adapt the </a:t>
+            </a:r>
+            <a:r>
+              <a:rPr lang="en-US" dirty="0" err="1">
+                <a:sym typeface="Wingdings" panose="05000000000000000000" pitchFamily="2" charset="2"/>
+              </a:rPr>
+              <a:t>ingress.yaml</a:t>
+            </a:r>
+            <a:r>
+              <a:rPr lang="en-US" dirty="0">
+                <a:sym typeface="Wingdings" panose="05000000000000000000" pitchFamily="2" charset="2"/>
+              </a:rPr>
+              <a:t> to your training project.</a:t>
+            </a:r>
+            <a:endParaRPr lang="en-US" dirty="0"/>
+          </a:p>
+        </p:txBody>
+      </p:sp>
+      <p:sp>
+        <p:nvSpPr>
+          <p:cNvPr id="4" name="Slide Number Placeholder 3"/>
+          <p:cNvSpPr>
+            <a:spLocks noGrp="1"/>
+          </p:cNvSpPr>
+          <p:nvPr>
+            <p:ph type="sldNum" sz="quarter" idx="10"/>
+          </p:nvPr>
+        </p:nvSpPr>
+        <p:spPr/>
+        <p:txBody>
+          <a:bodyPr/>
+          <a:lstStyle/>
+          <a:p>
+            <a:fld id="{7D8C2C35-2B8A-446E-BEC0-FD36716C29AC}" type="slidenum">
+              <a:rPr lang="de-DE" smtClean="0"/>
+              <a:pPr/>
+              <a:t>15</a:t>
+            </a:fld>
+            <a:endParaRPr lang="de-DE" dirty="0"/>
+          </a:p>
+        </p:txBody>
+      </p:sp>
+    </p:spTree>
+    <p:extLst>
+      <p:ext uri="{BB962C8B-B14F-4D97-AF65-F5344CB8AC3E}">
         <p14:creationId xmlns:p14="http://schemas.microsoft.com/office/powerpoint/2010/main" val="2003310675"/>
       </p:ext>
     </p:extLst>
@@ -1510,7 +1638,7 @@
 </p:notes>
 </file>
 
-<file path=ppt/notesSlides/notesSlide15.xml><?xml version="1.0" encoding="utf-8"?>
+<file path=ppt/notesSlides/notesSlide16.xml><?xml version="1.0" encoding="utf-8"?>
 <p:notes xmlns:a="http://schemas.openxmlformats.org/drawingml/2006/main" xmlns:r="http://schemas.openxmlformats.org/officeDocument/2006/relationships" xmlns:p="http://schemas.openxmlformats.org/presentationml/2006/main">
   <p:cSld>
     <p:spTree>
@@ -1545,7 +1673,7 @@
             <a:fld id="{7D8C2C35-2B8A-446E-BEC0-FD36716C29AC}" type="slidenum">
               <a:rPr lang="en-US" smtClean="0"/>
               <a:pPr/>
-              <a:t>16</a:t>
+              <a:t>17</a:t>
             </a:fld>
             <a:endParaRPr lang="en-US" dirty="0"/>
           </a:p>
@@ -2011,35 +2139,115 @@
           <a:p>
             <a:r>
               <a:rPr lang="en-US" dirty="0"/>
-              <a:t>The ingress controller needs to be present in the respective cluster. It is configured to watch for new ingress objects being posted to the k8s </a:t>
+              <a:t>The routing construct consists of several building blocks: </a:t>
+            </a:r>
+          </a:p>
+          <a:p>
+            <a:pPr marL="285750" indent="-285750">
+              <a:buFontTx/>
+              <a:buChar char="-"/>
+            </a:pPr>
+            <a:r>
+              <a:rPr lang="en-US" dirty="0"/>
+              <a:t>In part-0000 namespace there are pods &amp; a </a:t>
             </a:r>
             <a:r>
               <a:rPr lang="en-US" dirty="0" err="1"/>
-              <a:t>api</a:t>
+              <a:t>clusterIP</a:t>
             </a:r>
             <a:r>
               <a:rPr lang="en-US" dirty="0"/>
-              <a:t> server. </a:t>
-            </a:r>
-          </a:p>
-          <a:p>
+              <a:t> service, which can be used to access the pods cluster-internally</a:t>
+            </a:r>
+          </a:p>
+          <a:p>
+            <a:pPr marL="285750" indent="-285750">
+              <a:buFontTx/>
+              <a:buChar char="-"/>
+            </a:pPr>
             <a:r>
               <a:rPr lang="en-US" dirty="0"/>
-              <a:t>Once an ingress resource is created, the controller will try to enforce the desired state. That can include the setup of URL &amp; corresponding routing info etc.</a:t>
-            </a:r>
-          </a:p>
-          <a:p>
+              <a:t>In </a:t>
+            </a:r>
+            <a:r>
+              <a:rPr lang="en-US" dirty="0" err="1"/>
+              <a:t>kube</a:t>
+            </a:r>
             <a:r>
               <a:rPr lang="en-US" dirty="0"/>
-              <a:t>Most common ingress controller is the “</a:t>
+              <a:t>-system namespace a component called “ingress-controller” runs. This component is exposed via </a:t>
             </a:r>
             <a:r>
               <a:rPr lang="en-US" dirty="0" err="1"/>
-              <a:t>nginx</a:t>
+              <a:t>loadbalancer</a:t>
             </a:r>
             <a:r>
               <a:rPr lang="en-US" dirty="0"/>
-              <a:t> ingress controller”</a:t>
+              <a:t> service. The IP of this service is registered to a wildcard domain / top level domain.</a:t>
+            </a:r>
+          </a:p>
+          <a:p>
+            <a:pPr marL="285750" indent="-285750">
+              <a:buFontTx/>
+              <a:buChar char="-"/>
+            </a:pPr>
+            <a:r>
+              <a:rPr lang="en-US" dirty="0"/>
+              <a:t>In </a:t>
+            </a:r>
+            <a:r>
+              <a:rPr lang="en-US" dirty="0" err="1"/>
+              <a:t>kube</a:t>
+            </a:r>
+            <a:r>
+              <a:rPr lang="en-US" dirty="0"/>
+              <a:t>-system namespace a 2</a:t>
+            </a:r>
+            <a:r>
+              <a:rPr lang="en-US" baseline="30000" dirty="0"/>
+              <a:t>nd</a:t>
+            </a:r>
+            <a:r>
+              <a:rPr lang="en-US" dirty="0"/>
+              <a:t> component called “ingress-backend” is running.</a:t>
+            </a:r>
+          </a:p>
+          <a:p>
+            <a:pPr marL="285750" indent="-285750">
+              <a:buFontTx/>
+              <a:buChar char="-"/>
+            </a:pPr>
+            <a:r>
+              <a:rPr lang="en-US" dirty="0"/>
+              <a:t>In part-0000 the user deploys a routing description (ingress resource; regular k8s API object). This routing description is specific to the wildcard domain registered with the </a:t>
+            </a:r>
+            <a:r>
+              <a:rPr lang="en-US" dirty="0" err="1"/>
+              <a:t>loadbalancer</a:t>
+            </a:r>
+            <a:r>
+              <a:rPr lang="en-US" dirty="0"/>
+              <a:t> service.</a:t>
+            </a:r>
+          </a:p>
+          <a:p>
+            <a:pPr marL="285750" indent="-285750">
+              <a:buFontTx/>
+              <a:buChar char="-"/>
+            </a:pPr>
+            <a:r>
+              <a:rPr lang="en-US" dirty="0"/>
+              <a:t>The ingress-backend picks up the rules from this and all other namespaces and updates the server config of the ingress-controller</a:t>
+            </a:r>
+          </a:p>
+          <a:p>
+            <a:pPr marL="285750" indent="-285750">
+              <a:buFontTx/>
+              <a:buChar char="-"/>
+            </a:pPr>
+            <a:r>
+              <a:rPr lang="en-US" dirty="0"/>
+              <a:t>Now all traffic going in to *.ingress.com will be sent to the ingress-controller, evaluated and forwarded according to routing rules defined in the ingress resources.</a:t>
             </a:r>
           </a:p>
         </p:txBody>
@@ -2051,7 +2259,7 @@
             <a:spLocks noGrp="1"/>
           </p:cNvSpPr>
           <p:nvPr>
-            <p:ph type="sldNum" sz="quarter" idx="10"/>
+            <p:ph type="sldNum" sz="quarter" idx="5"/>
           </p:nvPr>
         </p:nvSpPr>
         <p:spPr/>
@@ -2071,7 +2279,7 @@
     </p:spTree>
     <p:extLst>
       <p:ext uri="{BB962C8B-B14F-4D97-AF65-F5344CB8AC3E}">
-        <p14:creationId xmlns:p14="http://schemas.microsoft.com/office/powerpoint/2010/main" val="2405405319"/>
+        <p14:creationId xmlns:p14="http://schemas.microsoft.com/office/powerpoint/2010/main" val="2426339589"/>
       </p:ext>
     </p:extLst>
   </p:cSld>
@@ -2127,19 +2335,35 @@
           <a:p>
             <a:r>
               <a:rPr lang="en-US" dirty="0"/>
-              <a:t>The easiest way of using an Ingress is as an entry point to a single service with one to multiple pods. The ingress is created for a dedicated URL (assuming the controller is in control of the domain). Users can use the URL specified with the Ingress resource to access the service &amp; associated backend pods.</a:t>
-            </a:r>
-          </a:p>
-          <a:p>
+              <a:t>The ingress controller needs to be present in the respective cluster. It is configured to watch for new ingress objects being posted to the k8s </a:t>
+            </a:r>
+            <a:r>
+              <a:rPr lang="en-US" dirty="0" err="1"/>
+              <a:t>api</a:t>
+            </a:r>
             <a:r>
               <a:rPr lang="en-US" dirty="0"/>
-              <a:t>You can add TLS termination at the Ingress endpoint by specifying a TLS secret with the corresponding hostname as subject or alternative subject.</a:t>
+              <a:t> server. </a:t>
             </a:r>
           </a:p>
           <a:p>
             <a:r>
               <a:rPr lang="en-US" dirty="0"/>
-              <a:t>From the services perspective everything works as usual. A port and a target port are specified and base on labels and selectors the traffic is routed.</a:t>
+              <a:t>Once an ingress resource is created, the controller will try to enforce the desired state. That can include the setup of URL &amp; corresponding routing info etc.</a:t>
+            </a:r>
+          </a:p>
+          <a:p>
+            <a:r>
+              <a:rPr lang="en-US" dirty="0"/>
+              <a:t>Most common ingress controller is the “</a:t>
+            </a:r>
+            <a:r>
+              <a:rPr lang="en-US" dirty="0" err="1"/>
+              <a:t>nginx</a:t>
+            </a:r>
+            <a:r>
+              <a:rPr lang="en-US" dirty="0"/>
+              <a:t> ingress controller”</a:t>
             </a:r>
           </a:p>
         </p:txBody>
@@ -2171,7 +2395,7 @@
     </p:spTree>
     <p:extLst>
       <p:ext uri="{BB962C8B-B14F-4D97-AF65-F5344CB8AC3E}">
-        <p14:creationId xmlns:p14="http://schemas.microsoft.com/office/powerpoint/2010/main" val="2984051873"/>
+        <p14:creationId xmlns:p14="http://schemas.microsoft.com/office/powerpoint/2010/main" val="2405405319"/>
       </p:ext>
     </p:extLst>
   </p:cSld>
@@ -2227,13 +2451,19 @@
           <a:p>
             <a:r>
               <a:rPr lang="en-US" dirty="0"/>
-              <a:t>In the spec, there is a section about rules &amp; TLS. </a:t>
+              <a:t>The easiest way of using an Ingress is as an entry point to a single service with one to multiple pods. The ingress is created for a dedicated URL (assuming the controller is in control of the domain). Users can use the URL specified with the Ingress resource to access the service &amp; associated backend pods.</a:t>
             </a:r>
           </a:p>
           <a:p>
             <a:r>
               <a:rPr lang="en-US" dirty="0"/>
-              <a:t>Rules define forwarding of incoming traffic to services.</a:t>
+              <a:t>You can add TLS termination at the Ingress endpoint by specifying a TLS secret with the corresponding hostname as subject or alternative subject.</a:t>
+            </a:r>
+          </a:p>
+          <a:p>
+            <a:r>
+              <a:rPr lang="en-US" dirty="0"/>
+              <a:t>From the services perspective everything works as usual. A port and a target port are specified and base on labels and selectors the traffic is routed.</a:t>
             </a:r>
           </a:p>
         </p:txBody>
@@ -2265,7 +2495,7 @@
     </p:spTree>
     <p:extLst>
       <p:ext uri="{BB962C8B-B14F-4D97-AF65-F5344CB8AC3E}">
-        <p14:creationId xmlns:p14="http://schemas.microsoft.com/office/powerpoint/2010/main" val="3919012191"/>
+        <p14:creationId xmlns:p14="http://schemas.microsoft.com/office/powerpoint/2010/main" val="2984051873"/>
       </p:ext>
     </p:extLst>
   </p:cSld>
@@ -2319,243 +2549,15 @@
           <a:bodyPr/>
           <a:lstStyle/>
           <a:p>
-            <a:pPr marL="285750" marR="0" lvl="0" indent="-285750" algn="l" defTabSz="1088776" rtl="0" eaLnBrk="1" fontAlgn="auto" latinLnBrk="0" hangingPunct="1">
-              <a:lnSpc>
-                <a:spcPct val="100000"/>
-              </a:lnSpc>
-              <a:spcBef>
-                <a:spcPts val="0"/>
-              </a:spcBef>
-              <a:spcAft>
-                <a:spcPts val="0"/>
-              </a:spcAft>
-              <a:buClrTx/>
-              <a:buSzTx/>
-              <a:buFontTx/>
-              <a:buChar char="-"/>
-              <a:tabLst/>
-              <a:defRPr/>
-            </a:pPr>
-            <a:r>
-              <a:rPr lang="en-US" baseline="0" dirty="0"/>
-              <a:t>Go to the admin folder in the repo and run the create_ingress_tls.sh script</a:t>
-            </a:r>
-          </a:p>
-          <a:p>
-            <a:pPr marL="285750" marR="0" lvl="0" indent="-285750" algn="l" defTabSz="1088776" rtl="0" eaLnBrk="1" fontAlgn="auto" latinLnBrk="0" hangingPunct="1">
-              <a:lnSpc>
-                <a:spcPct val="100000"/>
-              </a:lnSpc>
-              <a:spcBef>
-                <a:spcPts val="0"/>
-              </a:spcBef>
-              <a:spcAft>
-                <a:spcPts val="0"/>
-              </a:spcAft>
-              <a:buClrTx/>
-              <a:buSzTx/>
-              <a:buFontTx/>
-              <a:buChar char="-"/>
-              <a:tabLst/>
-              <a:defRPr/>
-            </a:pPr>
-            <a:r>
-              <a:rPr lang="en-US" baseline="0" dirty="0"/>
-              <a:t>Create a secret with the generated files as suggested by the script</a:t>
-            </a:r>
-          </a:p>
-          <a:p>
-            <a:pPr marL="285750" marR="0" lvl="0" indent="-285750" algn="l" defTabSz="1088776" rtl="0" eaLnBrk="1" fontAlgn="auto" latinLnBrk="0" hangingPunct="1">
-              <a:lnSpc>
-                <a:spcPct val="100000"/>
-              </a:lnSpc>
-              <a:spcBef>
-                <a:spcPts val="0"/>
-              </a:spcBef>
-              <a:spcAft>
-                <a:spcPts val="0"/>
-              </a:spcAft>
-              <a:buClrTx/>
-              <a:buSzTx/>
-              <a:buFontTx/>
-              <a:buChar char="-"/>
-              <a:tabLst/>
-              <a:defRPr/>
-            </a:pPr>
-            <a:r>
-              <a:rPr lang="en-US" baseline="0" dirty="0"/>
-              <a:t>Use the 09_tls_ingress.yaml to create a deployment, service and corresponding ingress resource</a:t>
-            </a:r>
-          </a:p>
-          <a:p>
-            <a:pPr marL="285750" marR="0" lvl="0" indent="-285750" algn="l" defTabSz="1088776" rtl="0" eaLnBrk="1" fontAlgn="auto" latinLnBrk="0" hangingPunct="1">
-              <a:lnSpc>
-                <a:spcPct val="100000"/>
-              </a:lnSpc>
-              <a:spcBef>
-                <a:spcPts val="0"/>
-              </a:spcBef>
-              <a:spcAft>
-                <a:spcPts val="0"/>
-              </a:spcAft>
-              <a:buClrTx/>
-              <a:buSzTx/>
-              <a:buFontTx/>
-              <a:buChar char="-"/>
-              <a:tabLst/>
-              <a:defRPr/>
-            </a:pPr>
-            <a:r>
-              <a:rPr lang="en-US" baseline="0" dirty="0"/>
-              <a:t>Show the deployment &amp; service</a:t>
-            </a:r>
-          </a:p>
-          <a:p>
-            <a:pPr marL="285750" marR="0" lvl="0" indent="-285750" algn="l" defTabSz="1088776" rtl="0" eaLnBrk="1" fontAlgn="auto" latinLnBrk="0" hangingPunct="1">
-              <a:lnSpc>
-                <a:spcPct val="100000"/>
-              </a:lnSpc>
-              <a:spcBef>
-                <a:spcPts val="0"/>
-              </a:spcBef>
-              <a:spcAft>
-                <a:spcPts val="0"/>
-              </a:spcAft>
-              <a:buClrTx/>
-              <a:buSzTx/>
-              <a:buFontTx/>
-              <a:buChar char="-"/>
-              <a:tabLst/>
-              <a:defRPr/>
-            </a:pPr>
-            <a:r>
-              <a:rPr lang="en-US" baseline="0" dirty="0"/>
-              <a:t>Show the ingress with the host &amp; </a:t>
-            </a:r>
-            <a:r>
-              <a:rPr lang="en-US" baseline="0" dirty="0" err="1"/>
-              <a:t>tls</a:t>
-            </a:r>
-            <a:r>
-              <a:rPr lang="en-US" baseline="0" dirty="0"/>
-              <a:t> section. Highlight that the </a:t>
-            </a:r>
-            <a:r>
-              <a:rPr lang="en-US" baseline="0" dirty="0" err="1"/>
-              <a:t>nginx</a:t>
-            </a:r>
-            <a:r>
-              <a:rPr lang="en-US" baseline="0" dirty="0"/>
-              <a:t> itself is not configured for https but the connection terminates at the ingress endpoint.</a:t>
-            </a:r>
-          </a:p>
-          <a:p>
-            <a:pPr marL="285750" marR="0" lvl="0" indent="-285750" algn="l" defTabSz="1088776" rtl="0" eaLnBrk="1" fontAlgn="auto" latinLnBrk="0" hangingPunct="1">
-              <a:lnSpc>
-                <a:spcPct val="100000"/>
-              </a:lnSpc>
-              <a:spcBef>
-                <a:spcPts val="0"/>
-              </a:spcBef>
-              <a:spcAft>
-                <a:spcPts val="0"/>
-              </a:spcAft>
-              <a:buClrTx/>
-              <a:buSzTx/>
-              <a:buFontTx/>
-              <a:buChar char="-"/>
-              <a:tabLst/>
-              <a:defRPr/>
-            </a:pPr>
-            <a:r>
-              <a:rPr lang="en-US" baseline="0" dirty="0"/>
-              <a:t>Open the URL in a browser, ignore the </a:t>
-            </a:r>
-            <a:r>
-              <a:rPr lang="en-US" baseline="0" dirty="0" err="1"/>
-              <a:t>ssl</a:t>
-            </a:r>
-            <a:r>
-              <a:rPr lang="en-US" baseline="0" dirty="0"/>
-              <a:t> error as it is self-signed</a:t>
-            </a:r>
-          </a:p>
-          <a:p>
-            <a:pPr marL="285750" marR="0" lvl="0" indent="-285750" algn="l" defTabSz="1088776" rtl="0" eaLnBrk="1" fontAlgn="auto" latinLnBrk="0" hangingPunct="1">
-              <a:lnSpc>
-                <a:spcPct val="100000"/>
-              </a:lnSpc>
-              <a:spcBef>
-                <a:spcPts val="0"/>
-              </a:spcBef>
-              <a:spcAft>
-                <a:spcPts val="0"/>
-              </a:spcAft>
-              <a:buClrTx/>
-              <a:buSzTx/>
-              <a:buFontTx/>
-              <a:buChar char="-"/>
-              <a:tabLst/>
-              <a:defRPr/>
-            </a:pPr>
-            <a:r>
-              <a:rPr lang="en-US" baseline="0" dirty="0"/>
-              <a:t>Go to the </a:t>
-            </a:r>
-            <a:r>
-              <a:rPr lang="en-US" baseline="0" dirty="0" err="1"/>
-              <a:t>yaml</a:t>
-            </a:r>
-            <a:r>
-              <a:rPr lang="en-US" baseline="0" dirty="0"/>
-              <a:t> file of the deployment and show the </a:t>
-            </a:r>
-            <a:r>
-              <a:rPr lang="en-US" baseline="0" dirty="0" err="1"/>
-              <a:t>init</a:t>
-            </a:r>
-            <a:r>
-              <a:rPr lang="en-US" baseline="0" dirty="0"/>
-              <a:t> container that runs upon pod start.</a:t>
-            </a:r>
-          </a:p>
-          <a:p>
-            <a:pPr marL="465750" marR="0" lvl="1" indent="-285750" algn="l" defTabSz="1088776" rtl="0" eaLnBrk="1" fontAlgn="auto" latinLnBrk="0" hangingPunct="1">
-              <a:lnSpc>
-                <a:spcPct val="100000"/>
-              </a:lnSpc>
-              <a:spcBef>
-                <a:spcPts val="0"/>
-              </a:spcBef>
-              <a:spcAft>
-                <a:spcPts val="0"/>
-              </a:spcAft>
-              <a:buClrTx/>
-              <a:buSzTx/>
-              <a:buFontTx/>
-              <a:buChar char="-"/>
-              <a:tabLst/>
-              <a:defRPr/>
-            </a:pPr>
-            <a:r>
-              <a:rPr lang="en-US" baseline="0" dirty="0"/>
-              <a:t>Highlight that it writes some text to an </a:t>
-            </a:r>
-            <a:r>
-              <a:rPr lang="en-US" baseline="0" dirty="0" err="1"/>
-              <a:t>emptyDir</a:t>
-            </a:r>
-            <a:r>
-              <a:rPr lang="en-US" baseline="0" dirty="0"/>
-              <a:t> volume which is then mounted into the </a:t>
-            </a:r>
-            <a:r>
-              <a:rPr lang="en-US" baseline="0" dirty="0" err="1"/>
-              <a:t>nginx</a:t>
-            </a:r>
-            <a:r>
-              <a:rPr lang="en-US" baseline="0" dirty="0"/>
-              <a:t> container.</a:t>
+            <a:r>
+              <a:rPr lang="en-US" dirty="0"/>
+              <a:t>In the spec, there is a section about rules &amp; TLS. </a:t>
+            </a:r>
+          </a:p>
+          <a:p>
+            <a:r>
+              <a:rPr lang="en-US" dirty="0"/>
+              <a:t>Rules define forwarding of incoming traffic to services.</a:t>
             </a:r>
           </a:p>
         </p:txBody>
@@ -2587,7 +2589,7 @@
     </p:spTree>
     <p:extLst>
       <p:ext uri="{BB962C8B-B14F-4D97-AF65-F5344CB8AC3E}">
-        <p14:creationId xmlns:p14="http://schemas.microsoft.com/office/powerpoint/2010/main" val="679445197"/>
+        <p14:creationId xmlns:p14="http://schemas.microsoft.com/office/powerpoint/2010/main" val="3919012191"/>
       </p:ext>
     </p:extLst>
   </p:cSld>
@@ -2641,9 +2643,243 @@
           <a:bodyPr/>
           <a:lstStyle/>
           <a:p>
-            <a:r>
-              <a:rPr lang="en-US" dirty="0"/>
-              <a:t>It is possible to mesh up multiple services within one Ingress endpoint and differentiate via URL paths. A user trying to access green needs to use https://app.ingress.com/my</a:t>
+            <a:pPr marL="285750" marR="0" lvl="0" indent="-285750" algn="l" defTabSz="1088776" rtl="0" eaLnBrk="1" fontAlgn="auto" latinLnBrk="0" hangingPunct="1">
+              <a:lnSpc>
+                <a:spcPct val="100000"/>
+              </a:lnSpc>
+              <a:spcBef>
+                <a:spcPts val="0"/>
+              </a:spcBef>
+              <a:spcAft>
+                <a:spcPts val="0"/>
+              </a:spcAft>
+              <a:buClrTx/>
+              <a:buSzTx/>
+              <a:buFontTx/>
+              <a:buChar char="-"/>
+              <a:tabLst/>
+              <a:defRPr/>
+            </a:pPr>
+            <a:r>
+              <a:rPr lang="en-US" baseline="0" dirty="0"/>
+              <a:t>Go to the admin folder in the repo and run the create_ingress_tls.sh script</a:t>
+            </a:r>
+          </a:p>
+          <a:p>
+            <a:pPr marL="285750" marR="0" lvl="0" indent="-285750" algn="l" defTabSz="1088776" rtl="0" eaLnBrk="1" fontAlgn="auto" latinLnBrk="0" hangingPunct="1">
+              <a:lnSpc>
+                <a:spcPct val="100000"/>
+              </a:lnSpc>
+              <a:spcBef>
+                <a:spcPts val="0"/>
+              </a:spcBef>
+              <a:spcAft>
+                <a:spcPts val="0"/>
+              </a:spcAft>
+              <a:buClrTx/>
+              <a:buSzTx/>
+              <a:buFontTx/>
+              <a:buChar char="-"/>
+              <a:tabLst/>
+              <a:defRPr/>
+            </a:pPr>
+            <a:r>
+              <a:rPr lang="en-US" baseline="0" dirty="0"/>
+              <a:t>Create a secret with the generated files as suggested by the script</a:t>
+            </a:r>
+          </a:p>
+          <a:p>
+            <a:pPr marL="285750" marR="0" lvl="0" indent="-285750" algn="l" defTabSz="1088776" rtl="0" eaLnBrk="1" fontAlgn="auto" latinLnBrk="0" hangingPunct="1">
+              <a:lnSpc>
+                <a:spcPct val="100000"/>
+              </a:lnSpc>
+              <a:spcBef>
+                <a:spcPts val="0"/>
+              </a:spcBef>
+              <a:spcAft>
+                <a:spcPts val="0"/>
+              </a:spcAft>
+              <a:buClrTx/>
+              <a:buSzTx/>
+              <a:buFontTx/>
+              <a:buChar char="-"/>
+              <a:tabLst/>
+              <a:defRPr/>
+            </a:pPr>
+            <a:r>
+              <a:rPr lang="en-US" baseline="0" dirty="0"/>
+              <a:t>Use the 09_tls_ingress.yaml to create a deployment, service and corresponding ingress resource</a:t>
+            </a:r>
+          </a:p>
+          <a:p>
+            <a:pPr marL="285750" marR="0" lvl="0" indent="-285750" algn="l" defTabSz="1088776" rtl="0" eaLnBrk="1" fontAlgn="auto" latinLnBrk="0" hangingPunct="1">
+              <a:lnSpc>
+                <a:spcPct val="100000"/>
+              </a:lnSpc>
+              <a:spcBef>
+                <a:spcPts val="0"/>
+              </a:spcBef>
+              <a:spcAft>
+                <a:spcPts val="0"/>
+              </a:spcAft>
+              <a:buClrTx/>
+              <a:buSzTx/>
+              <a:buFontTx/>
+              <a:buChar char="-"/>
+              <a:tabLst/>
+              <a:defRPr/>
+            </a:pPr>
+            <a:r>
+              <a:rPr lang="en-US" baseline="0" dirty="0"/>
+              <a:t>Show the deployment &amp; service</a:t>
+            </a:r>
+          </a:p>
+          <a:p>
+            <a:pPr marL="285750" marR="0" lvl="0" indent="-285750" algn="l" defTabSz="1088776" rtl="0" eaLnBrk="1" fontAlgn="auto" latinLnBrk="0" hangingPunct="1">
+              <a:lnSpc>
+                <a:spcPct val="100000"/>
+              </a:lnSpc>
+              <a:spcBef>
+                <a:spcPts val="0"/>
+              </a:spcBef>
+              <a:spcAft>
+                <a:spcPts val="0"/>
+              </a:spcAft>
+              <a:buClrTx/>
+              <a:buSzTx/>
+              <a:buFontTx/>
+              <a:buChar char="-"/>
+              <a:tabLst/>
+              <a:defRPr/>
+            </a:pPr>
+            <a:r>
+              <a:rPr lang="en-US" baseline="0" dirty="0"/>
+              <a:t>Show the ingress with the host &amp; </a:t>
+            </a:r>
+            <a:r>
+              <a:rPr lang="en-US" baseline="0" dirty="0" err="1"/>
+              <a:t>tls</a:t>
+            </a:r>
+            <a:r>
+              <a:rPr lang="en-US" baseline="0" dirty="0"/>
+              <a:t> section. Highlight that the </a:t>
+            </a:r>
+            <a:r>
+              <a:rPr lang="en-US" baseline="0" dirty="0" err="1"/>
+              <a:t>nginx</a:t>
+            </a:r>
+            <a:r>
+              <a:rPr lang="en-US" baseline="0" dirty="0"/>
+              <a:t> itself is not configured for https but the connection terminates at the ingress endpoint.</a:t>
+            </a:r>
+          </a:p>
+          <a:p>
+            <a:pPr marL="285750" marR="0" lvl="0" indent="-285750" algn="l" defTabSz="1088776" rtl="0" eaLnBrk="1" fontAlgn="auto" latinLnBrk="0" hangingPunct="1">
+              <a:lnSpc>
+                <a:spcPct val="100000"/>
+              </a:lnSpc>
+              <a:spcBef>
+                <a:spcPts val="0"/>
+              </a:spcBef>
+              <a:spcAft>
+                <a:spcPts val="0"/>
+              </a:spcAft>
+              <a:buClrTx/>
+              <a:buSzTx/>
+              <a:buFontTx/>
+              <a:buChar char="-"/>
+              <a:tabLst/>
+              <a:defRPr/>
+            </a:pPr>
+            <a:r>
+              <a:rPr lang="en-US" baseline="0" dirty="0"/>
+              <a:t>Open the URL in a browser, ignore the </a:t>
+            </a:r>
+            <a:r>
+              <a:rPr lang="en-US" baseline="0" dirty="0" err="1"/>
+              <a:t>ssl</a:t>
+            </a:r>
+            <a:r>
+              <a:rPr lang="en-US" baseline="0" dirty="0"/>
+              <a:t> error as it is self-signed</a:t>
+            </a:r>
+          </a:p>
+          <a:p>
+            <a:pPr marL="285750" marR="0" lvl="0" indent="-285750" algn="l" defTabSz="1088776" rtl="0" eaLnBrk="1" fontAlgn="auto" latinLnBrk="0" hangingPunct="1">
+              <a:lnSpc>
+                <a:spcPct val="100000"/>
+              </a:lnSpc>
+              <a:spcBef>
+                <a:spcPts val="0"/>
+              </a:spcBef>
+              <a:spcAft>
+                <a:spcPts val="0"/>
+              </a:spcAft>
+              <a:buClrTx/>
+              <a:buSzTx/>
+              <a:buFontTx/>
+              <a:buChar char="-"/>
+              <a:tabLst/>
+              <a:defRPr/>
+            </a:pPr>
+            <a:r>
+              <a:rPr lang="en-US" baseline="0" dirty="0"/>
+              <a:t>Go to the </a:t>
+            </a:r>
+            <a:r>
+              <a:rPr lang="en-US" baseline="0" dirty="0" err="1"/>
+              <a:t>yaml</a:t>
+            </a:r>
+            <a:r>
+              <a:rPr lang="en-US" baseline="0" dirty="0"/>
+              <a:t> file of the deployment and show the </a:t>
+            </a:r>
+            <a:r>
+              <a:rPr lang="en-US" baseline="0" dirty="0" err="1"/>
+              <a:t>init</a:t>
+            </a:r>
+            <a:r>
+              <a:rPr lang="en-US" baseline="0" dirty="0"/>
+              <a:t> container that runs upon pod start.</a:t>
+            </a:r>
+          </a:p>
+          <a:p>
+            <a:pPr marL="465750" marR="0" lvl="1" indent="-285750" algn="l" defTabSz="1088776" rtl="0" eaLnBrk="1" fontAlgn="auto" latinLnBrk="0" hangingPunct="1">
+              <a:lnSpc>
+                <a:spcPct val="100000"/>
+              </a:lnSpc>
+              <a:spcBef>
+                <a:spcPts val="0"/>
+              </a:spcBef>
+              <a:spcAft>
+                <a:spcPts val="0"/>
+              </a:spcAft>
+              <a:buClrTx/>
+              <a:buSzTx/>
+              <a:buFontTx/>
+              <a:buChar char="-"/>
+              <a:tabLst/>
+              <a:defRPr/>
+            </a:pPr>
+            <a:r>
+              <a:rPr lang="en-US" baseline="0" dirty="0"/>
+              <a:t>Highlight that it writes some text to an </a:t>
+            </a:r>
+            <a:r>
+              <a:rPr lang="en-US" baseline="0" dirty="0" err="1"/>
+              <a:t>emptyDir</a:t>
+            </a:r>
+            <a:r>
+              <a:rPr lang="en-US" baseline="0" dirty="0"/>
+              <a:t> volume which is then mounted into the </a:t>
+            </a:r>
+            <a:r>
+              <a:rPr lang="en-US" baseline="0" dirty="0" err="1"/>
+              <a:t>nginx</a:t>
+            </a:r>
+            <a:r>
+              <a:rPr lang="en-US" baseline="0" dirty="0"/>
+              <a:t> container.</a:t>
             </a:r>
           </a:p>
         </p:txBody>
@@ -2675,7 +2911,7 @@
     </p:spTree>
     <p:extLst>
       <p:ext uri="{BB962C8B-B14F-4D97-AF65-F5344CB8AC3E}">
-        <p14:creationId xmlns:p14="http://schemas.microsoft.com/office/powerpoint/2010/main" val="4009850538"/>
+        <p14:creationId xmlns:p14="http://schemas.microsoft.com/office/powerpoint/2010/main" val="679445197"/>
       </p:ext>
     </p:extLst>
   </p:cSld>
@@ -2731,47 +2967,8 @@
           <a:p>
             <a:r>
               <a:rPr lang="en-US" dirty="0"/>
-              <a:t>In the spec, there is a section about rules &amp; TLS. </a:t>
-            </a:r>
-          </a:p>
-          <a:p>
-            <a:r>
-              <a:rPr lang="en-US" dirty="0"/>
-              <a:t>Rules define forwarding of incoming traffic to services.</a:t>
-            </a:r>
-          </a:p>
-          <a:p>
-            <a:endParaRPr lang="en-US" dirty="0"/>
-          </a:p>
-          <a:p>
-            <a:r>
-              <a:rPr lang="en-US" dirty="0"/>
-              <a:t>With v0.22 the re-write annotation has been changed. Now it requires capture groups, if you want to pass on any substrings within the URI. Everything not captured will be dropped. In the example above every substring following “/my” and “/your” will be forwarded to the backend.</a:t>
-            </a:r>
-          </a:p>
-          <a:p>
-            <a:endParaRPr lang="en-US" dirty="0"/>
-          </a:p>
-          <a:p>
-            <a:r>
-              <a:rPr lang="en-US" dirty="0"/>
-              <a:t>For details, see: </a:t>
-            </a:r>
-          </a:p>
-          <a:p>
-            <a:r>
-              <a:rPr lang="en-US" dirty="0"/>
-              <a:t>https://github.com/kubernetes/ingress-nginx/releases/tag/nginx-0.22.0</a:t>
-            </a:r>
-          </a:p>
-          <a:p>
-            <a:r>
-              <a:rPr lang="en-US" dirty="0"/>
-              <a:t>https://kubernetes.github.io/ingress-nginx/examples/rewrite/#rewrite-target</a:t>
-            </a:r>
-          </a:p>
-          <a:p>
-            <a:endParaRPr lang="en-US" dirty="0"/>
+              <a:t>It is possible to mesh up multiple services within one Ingress endpoint and differentiate via URL paths. A user trying to access green needs to use https://app.ingress.com/my</a:t>
+            </a:r>
           </a:p>
         </p:txBody>
       </p:sp>
@@ -2802,7 +2999,7 @@
     </p:spTree>
     <p:extLst>
       <p:ext uri="{BB962C8B-B14F-4D97-AF65-F5344CB8AC3E}">
-        <p14:creationId xmlns:p14="http://schemas.microsoft.com/office/powerpoint/2010/main" val="2843793769"/>
+        <p14:creationId xmlns:p14="http://schemas.microsoft.com/office/powerpoint/2010/main" val="4009850538"/>
       </p:ext>
     </p:extLst>
   </p:cSld>
@@ -16259,6 +16456,518 @@
           <a:chExt cx="0" cy="0"/>
         </a:xfrm>
       </p:grpSpPr>
+      <p:pic>
+        <p:nvPicPr>
+          <p:cNvPr id="3" name="Picture 2">
+            <a:extLst>
+              <a:ext uri="{FF2B5EF4-FFF2-40B4-BE49-F238E27FC236}">
+                <a16:creationId xmlns:a16="http://schemas.microsoft.com/office/drawing/2014/main" id="{C8CAC47D-D6C8-41F3-9DEC-9D25F9D43C92}"/>
+              </a:ext>
+            </a:extLst>
+          </p:cNvPr>
+          <p:cNvPicPr>
+            <a:picLocks noChangeAspect="1"/>
+          </p:cNvPicPr>
+          <p:nvPr/>
+        </p:nvPicPr>
+        <p:blipFill>
+          <a:blip r:embed="rId3"/>
+          <a:stretch>
+            <a:fillRect/>
+          </a:stretch>
+        </p:blipFill>
+        <p:spPr>
+          <a:xfrm>
+            <a:off x="504001" y="1134348"/>
+            <a:ext cx="7047619" cy="4990476"/>
+          </a:xfrm>
+          <a:prstGeom prst="rect">
+            <a:avLst/>
+          </a:prstGeom>
+          <a:ln>
+            <a:solidFill>
+              <a:schemeClr val="tx1"/>
+            </a:solidFill>
+          </a:ln>
+        </p:spPr>
+      </p:pic>
+      <p:sp>
+        <p:nvSpPr>
+          <p:cNvPr id="2" name="Title 1">
+            <a:extLst>
+              <a:ext uri="{FF2B5EF4-FFF2-40B4-BE49-F238E27FC236}">
+                <a16:creationId xmlns:a16="http://schemas.microsoft.com/office/drawing/2014/main" id="{C4075F74-C4BE-475F-90D1-3AD64BAAF7E0}"/>
+              </a:ext>
+            </a:extLst>
+          </p:cNvPr>
+          <p:cNvSpPr>
+            <a:spLocks noGrp="1"/>
+          </p:cNvSpPr>
+          <p:nvPr>
+            <p:ph type="title"/>
+          </p:nvPr>
+        </p:nvSpPr>
+        <p:spPr/>
+        <p:txBody>
+          <a:bodyPr/>
+          <a:lstStyle/>
+          <a:p>
+            <a:r>
+              <a:rPr lang="en-US" dirty="0"/>
+              <a:t>Ingress resource with fanout</a:t>
+            </a:r>
+          </a:p>
+        </p:txBody>
+      </p:sp>
+      <p:sp>
+        <p:nvSpPr>
+          <p:cNvPr id="4" name="Speech Bubble: Rectangle 3">
+            <a:extLst>
+              <a:ext uri="{FF2B5EF4-FFF2-40B4-BE49-F238E27FC236}">
+                <a16:creationId xmlns:a16="http://schemas.microsoft.com/office/drawing/2014/main" id="{91A799BB-963F-47BC-97A7-1EBE8A747FA9}"/>
+              </a:ext>
+            </a:extLst>
+          </p:cNvPr>
+          <p:cNvSpPr/>
+          <p:nvPr/>
+        </p:nvSpPr>
+        <p:spPr bwMode="gray">
+          <a:xfrm>
+            <a:off x="8012317" y="2756491"/>
+            <a:ext cx="3678160" cy="677425"/>
+          </a:xfrm>
+          <a:prstGeom prst="wedgeRectCallout">
+            <a:avLst>
+              <a:gd name="adj1" fmla="val -84814"/>
+              <a:gd name="adj2" fmla="val -1164"/>
+            </a:avLst>
+          </a:prstGeom>
+          <a:ln>
+            <a:headEnd/>
+            <a:tailEnd/>
+          </a:ln>
+        </p:spPr>
+        <p:style>
+          <a:lnRef idx="2">
+            <a:schemeClr val="accent5"/>
+          </a:lnRef>
+          <a:fillRef idx="1">
+            <a:schemeClr val="lt1"/>
+          </a:fillRef>
+          <a:effectRef idx="0">
+            <a:schemeClr val="accent5"/>
+          </a:effectRef>
+          <a:fontRef idx="minor">
+            <a:schemeClr val="dk1"/>
+          </a:fontRef>
+        </p:style>
+        <p:txBody>
+          <a:bodyPr lIns="90000" tIns="72000" rIns="90000" bIns="72000" rtlCol="0" anchor="ctr"/>
+          <a:lstStyle/>
+          <a:p>
+            <a:pPr marR="0" algn="ctr" defTabSz="914400" eaLnBrk="1" fontAlgn="base" latinLnBrk="0" hangingPunct="1">
+              <a:lnSpc>
+                <a:spcPct val="100000"/>
+              </a:lnSpc>
+              <a:spcBef>
+                <a:spcPct val="50000"/>
+              </a:spcBef>
+              <a:spcAft>
+                <a:spcPct val="0"/>
+              </a:spcAft>
+              <a:buClr>
+                <a:srgbClr val="F0AB00"/>
+              </a:buClr>
+              <a:buSzPct val="80000"/>
+              <a:tabLst/>
+            </a:pPr>
+            <a:r>
+              <a:rPr lang="en-US" sz="1800" kern="0" dirty="0">
+                <a:ea typeface="Arial Unicode MS" pitchFamily="34" charset="-128"/>
+                <a:cs typeface="Arial Unicode MS" pitchFamily="34" charset="-128"/>
+              </a:rPr>
+              <a:t>spec with rules &amp; managed host</a:t>
+            </a:r>
+            <a:endParaRPr kumimoji="0" lang="en-US" sz="1800" b="0" i="0" u="none" strike="noStrike" kern="0" cap="none" spc="0" normalizeH="0" baseline="0" noProof="0" dirty="0">
+              <a:ln>
+                <a:noFill/>
+              </a:ln>
+              <a:effectLst/>
+              <a:uLnTx/>
+              <a:uFillTx/>
+              <a:ea typeface="Arial Unicode MS" pitchFamily="34" charset="-128"/>
+              <a:cs typeface="Arial Unicode MS" pitchFamily="34" charset="-128"/>
+            </a:endParaRPr>
+          </a:p>
+        </p:txBody>
+      </p:sp>
+      <p:sp>
+        <p:nvSpPr>
+          <p:cNvPr id="6" name="Speech Bubble: Rectangle 5">
+            <a:extLst>
+              <a:ext uri="{FF2B5EF4-FFF2-40B4-BE49-F238E27FC236}">
+                <a16:creationId xmlns:a16="http://schemas.microsoft.com/office/drawing/2014/main" id="{2A2CFC32-B275-495E-8ED6-11D7A98B67A4}"/>
+              </a:ext>
+            </a:extLst>
+          </p:cNvPr>
+          <p:cNvSpPr/>
+          <p:nvPr/>
+        </p:nvSpPr>
+        <p:spPr bwMode="gray">
+          <a:xfrm>
+            <a:off x="7190633" y="4428919"/>
+            <a:ext cx="4505724" cy="677425"/>
+          </a:xfrm>
+          <a:prstGeom prst="wedgeRectCallout">
+            <a:avLst>
+              <a:gd name="adj1" fmla="val -78085"/>
+              <a:gd name="adj2" fmla="val 2845"/>
+            </a:avLst>
+          </a:prstGeom>
+          <a:ln>
+            <a:headEnd/>
+            <a:tailEnd/>
+          </a:ln>
+        </p:spPr>
+        <p:style>
+          <a:lnRef idx="2">
+            <a:schemeClr val="accent5"/>
+          </a:lnRef>
+          <a:fillRef idx="1">
+            <a:schemeClr val="lt1"/>
+          </a:fillRef>
+          <a:effectRef idx="0">
+            <a:schemeClr val="accent5"/>
+          </a:effectRef>
+          <a:fontRef idx="minor">
+            <a:schemeClr val="dk1"/>
+          </a:fontRef>
+        </p:style>
+        <p:txBody>
+          <a:bodyPr lIns="90000" tIns="72000" rIns="90000" bIns="72000" rtlCol="0" anchor="ctr"/>
+          <a:lstStyle/>
+          <a:p>
+            <a:pPr marR="0" algn="ctr" defTabSz="914400" eaLnBrk="1" fontAlgn="base" latinLnBrk="0" hangingPunct="1">
+              <a:lnSpc>
+                <a:spcPct val="100000"/>
+              </a:lnSpc>
+              <a:spcBef>
+                <a:spcPct val="50000"/>
+              </a:spcBef>
+              <a:spcAft>
+                <a:spcPct val="0"/>
+              </a:spcAft>
+              <a:buClr>
+                <a:srgbClr val="F0AB00"/>
+              </a:buClr>
+              <a:buSzPct val="80000"/>
+              <a:tabLst/>
+            </a:pPr>
+            <a:r>
+              <a:rPr lang="en-US" sz="1800" kern="0" dirty="0">
+                <a:ea typeface="Arial Unicode MS" pitchFamily="34" charset="-128"/>
+                <a:cs typeface="Arial Unicode MS" pitchFamily="34" charset="-128"/>
+              </a:rPr>
+              <a:t>Traffic to /</a:t>
+            </a:r>
+            <a:r>
+              <a:rPr lang="en-US" sz="1800" b="1" kern="0" dirty="0">
+                <a:ea typeface="Arial Unicode MS" pitchFamily="34" charset="-128"/>
+                <a:cs typeface="Arial Unicode MS" pitchFamily="34" charset="-128"/>
+              </a:rPr>
+              <a:t>my </a:t>
+            </a:r>
+            <a:r>
+              <a:rPr lang="en-US" sz="1800" kern="0" dirty="0">
+                <a:ea typeface="Arial Unicode MS" pitchFamily="34" charset="-128"/>
+                <a:cs typeface="Arial Unicode MS" pitchFamily="34" charset="-128"/>
+              </a:rPr>
+              <a:t>is forwarded to service </a:t>
+            </a:r>
+            <a:r>
+              <a:rPr lang="en-US" sz="1800" b="1" kern="0" dirty="0" err="1">
+                <a:ea typeface="Arial Unicode MS" pitchFamily="34" charset="-128"/>
+                <a:cs typeface="Arial Unicode MS" pitchFamily="34" charset="-128"/>
+              </a:rPr>
+              <a:t>mynginx</a:t>
+            </a:r>
+            <a:r>
+              <a:rPr lang="en-US" sz="1800" b="1" kern="0" dirty="0">
+                <a:ea typeface="Arial Unicode MS" pitchFamily="34" charset="-128"/>
+                <a:cs typeface="Arial Unicode MS" pitchFamily="34" charset="-128"/>
+              </a:rPr>
+              <a:t>-service </a:t>
+            </a:r>
+            <a:r>
+              <a:rPr lang="en-US" sz="1800" kern="0" dirty="0">
+                <a:ea typeface="Arial Unicode MS" pitchFamily="34" charset="-128"/>
+                <a:cs typeface="Arial Unicode MS" pitchFamily="34" charset="-128"/>
+              </a:rPr>
+              <a:t>on port 80</a:t>
+            </a:r>
+            <a:endParaRPr kumimoji="0" lang="en-US" sz="1800" b="0" i="0" u="none" strike="noStrike" kern="0" cap="none" spc="0" normalizeH="0" baseline="0" noProof="0" dirty="0">
+              <a:ln>
+                <a:noFill/>
+              </a:ln>
+              <a:effectLst/>
+              <a:uLnTx/>
+              <a:uFillTx/>
+              <a:ea typeface="Arial Unicode MS" pitchFamily="34" charset="-128"/>
+              <a:cs typeface="Arial Unicode MS" pitchFamily="34" charset="-128"/>
+            </a:endParaRPr>
+          </a:p>
+        </p:txBody>
+      </p:sp>
+      <p:sp>
+        <p:nvSpPr>
+          <p:cNvPr id="7" name="Speech Bubble: Rectangle 6">
+            <a:extLst>
+              <a:ext uri="{FF2B5EF4-FFF2-40B4-BE49-F238E27FC236}">
+                <a16:creationId xmlns:a16="http://schemas.microsoft.com/office/drawing/2014/main" id="{D3252AD2-8613-4747-BF6B-F602CCDD2B12}"/>
+              </a:ext>
+            </a:extLst>
+          </p:cNvPr>
+          <p:cNvSpPr/>
+          <p:nvPr/>
+        </p:nvSpPr>
+        <p:spPr bwMode="gray">
+          <a:xfrm>
+            <a:off x="7184753" y="5786111"/>
+            <a:ext cx="4505724" cy="677425"/>
+          </a:xfrm>
+          <a:prstGeom prst="wedgeRectCallout">
+            <a:avLst>
+              <a:gd name="adj1" fmla="val -76679"/>
+              <a:gd name="adj2" fmla="val -43931"/>
+            </a:avLst>
+          </a:prstGeom>
+          <a:ln>
+            <a:headEnd/>
+            <a:tailEnd/>
+          </a:ln>
+        </p:spPr>
+        <p:style>
+          <a:lnRef idx="2">
+            <a:schemeClr val="accent5"/>
+          </a:lnRef>
+          <a:fillRef idx="1">
+            <a:schemeClr val="lt1"/>
+          </a:fillRef>
+          <a:effectRef idx="0">
+            <a:schemeClr val="accent5"/>
+          </a:effectRef>
+          <a:fontRef idx="minor">
+            <a:schemeClr val="dk1"/>
+          </a:fontRef>
+        </p:style>
+        <p:txBody>
+          <a:bodyPr lIns="90000" tIns="72000" rIns="90000" bIns="72000" rtlCol="0" anchor="ctr"/>
+          <a:lstStyle/>
+          <a:p>
+            <a:pPr marR="0" algn="ctr" defTabSz="914400" eaLnBrk="1" fontAlgn="base" latinLnBrk="0" hangingPunct="1">
+              <a:lnSpc>
+                <a:spcPct val="100000"/>
+              </a:lnSpc>
+              <a:spcBef>
+                <a:spcPct val="50000"/>
+              </a:spcBef>
+              <a:spcAft>
+                <a:spcPct val="0"/>
+              </a:spcAft>
+              <a:buClr>
+                <a:srgbClr val="F0AB00"/>
+              </a:buClr>
+              <a:buSzPct val="80000"/>
+              <a:tabLst/>
+            </a:pPr>
+            <a:r>
+              <a:rPr lang="en-US" sz="1800" kern="0" dirty="0">
+                <a:ea typeface="Arial Unicode MS" pitchFamily="34" charset="-128"/>
+                <a:cs typeface="Arial Unicode MS" pitchFamily="34" charset="-128"/>
+              </a:rPr>
+              <a:t>Traffic to /</a:t>
+            </a:r>
+            <a:r>
+              <a:rPr lang="en-US" sz="1800" b="1" kern="0" dirty="0">
+                <a:ea typeface="Arial Unicode MS" pitchFamily="34" charset="-128"/>
+                <a:cs typeface="Arial Unicode MS" pitchFamily="34" charset="-128"/>
+              </a:rPr>
+              <a:t>your </a:t>
+            </a:r>
+            <a:r>
+              <a:rPr lang="en-US" sz="1800" kern="0" dirty="0">
+                <a:ea typeface="Arial Unicode MS" pitchFamily="34" charset="-128"/>
+                <a:cs typeface="Arial Unicode MS" pitchFamily="34" charset="-128"/>
+              </a:rPr>
+              <a:t>is forwarded to service </a:t>
+            </a:r>
+            <a:r>
+              <a:rPr lang="en-US" sz="1800" b="1" kern="0" dirty="0" err="1">
+                <a:ea typeface="Arial Unicode MS" pitchFamily="34" charset="-128"/>
+                <a:cs typeface="Arial Unicode MS" pitchFamily="34" charset="-128"/>
+              </a:rPr>
+              <a:t>yournginx</a:t>
+            </a:r>
+            <a:r>
+              <a:rPr lang="en-US" sz="1800" b="1" kern="0" dirty="0">
+                <a:ea typeface="Arial Unicode MS" pitchFamily="34" charset="-128"/>
+                <a:cs typeface="Arial Unicode MS" pitchFamily="34" charset="-128"/>
+              </a:rPr>
+              <a:t>-service</a:t>
+            </a:r>
+            <a:r>
+              <a:rPr lang="en-US" sz="1800" kern="0" dirty="0">
+                <a:ea typeface="Arial Unicode MS" pitchFamily="34" charset="-128"/>
+                <a:cs typeface="Arial Unicode MS" pitchFamily="34" charset="-128"/>
+              </a:rPr>
+              <a:t> on port 80</a:t>
+            </a:r>
+            <a:endParaRPr kumimoji="0" lang="en-US" sz="1800" b="0" i="0" u="none" strike="noStrike" kern="0" cap="none" spc="0" normalizeH="0" baseline="0" noProof="0" dirty="0">
+              <a:ln>
+                <a:noFill/>
+              </a:ln>
+              <a:effectLst/>
+              <a:uLnTx/>
+              <a:uFillTx/>
+              <a:ea typeface="Arial Unicode MS" pitchFamily="34" charset="-128"/>
+              <a:cs typeface="Arial Unicode MS" pitchFamily="34" charset="-128"/>
+            </a:endParaRPr>
+          </a:p>
+        </p:txBody>
+      </p:sp>
+      <p:sp>
+        <p:nvSpPr>
+          <p:cNvPr id="9" name="Speech Bubble: Rectangle 8">
+            <a:extLst>
+              <a:ext uri="{FF2B5EF4-FFF2-40B4-BE49-F238E27FC236}">
+                <a16:creationId xmlns:a16="http://schemas.microsoft.com/office/drawing/2014/main" id="{7B87B546-ECB0-49D7-A71D-665AC122632A}"/>
+              </a:ext>
+            </a:extLst>
+          </p:cNvPr>
+          <p:cNvSpPr/>
+          <p:nvPr/>
+        </p:nvSpPr>
+        <p:spPr bwMode="gray">
+          <a:xfrm>
+            <a:off x="7184753" y="1595111"/>
+            <a:ext cx="4505724" cy="677425"/>
+          </a:xfrm>
+          <a:prstGeom prst="wedgeRectCallout">
+            <a:avLst>
+              <a:gd name="adj1" fmla="val -73263"/>
+              <a:gd name="adj2" fmla="val 64322"/>
+            </a:avLst>
+          </a:prstGeom>
+          <a:ln>
+            <a:headEnd/>
+            <a:tailEnd/>
+          </a:ln>
+        </p:spPr>
+        <p:style>
+          <a:lnRef idx="2">
+            <a:schemeClr val="accent5"/>
+          </a:lnRef>
+          <a:fillRef idx="1">
+            <a:schemeClr val="lt1"/>
+          </a:fillRef>
+          <a:effectRef idx="0">
+            <a:schemeClr val="accent5"/>
+          </a:effectRef>
+          <a:fontRef idx="minor">
+            <a:schemeClr val="dk1"/>
+          </a:fontRef>
+        </p:style>
+        <p:txBody>
+          <a:bodyPr lIns="90000" tIns="72000" rIns="90000" bIns="72000" rtlCol="0" anchor="ctr"/>
+          <a:lstStyle/>
+          <a:p>
+            <a:pPr marR="0" algn="ctr" defTabSz="914400" eaLnBrk="1" fontAlgn="base" latinLnBrk="0" hangingPunct="1">
+              <a:lnSpc>
+                <a:spcPct val="100000"/>
+              </a:lnSpc>
+              <a:spcBef>
+                <a:spcPct val="50000"/>
+              </a:spcBef>
+              <a:spcAft>
+                <a:spcPct val="0"/>
+              </a:spcAft>
+              <a:buClr>
+                <a:srgbClr val="F0AB00"/>
+              </a:buClr>
+              <a:buSzPct val="80000"/>
+              <a:tabLst/>
+            </a:pPr>
+            <a:r>
+              <a:rPr lang="en-US" sz="1800" kern="0" dirty="0">
+                <a:ea typeface="Arial Unicode MS" pitchFamily="34" charset="-128"/>
+                <a:cs typeface="Arial Unicode MS" pitchFamily="34" charset="-128"/>
+              </a:rPr>
+              <a:t>Annotation is required to route traffic to </a:t>
+            </a:r>
+            <a:r>
+              <a:rPr lang="en-US" sz="1800" b="1" kern="0" dirty="0">
+                <a:ea typeface="Arial Unicode MS" pitchFamily="34" charset="-128"/>
+                <a:cs typeface="Arial Unicode MS" pitchFamily="34" charset="-128"/>
+              </a:rPr>
+              <a:t>/index.html </a:t>
+            </a:r>
+            <a:r>
+              <a:rPr lang="en-US" sz="1800" kern="0" dirty="0">
+                <a:ea typeface="Arial Unicode MS" pitchFamily="34" charset="-128"/>
+                <a:cs typeface="Arial Unicode MS" pitchFamily="34" charset="-128"/>
+              </a:rPr>
+              <a:t>and not </a:t>
+            </a:r>
+            <a:r>
+              <a:rPr lang="en-US" sz="1800" b="1" kern="0" dirty="0">
+                <a:ea typeface="Arial Unicode MS" pitchFamily="34" charset="-128"/>
+                <a:cs typeface="Arial Unicode MS" pitchFamily="34" charset="-128"/>
+              </a:rPr>
+              <a:t>/my/index.html</a:t>
+            </a:r>
+            <a:endParaRPr kumimoji="0" lang="en-US" sz="1800" b="1" i="0" u="none" strike="noStrike" kern="0" cap="none" spc="0" normalizeH="0" baseline="0" noProof="0" dirty="0">
+              <a:ln>
+                <a:noFill/>
+              </a:ln>
+              <a:effectLst/>
+              <a:uLnTx/>
+              <a:uFillTx/>
+              <a:ea typeface="Arial Unicode MS" pitchFamily="34" charset="-128"/>
+              <a:cs typeface="Arial Unicode MS" pitchFamily="34" charset="-128"/>
+            </a:endParaRPr>
+          </a:p>
+        </p:txBody>
+      </p:sp>
+    </p:spTree>
+    <p:extLst>
+      <p:ext uri="{BB962C8B-B14F-4D97-AF65-F5344CB8AC3E}">
+        <p14:creationId xmlns:p14="http://schemas.microsoft.com/office/powerpoint/2010/main" val="3073656613"/>
+      </p:ext>
+    </p:extLst>
+  </p:cSld>
+  <p:clrMapOvr>
+    <a:masterClrMapping/>
+  </p:clrMapOvr>
+</p:sld>
+</file>
+
+<file path=ppt/slides/slide11.xml><?xml version="1.0" encoding="utf-8"?>
+<p:sld xmlns:a="http://schemas.openxmlformats.org/drawingml/2006/main" xmlns:r="http://schemas.openxmlformats.org/officeDocument/2006/relationships" xmlns:p="http://schemas.openxmlformats.org/presentationml/2006/main">
+  <p:cSld>
+    <p:spTree>
+      <p:nvGrpSpPr>
+        <p:cNvPr id="1" name=""/>
+        <p:cNvGrpSpPr/>
+        <p:nvPr/>
+      </p:nvGrpSpPr>
+      <p:grpSpPr>
+        <a:xfrm>
+          <a:off x="0" y="0"/>
+          <a:ext cx="0" cy="0"/>
+          <a:chOff x="0" y="0"/>
+          <a:chExt cx="0" cy="0"/>
+        </a:xfrm>
+      </p:grpSpPr>
       <p:sp>
         <p:nvSpPr>
           <p:cNvPr id="3" name="Title 2"/>
@@ -16324,7 +17033,7 @@
 </p:sld>
 </file>
 
-<file path=ppt/slides/slide11.xml><?xml version="1.0" encoding="utf-8"?>
+<file path=ppt/slides/slide12.xml><?xml version="1.0" encoding="utf-8"?>
 <p:sld xmlns:a="http://schemas.openxmlformats.org/drawingml/2006/main" xmlns:r="http://schemas.openxmlformats.org/officeDocument/2006/relationships" xmlns:p="http://schemas.openxmlformats.org/presentationml/2006/main">
   <p:cSld>
     <p:spTree>
@@ -16355,8 +17064,8 @@
         </p:nvSpPr>
         <p:spPr bwMode="gray">
           <a:xfrm>
-            <a:off x="7397496" y="1206858"/>
-            <a:ext cx="4251959" cy="5093357"/>
+            <a:off x="5301466" y="1206858"/>
+            <a:ext cx="6347990" cy="5093357"/>
           </a:xfrm>
           <a:prstGeom prst="roundRect">
             <a:avLst/>
@@ -18179,7 +18888,7 @@
 </p:sld>
 </file>
 
-<file path=ppt/slides/slide12.xml><?xml version="1.0" encoding="utf-8"?>
+<file path=ppt/slides/slide13.xml><?xml version="1.0" encoding="utf-8"?>
 <p:sld xmlns:a="http://schemas.openxmlformats.org/drawingml/2006/main" xmlns:r="http://schemas.openxmlformats.org/officeDocument/2006/relationships" xmlns:p="http://schemas.openxmlformats.org/presentationml/2006/main">
   <p:cSld>
     <p:spTree>
@@ -18464,7 +19173,7 @@
 </p:sld>
 </file>
 
-<file path=ppt/slides/slide13.xml><?xml version="1.0" encoding="utf-8"?>
+<file path=ppt/slides/slide14.xml><?xml version="1.0" encoding="utf-8"?>
 <p:sld xmlns:a="http://schemas.openxmlformats.org/drawingml/2006/main" xmlns:r="http://schemas.openxmlformats.org/officeDocument/2006/relationships" xmlns:p="http://schemas.openxmlformats.org/presentationml/2006/main">
   <p:cSld>
     <p:spTree>
@@ -18546,7 +19255,7 @@
 </p:sld>
 </file>
 
-<file path=ppt/slides/slide14.xml><?xml version="1.0" encoding="utf-8"?>
+<file path=ppt/slides/slide15.xml><?xml version="1.0" encoding="utf-8"?>
 <p:sld xmlns:a="http://schemas.openxmlformats.org/drawingml/2006/main" xmlns:r="http://schemas.openxmlformats.org/officeDocument/2006/relationships" xmlns:p="http://schemas.openxmlformats.org/presentationml/2006/main">
   <p:cSld>
     <p:spTree>
@@ -18674,7 +19383,7 @@
 </p:sld>
 </file>
 
-<file path=ppt/slides/slide15.xml><?xml version="1.0" encoding="utf-8"?>
+<file path=ppt/slides/slide16.xml><?xml version="1.0" encoding="utf-8"?>
 <p:sld xmlns:a="http://schemas.openxmlformats.org/drawingml/2006/main" xmlns:r="http://schemas.openxmlformats.org/officeDocument/2006/relationships" xmlns:p="http://schemas.openxmlformats.org/presentationml/2006/main">
   <p:cSld>
     <p:spTree>
@@ -20346,7 +21055,7 @@
 </p:sld>
 </file>
 
-<file path=ppt/slides/slide16.xml><?xml version="1.0" encoding="utf-8"?>
+<file path=ppt/slides/slide17.xml><?xml version="1.0" encoding="utf-8"?>
 <p:sld xmlns:a="http://schemas.openxmlformats.org/drawingml/2006/main" xmlns:r="http://schemas.openxmlformats.org/officeDocument/2006/relationships" xmlns:p="http://schemas.openxmlformats.org/presentationml/2006/main" show="0">
   <p:cSld>
     <p:spTree>
@@ -21292,7 +22001,12 @@
             <p:ph type="title"/>
           </p:nvPr>
         </p:nvSpPr>
-        <p:spPr/>
+        <p:spPr>
+          <a:xfrm>
+            <a:off x="504001" y="504000"/>
+            <a:ext cx="11186476" cy="369332"/>
+          </a:xfrm>
+        </p:spPr>
         <p:txBody>
           <a:bodyPr/>
           <a:lstStyle/>
@@ -24498,6 +25212,1807 @@
       </p:grpSpPr>
       <p:sp>
         <p:nvSpPr>
+          <p:cNvPr id="41" name="Rectangle: Rounded Corners 40">
+            <a:extLst>
+              <a:ext uri="{FF2B5EF4-FFF2-40B4-BE49-F238E27FC236}">
+                <a16:creationId xmlns:a16="http://schemas.microsoft.com/office/drawing/2014/main" id="{26B00B56-663D-40AE-B5A1-E2879A98E83E}"/>
+              </a:ext>
+            </a:extLst>
+          </p:cNvPr>
+          <p:cNvSpPr/>
+          <p:nvPr/>
+        </p:nvSpPr>
+        <p:spPr bwMode="gray">
+          <a:xfrm>
+            <a:off x="2948686" y="1208105"/>
+            <a:ext cx="9082355" cy="4750906"/>
+          </a:xfrm>
+          <a:prstGeom prst="roundRect">
+            <a:avLst/>
+          </a:prstGeom>
+          <a:ln>
+            <a:headEnd/>
+            <a:tailEnd/>
+          </a:ln>
+        </p:spPr>
+        <p:style>
+          <a:lnRef idx="1">
+            <a:schemeClr val="accent2"/>
+          </a:lnRef>
+          <a:fillRef idx="2">
+            <a:schemeClr val="accent2"/>
+          </a:fillRef>
+          <a:effectRef idx="1">
+            <a:schemeClr val="accent2"/>
+          </a:effectRef>
+          <a:fontRef idx="minor">
+            <a:schemeClr val="dk1"/>
+          </a:fontRef>
+        </p:style>
+        <p:txBody>
+          <a:bodyPr lIns="90000" tIns="72000" rIns="90000" bIns="72000" rtlCol="0" anchor="t"/>
+          <a:lstStyle/>
+          <a:p>
+            <a:pPr marR="0" algn="ctr" defTabSz="914400" eaLnBrk="1" fontAlgn="base" latinLnBrk="0" hangingPunct="1">
+              <a:lnSpc>
+                <a:spcPct val="100000"/>
+              </a:lnSpc>
+              <a:spcBef>
+                <a:spcPct val="50000"/>
+              </a:spcBef>
+              <a:spcAft>
+                <a:spcPct val="0"/>
+              </a:spcAft>
+              <a:buClr>
+                <a:srgbClr val="F0AB00"/>
+              </a:buClr>
+              <a:buSzPct val="80000"/>
+              <a:tabLst/>
+            </a:pPr>
+            <a:r>
+              <a:rPr kumimoji="0" lang="en-US" sz="1800" b="1" i="0" u="none" strike="noStrike" kern="0" cap="none" spc="0" normalizeH="0" baseline="0" noProof="0" dirty="0" err="1">
+                <a:ln>
+                  <a:noFill/>
+                </a:ln>
+                <a:effectLst/>
+                <a:uLnTx/>
+                <a:uFillTx/>
+                <a:ea typeface="Arial Unicode MS" pitchFamily="34" charset="-128"/>
+                <a:cs typeface="Arial Unicode MS" pitchFamily="34" charset="-128"/>
+              </a:rPr>
+              <a:t>kubernetes</a:t>
+            </a:r>
+            <a:r>
+              <a:rPr lang="en-US" sz="1800" b="1" kern="0" dirty="0">
+                <a:ea typeface="Arial Unicode MS" pitchFamily="34" charset="-128"/>
+                <a:cs typeface="Arial Unicode MS" pitchFamily="34" charset="-128"/>
+              </a:rPr>
+              <a:t> internal network</a:t>
+            </a:r>
+            <a:endParaRPr kumimoji="0" lang="en-US" sz="1800" b="1" i="0" u="none" strike="noStrike" kern="0" cap="none" spc="0" normalizeH="0" baseline="0" noProof="0" dirty="0" err="1">
+              <a:ln>
+                <a:noFill/>
+              </a:ln>
+              <a:effectLst/>
+              <a:uLnTx/>
+              <a:uFillTx/>
+              <a:ea typeface="Arial Unicode MS" pitchFamily="34" charset="-128"/>
+              <a:cs typeface="Arial Unicode MS" pitchFamily="34" charset="-128"/>
+            </a:endParaRPr>
+          </a:p>
+        </p:txBody>
+      </p:sp>
+      <p:sp>
+        <p:nvSpPr>
+          <p:cNvPr id="15" name="Rectangle: Rounded Corners 14">
+            <a:extLst>
+              <a:ext uri="{FF2B5EF4-FFF2-40B4-BE49-F238E27FC236}">
+                <a16:creationId xmlns:a16="http://schemas.microsoft.com/office/drawing/2014/main" id="{9A1D9EC9-1EBD-46CA-B0ED-978CB0DAE2A3}"/>
+              </a:ext>
+            </a:extLst>
+          </p:cNvPr>
+          <p:cNvSpPr/>
+          <p:nvPr/>
+        </p:nvSpPr>
+        <p:spPr bwMode="gray">
+          <a:xfrm>
+            <a:off x="7597517" y="1893013"/>
+            <a:ext cx="4092960" cy="3901612"/>
+          </a:xfrm>
+          <a:prstGeom prst="roundRect">
+            <a:avLst/>
+          </a:prstGeom>
+          <a:solidFill>
+            <a:schemeClr val="accent4">
+              <a:alpha val="50000"/>
+            </a:schemeClr>
+          </a:solidFill>
+          <a:ln>
+            <a:noFill/>
+          </a:ln>
+        </p:spPr>
+        <p:style>
+          <a:lnRef idx="0">
+            <a:scrgbClr r="0" g="0" b="0"/>
+          </a:lnRef>
+          <a:fillRef idx="0">
+            <a:scrgbClr r="0" g="0" b="0"/>
+          </a:fillRef>
+          <a:effectRef idx="0">
+            <a:scrgbClr r="0" g="0" b="0"/>
+          </a:effectRef>
+          <a:fontRef idx="minor">
+            <a:schemeClr val="lt1"/>
+          </a:fontRef>
+        </p:style>
+        <p:txBody>
+          <a:bodyPr lIns="90000" tIns="72000" rIns="90000" bIns="72000" rtlCol="0" anchor="t"/>
+          <a:lstStyle/>
+          <a:p>
+            <a:pPr marR="0" algn="ctr" defTabSz="914400" eaLnBrk="1" fontAlgn="base" latinLnBrk="0" hangingPunct="1">
+              <a:lnSpc>
+                <a:spcPct val="100000"/>
+              </a:lnSpc>
+              <a:spcBef>
+                <a:spcPct val="50000"/>
+              </a:spcBef>
+              <a:spcAft>
+                <a:spcPct val="0"/>
+              </a:spcAft>
+              <a:buClr>
+                <a:srgbClr val="F0AB00"/>
+              </a:buClr>
+              <a:buSzPct val="80000"/>
+              <a:tabLst/>
+            </a:pPr>
+            <a:r>
+              <a:rPr lang="en-US" sz="1800" b="1" kern="0" dirty="0">
+                <a:ea typeface="Arial Unicode MS" pitchFamily="34" charset="-128"/>
+                <a:cs typeface="Arial Unicode MS" pitchFamily="34" charset="-128"/>
+              </a:rPr>
+              <a:t>namespace: part-0000</a:t>
+            </a:r>
+            <a:endParaRPr kumimoji="0" lang="en-US" sz="1800" b="1" i="0" u="none" strike="noStrike" kern="0" cap="none" spc="0" normalizeH="0" baseline="0" noProof="0" dirty="0" err="1">
+              <a:ln>
+                <a:noFill/>
+              </a:ln>
+              <a:effectLst/>
+              <a:uLnTx/>
+              <a:uFillTx/>
+              <a:ea typeface="Arial Unicode MS" pitchFamily="34" charset="-128"/>
+              <a:cs typeface="Arial Unicode MS" pitchFamily="34" charset="-128"/>
+            </a:endParaRPr>
+          </a:p>
+        </p:txBody>
+      </p:sp>
+      <p:sp>
+        <p:nvSpPr>
+          <p:cNvPr id="2" name="Title 1">
+            <a:extLst>
+              <a:ext uri="{FF2B5EF4-FFF2-40B4-BE49-F238E27FC236}">
+                <a16:creationId xmlns:a16="http://schemas.microsoft.com/office/drawing/2014/main" id="{7073C2CB-D306-4B39-B905-FEF684ECD5D6}"/>
+              </a:ext>
+            </a:extLst>
+          </p:cNvPr>
+          <p:cNvSpPr>
+            <a:spLocks noGrp="1"/>
+          </p:cNvSpPr>
+          <p:nvPr>
+            <p:ph type="title"/>
+          </p:nvPr>
+        </p:nvSpPr>
+        <p:spPr/>
+        <p:txBody>
+          <a:bodyPr/>
+          <a:lstStyle/>
+          <a:p>
+            <a:r>
+              <a:rPr lang="en-US" dirty="0"/>
+              <a:t>How does it work?</a:t>
+            </a:r>
+          </a:p>
+        </p:txBody>
+      </p:sp>
+      <p:sp>
+        <p:nvSpPr>
+          <p:cNvPr id="10" name="Rectangle 9">
+            <a:extLst>
+              <a:ext uri="{FF2B5EF4-FFF2-40B4-BE49-F238E27FC236}">
+                <a16:creationId xmlns:a16="http://schemas.microsoft.com/office/drawing/2014/main" id="{E88C9445-9706-4262-83C3-2A6ED4EE52A1}"/>
+              </a:ext>
+            </a:extLst>
+          </p:cNvPr>
+          <p:cNvSpPr/>
+          <p:nvPr/>
+        </p:nvSpPr>
+        <p:spPr bwMode="gray">
+          <a:xfrm>
+            <a:off x="7857158" y="3091179"/>
+            <a:ext cx="1222647" cy="795956"/>
+          </a:xfrm>
+          <a:prstGeom prst="rect">
+            <a:avLst/>
+          </a:prstGeom>
+          <a:ln>
+            <a:headEnd/>
+            <a:tailEnd/>
+          </a:ln>
+        </p:spPr>
+        <p:style>
+          <a:lnRef idx="1">
+            <a:schemeClr val="accent3"/>
+          </a:lnRef>
+          <a:fillRef idx="2">
+            <a:schemeClr val="accent3"/>
+          </a:fillRef>
+          <a:effectRef idx="1">
+            <a:schemeClr val="accent3"/>
+          </a:effectRef>
+          <a:fontRef idx="minor">
+            <a:schemeClr val="dk1"/>
+          </a:fontRef>
+        </p:style>
+        <p:txBody>
+          <a:bodyPr lIns="90000" tIns="72000" rIns="90000" bIns="72000" rtlCol="0" anchor="ctr"/>
+          <a:lstStyle/>
+          <a:p>
+            <a:pPr marR="0" algn="ctr" defTabSz="914400" eaLnBrk="1" fontAlgn="base" latinLnBrk="0" hangingPunct="1">
+              <a:lnSpc>
+                <a:spcPct val="100000"/>
+              </a:lnSpc>
+              <a:spcBef>
+                <a:spcPct val="50000"/>
+              </a:spcBef>
+              <a:spcAft>
+                <a:spcPct val="0"/>
+              </a:spcAft>
+              <a:buClr>
+                <a:srgbClr val="F0AB00"/>
+              </a:buClr>
+              <a:buSzPct val="80000"/>
+              <a:tabLst/>
+            </a:pPr>
+            <a:r>
+              <a:rPr lang="de-DE" sz="1800" b="1" kern="0" dirty="0" err="1">
+                <a:ea typeface="Arial Unicode MS" pitchFamily="34" charset="-128"/>
+                <a:cs typeface="Arial Unicode MS" pitchFamily="34" charset="-128"/>
+              </a:rPr>
+              <a:t>ClusterIP</a:t>
+            </a:r>
+            <a:r>
+              <a:rPr lang="de-DE" sz="1800" b="1" kern="0" dirty="0">
+                <a:ea typeface="Arial Unicode MS" pitchFamily="34" charset="-128"/>
+                <a:cs typeface="Arial Unicode MS" pitchFamily="34" charset="-128"/>
+              </a:rPr>
+              <a:t> Service</a:t>
+            </a:r>
+          </a:p>
+        </p:txBody>
+      </p:sp>
+      <p:sp>
+        <p:nvSpPr>
+          <p:cNvPr id="11" name="Rectangle 10">
+            <a:extLst>
+              <a:ext uri="{FF2B5EF4-FFF2-40B4-BE49-F238E27FC236}">
+                <a16:creationId xmlns:a16="http://schemas.microsoft.com/office/drawing/2014/main" id="{3CFB9957-97EE-4CDE-A8B1-520618B7E77F}"/>
+              </a:ext>
+            </a:extLst>
+          </p:cNvPr>
+          <p:cNvSpPr/>
+          <p:nvPr/>
+        </p:nvSpPr>
+        <p:spPr bwMode="gray">
+          <a:xfrm>
+            <a:off x="10208188" y="2539966"/>
+            <a:ext cx="1222647" cy="795956"/>
+          </a:xfrm>
+          <a:prstGeom prst="rect">
+            <a:avLst/>
+          </a:prstGeom>
+          <a:ln>
+            <a:headEnd/>
+            <a:tailEnd/>
+          </a:ln>
+        </p:spPr>
+        <p:style>
+          <a:lnRef idx="1">
+            <a:schemeClr val="accent1"/>
+          </a:lnRef>
+          <a:fillRef idx="2">
+            <a:schemeClr val="accent1"/>
+          </a:fillRef>
+          <a:effectRef idx="1">
+            <a:schemeClr val="accent1"/>
+          </a:effectRef>
+          <a:fontRef idx="minor">
+            <a:schemeClr val="dk1"/>
+          </a:fontRef>
+        </p:style>
+        <p:txBody>
+          <a:bodyPr lIns="90000" tIns="72000" rIns="90000" bIns="72000" rtlCol="0" anchor="ctr"/>
+          <a:lstStyle/>
+          <a:p>
+            <a:pPr algn="ctr" defTabSz="914400" fontAlgn="base">
+              <a:spcBef>
+                <a:spcPct val="50000"/>
+              </a:spcBef>
+              <a:spcAft>
+                <a:spcPct val="0"/>
+              </a:spcAft>
+              <a:buClr>
+                <a:srgbClr val="F0AB00"/>
+              </a:buClr>
+              <a:buSzPct val="80000"/>
+            </a:pPr>
+            <a:r>
+              <a:rPr lang="de-DE" sz="1800" b="1" kern="0" dirty="0" err="1">
+                <a:ea typeface="Arial Unicode MS" pitchFamily="34" charset="-128"/>
+                <a:cs typeface="Arial Unicode MS" pitchFamily="34" charset="-128"/>
+              </a:rPr>
+              <a:t>Pod</a:t>
+            </a:r>
+            <a:endParaRPr lang="de-DE" sz="1800" b="1" kern="0" dirty="0">
+              <a:ea typeface="Arial Unicode MS" pitchFamily="34" charset="-128"/>
+              <a:cs typeface="Arial Unicode MS" pitchFamily="34" charset="-128"/>
+            </a:endParaRPr>
+          </a:p>
+        </p:txBody>
+      </p:sp>
+      <p:sp>
+        <p:nvSpPr>
+          <p:cNvPr id="12" name="Rectangle 11">
+            <a:extLst>
+              <a:ext uri="{FF2B5EF4-FFF2-40B4-BE49-F238E27FC236}">
+                <a16:creationId xmlns:a16="http://schemas.microsoft.com/office/drawing/2014/main" id="{9D827E62-DB83-40D2-9D58-56EFE71ABAFA}"/>
+              </a:ext>
+            </a:extLst>
+          </p:cNvPr>
+          <p:cNvSpPr/>
+          <p:nvPr/>
+        </p:nvSpPr>
+        <p:spPr bwMode="gray">
+          <a:xfrm>
+            <a:off x="10208188" y="3522078"/>
+            <a:ext cx="1222647" cy="795956"/>
+          </a:xfrm>
+          <a:prstGeom prst="rect">
+            <a:avLst/>
+          </a:prstGeom>
+          <a:ln>
+            <a:headEnd/>
+            <a:tailEnd/>
+          </a:ln>
+        </p:spPr>
+        <p:style>
+          <a:lnRef idx="1">
+            <a:schemeClr val="accent1"/>
+          </a:lnRef>
+          <a:fillRef idx="2">
+            <a:schemeClr val="accent1"/>
+          </a:fillRef>
+          <a:effectRef idx="1">
+            <a:schemeClr val="accent1"/>
+          </a:effectRef>
+          <a:fontRef idx="minor">
+            <a:schemeClr val="dk1"/>
+          </a:fontRef>
+        </p:style>
+        <p:txBody>
+          <a:bodyPr lIns="90000" tIns="72000" rIns="90000" bIns="72000" rtlCol="0" anchor="ctr"/>
+          <a:lstStyle/>
+          <a:p>
+            <a:pPr algn="ctr" defTabSz="914400" fontAlgn="base">
+              <a:spcBef>
+                <a:spcPct val="50000"/>
+              </a:spcBef>
+              <a:spcAft>
+                <a:spcPct val="0"/>
+              </a:spcAft>
+              <a:buClr>
+                <a:srgbClr val="F0AB00"/>
+              </a:buClr>
+              <a:buSzPct val="80000"/>
+            </a:pPr>
+            <a:r>
+              <a:rPr lang="de-DE" sz="1800" b="1" kern="0" dirty="0" err="1">
+                <a:ea typeface="Arial Unicode MS" pitchFamily="34" charset="-128"/>
+                <a:cs typeface="Arial Unicode MS" pitchFamily="34" charset="-128"/>
+              </a:rPr>
+              <a:t>Pod</a:t>
+            </a:r>
+            <a:endParaRPr lang="de-DE" sz="1800" b="1" kern="0" dirty="0">
+              <a:ea typeface="Arial Unicode MS" pitchFamily="34" charset="-128"/>
+              <a:cs typeface="Arial Unicode MS" pitchFamily="34" charset="-128"/>
+            </a:endParaRPr>
+          </a:p>
+        </p:txBody>
+      </p:sp>
+      <p:cxnSp>
+        <p:nvCxnSpPr>
+          <p:cNvPr id="13" name="Connector: Elbow 12">
+            <a:extLst>
+              <a:ext uri="{FF2B5EF4-FFF2-40B4-BE49-F238E27FC236}">
+                <a16:creationId xmlns:a16="http://schemas.microsoft.com/office/drawing/2014/main" id="{57C26E21-BB2B-4663-A9C7-8DF9EC75E7A3}"/>
+              </a:ext>
+            </a:extLst>
+          </p:cNvPr>
+          <p:cNvCxnSpPr>
+            <a:cxnSpLocks/>
+            <a:stCxn id="10" idx="3"/>
+            <a:endCxn id="11" idx="1"/>
+          </p:cNvCxnSpPr>
+          <p:nvPr/>
+        </p:nvCxnSpPr>
+        <p:spPr>
+          <a:xfrm flipV="1">
+            <a:off x="9079805" y="2937944"/>
+            <a:ext cx="1128383" cy="551213"/>
+          </a:xfrm>
+          <a:prstGeom prst="bentConnector3">
+            <a:avLst/>
+          </a:prstGeom>
+          <a:ln w="57150">
+            <a:solidFill>
+              <a:schemeClr val="accent1"/>
+            </a:solidFill>
+            <a:headEnd type="none" w="med" len="med"/>
+            <a:tailEnd type="triangle" w="med" len="med"/>
+          </a:ln>
+        </p:spPr>
+        <p:style>
+          <a:lnRef idx="1">
+            <a:schemeClr val="accent1"/>
+          </a:lnRef>
+          <a:fillRef idx="0">
+            <a:schemeClr val="accent1"/>
+          </a:fillRef>
+          <a:effectRef idx="0">
+            <a:schemeClr val="accent1"/>
+          </a:effectRef>
+          <a:fontRef idx="minor">
+            <a:schemeClr val="tx1"/>
+          </a:fontRef>
+        </p:style>
+      </p:cxnSp>
+      <p:cxnSp>
+        <p:nvCxnSpPr>
+          <p:cNvPr id="14" name="Connector: Elbow 13">
+            <a:extLst>
+              <a:ext uri="{FF2B5EF4-FFF2-40B4-BE49-F238E27FC236}">
+                <a16:creationId xmlns:a16="http://schemas.microsoft.com/office/drawing/2014/main" id="{D336F964-D7B5-4DAC-A34C-F9A82EFD4176}"/>
+              </a:ext>
+            </a:extLst>
+          </p:cNvPr>
+          <p:cNvCxnSpPr>
+            <a:cxnSpLocks/>
+            <a:stCxn id="10" idx="3"/>
+            <a:endCxn id="12" idx="1"/>
+          </p:cNvCxnSpPr>
+          <p:nvPr/>
+        </p:nvCxnSpPr>
+        <p:spPr>
+          <a:xfrm>
+            <a:off x="9079805" y="3489157"/>
+            <a:ext cx="1128383" cy="430899"/>
+          </a:xfrm>
+          <a:prstGeom prst="bentConnector3">
+            <a:avLst/>
+          </a:prstGeom>
+          <a:ln w="57150">
+            <a:solidFill>
+              <a:schemeClr val="accent1"/>
+            </a:solidFill>
+            <a:headEnd type="none" w="med" len="med"/>
+            <a:tailEnd type="triangle" w="med" len="med"/>
+          </a:ln>
+        </p:spPr>
+        <p:style>
+          <a:lnRef idx="1">
+            <a:schemeClr val="accent1"/>
+          </a:lnRef>
+          <a:fillRef idx="0">
+            <a:schemeClr val="accent1"/>
+          </a:fillRef>
+          <a:effectRef idx="0">
+            <a:schemeClr val="accent1"/>
+          </a:effectRef>
+          <a:fontRef idx="minor">
+            <a:schemeClr val="tx1"/>
+          </a:fontRef>
+        </p:style>
+      </p:cxnSp>
+      <p:sp>
+        <p:nvSpPr>
+          <p:cNvPr id="16" name="Rectangle: Rounded Corners 15">
+            <a:extLst>
+              <a:ext uri="{FF2B5EF4-FFF2-40B4-BE49-F238E27FC236}">
+                <a16:creationId xmlns:a16="http://schemas.microsoft.com/office/drawing/2014/main" id="{6231DD58-B049-4DA3-98AD-06E8F134860F}"/>
+              </a:ext>
+            </a:extLst>
+          </p:cNvPr>
+          <p:cNvSpPr/>
+          <p:nvPr/>
+        </p:nvSpPr>
+        <p:spPr bwMode="gray">
+          <a:xfrm>
+            <a:off x="3357109" y="1893012"/>
+            <a:ext cx="3522377" cy="3901612"/>
+          </a:xfrm>
+          <a:prstGeom prst="roundRect">
+            <a:avLst/>
+          </a:prstGeom>
+          <a:solidFill>
+            <a:schemeClr val="accent5">
+              <a:alpha val="50000"/>
+            </a:schemeClr>
+          </a:solidFill>
+          <a:ln>
+            <a:noFill/>
+          </a:ln>
+        </p:spPr>
+        <p:style>
+          <a:lnRef idx="0">
+            <a:scrgbClr r="0" g="0" b="0"/>
+          </a:lnRef>
+          <a:fillRef idx="0">
+            <a:scrgbClr r="0" g="0" b="0"/>
+          </a:fillRef>
+          <a:effectRef idx="0">
+            <a:scrgbClr r="0" g="0" b="0"/>
+          </a:effectRef>
+          <a:fontRef idx="minor">
+            <a:schemeClr val="lt1"/>
+          </a:fontRef>
+        </p:style>
+        <p:txBody>
+          <a:bodyPr lIns="90000" tIns="72000" rIns="90000" bIns="72000" rtlCol="0" anchor="t"/>
+          <a:lstStyle/>
+          <a:p>
+            <a:pPr marR="0" algn="ctr" defTabSz="914400" eaLnBrk="1" fontAlgn="base" latinLnBrk="0" hangingPunct="1">
+              <a:lnSpc>
+                <a:spcPct val="100000"/>
+              </a:lnSpc>
+              <a:spcBef>
+                <a:spcPct val="50000"/>
+              </a:spcBef>
+              <a:spcAft>
+                <a:spcPct val="0"/>
+              </a:spcAft>
+              <a:buClr>
+                <a:srgbClr val="F0AB00"/>
+              </a:buClr>
+              <a:buSzPct val="80000"/>
+              <a:tabLst/>
+            </a:pPr>
+            <a:r>
+              <a:rPr lang="en-US" sz="1800" b="1" kern="0" dirty="0">
+                <a:ea typeface="Arial Unicode MS" pitchFamily="34" charset="-128"/>
+                <a:cs typeface="Arial Unicode MS" pitchFamily="34" charset="-128"/>
+              </a:rPr>
+              <a:t>namespace: </a:t>
+            </a:r>
+            <a:r>
+              <a:rPr lang="en-US" sz="1800" b="1" kern="0" dirty="0" err="1">
+                <a:ea typeface="Arial Unicode MS" pitchFamily="34" charset="-128"/>
+                <a:cs typeface="Arial Unicode MS" pitchFamily="34" charset="-128"/>
+              </a:rPr>
+              <a:t>kube</a:t>
+            </a:r>
+            <a:r>
+              <a:rPr lang="en-US" sz="1800" b="1" kern="0" dirty="0">
+                <a:ea typeface="Arial Unicode MS" pitchFamily="34" charset="-128"/>
+                <a:cs typeface="Arial Unicode MS" pitchFamily="34" charset="-128"/>
+              </a:rPr>
+              <a:t>-system</a:t>
+            </a:r>
+            <a:endParaRPr kumimoji="0" lang="en-US" sz="1800" b="1" i="0" u="none" strike="noStrike" kern="0" cap="none" spc="0" normalizeH="0" baseline="0" noProof="0" dirty="0" err="1">
+              <a:ln>
+                <a:noFill/>
+              </a:ln>
+              <a:effectLst/>
+              <a:uLnTx/>
+              <a:uFillTx/>
+              <a:ea typeface="Arial Unicode MS" pitchFamily="34" charset="-128"/>
+              <a:cs typeface="Arial Unicode MS" pitchFamily="34" charset="-128"/>
+            </a:endParaRPr>
+          </a:p>
+        </p:txBody>
+      </p:sp>
+      <p:sp>
+        <p:nvSpPr>
+          <p:cNvPr id="18" name="Rectangle 17">
+            <a:extLst>
+              <a:ext uri="{FF2B5EF4-FFF2-40B4-BE49-F238E27FC236}">
+                <a16:creationId xmlns:a16="http://schemas.microsoft.com/office/drawing/2014/main" id="{021572A9-6976-4081-B145-7278775BF274}"/>
+              </a:ext>
+            </a:extLst>
+          </p:cNvPr>
+          <p:cNvSpPr/>
+          <p:nvPr/>
+        </p:nvSpPr>
+        <p:spPr bwMode="gray">
+          <a:xfrm>
+            <a:off x="2276077" y="3091179"/>
+            <a:ext cx="1870188" cy="795956"/>
+          </a:xfrm>
+          <a:prstGeom prst="rect">
+            <a:avLst/>
+          </a:prstGeom>
+          <a:ln>
+            <a:headEnd/>
+            <a:tailEnd/>
+          </a:ln>
+        </p:spPr>
+        <p:style>
+          <a:lnRef idx="1">
+            <a:schemeClr val="accent3"/>
+          </a:lnRef>
+          <a:fillRef idx="2">
+            <a:schemeClr val="accent3"/>
+          </a:fillRef>
+          <a:effectRef idx="1">
+            <a:schemeClr val="accent3"/>
+          </a:effectRef>
+          <a:fontRef idx="minor">
+            <a:schemeClr val="dk1"/>
+          </a:fontRef>
+        </p:style>
+        <p:txBody>
+          <a:bodyPr lIns="90000" tIns="72000" rIns="90000" bIns="72000" rtlCol="0" anchor="ctr"/>
+          <a:lstStyle/>
+          <a:p>
+            <a:pPr marR="0" algn="ctr" defTabSz="914400" eaLnBrk="1" fontAlgn="base" latinLnBrk="0" hangingPunct="1">
+              <a:lnSpc>
+                <a:spcPct val="100000"/>
+              </a:lnSpc>
+              <a:spcBef>
+                <a:spcPct val="50000"/>
+              </a:spcBef>
+              <a:spcAft>
+                <a:spcPct val="0"/>
+              </a:spcAft>
+              <a:buClr>
+                <a:srgbClr val="F0AB00"/>
+              </a:buClr>
+              <a:buSzPct val="80000"/>
+              <a:tabLst/>
+            </a:pPr>
+            <a:r>
+              <a:rPr lang="de-DE" sz="1800" b="1" kern="0" dirty="0" err="1">
+                <a:ea typeface="Arial Unicode MS" pitchFamily="34" charset="-128"/>
+                <a:cs typeface="Arial Unicode MS" pitchFamily="34" charset="-128"/>
+              </a:rPr>
+              <a:t>LoadBalancer</a:t>
+            </a:r>
+            <a:r>
+              <a:rPr lang="de-DE" sz="1800" b="1" kern="0" dirty="0">
+                <a:ea typeface="Arial Unicode MS" pitchFamily="34" charset="-128"/>
+                <a:cs typeface="Arial Unicode MS" pitchFamily="34" charset="-128"/>
+              </a:rPr>
+              <a:t> Service</a:t>
+            </a:r>
+          </a:p>
+        </p:txBody>
+      </p:sp>
+      <p:sp>
+        <p:nvSpPr>
+          <p:cNvPr id="19" name="Rectangle 18">
+            <a:extLst>
+              <a:ext uri="{FF2B5EF4-FFF2-40B4-BE49-F238E27FC236}">
+                <a16:creationId xmlns:a16="http://schemas.microsoft.com/office/drawing/2014/main" id="{1F4902FD-5842-4B59-BAE8-175F6C77D5BD}"/>
+              </a:ext>
+            </a:extLst>
+          </p:cNvPr>
+          <p:cNvSpPr/>
+          <p:nvPr/>
+        </p:nvSpPr>
+        <p:spPr bwMode="gray">
+          <a:xfrm>
+            <a:off x="4884806" y="3032660"/>
+            <a:ext cx="1567408" cy="912994"/>
+          </a:xfrm>
+          <a:prstGeom prst="rect">
+            <a:avLst/>
+          </a:prstGeom>
+          <a:ln>
+            <a:headEnd/>
+            <a:tailEnd/>
+          </a:ln>
+        </p:spPr>
+        <p:style>
+          <a:lnRef idx="1">
+            <a:schemeClr val="accent1"/>
+          </a:lnRef>
+          <a:fillRef idx="2">
+            <a:schemeClr val="accent1"/>
+          </a:fillRef>
+          <a:effectRef idx="1">
+            <a:schemeClr val="accent1"/>
+          </a:effectRef>
+          <a:fontRef idx="minor">
+            <a:schemeClr val="dk1"/>
+          </a:fontRef>
+        </p:style>
+        <p:txBody>
+          <a:bodyPr lIns="90000" tIns="72000" rIns="90000" bIns="72000" rtlCol="0" anchor="ctr"/>
+          <a:lstStyle/>
+          <a:p>
+            <a:pPr algn="ctr" defTabSz="914400" fontAlgn="base">
+              <a:spcBef>
+                <a:spcPct val="50000"/>
+              </a:spcBef>
+              <a:spcAft>
+                <a:spcPct val="0"/>
+              </a:spcAft>
+              <a:buClr>
+                <a:srgbClr val="F0AB00"/>
+              </a:buClr>
+              <a:buSzPct val="80000"/>
+            </a:pPr>
+            <a:r>
+              <a:rPr lang="de-DE" sz="1800" b="1" kern="0" dirty="0">
+                <a:ea typeface="Arial Unicode MS" pitchFamily="34" charset="-128"/>
+                <a:cs typeface="Arial Unicode MS" pitchFamily="34" charset="-128"/>
+              </a:rPr>
+              <a:t>Ingress Controlle</a:t>
+            </a:r>
+            <a:r>
+              <a:rPr lang="de-DE" sz="1800" kern="0" dirty="0">
+                <a:ea typeface="Arial Unicode MS" pitchFamily="34" charset="-128"/>
+                <a:cs typeface="Arial Unicode MS" pitchFamily="34" charset="-128"/>
+              </a:rPr>
+              <a:t>r</a:t>
+            </a:r>
+          </a:p>
+        </p:txBody>
+      </p:sp>
+      <p:pic>
+        <p:nvPicPr>
+          <p:cNvPr id="29" name="Graphic 28" descr="Document">
+            <a:extLst>
+              <a:ext uri="{FF2B5EF4-FFF2-40B4-BE49-F238E27FC236}">
+                <a16:creationId xmlns:a16="http://schemas.microsoft.com/office/drawing/2014/main" id="{91BC4884-401A-40D3-A07B-72E5820CB01F}"/>
+              </a:ext>
+            </a:extLst>
+          </p:cNvPr>
+          <p:cNvPicPr>
+            <a:picLocks noChangeAspect="1"/>
+          </p:cNvPicPr>
+          <p:nvPr/>
+        </p:nvPicPr>
+        <p:blipFill>
+          <a:blip r:embed="rId3">
+            <a:extLst>
+              <a:ext uri="{96DAC541-7B7A-43D3-8B79-37D633B846F1}">
+                <asvg:svgBlip xmlns:asvg="http://schemas.microsoft.com/office/drawing/2016/SVG/main" r:embed="rId4"/>
+              </a:ext>
+            </a:extLst>
+          </a:blip>
+          <a:stretch>
+            <a:fillRect/>
+          </a:stretch>
+        </p:blipFill>
+        <p:spPr>
+          <a:xfrm>
+            <a:off x="8113611" y="4392861"/>
+            <a:ext cx="949274" cy="949274"/>
+          </a:xfrm>
+          <a:prstGeom prst="rect">
+            <a:avLst/>
+          </a:prstGeom>
+        </p:spPr>
+      </p:pic>
+      <p:sp>
+        <p:nvSpPr>
+          <p:cNvPr id="30" name="Rectangle 29">
+            <a:extLst>
+              <a:ext uri="{FF2B5EF4-FFF2-40B4-BE49-F238E27FC236}">
+                <a16:creationId xmlns:a16="http://schemas.microsoft.com/office/drawing/2014/main" id="{9C7EC393-EAC6-4D4C-A63C-7D3EE5945207}"/>
+              </a:ext>
+            </a:extLst>
+          </p:cNvPr>
+          <p:cNvSpPr/>
+          <p:nvPr/>
+        </p:nvSpPr>
+        <p:spPr>
+          <a:xfrm>
+            <a:off x="8039861" y="5236161"/>
+            <a:ext cx="1096775" cy="400110"/>
+          </a:xfrm>
+          <a:prstGeom prst="rect">
+            <a:avLst/>
+          </a:prstGeom>
+        </p:spPr>
+        <p:txBody>
+          <a:bodyPr wrap="none">
+            <a:spAutoFit/>
+          </a:bodyPr>
+          <a:lstStyle/>
+          <a:p>
+            <a:r>
+              <a:rPr lang="en-US" sz="2000" b="1" dirty="0"/>
+              <a:t>Ingress</a:t>
+            </a:r>
+          </a:p>
+        </p:txBody>
+      </p:sp>
+      <p:sp>
+        <p:nvSpPr>
+          <p:cNvPr id="31" name="Rectangle 30">
+            <a:extLst>
+              <a:ext uri="{FF2B5EF4-FFF2-40B4-BE49-F238E27FC236}">
+                <a16:creationId xmlns:a16="http://schemas.microsoft.com/office/drawing/2014/main" id="{251DAEA0-6088-4363-91D0-61B27629D20A}"/>
+              </a:ext>
+            </a:extLst>
+          </p:cNvPr>
+          <p:cNvSpPr/>
+          <p:nvPr/>
+        </p:nvSpPr>
+        <p:spPr bwMode="gray">
+          <a:xfrm>
+            <a:off x="4884806" y="4410164"/>
+            <a:ext cx="1567408" cy="912994"/>
+          </a:xfrm>
+          <a:prstGeom prst="rect">
+            <a:avLst/>
+          </a:prstGeom>
+          <a:ln>
+            <a:headEnd/>
+            <a:tailEnd/>
+          </a:ln>
+        </p:spPr>
+        <p:style>
+          <a:lnRef idx="1">
+            <a:schemeClr val="accent1"/>
+          </a:lnRef>
+          <a:fillRef idx="2">
+            <a:schemeClr val="accent1"/>
+          </a:fillRef>
+          <a:effectRef idx="1">
+            <a:schemeClr val="accent1"/>
+          </a:effectRef>
+          <a:fontRef idx="minor">
+            <a:schemeClr val="dk1"/>
+          </a:fontRef>
+        </p:style>
+        <p:txBody>
+          <a:bodyPr lIns="90000" tIns="72000" rIns="90000" bIns="72000" rtlCol="0" anchor="ctr"/>
+          <a:lstStyle/>
+          <a:p>
+            <a:pPr algn="ctr" defTabSz="914400" fontAlgn="base">
+              <a:spcBef>
+                <a:spcPct val="50000"/>
+              </a:spcBef>
+              <a:spcAft>
+                <a:spcPct val="0"/>
+              </a:spcAft>
+              <a:buClr>
+                <a:srgbClr val="F0AB00"/>
+              </a:buClr>
+              <a:buSzPct val="80000"/>
+            </a:pPr>
+            <a:r>
+              <a:rPr lang="de-DE" sz="1800" b="1" kern="0" dirty="0">
+                <a:ea typeface="Arial Unicode MS" pitchFamily="34" charset="-128"/>
+                <a:cs typeface="Arial Unicode MS" pitchFamily="34" charset="-128"/>
+              </a:rPr>
+              <a:t>Ingress Backend</a:t>
+            </a:r>
+          </a:p>
+        </p:txBody>
+      </p:sp>
+      <p:grpSp>
+        <p:nvGrpSpPr>
+          <p:cNvPr id="38" name="Group 37">
+            <a:extLst>
+              <a:ext uri="{FF2B5EF4-FFF2-40B4-BE49-F238E27FC236}">
+                <a16:creationId xmlns:a16="http://schemas.microsoft.com/office/drawing/2014/main" id="{0132434E-2832-4EDA-A3FB-9F567C37A600}"/>
+              </a:ext>
+            </a:extLst>
+          </p:cNvPr>
+          <p:cNvGrpSpPr/>
+          <p:nvPr/>
+        </p:nvGrpSpPr>
+        <p:grpSpPr>
+          <a:xfrm>
+            <a:off x="389308" y="1692841"/>
+            <a:ext cx="2249770" cy="1106406"/>
+            <a:chOff x="1122252" y="3219863"/>
+            <a:chExt cx="2249770" cy="1106406"/>
+          </a:xfrm>
+        </p:grpSpPr>
+        <p:sp>
+          <p:nvSpPr>
+            <p:cNvPr id="39" name="Cloud 38">
+              <a:extLst>
+                <a:ext uri="{FF2B5EF4-FFF2-40B4-BE49-F238E27FC236}">
+                  <a16:creationId xmlns:a16="http://schemas.microsoft.com/office/drawing/2014/main" id="{3C10E259-D9F3-4770-9A41-6C5DF9C4DC1E}"/>
+                </a:ext>
+              </a:extLst>
+            </p:cNvPr>
+            <p:cNvSpPr/>
+            <p:nvPr/>
+          </p:nvSpPr>
+          <p:spPr bwMode="gray">
+            <a:xfrm>
+              <a:off x="1122252" y="3219863"/>
+              <a:ext cx="2249770" cy="1106406"/>
+            </a:xfrm>
+            <a:prstGeom prst="cloud">
+              <a:avLst/>
+            </a:prstGeom>
+            <a:solidFill>
+              <a:schemeClr val="accent1"/>
+            </a:solidFill>
+            <a:ln w="6350" algn="ctr">
+              <a:noFill/>
+              <a:miter lim="800000"/>
+              <a:headEnd/>
+              <a:tailEnd/>
+            </a:ln>
+          </p:spPr>
+          <p:txBody>
+            <a:bodyPr lIns="90000" tIns="72000" rIns="90000" bIns="72000" rtlCol="0" anchor="ctr"/>
+            <a:lstStyle/>
+            <a:p>
+              <a:pPr marR="0" algn="ctr" defTabSz="914400" eaLnBrk="1" fontAlgn="base" latinLnBrk="0" hangingPunct="1">
+                <a:lnSpc>
+                  <a:spcPct val="100000"/>
+                </a:lnSpc>
+                <a:spcBef>
+                  <a:spcPct val="50000"/>
+                </a:spcBef>
+                <a:spcAft>
+                  <a:spcPct val="0"/>
+                </a:spcAft>
+                <a:buClr>
+                  <a:srgbClr val="F0AB00"/>
+                </a:buClr>
+                <a:buSzPct val="80000"/>
+                <a:tabLst/>
+              </a:pPr>
+              <a:endParaRPr kumimoji="0" lang="en-US" sz="1800" b="0" i="0" u="none" strike="noStrike" kern="0" cap="none" spc="0" normalizeH="0" baseline="0" noProof="0" dirty="0" err="1">
+                <a:ln>
+                  <a:noFill/>
+                </a:ln>
+                <a:effectLst/>
+                <a:uLnTx/>
+                <a:uFillTx/>
+                <a:ea typeface="Arial Unicode MS" pitchFamily="34" charset="-128"/>
+                <a:cs typeface="Arial Unicode MS" pitchFamily="34" charset="-128"/>
+              </a:endParaRPr>
+            </a:p>
+          </p:txBody>
+        </p:sp>
+        <p:pic>
+          <p:nvPicPr>
+            <p:cNvPr id="40" name="Graphic 39" descr="User">
+              <a:extLst>
+                <a:ext uri="{FF2B5EF4-FFF2-40B4-BE49-F238E27FC236}">
+                  <a16:creationId xmlns:a16="http://schemas.microsoft.com/office/drawing/2014/main" id="{BE1C7252-16D0-4CFC-BDDF-CCC7479882CF}"/>
+                </a:ext>
+              </a:extLst>
+            </p:cNvPr>
+            <p:cNvPicPr>
+              <a:picLocks noChangeAspect="1"/>
+            </p:cNvPicPr>
+            <p:nvPr/>
+          </p:nvPicPr>
+          <p:blipFill>
+            <a:blip r:embed="rId5">
+              <a:extLst>
+                <a:ext uri="{96DAC541-7B7A-43D3-8B79-37D633B846F1}">
+                  <asvg:svgBlip xmlns:asvg="http://schemas.microsoft.com/office/drawing/2016/SVG/main" r:embed="rId6"/>
+                </a:ext>
+              </a:extLst>
+            </a:blip>
+            <a:stretch>
+              <a:fillRect/>
+            </a:stretch>
+          </p:blipFill>
+          <p:spPr>
+            <a:xfrm>
+              <a:off x="1789937" y="3335277"/>
+              <a:ext cx="914400" cy="914400"/>
+            </a:xfrm>
+            <a:prstGeom prst="rect">
+              <a:avLst/>
+            </a:prstGeom>
+          </p:spPr>
+        </p:pic>
+      </p:grpSp>
+      <p:cxnSp>
+        <p:nvCxnSpPr>
+          <p:cNvPr id="42" name="Connector: Elbow 41">
+            <a:extLst>
+              <a:ext uri="{FF2B5EF4-FFF2-40B4-BE49-F238E27FC236}">
+                <a16:creationId xmlns:a16="http://schemas.microsoft.com/office/drawing/2014/main" id="{B9A0A99E-6624-475B-BBC7-BE1A6C23B42C}"/>
+              </a:ext>
+            </a:extLst>
+          </p:cNvPr>
+          <p:cNvCxnSpPr>
+            <a:cxnSpLocks/>
+            <a:stCxn id="39" idx="1"/>
+            <a:endCxn id="18" idx="1"/>
+          </p:cNvCxnSpPr>
+          <p:nvPr/>
+        </p:nvCxnSpPr>
+        <p:spPr>
+          <a:xfrm rot="16200000" flipH="1">
+            <a:off x="1549591" y="2762671"/>
+            <a:ext cx="691088" cy="761884"/>
+          </a:xfrm>
+          <a:prstGeom prst="bentConnector2">
+            <a:avLst/>
+          </a:prstGeom>
+          <a:ln w="57150">
+            <a:solidFill>
+              <a:schemeClr val="accent1"/>
+            </a:solidFill>
+            <a:headEnd type="none" w="med" len="med"/>
+            <a:tailEnd type="triangle" w="med" len="med"/>
+          </a:ln>
+        </p:spPr>
+        <p:style>
+          <a:lnRef idx="1">
+            <a:schemeClr val="accent1"/>
+          </a:lnRef>
+          <a:fillRef idx="0">
+            <a:schemeClr val="accent1"/>
+          </a:fillRef>
+          <a:effectRef idx="0">
+            <a:schemeClr val="accent1"/>
+          </a:effectRef>
+          <a:fontRef idx="minor">
+            <a:schemeClr val="tx1"/>
+          </a:fontRef>
+        </p:style>
+      </p:cxnSp>
+      <p:cxnSp>
+        <p:nvCxnSpPr>
+          <p:cNvPr id="63" name="Straight Connector 62">
+            <a:extLst>
+              <a:ext uri="{FF2B5EF4-FFF2-40B4-BE49-F238E27FC236}">
+                <a16:creationId xmlns:a16="http://schemas.microsoft.com/office/drawing/2014/main" id="{D052CF1A-EF4E-4426-9C36-3ACB823F1DC3}"/>
+              </a:ext>
+            </a:extLst>
+          </p:cNvPr>
+          <p:cNvCxnSpPr>
+            <a:stCxn id="18" idx="3"/>
+            <a:endCxn id="19" idx="1"/>
+          </p:cNvCxnSpPr>
+          <p:nvPr/>
+        </p:nvCxnSpPr>
+        <p:spPr>
+          <a:xfrm>
+            <a:off x="4146265" y="3489157"/>
+            <a:ext cx="738541" cy="0"/>
+          </a:xfrm>
+          <a:prstGeom prst="line">
+            <a:avLst/>
+          </a:prstGeom>
+          <a:ln w="57150">
+            <a:solidFill>
+              <a:schemeClr val="accent1"/>
+            </a:solidFill>
+            <a:headEnd type="none" w="med" len="med"/>
+            <a:tailEnd type="triangle" w="med" len="med"/>
+          </a:ln>
+        </p:spPr>
+        <p:style>
+          <a:lnRef idx="1">
+            <a:schemeClr val="accent1"/>
+          </a:lnRef>
+          <a:fillRef idx="0">
+            <a:schemeClr val="accent1"/>
+          </a:fillRef>
+          <a:effectRef idx="0">
+            <a:schemeClr val="accent1"/>
+          </a:effectRef>
+          <a:fontRef idx="minor">
+            <a:schemeClr val="tx1"/>
+          </a:fontRef>
+        </p:style>
+      </p:cxnSp>
+      <p:cxnSp>
+        <p:nvCxnSpPr>
+          <p:cNvPr id="65" name="Straight Connector 64">
+            <a:extLst>
+              <a:ext uri="{FF2B5EF4-FFF2-40B4-BE49-F238E27FC236}">
+                <a16:creationId xmlns:a16="http://schemas.microsoft.com/office/drawing/2014/main" id="{C805A0E4-E458-4109-A529-5E6395D587A0}"/>
+              </a:ext>
+            </a:extLst>
+          </p:cNvPr>
+          <p:cNvCxnSpPr>
+            <a:stCxn id="19" idx="3"/>
+            <a:endCxn id="10" idx="1"/>
+          </p:cNvCxnSpPr>
+          <p:nvPr/>
+        </p:nvCxnSpPr>
+        <p:spPr>
+          <a:xfrm>
+            <a:off x="6452214" y="3489157"/>
+            <a:ext cx="1404944" cy="0"/>
+          </a:xfrm>
+          <a:prstGeom prst="line">
+            <a:avLst/>
+          </a:prstGeom>
+          <a:ln w="57150">
+            <a:solidFill>
+              <a:schemeClr val="accent1"/>
+            </a:solidFill>
+            <a:headEnd type="none" w="med" len="med"/>
+            <a:tailEnd type="triangle" w="med" len="med"/>
+          </a:ln>
+        </p:spPr>
+        <p:style>
+          <a:lnRef idx="1">
+            <a:schemeClr val="accent1"/>
+          </a:lnRef>
+          <a:fillRef idx="0">
+            <a:schemeClr val="accent1"/>
+          </a:fillRef>
+          <a:effectRef idx="0">
+            <a:schemeClr val="accent1"/>
+          </a:effectRef>
+          <a:fontRef idx="minor">
+            <a:schemeClr val="tx1"/>
+          </a:fontRef>
+        </p:style>
+      </p:cxnSp>
+      <p:cxnSp>
+        <p:nvCxnSpPr>
+          <p:cNvPr id="67" name="Straight Connector 66">
+            <a:extLst>
+              <a:ext uri="{FF2B5EF4-FFF2-40B4-BE49-F238E27FC236}">
+                <a16:creationId xmlns:a16="http://schemas.microsoft.com/office/drawing/2014/main" id="{4C3E2339-A29C-43AB-AF53-6364372A14BD}"/>
+              </a:ext>
+            </a:extLst>
+          </p:cNvPr>
+          <p:cNvCxnSpPr>
+            <a:stCxn id="19" idx="2"/>
+            <a:endCxn id="31" idx="0"/>
+          </p:cNvCxnSpPr>
+          <p:nvPr/>
+        </p:nvCxnSpPr>
+        <p:spPr>
+          <a:xfrm>
+            <a:off x="5668510" y="3945654"/>
+            <a:ext cx="0" cy="464510"/>
+          </a:xfrm>
+          <a:prstGeom prst="line">
+            <a:avLst/>
+          </a:prstGeom>
+          <a:ln w="57150">
+            <a:solidFill>
+              <a:schemeClr val="tx1"/>
+            </a:solidFill>
+            <a:prstDash val="sysDot"/>
+            <a:headEnd type="triangle" w="med" len="med"/>
+            <a:tailEnd type="none" w="med" len="med"/>
+          </a:ln>
+        </p:spPr>
+        <p:style>
+          <a:lnRef idx="1">
+            <a:schemeClr val="accent1"/>
+          </a:lnRef>
+          <a:fillRef idx="0">
+            <a:schemeClr val="accent1"/>
+          </a:fillRef>
+          <a:effectRef idx="0">
+            <a:schemeClr val="accent1"/>
+          </a:effectRef>
+          <a:fontRef idx="minor">
+            <a:schemeClr val="tx1"/>
+          </a:fontRef>
+        </p:style>
+      </p:cxnSp>
+      <p:cxnSp>
+        <p:nvCxnSpPr>
+          <p:cNvPr id="69" name="Straight Connector 68">
+            <a:extLst>
+              <a:ext uri="{FF2B5EF4-FFF2-40B4-BE49-F238E27FC236}">
+                <a16:creationId xmlns:a16="http://schemas.microsoft.com/office/drawing/2014/main" id="{534E0F4E-A136-4242-8C93-C5836C6796CF}"/>
+              </a:ext>
+            </a:extLst>
+          </p:cNvPr>
+          <p:cNvCxnSpPr>
+            <a:stCxn id="31" idx="3"/>
+            <a:endCxn id="29" idx="1"/>
+          </p:cNvCxnSpPr>
+          <p:nvPr/>
+        </p:nvCxnSpPr>
+        <p:spPr>
+          <a:xfrm>
+            <a:off x="6452214" y="4866661"/>
+            <a:ext cx="1661397" cy="837"/>
+          </a:xfrm>
+          <a:prstGeom prst="line">
+            <a:avLst/>
+          </a:prstGeom>
+          <a:ln w="57150">
+            <a:solidFill>
+              <a:schemeClr val="tx1"/>
+            </a:solidFill>
+            <a:prstDash val="sysDot"/>
+            <a:headEnd type="triangle" w="med" len="med"/>
+            <a:tailEnd type="none" w="med" len="med"/>
+          </a:ln>
+        </p:spPr>
+        <p:style>
+          <a:lnRef idx="1">
+            <a:schemeClr val="accent1"/>
+          </a:lnRef>
+          <a:fillRef idx="0">
+            <a:schemeClr val="accent1"/>
+          </a:fillRef>
+          <a:effectRef idx="0">
+            <a:schemeClr val="accent1"/>
+          </a:effectRef>
+          <a:fontRef idx="minor">
+            <a:schemeClr val="tx1"/>
+          </a:fontRef>
+        </p:style>
+      </p:cxnSp>
+      <p:sp>
+        <p:nvSpPr>
+          <p:cNvPr id="70" name="Speech Bubble: Rectangle 69">
+            <a:extLst>
+              <a:ext uri="{FF2B5EF4-FFF2-40B4-BE49-F238E27FC236}">
+                <a16:creationId xmlns:a16="http://schemas.microsoft.com/office/drawing/2014/main" id="{289E23CB-40FD-44C8-B9AD-5ED101D48D38}"/>
+              </a:ext>
+            </a:extLst>
+          </p:cNvPr>
+          <p:cNvSpPr/>
+          <p:nvPr/>
+        </p:nvSpPr>
+        <p:spPr bwMode="gray">
+          <a:xfrm>
+            <a:off x="389308" y="4392861"/>
+            <a:ext cx="2042069" cy="921007"/>
+          </a:xfrm>
+          <a:prstGeom prst="wedgeRectCallout">
+            <a:avLst>
+              <a:gd name="adj1" fmla="val 55139"/>
+              <a:gd name="adj2" fmla="val -89213"/>
+            </a:avLst>
+          </a:prstGeom>
+          <a:ln>
+            <a:headEnd/>
+            <a:tailEnd/>
+          </a:ln>
+        </p:spPr>
+        <p:style>
+          <a:lnRef idx="2">
+            <a:schemeClr val="accent5"/>
+          </a:lnRef>
+          <a:fillRef idx="1">
+            <a:schemeClr val="lt1"/>
+          </a:fillRef>
+          <a:effectRef idx="0">
+            <a:schemeClr val="accent5"/>
+          </a:effectRef>
+          <a:fontRef idx="minor">
+            <a:schemeClr val="dk1"/>
+          </a:fontRef>
+        </p:style>
+        <p:txBody>
+          <a:bodyPr lIns="90000" tIns="72000" rIns="90000" bIns="72000" rtlCol="0" anchor="ctr"/>
+          <a:lstStyle/>
+          <a:p>
+            <a:pPr marR="0" algn="ctr" defTabSz="914400" eaLnBrk="1" fontAlgn="base" latinLnBrk="0" hangingPunct="1">
+              <a:lnSpc>
+                <a:spcPct val="100000"/>
+              </a:lnSpc>
+              <a:spcBef>
+                <a:spcPct val="50000"/>
+              </a:spcBef>
+              <a:spcAft>
+                <a:spcPct val="0"/>
+              </a:spcAft>
+              <a:buClr>
+                <a:srgbClr val="F0AB00"/>
+              </a:buClr>
+              <a:buSzPct val="80000"/>
+              <a:tabLst/>
+            </a:pPr>
+            <a:r>
+              <a:rPr lang="de-DE" sz="1800" kern="0" dirty="0">
+                <a:ea typeface="Arial Unicode MS" pitchFamily="34" charset="-128"/>
+                <a:cs typeface="Arial Unicode MS" pitchFamily="34" charset="-128"/>
+                <a:hlinkClick r:id="rId7"/>
+              </a:rPr>
+              <a:t>*.ingress.com</a:t>
+            </a:r>
+            <a:r>
+              <a:rPr lang="de-DE" sz="1800" kern="0" dirty="0">
+                <a:ea typeface="Arial Unicode MS" pitchFamily="34" charset="-128"/>
+                <a:cs typeface="Arial Unicode MS" pitchFamily="34" charset="-128"/>
+              </a:rPr>
+              <a:t> </a:t>
+            </a:r>
+          </a:p>
+          <a:p>
+            <a:pPr algn="ctr" defTabSz="914400" fontAlgn="base">
+              <a:spcBef>
+                <a:spcPct val="50000"/>
+              </a:spcBef>
+              <a:spcAft>
+                <a:spcPct val="0"/>
+              </a:spcAft>
+              <a:buClr>
+                <a:srgbClr val="F0AB00"/>
+              </a:buClr>
+              <a:buSzPct val="80000"/>
+            </a:pPr>
+            <a:r>
+              <a:rPr lang="de-DE" sz="1800" kern="0" dirty="0">
+                <a:ea typeface="Arial Unicode MS" pitchFamily="34" charset="-128"/>
+                <a:cs typeface="Arial Unicode MS" pitchFamily="34" charset="-128"/>
+              </a:rPr>
+              <a:t>35.205.166.164</a:t>
+            </a:r>
+            <a:endParaRPr kumimoji="0" lang="de-DE" sz="1800" b="0" i="0" u="none" strike="noStrike" kern="0" cap="none" spc="0" normalizeH="0" baseline="0" noProof="0" dirty="0">
+              <a:ln>
+                <a:noFill/>
+              </a:ln>
+              <a:effectLst/>
+              <a:uLnTx/>
+              <a:uFillTx/>
+              <a:ea typeface="Arial Unicode MS" pitchFamily="34" charset="-128"/>
+              <a:cs typeface="Arial Unicode MS" pitchFamily="34" charset="-128"/>
+            </a:endParaRPr>
+          </a:p>
+        </p:txBody>
+      </p:sp>
+    </p:spTree>
+    <p:extLst>
+      <p:ext uri="{BB962C8B-B14F-4D97-AF65-F5344CB8AC3E}">
+        <p14:creationId xmlns:p14="http://schemas.microsoft.com/office/powerpoint/2010/main" val="4031003063"/>
+      </p:ext>
+    </p:extLst>
+  </p:cSld>
+  <p:clrMapOvr>
+    <a:masterClrMapping/>
+  </p:clrMapOvr>
+  <p:timing>
+    <p:tnLst>
+      <p:par>
+        <p:cTn id="1" dur="indefinite" restart="never" nodeType="tmRoot">
+          <p:childTnLst>
+            <p:seq concurrent="1" nextAc="seek">
+              <p:cTn id="2" dur="indefinite" nodeType="mainSeq">
+                <p:childTnLst>
+                  <p:par>
+                    <p:cTn id="3" fill="hold">
+                      <p:stCondLst>
+                        <p:cond delay="indefinite"/>
+                      </p:stCondLst>
+                      <p:childTnLst>
+                        <p:par>
+                          <p:cTn id="4" fill="hold">
+                            <p:stCondLst>
+                              <p:cond delay="0"/>
+                            </p:stCondLst>
+                            <p:childTnLst>
+                              <p:par>
+                                <p:cTn id="5" presetID="1" presetClass="entr" presetSubtype="0" fill="hold" grpId="0" nodeType="clickEffect">
+                                  <p:stCondLst>
+                                    <p:cond delay="0"/>
+                                  </p:stCondLst>
+                                  <p:childTnLst>
+                                    <p:set>
+                                      <p:cBhvr>
+                                        <p:cTn id="6" dur="1" fill="hold">
+                                          <p:stCondLst>
+                                            <p:cond delay="0"/>
+                                          </p:stCondLst>
+                                        </p:cTn>
+                                        <p:tgtEl>
+                                          <p:spTgt spid="16"/>
+                                        </p:tgtEl>
+                                        <p:attrNameLst>
+                                          <p:attrName>style.visibility</p:attrName>
+                                        </p:attrNameLst>
+                                      </p:cBhvr>
+                                      <p:to>
+                                        <p:strVal val="visible"/>
+                                      </p:to>
+                                    </p:set>
+                                  </p:childTnLst>
+                                </p:cTn>
+                              </p:par>
+                              <p:par>
+                                <p:cTn id="7" presetID="1" presetClass="entr" presetSubtype="0" fill="hold" grpId="0" nodeType="withEffect">
+                                  <p:stCondLst>
+                                    <p:cond delay="0"/>
+                                  </p:stCondLst>
+                                  <p:childTnLst>
+                                    <p:set>
+                                      <p:cBhvr>
+                                        <p:cTn id="8" dur="1" fill="hold">
+                                          <p:stCondLst>
+                                            <p:cond delay="0"/>
+                                          </p:stCondLst>
+                                        </p:cTn>
+                                        <p:tgtEl>
+                                          <p:spTgt spid="19"/>
+                                        </p:tgtEl>
+                                        <p:attrNameLst>
+                                          <p:attrName>style.visibility</p:attrName>
+                                        </p:attrNameLst>
+                                      </p:cBhvr>
+                                      <p:to>
+                                        <p:strVal val="visible"/>
+                                      </p:to>
+                                    </p:set>
+                                  </p:childTnLst>
+                                </p:cTn>
+                              </p:par>
+                              <p:par>
+                                <p:cTn id="9" presetID="1" presetClass="entr" presetSubtype="0" fill="hold" grpId="0" nodeType="withEffect">
+                                  <p:stCondLst>
+                                    <p:cond delay="0"/>
+                                  </p:stCondLst>
+                                  <p:childTnLst>
+                                    <p:set>
+                                      <p:cBhvr>
+                                        <p:cTn id="10" dur="1" fill="hold">
+                                          <p:stCondLst>
+                                            <p:cond delay="0"/>
+                                          </p:stCondLst>
+                                        </p:cTn>
+                                        <p:tgtEl>
+                                          <p:spTgt spid="18"/>
+                                        </p:tgtEl>
+                                        <p:attrNameLst>
+                                          <p:attrName>style.visibility</p:attrName>
+                                        </p:attrNameLst>
+                                      </p:cBhvr>
+                                      <p:to>
+                                        <p:strVal val="visible"/>
+                                      </p:to>
+                                    </p:set>
+                                  </p:childTnLst>
+                                </p:cTn>
+                              </p:par>
+                              <p:par>
+                                <p:cTn id="11" presetID="1" presetClass="entr" presetSubtype="0" fill="hold" nodeType="withEffect">
+                                  <p:stCondLst>
+                                    <p:cond delay="0"/>
+                                  </p:stCondLst>
+                                  <p:childTnLst>
+                                    <p:set>
+                                      <p:cBhvr>
+                                        <p:cTn id="12" dur="1" fill="hold">
+                                          <p:stCondLst>
+                                            <p:cond delay="0"/>
+                                          </p:stCondLst>
+                                        </p:cTn>
+                                        <p:tgtEl>
+                                          <p:spTgt spid="63"/>
+                                        </p:tgtEl>
+                                        <p:attrNameLst>
+                                          <p:attrName>style.visibility</p:attrName>
+                                        </p:attrNameLst>
+                                      </p:cBhvr>
+                                      <p:to>
+                                        <p:strVal val="visible"/>
+                                      </p:to>
+                                    </p:set>
+                                  </p:childTnLst>
+                                </p:cTn>
+                              </p:par>
+                              <p:par>
+                                <p:cTn id="13" presetID="1" presetClass="entr" presetSubtype="0" fill="hold" grpId="0" nodeType="withEffect">
+                                  <p:stCondLst>
+                                    <p:cond delay="0"/>
+                                  </p:stCondLst>
+                                  <p:childTnLst>
+                                    <p:set>
+                                      <p:cBhvr>
+                                        <p:cTn id="14" dur="1" fill="hold">
+                                          <p:stCondLst>
+                                            <p:cond delay="0"/>
+                                          </p:stCondLst>
+                                        </p:cTn>
+                                        <p:tgtEl>
+                                          <p:spTgt spid="31"/>
+                                        </p:tgtEl>
+                                        <p:attrNameLst>
+                                          <p:attrName>style.visibility</p:attrName>
+                                        </p:attrNameLst>
+                                      </p:cBhvr>
+                                      <p:to>
+                                        <p:strVal val="visible"/>
+                                      </p:to>
+                                    </p:set>
+                                  </p:childTnLst>
+                                </p:cTn>
+                              </p:par>
+                              <p:par>
+                                <p:cTn id="15" presetID="1" presetClass="entr" presetSubtype="0" fill="hold" grpId="0" nodeType="withEffect">
+                                  <p:stCondLst>
+                                    <p:cond delay="0"/>
+                                  </p:stCondLst>
+                                  <p:childTnLst>
+                                    <p:set>
+                                      <p:cBhvr>
+                                        <p:cTn id="16" dur="1" fill="hold">
+                                          <p:stCondLst>
+                                            <p:cond delay="0"/>
+                                          </p:stCondLst>
+                                        </p:cTn>
+                                        <p:tgtEl>
+                                          <p:spTgt spid="70"/>
+                                        </p:tgtEl>
+                                        <p:attrNameLst>
+                                          <p:attrName>style.visibility</p:attrName>
+                                        </p:attrNameLst>
+                                      </p:cBhvr>
+                                      <p:to>
+                                        <p:strVal val="visible"/>
+                                      </p:to>
+                                    </p:set>
+                                  </p:childTnLst>
+                                </p:cTn>
+                              </p:par>
+                            </p:childTnLst>
+                          </p:cTn>
+                        </p:par>
+                      </p:childTnLst>
+                    </p:cTn>
+                  </p:par>
+                  <p:par>
+                    <p:cTn id="17" fill="hold">
+                      <p:stCondLst>
+                        <p:cond delay="indefinite"/>
+                      </p:stCondLst>
+                      <p:childTnLst>
+                        <p:par>
+                          <p:cTn id="18" fill="hold">
+                            <p:stCondLst>
+                              <p:cond delay="0"/>
+                            </p:stCondLst>
+                            <p:childTnLst>
+                              <p:par>
+                                <p:cTn id="19" presetID="1" presetClass="entr" presetSubtype="0" fill="hold" grpId="0" nodeType="clickEffect">
+                                  <p:stCondLst>
+                                    <p:cond delay="0"/>
+                                  </p:stCondLst>
+                                  <p:childTnLst>
+                                    <p:set>
+                                      <p:cBhvr>
+                                        <p:cTn id="20" dur="1" fill="hold">
+                                          <p:stCondLst>
+                                            <p:cond delay="0"/>
+                                          </p:stCondLst>
+                                        </p:cTn>
+                                        <p:tgtEl>
+                                          <p:spTgt spid="30"/>
+                                        </p:tgtEl>
+                                        <p:attrNameLst>
+                                          <p:attrName>style.visibility</p:attrName>
+                                        </p:attrNameLst>
+                                      </p:cBhvr>
+                                      <p:to>
+                                        <p:strVal val="visible"/>
+                                      </p:to>
+                                    </p:set>
+                                  </p:childTnLst>
+                                </p:cTn>
+                              </p:par>
+                              <p:par>
+                                <p:cTn id="21" presetID="1" presetClass="entr" presetSubtype="0" fill="hold" nodeType="withEffect">
+                                  <p:stCondLst>
+                                    <p:cond delay="0"/>
+                                  </p:stCondLst>
+                                  <p:childTnLst>
+                                    <p:set>
+                                      <p:cBhvr>
+                                        <p:cTn id="22" dur="1" fill="hold">
+                                          <p:stCondLst>
+                                            <p:cond delay="0"/>
+                                          </p:stCondLst>
+                                        </p:cTn>
+                                        <p:tgtEl>
+                                          <p:spTgt spid="29"/>
+                                        </p:tgtEl>
+                                        <p:attrNameLst>
+                                          <p:attrName>style.visibility</p:attrName>
+                                        </p:attrNameLst>
+                                      </p:cBhvr>
+                                      <p:to>
+                                        <p:strVal val="visible"/>
+                                      </p:to>
+                                    </p:set>
+                                  </p:childTnLst>
+                                </p:cTn>
+                              </p:par>
+                              <p:par>
+                                <p:cTn id="23" presetID="1" presetClass="entr" presetSubtype="0" fill="hold" nodeType="withEffect">
+                                  <p:stCondLst>
+                                    <p:cond delay="0"/>
+                                  </p:stCondLst>
+                                  <p:childTnLst>
+                                    <p:set>
+                                      <p:cBhvr>
+                                        <p:cTn id="24" dur="1" fill="hold">
+                                          <p:stCondLst>
+                                            <p:cond delay="0"/>
+                                          </p:stCondLst>
+                                        </p:cTn>
+                                        <p:tgtEl>
+                                          <p:spTgt spid="69"/>
+                                        </p:tgtEl>
+                                        <p:attrNameLst>
+                                          <p:attrName>style.visibility</p:attrName>
+                                        </p:attrNameLst>
+                                      </p:cBhvr>
+                                      <p:to>
+                                        <p:strVal val="visible"/>
+                                      </p:to>
+                                    </p:set>
+                                  </p:childTnLst>
+                                </p:cTn>
+                              </p:par>
+                              <p:par>
+                                <p:cTn id="25" presetID="1" presetClass="entr" presetSubtype="0" fill="hold" nodeType="withEffect">
+                                  <p:stCondLst>
+                                    <p:cond delay="0"/>
+                                  </p:stCondLst>
+                                  <p:childTnLst>
+                                    <p:set>
+                                      <p:cBhvr>
+                                        <p:cTn id="26" dur="1" fill="hold">
+                                          <p:stCondLst>
+                                            <p:cond delay="0"/>
+                                          </p:stCondLst>
+                                        </p:cTn>
+                                        <p:tgtEl>
+                                          <p:spTgt spid="67"/>
+                                        </p:tgtEl>
+                                        <p:attrNameLst>
+                                          <p:attrName>style.visibility</p:attrName>
+                                        </p:attrNameLst>
+                                      </p:cBhvr>
+                                      <p:to>
+                                        <p:strVal val="visible"/>
+                                      </p:to>
+                                    </p:set>
+                                  </p:childTnLst>
+                                </p:cTn>
+                              </p:par>
+                            </p:childTnLst>
+                          </p:cTn>
+                        </p:par>
+                      </p:childTnLst>
+                    </p:cTn>
+                  </p:par>
+                  <p:par>
+                    <p:cTn id="27" fill="hold">
+                      <p:stCondLst>
+                        <p:cond delay="indefinite"/>
+                      </p:stCondLst>
+                      <p:childTnLst>
+                        <p:par>
+                          <p:cTn id="28" fill="hold">
+                            <p:stCondLst>
+                              <p:cond delay="0"/>
+                            </p:stCondLst>
+                            <p:childTnLst>
+                              <p:par>
+                                <p:cTn id="29" presetID="1" presetClass="entr" presetSubtype="0" fill="hold" nodeType="clickEffect">
+                                  <p:stCondLst>
+                                    <p:cond delay="0"/>
+                                  </p:stCondLst>
+                                  <p:childTnLst>
+                                    <p:set>
+                                      <p:cBhvr>
+                                        <p:cTn id="30" dur="1" fill="hold">
+                                          <p:stCondLst>
+                                            <p:cond delay="0"/>
+                                          </p:stCondLst>
+                                        </p:cTn>
+                                        <p:tgtEl>
+                                          <p:spTgt spid="42"/>
+                                        </p:tgtEl>
+                                        <p:attrNameLst>
+                                          <p:attrName>style.visibility</p:attrName>
+                                        </p:attrNameLst>
+                                      </p:cBhvr>
+                                      <p:to>
+                                        <p:strVal val="visible"/>
+                                      </p:to>
+                                    </p:set>
+                                  </p:childTnLst>
+                                </p:cTn>
+                              </p:par>
+                              <p:par>
+                                <p:cTn id="31" presetID="1" presetClass="entr" presetSubtype="0" fill="hold" nodeType="withEffect">
+                                  <p:stCondLst>
+                                    <p:cond delay="0"/>
+                                  </p:stCondLst>
+                                  <p:childTnLst>
+                                    <p:set>
+                                      <p:cBhvr>
+                                        <p:cTn id="32" dur="1" fill="hold">
+                                          <p:stCondLst>
+                                            <p:cond delay="0"/>
+                                          </p:stCondLst>
+                                        </p:cTn>
+                                        <p:tgtEl>
+                                          <p:spTgt spid="65"/>
+                                        </p:tgtEl>
+                                        <p:attrNameLst>
+                                          <p:attrName>style.visibility</p:attrName>
+                                        </p:attrNameLst>
+                                      </p:cBhvr>
+                                      <p:to>
+                                        <p:strVal val="visible"/>
+                                      </p:to>
+                                    </p:set>
+                                  </p:childTnLst>
+                                </p:cTn>
+                              </p:par>
+                            </p:childTnLst>
+                          </p:cTn>
+                        </p:par>
+                      </p:childTnLst>
+                    </p:cTn>
+                  </p:par>
+                </p:childTnLst>
+              </p:cTn>
+              <p:prevCondLst>
+                <p:cond evt="onPrev" delay="0">
+                  <p:tgtEl>
+                    <p:sldTgt/>
+                  </p:tgtEl>
+                </p:cond>
+              </p:prevCondLst>
+              <p:nextCondLst>
+                <p:cond evt="onNext" delay="0">
+                  <p:tgtEl>
+                    <p:sldTgt/>
+                  </p:tgtEl>
+                </p:cond>
+              </p:nextCondLst>
+            </p:seq>
+          </p:childTnLst>
+        </p:cTn>
+      </p:par>
+    </p:tnLst>
+    <p:bldLst>
+      <p:bldP spid="16" grpId="0" animBg="1"/>
+      <p:bldP spid="18" grpId="0" animBg="1"/>
+      <p:bldP spid="19" grpId="0" animBg="1"/>
+      <p:bldP spid="30" grpId="0"/>
+      <p:bldP spid="31" grpId="0" animBg="1"/>
+      <p:bldP spid="70" grpId="0" animBg="1"/>
+    </p:bldLst>
+  </p:timing>
+</p:sld>
+</file>
+
+<file path=ppt/slides/slide5.xml><?xml version="1.0" encoding="utf-8"?>
+<p:sld xmlns:a="http://schemas.openxmlformats.org/drawingml/2006/main" xmlns:r="http://schemas.openxmlformats.org/officeDocument/2006/relationships" xmlns:p="http://schemas.openxmlformats.org/presentationml/2006/main">
+  <p:cSld>
+    <p:spTree>
+      <p:nvGrpSpPr>
+        <p:cNvPr id="1" name=""/>
+        <p:cNvGrpSpPr/>
+        <p:nvPr/>
+      </p:nvGrpSpPr>
+      <p:grpSpPr>
+        <a:xfrm>
+          <a:off x="0" y="0"/>
+          <a:ext cx="0" cy="0"/>
+          <a:chOff x="0" y="0"/>
+          <a:chExt cx="0" cy="0"/>
+        </a:xfrm>
+      </p:grpSpPr>
+      <p:sp>
+        <p:nvSpPr>
           <p:cNvPr id="2" name="Title 1">
             <a:extLst>
               <a:ext uri="{FF2B5EF4-FFF2-40B4-BE49-F238E27FC236}">
@@ -25100,7 +27615,7 @@
 </p:sld>
 </file>
 
-<file path=ppt/slides/slide5.xml><?xml version="1.0" encoding="utf-8"?>
+<file path=ppt/slides/slide6.xml><?xml version="1.0" encoding="utf-8"?>
 <p:sld xmlns:a="http://schemas.openxmlformats.org/drawingml/2006/main" xmlns:r="http://schemas.openxmlformats.org/officeDocument/2006/relationships" xmlns:p="http://schemas.openxmlformats.org/presentationml/2006/main">
   <p:cSld>
     <p:spTree>
@@ -25131,8 +27646,8 @@
         </p:nvSpPr>
         <p:spPr bwMode="gray">
           <a:xfrm>
-            <a:off x="6899146" y="1206858"/>
-            <a:ext cx="4750309" cy="5093357"/>
+            <a:off x="5223956" y="1206858"/>
+            <a:ext cx="6425500" cy="5093357"/>
           </a:xfrm>
           <a:prstGeom prst="roundRect">
             <a:avLst/>
@@ -26480,7 +28995,7 @@
 </p:sld>
 </file>
 
-<file path=ppt/slides/slide6.xml><?xml version="1.0" encoding="utf-8"?>
+<file path=ppt/slides/slide7.xml><?xml version="1.0" encoding="utf-8"?>
 <p:sld xmlns:a="http://schemas.openxmlformats.org/drawingml/2006/main" xmlns:r="http://schemas.openxmlformats.org/officeDocument/2006/relationships" xmlns:p="http://schemas.openxmlformats.org/presentationml/2006/main">
   <p:cSld>
     <p:spTree>
@@ -26861,7 +29376,7 @@
 </p:sld>
 </file>
 
-<file path=ppt/slides/slide7.xml><?xml version="1.0" encoding="utf-8"?>
+<file path=ppt/slides/slide8.xml><?xml version="1.0" encoding="utf-8"?>
 <p:sld xmlns:a="http://schemas.openxmlformats.org/drawingml/2006/main" xmlns:r="http://schemas.openxmlformats.org/officeDocument/2006/relationships" xmlns:p="http://schemas.openxmlformats.org/presentationml/2006/main">
   <p:cSld>
     <p:spTree>
@@ -26943,7 +29458,7 @@
 </p:sld>
 </file>
 
-<file path=ppt/slides/slide8.xml><?xml version="1.0" encoding="utf-8"?>
+<file path=ppt/slides/slide9.xml><?xml version="1.0" encoding="utf-8"?>
 <p:sld xmlns:a="http://schemas.openxmlformats.org/drawingml/2006/main" xmlns:r="http://schemas.openxmlformats.org/officeDocument/2006/relationships" xmlns:p="http://schemas.openxmlformats.org/presentationml/2006/main">
   <p:cSld>
     <p:spTree>
@@ -26974,8 +29489,8 @@
         </p:nvSpPr>
         <p:spPr bwMode="gray">
           <a:xfrm>
-            <a:off x="7397496" y="1206858"/>
-            <a:ext cx="4251959" cy="5093357"/>
+            <a:off x="5270643" y="1206858"/>
+            <a:ext cx="6378813" cy="5093357"/>
           </a:xfrm>
           <a:prstGeom prst="roundRect">
             <a:avLst/>
@@ -28705,518 +31220,6 @@
     <p:extLst>
       <p:ext uri="{BB962C8B-B14F-4D97-AF65-F5344CB8AC3E}">
         <p14:creationId xmlns:p14="http://schemas.microsoft.com/office/powerpoint/2010/main" val="3337258942"/>
-      </p:ext>
-    </p:extLst>
-  </p:cSld>
-  <p:clrMapOvr>
-    <a:masterClrMapping/>
-  </p:clrMapOvr>
-</p:sld>
-</file>
-
-<file path=ppt/slides/slide9.xml><?xml version="1.0" encoding="utf-8"?>
-<p:sld xmlns:a="http://schemas.openxmlformats.org/drawingml/2006/main" xmlns:r="http://schemas.openxmlformats.org/officeDocument/2006/relationships" xmlns:p="http://schemas.openxmlformats.org/presentationml/2006/main">
-  <p:cSld>
-    <p:spTree>
-      <p:nvGrpSpPr>
-        <p:cNvPr id="1" name=""/>
-        <p:cNvGrpSpPr/>
-        <p:nvPr/>
-      </p:nvGrpSpPr>
-      <p:grpSpPr>
-        <a:xfrm>
-          <a:off x="0" y="0"/>
-          <a:ext cx="0" cy="0"/>
-          <a:chOff x="0" y="0"/>
-          <a:chExt cx="0" cy="0"/>
-        </a:xfrm>
-      </p:grpSpPr>
-      <p:pic>
-        <p:nvPicPr>
-          <p:cNvPr id="3" name="Picture 2">
-            <a:extLst>
-              <a:ext uri="{FF2B5EF4-FFF2-40B4-BE49-F238E27FC236}">
-                <a16:creationId xmlns:a16="http://schemas.microsoft.com/office/drawing/2014/main" id="{C8CAC47D-D6C8-41F3-9DEC-9D25F9D43C92}"/>
-              </a:ext>
-            </a:extLst>
-          </p:cNvPr>
-          <p:cNvPicPr>
-            <a:picLocks noChangeAspect="1"/>
-          </p:cNvPicPr>
-          <p:nvPr/>
-        </p:nvPicPr>
-        <p:blipFill>
-          <a:blip r:embed="rId3"/>
-          <a:stretch>
-            <a:fillRect/>
-          </a:stretch>
-        </p:blipFill>
-        <p:spPr>
-          <a:xfrm>
-            <a:off x="504001" y="1134348"/>
-            <a:ext cx="7047619" cy="4990476"/>
-          </a:xfrm>
-          <a:prstGeom prst="rect">
-            <a:avLst/>
-          </a:prstGeom>
-          <a:ln>
-            <a:solidFill>
-              <a:schemeClr val="tx1"/>
-            </a:solidFill>
-          </a:ln>
-        </p:spPr>
-      </p:pic>
-      <p:sp>
-        <p:nvSpPr>
-          <p:cNvPr id="2" name="Title 1">
-            <a:extLst>
-              <a:ext uri="{FF2B5EF4-FFF2-40B4-BE49-F238E27FC236}">
-                <a16:creationId xmlns:a16="http://schemas.microsoft.com/office/drawing/2014/main" id="{C4075F74-C4BE-475F-90D1-3AD64BAAF7E0}"/>
-              </a:ext>
-            </a:extLst>
-          </p:cNvPr>
-          <p:cNvSpPr>
-            <a:spLocks noGrp="1"/>
-          </p:cNvSpPr>
-          <p:nvPr>
-            <p:ph type="title"/>
-          </p:nvPr>
-        </p:nvSpPr>
-        <p:spPr/>
-        <p:txBody>
-          <a:bodyPr/>
-          <a:lstStyle/>
-          <a:p>
-            <a:r>
-              <a:rPr lang="en-US" dirty="0"/>
-              <a:t>Ingress resource with fanout</a:t>
-            </a:r>
-          </a:p>
-        </p:txBody>
-      </p:sp>
-      <p:sp>
-        <p:nvSpPr>
-          <p:cNvPr id="4" name="Speech Bubble: Rectangle 3">
-            <a:extLst>
-              <a:ext uri="{FF2B5EF4-FFF2-40B4-BE49-F238E27FC236}">
-                <a16:creationId xmlns:a16="http://schemas.microsoft.com/office/drawing/2014/main" id="{91A799BB-963F-47BC-97A7-1EBE8A747FA9}"/>
-              </a:ext>
-            </a:extLst>
-          </p:cNvPr>
-          <p:cNvSpPr/>
-          <p:nvPr/>
-        </p:nvSpPr>
-        <p:spPr bwMode="gray">
-          <a:xfrm>
-            <a:off x="8012317" y="2756491"/>
-            <a:ext cx="3678160" cy="677425"/>
-          </a:xfrm>
-          <a:prstGeom prst="wedgeRectCallout">
-            <a:avLst>
-              <a:gd name="adj1" fmla="val -84814"/>
-              <a:gd name="adj2" fmla="val -1164"/>
-            </a:avLst>
-          </a:prstGeom>
-          <a:ln>
-            <a:headEnd/>
-            <a:tailEnd/>
-          </a:ln>
-        </p:spPr>
-        <p:style>
-          <a:lnRef idx="2">
-            <a:schemeClr val="accent5"/>
-          </a:lnRef>
-          <a:fillRef idx="1">
-            <a:schemeClr val="lt1"/>
-          </a:fillRef>
-          <a:effectRef idx="0">
-            <a:schemeClr val="accent5"/>
-          </a:effectRef>
-          <a:fontRef idx="minor">
-            <a:schemeClr val="dk1"/>
-          </a:fontRef>
-        </p:style>
-        <p:txBody>
-          <a:bodyPr lIns="90000" tIns="72000" rIns="90000" bIns="72000" rtlCol="0" anchor="ctr"/>
-          <a:lstStyle/>
-          <a:p>
-            <a:pPr marR="0" algn="ctr" defTabSz="914400" eaLnBrk="1" fontAlgn="base" latinLnBrk="0" hangingPunct="1">
-              <a:lnSpc>
-                <a:spcPct val="100000"/>
-              </a:lnSpc>
-              <a:spcBef>
-                <a:spcPct val="50000"/>
-              </a:spcBef>
-              <a:spcAft>
-                <a:spcPct val="0"/>
-              </a:spcAft>
-              <a:buClr>
-                <a:srgbClr val="F0AB00"/>
-              </a:buClr>
-              <a:buSzPct val="80000"/>
-              <a:tabLst/>
-            </a:pPr>
-            <a:r>
-              <a:rPr lang="en-US" sz="1800" kern="0" dirty="0">
-                <a:ea typeface="Arial Unicode MS" pitchFamily="34" charset="-128"/>
-                <a:cs typeface="Arial Unicode MS" pitchFamily="34" charset="-128"/>
-              </a:rPr>
-              <a:t>spec with rules &amp; managed host</a:t>
-            </a:r>
-            <a:endParaRPr kumimoji="0" lang="en-US" sz="1800" b="0" i="0" u="none" strike="noStrike" kern="0" cap="none" spc="0" normalizeH="0" baseline="0" noProof="0" dirty="0">
-              <a:ln>
-                <a:noFill/>
-              </a:ln>
-              <a:effectLst/>
-              <a:uLnTx/>
-              <a:uFillTx/>
-              <a:ea typeface="Arial Unicode MS" pitchFamily="34" charset="-128"/>
-              <a:cs typeface="Arial Unicode MS" pitchFamily="34" charset="-128"/>
-            </a:endParaRPr>
-          </a:p>
-        </p:txBody>
-      </p:sp>
-      <p:sp>
-        <p:nvSpPr>
-          <p:cNvPr id="6" name="Speech Bubble: Rectangle 5">
-            <a:extLst>
-              <a:ext uri="{FF2B5EF4-FFF2-40B4-BE49-F238E27FC236}">
-                <a16:creationId xmlns:a16="http://schemas.microsoft.com/office/drawing/2014/main" id="{2A2CFC32-B275-495E-8ED6-11D7A98B67A4}"/>
-              </a:ext>
-            </a:extLst>
-          </p:cNvPr>
-          <p:cNvSpPr/>
-          <p:nvPr/>
-        </p:nvSpPr>
-        <p:spPr bwMode="gray">
-          <a:xfrm>
-            <a:off x="7190633" y="4428919"/>
-            <a:ext cx="4505724" cy="677425"/>
-          </a:xfrm>
-          <a:prstGeom prst="wedgeRectCallout">
-            <a:avLst>
-              <a:gd name="adj1" fmla="val -78085"/>
-              <a:gd name="adj2" fmla="val 2845"/>
-            </a:avLst>
-          </a:prstGeom>
-          <a:ln>
-            <a:headEnd/>
-            <a:tailEnd/>
-          </a:ln>
-        </p:spPr>
-        <p:style>
-          <a:lnRef idx="2">
-            <a:schemeClr val="accent5"/>
-          </a:lnRef>
-          <a:fillRef idx="1">
-            <a:schemeClr val="lt1"/>
-          </a:fillRef>
-          <a:effectRef idx="0">
-            <a:schemeClr val="accent5"/>
-          </a:effectRef>
-          <a:fontRef idx="minor">
-            <a:schemeClr val="dk1"/>
-          </a:fontRef>
-        </p:style>
-        <p:txBody>
-          <a:bodyPr lIns="90000" tIns="72000" rIns="90000" bIns="72000" rtlCol="0" anchor="ctr"/>
-          <a:lstStyle/>
-          <a:p>
-            <a:pPr marR="0" algn="ctr" defTabSz="914400" eaLnBrk="1" fontAlgn="base" latinLnBrk="0" hangingPunct="1">
-              <a:lnSpc>
-                <a:spcPct val="100000"/>
-              </a:lnSpc>
-              <a:spcBef>
-                <a:spcPct val="50000"/>
-              </a:spcBef>
-              <a:spcAft>
-                <a:spcPct val="0"/>
-              </a:spcAft>
-              <a:buClr>
-                <a:srgbClr val="F0AB00"/>
-              </a:buClr>
-              <a:buSzPct val="80000"/>
-              <a:tabLst/>
-            </a:pPr>
-            <a:r>
-              <a:rPr lang="en-US" sz="1800" kern="0" dirty="0">
-                <a:ea typeface="Arial Unicode MS" pitchFamily="34" charset="-128"/>
-                <a:cs typeface="Arial Unicode MS" pitchFamily="34" charset="-128"/>
-              </a:rPr>
-              <a:t>Traffic to /</a:t>
-            </a:r>
-            <a:r>
-              <a:rPr lang="en-US" sz="1800" b="1" kern="0" dirty="0">
-                <a:ea typeface="Arial Unicode MS" pitchFamily="34" charset="-128"/>
-                <a:cs typeface="Arial Unicode MS" pitchFamily="34" charset="-128"/>
-              </a:rPr>
-              <a:t>my </a:t>
-            </a:r>
-            <a:r>
-              <a:rPr lang="en-US" sz="1800" kern="0" dirty="0">
-                <a:ea typeface="Arial Unicode MS" pitchFamily="34" charset="-128"/>
-                <a:cs typeface="Arial Unicode MS" pitchFamily="34" charset="-128"/>
-              </a:rPr>
-              <a:t>is forwarded to service </a:t>
-            </a:r>
-            <a:r>
-              <a:rPr lang="en-US" sz="1800" b="1" kern="0" dirty="0" err="1">
-                <a:ea typeface="Arial Unicode MS" pitchFamily="34" charset="-128"/>
-                <a:cs typeface="Arial Unicode MS" pitchFamily="34" charset="-128"/>
-              </a:rPr>
-              <a:t>mynginx</a:t>
-            </a:r>
-            <a:r>
-              <a:rPr lang="en-US" sz="1800" b="1" kern="0" dirty="0">
-                <a:ea typeface="Arial Unicode MS" pitchFamily="34" charset="-128"/>
-                <a:cs typeface="Arial Unicode MS" pitchFamily="34" charset="-128"/>
-              </a:rPr>
-              <a:t>-service </a:t>
-            </a:r>
-            <a:r>
-              <a:rPr lang="en-US" sz="1800" kern="0" dirty="0">
-                <a:ea typeface="Arial Unicode MS" pitchFamily="34" charset="-128"/>
-                <a:cs typeface="Arial Unicode MS" pitchFamily="34" charset="-128"/>
-              </a:rPr>
-              <a:t>on port 80</a:t>
-            </a:r>
-            <a:endParaRPr kumimoji="0" lang="en-US" sz="1800" b="0" i="0" u="none" strike="noStrike" kern="0" cap="none" spc="0" normalizeH="0" baseline="0" noProof="0" dirty="0">
-              <a:ln>
-                <a:noFill/>
-              </a:ln>
-              <a:effectLst/>
-              <a:uLnTx/>
-              <a:uFillTx/>
-              <a:ea typeface="Arial Unicode MS" pitchFamily="34" charset="-128"/>
-              <a:cs typeface="Arial Unicode MS" pitchFamily="34" charset="-128"/>
-            </a:endParaRPr>
-          </a:p>
-        </p:txBody>
-      </p:sp>
-      <p:sp>
-        <p:nvSpPr>
-          <p:cNvPr id="7" name="Speech Bubble: Rectangle 6">
-            <a:extLst>
-              <a:ext uri="{FF2B5EF4-FFF2-40B4-BE49-F238E27FC236}">
-                <a16:creationId xmlns:a16="http://schemas.microsoft.com/office/drawing/2014/main" id="{D3252AD2-8613-4747-BF6B-F602CCDD2B12}"/>
-              </a:ext>
-            </a:extLst>
-          </p:cNvPr>
-          <p:cNvSpPr/>
-          <p:nvPr/>
-        </p:nvSpPr>
-        <p:spPr bwMode="gray">
-          <a:xfrm>
-            <a:off x="7184753" y="5786111"/>
-            <a:ext cx="4505724" cy="677425"/>
-          </a:xfrm>
-          <a:prstGeom prst="wedgeRectCallout">
-            <a:avLst>
-              <a:gd name="adj1" fmla="val -76679"/>
-              <a:gd name="adj2" fmla="val -43931"/>
-            </a:avLst>
-          </a:prstGeom>
-          <a:ln>
-            <a:headEnd/>
-            <a:tailEnd/>
-          </a:ln>
-        </p:spPr>
-        <p:style>
-          <a:lnRef idx="2">
-            <a:schemeClr val="accent5"/>
-          </a:lnRef>
-          <a:fillRef idx="1">
-            <a:schemeClr val="lt1"/>
-          </a:fillRef>
-          <a:effectRef idx="0">
-            <a:schemeClr val="accent5"/>
-          </a:effectRef>
-          <a:fontRef idx="minor">
-            <a:schemeClr val="dk1"/>
-          </a:fontRef>
-        </p:style>
-        <p:txBody>
-          <a:bodyPr lIns="90000" tIns="72000" rIns="90000" bIns="72000" rtlCol="0" anchor="ctr"/>
-          <a:lstStyle/>
-          <a:p>
-            <a:pPr marR="0" algn="ctr" defTabSz="914400" eaLnBrk="1" fontAlgn="base" latinLnBrk="0" hangingPunct="1">
-              <a:lnSpc>
-                <a:spcPct val="100000"/>
-              </a:lnSpc>
-              <a:spcBef>
-                <a:spcPct val="50000"/>
-              </a:spcBef>
-              <a:spcAft>
-                <a:spcPct val="0"/>
-              </a:spcAft>
-              <a:buClr>
-                <a:srgbClr val="F0AB00"/>
-              </a:buClr>
-              <a:buSzPct val="80000"/>
-              <a:tabLst/>
-            </a:pPr>
-            <a:r>
-              <a:rPr lang="en-US" sz="1800" kern="0" dirty="0">
-                <a:ea typeface="Arial Unicode MS" pitchFamily="34" charset="-128"/>
-                <a:cs typeface="Arial Unicode MS" pitchFamily="34" charset="-128"/>
-              </a:rPr>
-              <a:t>Traffic to /</a:t>
-            </a:r>
-            <a:r>
-              <a:rPr lang="en-US" sz="1800" b="1" kern="0" dirty="0">
-                <a:ea typeface="Arial Unicode MS" pitchFamily="34" charset="-128"/>
-                <a:cs typeface="Arial Unicode MS" pitchFamily="34" charset="-128"/>
-              </a:rPr>
-              <a:t>your </a:t>
-            </a:r>
-            <a:r>
-              <a:rPr lang="en-US" sz="1800" kern="0" dirty="0">
-                <a:ea typeface="Arial Unicode MS" pitchFamily="34" charset="-128"/>
-                <a:cs typeface="Arial Unicode MS" pitchFamily="34" charset="-128"/>
-              </a:rPr>
-              <a:t>is forwarded to service </a:t>
-            </a:r>
-            <a:r>
-              <a:rPr lang="en-US" sz="1800" b="1" kern="0" dirty="0" err="1">
-                <a:ea typeface="Arial Unicode MS" pitchFamily="34" charset="-128"/>
-                <a:cs typeface="Arial Unicode MS" pitchFamily="34" charset="-128"/>
-              </a:rPr>
-              <a:t>yournginx</a:t>
-            </a:r>
-            <a:r>
-              <a:rPr lang="en-US" sz="1800" b="1" kern="0" dirty="0">
-                <a:ea typeface="Arial Unicode MS" pitchFamily="34" charset="-128"/>
-                <a:cs typeface="Arial Unicode MS" pitchFamily="34" charset="-128"/>
-              </a:rPr>
-              <a:t>-service</a:t>
-            </a:r>
-            <a:r>
-              <a:rPr lang="en-US" sz="1800" kern="0" dirty="0">
-                <a:ea typeface="Arial Unicode MS" pitchFamily="34" charset="-128"/>
-                <a:cs typeface="Arial Unicode MS" pitchFamily="34" charset="-128"/>
-              </a:rPr>
-              <a:t> on port 80</a:t>
-            </a:r>
-            <a:endParaRPr kumimoji="0" lang="en-US" sz="1800" b="0" i="0" u="none" strike="noStrike" kern="0" cap="none" spc="0" normalizeH="0" baseline="0" noProof="0" dirty="0">
-              <a:ln>
-                <a:noFill/>
-              </a:ln>
-              <a:effectLst/>
-              <a:uLnTx/>
-              <a:uFillTx/>
-              <a:ea typeface="Arial Unicode MS" pitchFamily="34" charset="-128"/>
-              <a:cs typeface="Arial Unicode MS" pitchFamily="34" charset="-128"/>
-            </a:endParaRPr>
-          </a:p>
-        </p:txBody>
-      </p:sp>
-      <p:sp>
-        <p:nvSpPr>
-          <p:cNvPr id="9" name="Speech Bubble: Rectangle 8">
-            <a:extLst>
-              <a:ext uri="{FF2B5EF4-FFF2-40B4-BE49-F238E27FC236}">
-                <a16:creationId xmlns:a16="http://schemas.microsoft.com/office/drawing/2014/main" id="{7B87B546-ECB0-49D7-A71D-665AC122632A}"/>
-              </a:ext>
-            </a:extLst>
-          </p:cNvPr>
-          <p:cNvSpPr/>
-          <p:nvPr/>
-        </p:nvSpPr>
-        <p:spPr bwMode="gray">
-          <a:xfrm>
-            <a:off x="7184753" y="1595111"/>
-            <a:ext cx="4505724" cy="677425"/>
-          </a:xfrm>
-          <a:prstGeom prst="wedgeRectCallout">
-            <a:avLst>
-              <a:gd name="adj1" fmla="val -73263"/>
-              <a:gd name="adj2" fmla="val 64322"/>
-            </a:avLst>
-          </a:prstGeom>
-          <a:ln>
-            <a:headEnd/>
-            <a:tailEnd/>
-          </a:ln>
-        </p:spPr>
-        <p:style>
-          <a:lnRef idx="2">
-            <a:schemeClr val="accent5"/>
-          </a:lnRef>
-          <a:fillRef idx="1">
-            <a:schemeClr val="lt1"/>
-          </a:fillRef>
-          <a:effectRef idx="0">
-            <a:schemeClr val="accent5"/>
-          </a:effectRef>
-          <a:fontRef idx="minor">
-            <a:schemeClr val="dk1"/>
-          </a:fontRef>
-        </p:style>
-        <p:txBody>
-          <a:bodyPr lIns="90000" tIns="72000" rIns="90000" bIns="72000" rtlCol="0" anchor="ctr"/>
-          <a:lstStyle/>
-          <a:p>
-            <a:pPr marR="0" algn="ctr" defTabSz="914400" eaLnBrk="1" fontAlgn="base" latinLnBrk="0" hangingPunct="1">
-              <a:lnSpc>
-                <a:spcPct val="100000"/>
-              </a:lnSpc>
-              <a:spcBef>
-                <a:spcPct val="50000"/>
-              </a:spcBef>
-              <a:spcAft>
-                <a:spcPct val="0"/>
-              </a:spcAft>
-              <a:buClr>
-                <a:srgbClr val="F0AB00"/>
-              </a:buClr>
-              <a:buSzPct val="80000"/>
-              <a:tabLst/>
-            </a:pPr>
-            <a:r>
-              <a:rPr lang="en-US" sz="1800" kern="0" dirty="0">
-                <a:ea typeface="Arial Unicode MS" pitchFamily="34" charset="-128"/>
-                <a:cs typeface="Arial Unicode MS" pitchFamily="34" charset="-128"/>
-              </a:rPr>
-              <a:t>Annotation is required to route traffic to </a:t>
-            </a:r>
-            <a:r>
-              <a:rPr lang="en-US" sz="1800" b="1" kern="0" dirty="0">
-                <a:ea typeface="Arial Unicode MS" pitchFamily="34" charset="-128"/>
-                <a:cs typeface="Arial Unicode MS" pitchFamily="34" charset="-128"/>
-              </a:rPr>
-              <a:t>/index.html </a:t>
-            </a:r>
-            <a:r>
-              <a:rPr lang="en-US" sz="1800" kern="0" dirty="0">
-                <a:ea typeface="Arial Unicode MS" pitchFamily="34" charset="-128"/>
-                <a:cs typeface="Arial Unicode MS" pitchFamily="34" charset="-128"/>
-              </a:rPr>
-              <a:t>and not </a:t>
-            </a:r>
-            <a:r>
-              <a:rPr lang="en-US" sz="1800" b="1" kern="0" dirty="0">
-                <a:ea typeface="Arial Unicode MS" pitchFamily="34" charset="-128"/>
-                <a:cs typeface="Arial Unicode MS" pitchFamily="34" charset="-128"/>
-              </a:rPr>
-              <a:t>/my/index.html</a:t>
-            </a:r>
-            <a:endParaRPr kumimoji="0" lang="en-US" sz="1800" b="1" i="0" u="none" strike="noStrike" kern="0" cap="none" spc="0" normalizeH="0" baseline="0" noProof="0" dirty="0">
-              <a:ln>
-                <a:noFill/>
-              </a:ln>
-              <a:effectLst/>
-              <a:uLnTx/>
-              <a:uFillTx/>
-              <a:ea typeface="Arial Unicode MS" pitchFamily="34" charset="-128"/>
-              <a:cs typeface="Arial Unicode MS" pitchFamily="34" charset="-128"/>
-            </a:endParaRPr>
-          </a:p>
-        </p:txBody>
-      </p:sp>
-    </p:spTree>
-    <p:extLst>
-      <p:ext uri="{BB962C8B-B14F-4D97-AF65-F5344CB8AC3E}">
-        <p14:creationId xmlns:p14="http://schemas.microsoft.com/office/powerpoint/2010/main" val="3073656613"/>
       </p:ext>
     </p:extLst>
   </p:cSld>

</xml_diff>

<commit_message>
slide 4, fix arrow from ingress resource
</commit_message>
<xml_diff>
--- a/kubernetes/09_ingress.pptx
+++ b/kubernetes/09_ingress.pptx
@@ -26313,15 +26313,15 @@
             </a:extLst>
           </p:cNvPr>
           <p:cNvCxnSpPr>
-            <a:stCxn id="31" idx="3"/>
+            <a:cxnSpLocks/>
             <a:endCxn id="29" idx="1"/>
           </p:cNvCxnSpPr>
           <p:nvPr/>
         </p:nvCxnSpPr>
         <p:spPr>
           <a:xfrm>
-            <a:off x="6452214" y="4866661"/>
-            <a:ext cx="1661397" cy="837"/>
+            <a:off x="6442745" y="3951215"/>
+            <a:ext cx="1670866" cy="916283"/>
           </a:xfrm>
           <a:prstGeom prst="line">
             <a:avLst/>

</xml_diff>

<commit_message>
add cert manager references
</commit_message>
<xml_diff>
--- a/kubernetes/09_ingress.pptx
+++ b/kubernetes/09_ingress.pptx
@@ -2792,16 +2792,12 @@
               <a:defRPr/>
             </a:pPr>
             <a:r>
+              <a:rPr lang="en-US" baseline="0" dirty="0" err="1"/>
+              <a:t>Kubectl</a:t>
+            </a:r>
+            <a:r>
               <a:rPr lang="en-US" baseline="0" dirty="0"/>
-              <a:t>Open the URL in a browser, ignore the </a:t>
-            </a:r>
-            <a:r>
-              <a:rPr lang="en-US" baseline="0" dirty="0" err="1"/>
-              <a:t>ssl</a:t>
-            </a:r>
-            <a:r>
-              <a:rPr lang="en-US" baseline="0" dirty="0"/>
-              <a:t> error as it is self-signed</a:t>
+              <a:t> describe ingress &lt;ingress-name&gt; -&gt; show the events for this ingress and point to the cert-manager events to provision the secret</a:t>
             </a:r>
           </a:p>
           <a:p>
@@ -2824,6 +2820,29 @@
             </a:pPr>
             <a:r>
               <a:rPr lang="en-US" baseline="0" dirty="0"/>
+              <a:t>Open the URL in a browser, show the certificate – it should be issued by let’s encrypt. </a:t>
+            </a:r>
+          </a:p>
+          <a:p>
+            <a:pPr marL="285750" marR="0" lvl="0" indent="-285750" algn="l" defTabSz="1088776" rtl="0" eaLnBrk="1" fontAlgn="auto" latinLnBrk="0" hangingPunct="1">
+              <a:lnSpc>
+                <a:spcPct val="100000"/>
+              </a:lnSpc>
+              <a:spcBef>
+                <a:spcPts val="0"/>
+              </a:spcBef>
+              <a:spcAft>
+                <a:spcPts val="0"/>
+              </a:spcAft>
+              <a:buClrTx/>
+              <a:buSzTx/>
+              <a:buFontTx/>
+              <a:buChar char="-"/>
+              <a:tabLst/>
+              <a:defRPr/>
+            </a:pPr>
+            <a:r>
+              <a:rPr lang="en-US" baseline="0" dirty="0"/>
               <a:t>Go to the </a:t>
             </a:r>
             <a:r>
@@ -2881,6 +2900,94 @@
               <a:rPr lang="en-US" baseline="0" dirty="0"/>
               <a:t> container.</a:t>
             </a:r>
+          </a:p>
+          <a:p>
+            <a:pPr marL="0" marR="0" lvl="0" indent="0" algn="l" defTabSz="1088776" rtl="0" eaLnBrk="1" fontAlgn="auto" latinLnBrk="0" hangingPunct="1">
+              <a:lnSpc>
+                <a:spcPct val="100000"/>
+              </a:lnSpc>
+              <a:spcBef>
+                <a:spcPts val="0"/>
+              </a:spcBef>
+              <a:spcAft>
+                <a:spcPts val="0"/>
+              </a:spcAft>
+              <a:buClrTx/>
+              <a:buSzTx/>
+              <a:buFontTx/>
+              <a:buNone/>
+              <a:tabLst/>
+              <a:defRPr/>
+            </a:pPr>
+            <a:endParaRPr lang="en-US" baseline="0" dirty="0"/>
+          </a:p>
+          <a:p>
+            <a:pPr marL="0" marR="0" lvl="0" indent="0" algn="l" defTabSz="1088776" rtl="0" eaLnBrk="1" fontAlgn="auto" latinLnBrk="0" hangingPunct="1">
+              <a:lnSpc>
+                <a:spcPct val="100000"/>
+              </a:lnSpc>
+              <a:spcBef>
+                <a:spcPts val="0"/>
+              </a:spcBef>
+              <a:spcAft>
+                <a:spcPts val="0"/>
+              </a:spcAft>
+              <a:buClrTx/>
+              <a:buSzTx/>
+              <a:buFontTx/>
+              <a:buNone/>
+              <a:tabLst/>
+              <a:defRPr/>
+            </a:pPr>
+            <a:r>
+              <a:rPr lang="en-US" baseline="0" dirty="0"/>
+              <a:t>Cert manager </a:t>
+            </a:r>
+            <a:r>
+              <a:rPr lang="en-US" baseline="0"/>
+              <a:t>tutorial: </a:t>
+            </a:r>
+            <a:r>
+              <a:rPr lang="de-DE" sz="1400" b="0" u="sng" kern="1200">
+                <a:solidFill>
+                  <a:schemeClr val="tx1"/>
+                </a:solidFill>
+                <a:effectLst/>
+                <a:latin typeface="+mn-lt"/>
+                <a:ea typeface="+mn-ea"/>
+                <a:cs typeface="+mn-cs"/>
+              </a:rPr>
+              <a:t>https://gardener.cloud/050-tutorials/content/howto/x509_certificates/</a:t>
+            </a:r>
+            <a:endParaRPr lang="de-DE" sz="1400" b="0" kern="1200">
+              <a:solidFill>
+                <a:schemeClr val="tx1"/>
+              </a:solidFill>
+              <a:effectLst/>
+              <a:latin typeface="+mn-lt"/>
+              <a:ea typeface="+mn-ea"/>
+              <a:cs typeface="+mn-cs"/>
+            </a:endParaRPr>
+          </a:p>
+          <a:p>
+            <a:pPr marL="0" marR="0" lvl="0" indent="0" algn="l" defTabSz="1088776" rtl="0" eaLnBrk="1" fontAlgn="auto" latinLnBrk="0" hangingPunct="1">
+              <a:lnSpc>
+                <a:spcPct val="100000"/>
+              </a:lnSpc>
+              <a:spcBef>
+                <a:spcPts val="0"/>
+              </a:spcBef>
+              <a:spcAft>
+                <a:spcPts val="0"/>
+              </a:spcAft>
+              <a:buClrTx/>
+              <a:buSzTx/>
+              <a:buFontTx/>
+              <a:buNone/>
+              <a:tabLst/>
+              <a:defRPr/>
+            </a:pPr>
+            <a:endParaRPr lang="en-US" baseline="0" dirty="0"/>
           </a:p>
         </p:txBody>
       </p:sp>
@@ -3632,7 +3739,7 @@
   <p:clrMapOvr>
     <a:masterClrMapping/>
   </p:clrMapOvr>
-  <p:extLst mod="1">
+  <p:extLst>
     <p:ext uri="{DCECCB84-F9BA-43D5-87BE-67443E8EF086}">
       <p15:sldGuideLst xmlns:p15="http://schemas.microsoft.com/office/powerpoint/2012/main"/>
     </p:ext>
@@ -6523,7 +6630,7 @@
   <p:clrMapOvr>
     <a:masterClrMapping/>
   </p:clrMapOvr>
-  <p:extLst mod="1">
+  <p:extLst>
     <p:ext uri="{DCECCB84-F9BA-43D5-87BE-67443E8EF086}">
       <p15:sldGuideLst xmlns:p15="http://schemas.microsoft.com/office/powerpoint/2012/main"/>
     </p:ext>
@@ -6700,7 +6807,7 @@
   <p:clrMapOvr>
     <a:masterClrMapping/>
   </p:clrMapOvr>
-  <p:extLst mod="1">
+  <p:extLst>
     <p:ext uri="{DCECCB84-F9BA-43D5-87BE-67443E8EF086}">
       <p15:sldGuideLst xmlns:p15="http://schemas.microsoft.com/office/powerpoint/2012/main"/>
     </p:ext>
@@ -14497,7 +14604,7 @@
   <p:clrMapOvr>
     <a:masterClrMapping/>
   </p:clrMapOvr>
-  <p:extLst mod="1">
+  <p:extLst>
     <p:ext uri="{DCECCB84-F9BA-43D5-87BE-67443E8EF086}">
       <p15:sldGuideLst xmlns:p15="http://schemas.microsoft.com/office/powerpoint/2012/main"/>
     </p:ext>
@@ -14922,7 +15029,7 @@
   <p:clrMapOvr>
     <a:masterClrMapping/>
   </p:clrMapOvr>
-  <p:extLst mod="1">
+  <p:extLst>
     <p:ext uri="{DCECCB84-F9BA-43D5-87BE-67443E8EF086}">
       <p15:sldGuideLst xmlns:p15="http://schemas.microsoft.com/office/powerpoint/2012/main"/>
     </p:ext>
@@ -16278,7 +16385,7 @@
       </a:lvl9pPr>
     </p:otherStyle>
   </p:txStyles>
-  <p:extLst mod="1">
+  <p:extLst>
     <p:ext uri="{27BBF7A9-308A-43DC-89C8-2F10F3537804}">
       <p15:sldGuideLst xmlns:p15="http://schemas.microsoft.com/office/powerpoint/2012/main"/>
     </p:ext>

</xml_diff>